<commit_message>
add github link; consolas for links
</commit_message>
<xml_diff>
--- a/poster.pptx
+++ b/poster.pptx
@@ -243,7 +243,7 @@
             <a:fld id="{4DB31F7E-24C3-4F74-B155-4FAB7B65A36F}" type="datetime1">
               <a:rPr lang="en-US" altLang="he-IL"/>
               <a:pPr/>
-              <a:t>6/7/2015</a:t>
+              <a:t>6/8/2015</a:t>
             </a:fld>
             <a:endParaRPr lang="en-US" altLang="he-IL"/>
           </a:p>
@@ -4528,8 +4528,8 @@
           </a:extLst>
         </p:spPr>
       </p:pic>
-      <mc:AlternateContent xmlns:mc="http://schemas.openxmlformats.org/markup-compatibility/2006">
-        <mc:Choice xmlns:a14="http://schemas.microsoft.com/office/drawing/2010/main" Requires="a14">
+      <mc:AlternateContent xmlns:mc="http://schemas.openxmlformats.org/markup-compatibility/2006" xmlns:a14="http://schemas.microsoft.com/office/drawing/2010/main">
+        <mc:Choice Requires="a14">
           <p:sp>
             <p:nvSpPr>
               <p:cNvPr id="51" name="Text Box 11"/>
@@ -5305,7 +5305,7 @@
             </p:txBody>
           </p:sp>
         </mc:Choice>
-        <mc:Fallback>
+        <mc:Fallback xmlns="">
           <p:sp>
             <p:nvSpPr>
               <p:cNvPr id="51" name="Text Box 11"/>
@@ -5627,8 +5627,8 @@
           </a:p>
         </p:txBody>
       </p:sp>
-      <mc:AlternateContent xmlns:mc="http://schemas.openxmlformats.org/markup-compatibility/2006">
-        <mc:Choice xmlns:a14="http://schemas.microsoft.com/office/drawing/2010/main" Requires="a14">
+      <mc:AlternateContent xmlns:mc="http://schemas.openxmlformats.org/markup-compatibility/2006" xmlns:a14="http://schemas.microsoft.com/office/drawing/2010/main">
+        <mc:Choice Requires="a14">
           <p:sp>
             <p:nvSpPr>
               <p:cNvPr id="14340" name="Text Box 11"/>
@@ -5823,17 +5823,8 @@
                   <a:rPr lang="en-US" sz="2500" dirty="0">
                     <a:latin typeface="Times New Roman" pitchFamily="18" charset="0"/>
                   </a:rPr>
-                  <a:t>-Roberts model</a:t>
+                  <a:t>-Roberts model:</a:t>
                 </a:r>
-                <a:r>
-                  <a:rPr lang="en-US" sz="2500" dirty="0">
-                    <a:latin typeface="Times New Roman" pitchFamily="18" charset="0"/>
-                  </a:rPr>
-                  <a:t>:</a:t>
-                </a:r>
-                <a:endParaRPr lang="en-US" sz="2500" dirty="0">
-                  <a:latin typeface="Times New Roman" pitchFamily="18" charset="0"/>
-                </a:endParaRPr>
               </a:p>
               <a:p>
                 <a:endParaRPr lang="en-US" sz="2400" i="1" dirty="0">
@@ -6020,7 +6011,7 @@
                         <m:dPr>
                           <m:ctrlPr>
                             <a:rPr lang="en-US" sz="2500" i="1">
-                              <a:latin typeface="Cambria Math" panose="02040503050406030204" pitchFamily="18" charset="0"/>
+                              <a:latin typeface="Cambria Math"/>
                               <a:ea typeface="Cambria Math" panose="02040503050406030204" pitchFamily="18" charset="0"/>
                             </a:rPr>
                           </m:ctrlPr>
@@ -6368,9 +6359,6 @@
                   </a:rPr>
                   <a:t>. adjustment rate</a:t>
                 </a:r>
-                <a:endParaRPr lang="en-US" altLang="he-IL" sz="2000" dirty="0" smtClean="0">
-                  <a:latin typeface="Times New Roman" pitchFamily="18" charset="0"/>
-                </a:endParaRPr>
               </a:p>
               <a:p>
                 <a:pPr eaLnBrk="1" hangingPunct="1">
@@ -6385,7 +6373,7 @@
             </p:txBody>
           </p:sp>
         </mc:Choice>
-        <mc:Fallback>
+        <mc:Fallback xmlns="">
           <p:sp>
             <p:nvSpPr>
               <p:cNvPr id="14340" name="Text Box 11"/>
@@ -6597,8 +6585,8 @@
           </a:p>
         </p:txBody>
       </p:sp>
-      <mc:AlternateContent xmlns:mc="http://schemas.openxmlformats.org/markup-compatibility/2006">
-        <mc:Choice xmlns:a14="http://schemas.microsoft.com/office/drawing/2010/main" Requires="a14">
+      <mc:AlternateContent xmlns:mc="http://schemas.openxmlformats.org/markup-compatibility/2006" xmlns:a14="http://schemas.microsoft.com/office/drawing/2010/main">
+        <mc:Choice Requires="a14">
           <p:sp>
             <p:nvSpPr>
               <p:cNvPr id="14342" name="Text Box 12"/>
@@ -7124,7 +7112,7 @@
             </p:txBody>
           </p:sp>
         </mc:Choice>
-        <mc:Fallback>
+        <mc:Fallback xmlns="">
           <p:sp>
             <p:nvSpPr>
               <p:cNvPr id="14342" name="Text Box 12"/>
@@ -8695,7 +8683,7 @@
         </p:blipFill>
         <p:spPr bwMode="auto">
           <a:xfrm>
-            <a:off x="24538923" y="38008120"/>
+            <a:off x="24538923" y="38122420"/>
             <a:ext cx="1339140" cy="1657351"/>
           </a:xfrm>
           <a:prstGeom prst="rect">
@@ -8734,7 +8722,7 @@
         </p:nvSpPr>
         <p:spPr>
           <a:xfrm>
-            <a:off x="26136728" y="38008120"/>
+            <a:off x="26136728" y="38179570"/>
             <a:ext cx="2674130" cy="1384995"/>
           </a:xfrm>
           <a:prstGeom prst="rect">
@@ -9358,280 +9346,6 @@
           </a:extLst>
         </p:spPr>
       </p:pic>
-      <p:grpSp>
-        <p:nvGrpSpPr>
-          <p:cNvPr id="63" name="Group 62"/>
-          <p:cNvGrpSpPr/>
-          <p:nvPr/>
-        </p:nvGrpSpPr>
-        <p:grpSpPr>
-          <a:xfrm>
-            <a:off x="20416245" y="38403010"/>
-            <a:ext cx="4006476" cy="1384995"/>
-            <a:chOff x="1026840" y="5356373"/>
-            <a:chExt cx="4913312" cy="1384995"/>
-          </a:xfrm>
-        </p:grpSpPr>
-        <p:pic>
-          <p:nvPicPr>
-            <p:cNvPr id="64" name="Picture 1"/>
-            <p:cNvPicPr>
-              <a:picLocks noChangeAspect="1" noChangeArrowheads="1"/>
-            </p:cNvPicPr>
-            <p:nvPr/>
-          </p:nvPicPr>
-          <p:blipFill>
-            <a:blip r:embed="rId27">
-              <a:extLst>
-                <a:ext uri="{28A0092B-C50C-407E-A947-70E740481C1C}">
-                  <a14:useLocalDpi xmlns:a14="http://schemas.microsoft.com/office/drawing/2010/main" val="0"/>
-                </a:ext>
-              </a:extLst>
-            </a:blip>
-            <a:srcRect/>
-            <a:stretch>
-              <a:fillRect/>
-            </a:stretch>
-          </p:blipFill>
-          <p:spPr bwMode="auto">
-            <a:xfrm>
-              <a:off x="1026840" y="5932512"/>
-              <a:ext cx="304800" cy="304800"/>
-            </a:xfrm>
-            <a:prstGeom prst="rect">
-              <a:avLst/>
-            </a:prstGeom>
-            <a:noFill/>
-            <a:ln>
-              <a:noFill/>
-            </a:ln>
-            <a:effectLst/>
-            <a:extLst>
-              <a:ext uri="{909E8E84-426E-40DD-AFC4-6F175D3DCCD1}">
-                <a14:hiddenFill xmlns:a14="http://schemas.microsoft.com/office/drawing/2010/main">
-                  <a:solidFill>
-                    <a:schemeClr val="accent1"/>
-                  </a:solidFill>
-                </a14:hiddenFill>
-              </a:ext>
-              <a:ext uri="{91240B29-F687-4F45-9708-019B960494DF}">
-                <a14:hiddenLine xmlns:a14="http://schemas.microsoft.com/office/drawing/2010/main" w="9525">
-                  <a:solidFill>
-                    <a:schemeClr val="tx1"/>
-                  </a:solidFill>
-                  <a:miter lim="800000"/>
-                  <a:headEnd/>
-                  <a:tailEnd/>
-                </a14:hiddenLine>
-              </a:ext>
-              <a:ext uri="{AF507438-7753-43E0-B8FC-AC1667EBCBE1}">
-                <a14:hiddenEffects xmlns:a14="http://schemas.microsoft.com/office/drawing/2010/main">
-                  <a:effectLst>
-                    <a:outerShdw dist="35921" dir="2700000" algn="ctr" rotWithShape="0">
-                      <a:schemeClr val="bg2"/>
-                    </a:outerShdw>
-                  </a:effectLst>
-                </a14:hiddenEffects>
-              </a:ext>
-            </a:extLst>
-          </p:spPr>
-        </p:pic>
-        <p:pic>
-          <p:nvPicPr>
-            <p:cNvPr id="65" name="Picture 2"/>
-            <p:cNvPicPr>
-              <a:picLocks noChangeAspect="1" noChangeArrowheads="1"/>
-            </p:cNvPicPr>
-            <p:nvPr/>
-          </p:nvPicPr>
-          <p:blipFill>
-            <a:blip r:embed="rId28">
-              <a:extLst>
-                <a:ext uri="{28A0092B-C50C-407E-A947-70E740481C1C}">
-                  <a14:useLocalDpi xmlns:a14="http://schemas.microsoft.com/office/drawing/2010/main" val="0"/>
-                </a:ext>
-              </a:extLst>
-            </a:blip>
-            <a:srcRect/>
-            <a:stretch>
-              <a:fillRect/>
-            </a:stretch>
-          </p:blipFill>
-          <p:spPr bwMode="auto">
-            <a:xfrm>
-              <a:off x="1026840" y="5500464"/>
-              <a:ext cx="304800" cy="304800"/>
-            </a:xfrm>
-            <a:prstGeom prst="rect">
-              <a:avLst/>
-            </a:prstGeom>
-            <a:noFill/>
-            <a:ln>
-              <a:noFill/>
-            </a:ln>
-            <a:effectLst/>
-            <a:extLst>
-              <a:ext uri="{909E8E84-426E-40DD-AFC4-6F175D3DCCD1}">
-                <a14:hiddenFill xmlns:a14="http://schemas.microsoft.com/office/drawing/2010/main">
-                  <a:solidFill>
-                    <a:schemeClr val="accent1"/>
-                  </a:solidFill>
-                </a14:hiddenFill>
-              </a:ext>
-              <a:ext uri="{91240B29-F687-4F45-9708-019B960494DF}">
-                <a14:hiddenLine xmlns:a14="http://schemas.microsoft.com/office/drawing/2010/main" w="9525">
-                  <a:solidFill>
-                    <a:schemeClr val="tx1"/>
-                  </a:solidFill>
-                  <a:miter lim="800000"/>
-                  <a:headEnd/>
-                  <a:tailEnd/>
-                </a14:hiddenLine>
-              </a:ext>
-              <a:ext uri="{AF507438-7753-43E0-B8FC-AC1667EBCBE1}">
-                <a14:hiddenEffects xmlns:a14="http://schemas.microsoft.com/office/drawing/2010/main">
-                  <a:effectLst>
-                    <a:outerShdw dist="35921" dir="2700000" algn="ctr" rotWithShape="0">
-                      <a:schemeClr val="bg2"/>
-                    </a:outerShdw>
-                  </a:effectLst>
-                </a14:hiddenEffects>
-              </a:ext>
-            </a:extLst>
-          </p:spPr>
-        </p:pic>
-        <p:pic>
-          <p:nvPicPr>
-            <p:cNvPr id="66" name="Picture 3"/>
-            <p:cNvPicPr>
-              <a:picLocks noChangeAspect="1" noChangeArrowheads="1"/>
-            </p:cNvPicPr>
-            <p:nvPr/>
-          </p:nvPicPr>
-          <p:blipFill>
-            <a:blip r:embed="rId29">
-              <a:extLst>
-                <a:ext uri="{28A0092B-C50C-407E-A947-70E740481C1C}">
-                  <a14:useLocalDpi xmlns:a14="http://schemas.microsoft.com/office/drawing/2010/main" val="0"/>
-                </a:ext>
-              </a:extLst>
-            </a:blip>
-            <a:srcRect/>
-            <a:stretch>
-              <a:fillRect/>
-            </a:stretch>
-          </p:blipFill>
-          <p:spPr bwMode="auto">
-            <a:xfrm>
-              <a:off x="1026840" y="6309320"/>
-              <a:ext cx="304800" cy="304800"/>
-            </a:xfrm>
-            <a:prstGeom prst="rect">
-              <a:avLst/>
-            </a:prstGeom>
-            <a:noFill/>
-            <a:ln>
-              <a:noFill/>
-            </a:ln>
-            <a:effectLst/>
-            <a:extLst>
-              <a:ext uri="{909E8E84-426E-40DD-AFC4-6F175D3DCCD1}">
-                <a14:hiddenFill xmlns:a14="http://schemas.microsoft.com/office/drawing/2010/main">
-                  <a:solidFill>
-                    <a:schemeClr val="accent1"/>
-                  </a:solidFill>
-                </a14:hiddenFill>
-              </a:ext>
-              <a:ext uri="{91240B29-F687-4F45-9708-019B960494DF}">
-                <a14:hiddenLine xmlns:a14="http://schemas.microsoft.com/office/drawing/2010/main" w="9525">
-                  <a:solidFill>
-                    <a:schemeClr val="tx1"/>
-                  </a:solidFill>
-                  <a:miter lim="800000"/>
-                  <a:headEnd/>
-                  <a:tailEnd/>
-                </a14:hiddenLine>
-              </a:ext>
-              <a:ext uri="{AF507438-7753-43E0-B8FC-AC1667EBCBE1}">
-                <a14:hiddenEffects xmlns:a14="http://schemas.microsoft.com/office/drawing/2010/main">
-                  <a:effectLst>
-                    <a:outerShdw dist="35921" dir="2700000" algn="ctr" rotWithShape="0">
-                      <a:schemeClr val="bg2"/>
-                    </a:outerShdw>
-                  </a:effectLst>
-                </a14:hiddenEffects>
-              </a:ext>
-            </a:extLst>
-          </p:spPr>
-        </p:pic>
-        <p:sp>
-          <p:nvSpPr>
-            <p:cNvPr id="67" name="Rectangle 66"/>
-            <p:cNvSpPr/>
-            <p:nvPr/>
-          </p:nvSpPr>
-          <p:spPr>
-            <a:xfrm>
-              <a:off x="1368152" y="5356373"/>
-              <a:ext cx="4572000" cy="1384995"/>
-            </a:xfrm>
-            <a:prstGeom prst="rect">
-              <a:avLst/>
-            </a:prstGeom>
-          </p:spPr>
-          <p:txBody>
-            <a:bodyPr>
-              <a:spAutoFit/>
-            </a:bodyPr>
-            <a:lstStyle/>
-            <a:p>
-              <a:pPr algn="l" rtl="0"/>
-              <a:r>
-                <a:rPr lang="en-US" sz="2800" b="1" dirty="0" smtClean="0">
-                  <a:latin typeface="+mn-lt"/>
-                  <a:ea typeface="Dotum" panose="020B0600000101010101" pitchFamily="34" charset="-127"/>
-                </a:rPr>
-                <a:t>yoav@yoavram.com</a:t>
-              </a:r>
-              <a:endParaRPr lang="en-US" sz="2800" b="1" dirty="0">
-                <a:latin typeface="+mn-lt"/>
-                <a:ea typeface="Dotum" panose="020B0600000101010101" pitchFamily="34" charset="-127"/>
-              </a:endParaRPr>
-            </a:p>
-            <a:p>
-              <a:pPr algn="l" rtl="0"/>
-              <a:r>
-                <a:rPr lang="en-US" sz="2800" b="1" dirty="0" smtClean="0">
-                  <a:latin typeface="+mn-lt"/>
-                  <a:ea typeface="Dotum" panose="020B0600000101010101" pitchFamily="34" charset="-127"/>
-                </a:rPr>
-                <a:t>@</a:t>
-              </a:r>
-              <a:r>
-                <a:rPr lang="en-US" sz="2800" b="1" dirty="0">
-                  <a:latin typeface="+mn-lt"/>
-                  <a:ea typeface="Dotum" panose="020B0600000101010101" pitchFamily="34" charset="-127"/>
-                </a:rPr>
-                <a:t>yoavram</a:t>
-              </a:r>
-            </a:p>
-            <a:p>
-              <a:pPr algn="l" rtl="0"/>
-              <a:r>
-                <a:rPr lang="en-US" sz="2800" b="1" dirty="0" smtClean="0">
-                  <a:latin typeface="+mn-lt"/>
-                  <a:ea typeface="Dotum" panose="020B0600000101010101" pitchFamily="34" charset="-127"/>
-                </a:rPr>
-                <a:t>www.yoavram.com</a:t>
-              </a:r>
-              <a:endParaRPr lang="he-IL" sz="2800" b="1" dirty="0">
-                <a:latin typeface="+mn-lt"/>
-                <a:ea typeface="Dotum" panose="020B0600000101010101" pitchFamily="34" charset="-127"/>
-              </a:endParaRPr>
-            </a:p>
-          </p:txBody>
-        </p:sp>
-      </p:grpSp>
       <p:sp>
         <p:nvSpPr>
           <p:cNvPr id="11" name="TextBox 10"/>
@@ -9652,18 +9366,23 @@
           <a:bodyPr wrap="square" rtlCol="1">
             <a:spAutoFit/>
           </a:bodyPr>
-          <a:lstStyle/>
-          <a:p>
-            <a:pPr algn="ctr"/>
-            <a:r>
-              <a:rPr lang="en-US" sz="2500" dirty="0" smtClean="0">
-                <a:latin typeface="+mn-lt"/>
-              </a:rPr>
+          <a:lstStyle>
+            <a:defPPr>
+              <a:defRPr lang="en-US"/>
+            </a:defPPr>
+            <a:lvl1pPr algn="ctr">
+              <a:defRPr sz="2500">
+                <a:latin typeface="Consolas" panose="020B0609020204030204" pitchFamily="49" charset="0"/>
+                <a:cs typeface="Consolas" panose="020B0609020204030204" pitchFamily="49" charset="0"/>
+              </a:defRPr>
+            </a:lvl1pPr>
+          </a:lstStyle>
+          <a:p>
+            <a:r>
+              <a:rPr lang="en-US" dirty="0"/>
               <a:t>plato.yoavram.com</a:t>
             </a:r>
-            <a:endParaRPr lang="he-IL" sz="2500" dirty="0">
-              <a:latin typeface="+mn-lt"/>
-            </a:endParaRPr>
+            <a:endParaRPr lang="he-IL" dirty="0"/>
           </a:p>
         </p:txBody>
       </p:sp>
@@ -9675,8 +9394,8 @@
         </p:nvSpPr>
         <p:spPr>
           <a:xfrm>
-            <a:off x="12420079" y="42095853"/>
-            <a:ext cx="3714750" cy="477054"/>
+            <a:off x="12334354" y="42095853"/>
+            <a:ext cx="4353446" cy="477054"/>
           </a:xfrm>
           <a:prstGeom prst="rect">
             <a:avLst/>
@@ -9692,16 +9411,333 @@
             <a:pPr algn="ctr"/>
             <a:r>
               <a:rPr lang="en-US" sz="2500" dirty="0" smtClean="0">
-                <a:latin typeface="+mn-lt"/>
+                <a:latin typeface="Consolas" panose="020B0609020204030204" pitchFamily="49" charset="0"/>
+                <a:cs typeface="Consolas" panose="020B0609020204030204" pitchFamily="49" charset="0"/>
               </a:rPr>
               <a:t>curveball.yoavram.com</a:t>
             </a:r>
             <a:endParaRPr lang="he-IL" sz="2500" dirty="0">
-              <a:latin typeface="+mn-lt"/>
+              <a:latin typeface="Consolas" panose="020B0609020204030204" pitchFamily="49" charset="0"/>
             </a:endParaRPr>
           </a:p>
         </p:txBody>
       </p:sp>
+      <p:grpSp>
+        <p:nvGrpSpPr>
+          <p:cNvPr id="48" name="Group 47"/>
+          <p:cNvGrpSpPr/>
+          <p:nvPr/>
+        </p:nvGrpSpPr>
+        <p:grpSpPr>
+          <a:xfrm>
+            <a:off x="20266242" y="38344080"/>
+            <a:ext cx="5002971" cy="1815882"/>
+            <a:chOff x="323528" y="5287813"/>
+            <a:chExt cx="5002971" cy="1815882"/>
+          </a:xfrm>
+        </p:grpSpPr>
+        <p:grpSp>
+          <p:nvGrpSpPr>
+            <p:cNvPr id="49" name="Group 48"/>
+            <p:cNvGrpSpPr/>
+            <p:nvPr/>
+          </p:nvGrpSpPr>
+          <p:grpSpPr>
+            <a:xfrm>
+              <a:off x="413187" y="5287813"/>
+              <a:ext cx="4913312" cy="1815882"/>
+              <a:chOff x="1026840" y="5356373"/>
+              <a:chExt cx="4913312" cy="1815882"/>
+            </a:xfrm>
+          </p:grpSpPr>
+          <p:pic>
+            <p:nvPicPr>
+              <p:cNvPr id="52" name="Picture 1"/>
+              <p:cNvPicPr>
+                <a:picLocks noChangeAspect="1" noChangeArrowheads="1"/>
+              </p:cNvPicPr>
+              <p:nvPr/>
+            </p:nvPicPr>
+            <p:blipFill>
+              <a:blip r:embed="rId27">
+                <a:extLst>
+                  <a:ext uri="{28A0092B-C50C-407E-A947-70E740481C1C}">
+                    <a14:useLocalDpi xmlns:a14="http://schemas.microsoft.com/office/drawing/2010/main" val="0"/>
+                  </a:ext>
+                </a:extLst>
+              </a:blip>
+              <a:srcRect/>
+              <a:stretch>
+                <a:fillRect/>
+              </a:stretch>
+            </p:blipFill>
+            <p:spPr bwMode="auto">
+              <a:xfrm>
+                <a:off x="1026840" y="5932512"/>
+                <a:ext cx="304800" cy="304800"/>
+              </a:xfrm>
+              <a:prstGeom prst="rect">
+                <a:avLst/>
+              </a:prstGeom>
+              <a:noFill/>
+              <a:ln>
+                <a:noFill/>
+              </a:ln>
+              <a:effectLst/>
+              <a:extLst>
+                <a:ext uri="{909E8E84-426E-40DD-AFC4-6F175D3DCCD1}">
+                  <a14:hiddenFill xmlns:a14="http://schemas.microsoft.com/office/drawing/2010/main">
+                    <a:solidFill>
+                      <a:schemeClr val="accent1"/>
+                    </a:solidFill>
+                  </a14:hiddenFill>
+                </a:ext>
+                <a:ext uri="{91240B29-F687-4F45-9708-019B960494DF}">
+                  <a14:hiddenLine xmlns:a14="http://schemas.microsoft.com/office/drawing/2010/main" w="9525">
+                    <a:solidFill>
+                      <a:schemeClr val="tx1"/>
+                    </a:solidFill>
+                    <a:miter lim="800000"/>
+                    <a:headEnd/>
+                    <a:tailEnd/>
+                  </a14:hiddenLine>
+                </a:ext>
+                <a:ext uri="{AF507438-7753-43E0-B8FC-AC1667EBCBE1}">
+                  <a14:hiddenEffects xmlns:a14="http://schemas.microsoft.com/office/drawing/2010/main">
+                    <a:effectLst>
+                      <a:outerShdw dist="35921" dir="2700000" algn="ctr" rotWithShape="0">
+                        <a:schemeClr val="bg2"/>
+                      </a:outerShdw>
+                    </a:effectLst>
+                  </a14:hiddenEffects>
+                </a:ext>
+              </a:extLst>
+            </p:spPr>
+          </p:pic>
+          <p:pic>
+            <p:nvPicPr>
+              <p:cNvPr id="53" name="Picture 2"/>
+              <p:cNvPicPr>
+                <a:picLocks noChangeAspect="1" noChangeArrowheads="1"/>
+              </p:cNvPicPr>
+              <p:nvPr/>
+            </p:nvPicPr>
+            <p:blipFill>
+              <a:blip r:embed="rId28">
+                <a:extLst>
+                  <a:ext uri="{28A0092B-C50C-407E-A947-70E740481C1C}">
+                    <a14:useLocalDpi xmlns:a14="http://schemas.microsoft.com/office/drawing/2010/main" val="0"/>
+                  </a:ext>
+                </a:extLst>
+              </a:blip>
+              <a:srcRect/>
+              <a:stretch>
+                <a:fillRect/>
+              </a:stretch>
+            </p:blipFill>
+            <p:spPr bwMode="auto">
+              <a:xfrm>
+                <a:off x="1026840" y="5500464"/>
+                <a:ext cx="304800" cy="304800"/>
+              </a:xfrm>
+              <a:prstGeom prst="rect">
+                <a:avLst/>
+              </a:prstGeom>
+              <a:noFill/>
+              <a:ln>
+                <a:noFill/>
+              </a:ln>
+              <a:effectLst/>
+              <a:extLst>
+                <a:ext uri="{909E8E84-426E-40DD-AFC4-6F175D3DCCD1}">
+                  <a14:hiddenFill xmlns:a14="http://schemas.microsoft.com/office/drawing/2010/main">
+                    <a:solidFill>
+                      <a:schemeClr val="accent1"/>
+                    </a:solidFill>
+                  </a14:hiddenFill>
+                </a:ext>
+                <a:ext uri="{91240B29-F687-4F45-9708-019B960494DF}">
+                  <a14:hiddenLine xmlns:a14="http://schemas.microsoft.com/office/drawing/2010/main" w="9525">
+                    <a:solidFill>
+                      <a:schemeClr val="tx1"/>
+                    </a:solidFill>
+                    <a:miter lim="800000"/>
+                    <a:headEnd/>
+                    <a:tailEnd/>
+                  </a14:hiddenLine>
+                </a:ext>
+                <a:ext uri="{AF507438-7753-43E0-B8FC-AC1667EBCBE1}">
+                  <a14:hiddenEffects xmlns:a14="http://schemas.microsoft.com/office/drawing/2010/main">
+                    <a:effectLst>
+                      <a:outerShdw dist="35921" dir="2700000" algn="ctr" rotWithShape="0">
+                        <a:schemeClr val="bg2"/>
+                      </a:outerShdw>
+                    </a:effectLst>
+                  </a14:hiddenEffects>
+                </a:ext>
+              </a:extLst>
+            </p:spPr>
+          </p:pic>
+          <p:pic>
+            <p:nvPicPr>
+              <p:cNvPr id="54" name="Picture 3"/>
+              <p:cNvPicPr>
+                <a:picLocks noChangeAspect="1" noChangeArrowheads="1"/>
+              </p:cNvPicPr>
+              <p:nvPr/>
+            </p:nvPicPr>
+            <p:blipFill>
+              <a:blip r:embed="rId29">
+                <a:extLst>
+                  <a:ext uri="{28A0092B-C50C-407E-A947-70E740481C1C}">
+                    <a14:useLocalDpi xmlns:a14="http://schemas.microsoft.com/office/drawing/2010/main" val="0"/>
+                  </a:ext>
+                </a:extLst>
+              </a:blip>
+              <a:srcRect/>
+              <a:stretch>
+                <a:fillRect/>
+              </a:stretch>
+            </p:blipFill>
+            <p:spPr bwMode="auto">
+              <a:xfrm>
+                <a:off x="1026840" y="6721152"/>
+                <a:ext cx="304800" cy="304800"/>
+              </a:xfrm>
+              <a:prstGeom prst="rect">
+                <a:avLst/>
+              </a:prstGeom>
+              <a:noFill/>
+              <a:ln>
+                <a:noFill/>
+              </a:ln>
+              <a:effectLst/>
+              <a:extLst>
+                <a:ext uri="{909E8E84-426E-40DD-AFC4-6F175D3DCCD1}">
+                  <a14:hiddenFill xmlns:a14="http://schemas.microsoft.com/office/drawing/2010/main">
+                    <a:solidFill>
+                      <a:schemeClr val="accent1"/>
+                    </a:solidFill>
+                  </a14:hiddenFill>
+                </a:ext>
+                <a:ext uri="{91240B29-F687-4F45-9708-019B960494DF}">
+                  <a14:hiddenLine xmlns:a14="http://schemas.microsoft.com/office/drawing/2010/main" w="9525">
+                    <a:solidFill>
+                      <a:schemeClr val="tx1"/>
+                    </a:solidFill>
+                    <a:miter lim="800000"/>
+                    <a:headEnd/>
+                    <a:tailEnd/>
+                  </a14:hiddenLine>
+                </a:ext>
+                <a:ext uri="{AF507438-7753-43E0-B8FC-AC1667EBCBE1}">
+                  <a14:hiddenEffects xmlns:a14="http://schemas.microsoft.com/office/drawing/2010/main">
+                    <a:effectLst>
+                      <a:outerShdw dist="35921" dir="2700000" algn="ctr" rotWithShape="0">
+                        <a:schemeClr val="bg2"/>
+                      </a:outerShdw>
+                    </a:effectLst>
+                  </a14:hiddenEffects>
+                </a:ext>
+              </a:extLst>
+            </p:spPr>
+          </p:pic>
+          <p:sp>
+            <p:nvSpPr>
+              <p:cNvPr id="55" name="Rectangle 54"/>
+              <p:cNvSpPr/>
+              <p:nvPr/>
+            </p:nvSpPr>
+            <p:spPr>
+              <a:xfrm>
+                <a:off x="1368152" y="5356373"/>
+                <a:ext cx="4572000" cy="1815882"/>
+              </a:xfrm>
+              <a:prstGeom prst="rect">
+                <a:avLst/>
+              </a:prstGeom>
+            </p:spPr>
+            <p:txBody>
+              <a:bodyPr>
+                <a:spAutoFit/>
+              </a:bodyPr>
+              <a:lstStyle/>
+              <a:p>
+                <a:r>
+                  <a:rPr lang="en-US" sz="2800" b="1" dirty="0"/>
+                  <a:t>yoav@yoavram.com</a:t>
+                </a:r>
+              </a:p>
+              <a:p>
+                <a:pPr algn="l" rtl="0"/>
+                <a:r>
+                  <a:rPr lang="en-US" sz="2800" b="1" dirty="0" smtClean="0"/>
+                  <a:t>@</a:t>
+                </a:r>
+                <a:r>
+                  <a:rPr lang="en-US" sz="2800" b="1" dirty="0" err="1" smtClean="0"/>
+                  <a:t>yoavram</a:t>
+                </a:r>
+                <a:endParaRPr lang="en-US" sz="2800" b="1" dirty="0" smtClean="0"/>
+              </a:p>
+              <a:p>
+                <a:pPr algn="l" rtl="0"/>
+                <a:r>
+                  <a:rPr lang="en-US" b="1" dirty="0" smtClean="0"/>
+                  <a:t>@</a:t>
+                </a:r>
+                <a:r>
+                  <a:rPr lang="en-US" sz="2800" b="1" dirty="0" err="1" smtClean="0"/>
+                  <a:t>yoavram</a:t>
+                </a:r>
+                <a:endParaRPr lang="en-US" sz="2800" b="1" dirty="0"/>
+              </a:p>
+              <a:p>
+                <a:pPr algn="l" rtl="0"/>
+                <a:r>
+                  <a:rPr lang="en-US" sz="2800" b="1" dirty="0" smtClean="0"/>
+                  <a:t>www.yoavram.com</a:t>
+                </a:r>
+                <a:endParaRPr lang="he-IL" sz="2800" b="1" dirty="0"/>
+              </a:p>
+            </p:txBody>
+          </p:sp>
+        </p:grpSp>
+        <p:sp>
+          <p:nvSpPr>
+            <p:cNvPr id="50" name="TextBox 49"/>
+            <p:cNvSpPr txBox="1"/>
+            <p:nvPr/>
+          </p:nvSpPr>
+          <p:spPr>
+            <a:xfrm>
+              <a:off x="323528" y="6165304"/>
+              <a:ext cx="341312" cy="461665"/>
+            </a:xfrm>
+            <a:prstGeom prst="rect">
+              <a:avLst/>
+            </a:prstGeom>
+            <a:noFill/>
+          </p:spPr>
+          <p:txBody>
+            <a:bodyPr wrap="square" rtlCol="1">
+              <a:spAutoFit/>
+            </a:bodyPr>
+            <a:lstStyle/>
+            <a:p>
+              <a:r>
+                <a:rPr lang="en-US" sz="2400" dirty="0" smtClean="0">
+                  <a:latin typeface="github-octicons" panose="02000503000000000000" pitchFamily="2" charset="0"/>
+                </a:rPr>
+                <a:t>a</a:t>
+              </a:r>
+              <a:endParaRPr lang="he-IL" sz="2400" dirty="0">
+                <a:latin typeface="github-octicons" panose="02000503000000000000" pitchFamily="2" charset="0"/>
+              </a:endParaRPr>
+            </a:p>
+          </p:txBody>
+        </p:sp>
+      </p:grpSp>
     </p:spTree>
   </p:cSld>
   <p:clrMapOvr>
@@ -9710,75 +9746,7 @@
   <p:timing>
     <p:tnLst>
       <p:par>
-        <p:cTn id="1" dur="indefinite" restart="never" nodeType="tmRoot">
-          <p:childTnLst>
-            <p:seq concurrent="1" nextAc="seek">
-              <p:cTn id="2" dur="indefinite" nodeType="mainSeq">
-                <p:childTnLst>
-                  <p:par>
-                    <p:cTn id="3" fill="hold">
-                      <p:stCondLst>
-                        <p:cond delay="indefinite"/>
-                      </p:stCondLst>
-                      <p:childTnLst>
-                        <p:par>
-                          <p:cTn id="4" fill="hold">
-                            <p:stCondLst>
-                              <p:cond delay="0"/>
-                            </p:stCondLst>
-                            <p:childTnLst>
-                              <p:par>
-                                <p:cTn id="5" presetID="1" presetClass="entr" presetSubtype="0" fill="hold" nodeType="clickEffect">
-                                  <p:stCondLst>
-                                    <p:cond delay="0"/>
-                                  </p:stCondLst>
-                                  <p:childTnLst>
-                                    <p:set>
-                                      <p:cBhvr>
-                                        <p:cTn id="6" dur="1" fill="hold">
-                                          <p:stCondLst>
-                                            <p:cond delay="0"/>
-                                          </p:stCondLst>
-                                        </p:cTn>
-                                        <p:tgtEl>
-                                          <p:spTgt spid="63"/>
-                                        </p:tgtEl>
-                                        <p:attrNameLst>
-                                          <p:attrName>style.visibility</p:attrName>
-                                        </p:attrNameLst>
-                                      </p:cBhvr>
-                                      <p:to>
-                                        <p:strVal val="visible"/>
-                                      </p:to>
-                                    </p:set>
-                                  </p:childTnLst>
-                                </p:cTn>
-                              </p:par>
-                            </p:childTnLst>
-                          </p:cTn>
-                        </p:par>
-                      </p:childTnLst>
-                    </p:cTn>
-                  </p:par>
-                </p:childTnLst>
-              </p:cTn>
-              <p:prevCondLst>
-                <p:cond evt="onPrev" delay="0">
-                  <p:tgtEl>
-                    <p:sldTgt/>
-                  </p:tgtEl>
-                </p:cond>
-              </p:prevCondLst>
-              <p:nextCondLst>
-                <p:cond evt="onNext" delay="0">
-                  <p:tgtEl>
-                    <p:sldTgt/>
-                  </p:tgtEl>
-                </p:cond>
-              </p:nextCondLst>
-            </p:seq>
-          </p:childTnLst>
-        </p:cTn>
+        <p:cTn id="1" dur="indefinite" restart="never" nodeType="tmRoot"/>
       </p:par>
     </p:tnLst>
   </p:timing>

</xml_diff>

<commit_message>
figure formatting, size, font size, position
</commit_message>
<xml_diff>
--- a/poster.pptx
+++ b/poster.pptx
@@ -4434,72 +4434,8 @@
           </a:p>
         </p:txBody>
       </p:sp>
-      <p:pic>
-        <p:nvPicPr>
-          <p:cNvPr id="1051" name="Picture 27"/>
-          <p:cNvPicPr>
-            <a:picLocks noChangeAspect="1" noChangeArrowheads="1"/>
-          </p:cNvPicPr>
-          <p:nvPr/>
-        </p:nvPicPr>
-        <p:blipFill>
-          <a:blip r:embed="rId5">
-            <a:extLst>
-              <a:ext uri="{28A0092B-C50C-407E-A947-70E740481C1C}">
-                <a14:useLocalDpi xmlns:a14="http://schemas.microsoft.com/office/drawing/2010/main" val="0"/>
-              </a:ext>
-            </a:extLst>
-          </a:blip>
-          <a:srcRect/>
-          <a:stretch>
-            <a:fillRect/>
-          </a:stretch>
-        </p:blipFill>
-        <p:spPr bwMode="auto">
-          <a:xfrm>
-            <a:off x="24422720" y="11931277"/>
-            <a:ext cx="4444320" cy="3122810"/>
-          </a:xfrm>
-          <a:prstGeom prst="rect">
-            <a:avLst/>
-          </a:prstGeom>
-          <a:noFill/>
-          <a:ln>
-            <a:noFill/>
-          </a:ln>
-          <a:effectLst/>
-          <a:extLst>
-            <a:ext uri="{909E8E84-426E-40DD-AFC4-6F175D3DCCD1}">
-              <a14:hiddenFill xmlns:a14="http://schemas.microsoft.com/office/drawing/2010/main">
-                <a:solidFill>
-                  <a:schemeClr val="accent1"/>
-                </a:solidFill>
-              </a14:hiddenFill>
-            </a:ext>
-            <a:ext uri="{91240B29-F687-4F45-9708-019B960494DF}">
-              <a14:hiddenLine xmlns:a14="http://schemas.microsoft.com/office/drawing/2010/main" w="9525">
-                <a:solidFill>
-                  <a:schemeClr val="tx1"/>
-                </a:solidFill>
-                <a:miter lim="800000"/>
-                <a:headEnd/>
-                <a:tailEnd/>
-              </a14:hiddenLine>
-            </a:ext>
-            <a:ext uri="{AF507438-7753-43E0-B8FC-AC1667EBCBE1}">
-              <a14:hiddenEffects xmlns:a14="http://schemas.microsoft.com/office/drawing/2010/main">
-                <a:effectLst>
-                  <a:outerShdw dist="35921" dir="2700000" algn="ctr" rotWithShape="0">
-                    <a:schemeClr val="bg2"/>
-                  </a:outerShdw>
-                </a:effectLst>
-              </a14:hiddenEffects>
-            </a:ext>
-          </a:extLst>
-        </p:spPr>
-      </p:pic>
-      <mc:AlternateContent xmlns:mc="http://schemas.openxmlformats.org/markup-compatibility/2006" xmlns:a14="http://schemas.microsoft.com/office/drawing/2010/main">
-        <mc:Choice Requires="a14">
+      <mc:AlternateContent xmlns:mc="http://schemas.openxmlformats.org/markup-compatibility/2006">
+        <mc:Choice xmlns:a14="http://schemas.microsoft.com/office/drawing/2010/main" Requires="a14">
           <p:sp>
             <p:nvSpPr>
               <p:cNvPr id="51" name="Text Box 11"/>
@@ -4510,7 +4446,7 @@
             </p:nvSpPr>
             <p:spPr bwMode="auto">
               <a:xfrm>
-                <a:off x="11225433" y="19716750"/>
+                <a:off x="10944000" y="19716750"/>
                 <a:ext cx="8458200" cy="14363700"/>
               </a:xfrm>
               <a:prstGeom prst="rect">
@@ -5275,7 +5211,7 @@
             </p:txBody>
           </p:sp>
         </mc:Choice>
-        <mc:Fallback xmlns="">
+        <mc:Fallback>
           <p:sp>
             <p:nvSpPr>
               <p:cNvPr id="51" name="Text Box 11"/>
@@ -5286,14 +5222,14 @@
             </p:nvSpPr>
             <p:spPr bwMode="auto">
               <a:xfrm>
-                <a:off x="11225433" y="19716750"/>
+                <a:off x="10944000" y="19716750"/>
                 <a:ext cx="8458200" cy="14363700"/>
               </a:xfrm>
               <a:prstGeom prst="rect">
                 <a:avLst/>
               </a:prstGeom>
               <a:blipFill rotWithShape="1">
-                <a:blip r:embed="rId7"/>
+                <a:blip r:embed="rId5"/>
                 <a:stretch>
                   <a:fillRect/>
                 </a:stretch>
@@ -8740,203 +8676,6 @@
       </p:pic>
       <p:pic>
         <p:nvPicPr>
-          <p:cNvPr id="1032" name="Picture 8" descr="D:\university\presentations\GRC2015\all_curves.png"/>
-          <p:cNvPicPr>
-            <a:picLocks noChangeAspect="1" noChangeArrowheads="1"/>
-          </p:cNvPicPr>
-          <p:nvPr/>
-        </p:nvPicPr>
-        <p:blipFill rotWithShape="1">
-          <a:blip r:embed="rId15">
-            <a:extLst>
-              <a:ext uri="{28A0092B-C50C-407E-A947-70E740481C1C}">
-                <a14:useLocalDpi xmlns:a14="http://schemas.microsoft.com/office/drawing/2010/main" val="0"/>
-              </a:ext>
-            </a:extLst>
-          </a:blip>
-          <a:srcRect l="3369" r="8142"/>
-          <a:stretch/>
-        </p:blipFill>
-        <p:spPr bwMode="auto">
-          <a:xfrm>
-            <a:off x="1438664" y="10417193"/>
-            <a:ext cx="7920000" cy="6150978"/>
-          </a:xfrm>
-          <a:prstGeom prst="rect">
-            <a:avLst/>
-          </a:prstGeom>
-          <a:noFill/>
-          <a:extLst>
-            <a:ext uri="{909E8E84-426E-40DD-AFC4-6F175D3DCCD1}">
-              <a14:hiddenFill xmlns:a14="http://schemas.microsoft.com/office/drawing/2010/main">
-                <a:solidFill>
-                  <a:srgbClr val="FFFFFF"/>
-                </a:solidFill>
-              </a14:hiddenFill>
-            </a:ext>
-          </a:extLst>
-        </p:spPr>
-      </p:pic>
-      <p:pic>
-        <p:nvPicPr>
-          <p:cNvPr id="1034" name="Picture 10" descr="D:\university\presentations\GRC2015\model_fits.png"/>
-          <p:cNvPicPr>
-            <a:picLocks noChangeAspect="1" noChangeArrowheads="1"/>
-          </p:cNvPicPr>
-          <p:nvPr/>
-        </p:nvPicPr>
-        <p:blipFill rotWithShape="1">
-          <a:blip r:embed="rId16">
-            <a:extLst>
-              <a:ext uri="{28A0092B-C50C-407E-A947-70E740481C1C}">
-                <a14:useLocalDpi xmlns:a14="http://schemas.microsoft.com/office/drawing/2010/main" val="0"/>
-              </a:ext>
-            </a:extLst>
-          </a:blip>
-          <a:srcRect l="4167" t="7351" r="7172"/>
-          <a:stretch/>
-        </p:blipFill>
-        <p:spPr bwMode="auto">
-          <a:xfrm>
-            <a:off x="1539100" y="27984450"/>
-            <a:ext cx="7920000" cy="5687811"/>
-          </a:xfrm>
-          <a:prstGeom prst="rect">
-            <a:avLst/>
-          </a:prstGeom>
-          <a:noFill/>
-          <a:extLst>
-            <a:ext uri="{909E8E84-426E-40DD-AFC4-6F175D3DCCD1}">
-              <a14:hiddenFill xmlns:a14="http://schemas.microsoft.com/office/drawing/2010/main">
-                <a:solidFill>
-                  <a:srgbClr val="FFFFFF"/>
-                </a:solidFill>
-              </a14:hiddenFill>
-            </a:ext>
-          </a:extLst>
-        </p:spPr>
-      </p:pic>
-      <p:pic>
-        <p:nvPicPr>
-          <p:cNvPr id="1035" name="Picture 11" descr="D:\university\presentations\GRC2015\G_models.png"/>
-          <p:cNvPicPr>
-            <a:picLocks noChangeAspect="1" noChangeArrowheads="1"/>
-          </p:cNvPicPr>
-          <p:nvPr/>
-        </p:nvPicPr>
-        <p:blipFill>
-          <a:blip r:embed="rId17">
-            <a:extLst>
-              <a:ext uri="{28A0092B-C50C-407E-A947-70E740481C1C}">
-                <a14:useLocalDpi xmlns:a14="http://schemas.microsoft.com/office/drawing/2010/main" val="0"/>
-              </a:ext>
-            </a:extLst>
-          </a:blip>
-          <a:srcRect/>
-          <a:stretch>
-            <a:fillRect/>
-          </a:stretch>
-        </p:blipFill>
-        <p:spPr bwMode="auto">
-          <a:xfrm>
-            <a:off x="1581188" y="24278706"/>
-            <a:ext cx="7920000" cy="2970214"/>
-          </a:xfrm>
-          <a:prstGeom prst="rect">
-            <a:avLst/>
-          </a:prstGeom>
-          <a:noFill/>
-          <a:extLst>
-            <a:ext uri="{909E8E84-426E-40DD-AFC4-6F175D3DCCD1}">
-              <a14:hiddenFill xmlns:a14="http://schemas.microsoft.com/office/drawing/2010/main">
-                <a:solidFill>
-                  <a:srgbClr val="FFFFFF"/>
-                </a:solidFill>
-              </a14:hiddenFill>
-            </a:ext>
-          </a:extLst>
-        </p:spPr>
-      </p:pic>
-      <p:pic>
-        <p:nvPicPr>
-          <p:cNvPr id="1039" name="Picture 15" descr="D:\university\presentations\GRC2015\competition.png"/>
-          <p:cNvPicPr>
-            <a:picLocks noChangeAspect="1" noChangeArrowheads="1"/>
-          </p:cNvPicPr>
-          <p:nvPr/>
-        </p:nvPicPr>
-        <p:blipFill rotWithShape="1">
-          <a:blip r:embed="rId18">
-            <a:extLst>
-              <a:ext uri="{28A0092B-C50C-407E-A947-70E740481C1C}">
-                <a14:useLocalDpi xmlns:a14="http://schemas.microsoft.com/office/drawing/2010/main" val="0"/>
-              </a:ext>
-            </a:extLst>
-          </a:blip>
-          <a:srcRect l="3964" t="5568" r="7260"/>
-          <a:stretch/>
-        </p:blipFill>
-        <p:spPr bwMode="auto">
-          <a:xfrm>
-            <a:off x="11184899" y="11921787"/>
-            <a:ext cx="7920000" cy="5789797"/>
-          </a:xfrm>
-          <a:prstGeom prst="rect">
-            <a:avLst/>
-          </a:prstGeom>
-          <a:noFill/>
-          <a:extLst>
-            <a:ext uri="{909E8E84-426E-40DD-AFC4-6F175D3DCCD1}">
-              <a14:hiddenFill xmlns:a14="http://schemas.microsoft.com/office/drawing/2010/main">
-                <a:solidFill>
-                  <a:srgbClr val="FFFFFF"/>
-                </a:solidFill>
-              </a14:hiddenFill>
-            </a:ext>
-          </a:extLst>
-        </p:spPr>
-      </p:pic>
-      <p:pic>
-        <p:nvPicPr>
-          <p:cNvPr id="1041" name="Picture 17" descr="D:\university\presentations\GRC2015\frequency_fit.png"/>
-          <p:cNvPicPr>
-            <a:picLocks noChangeAspect="1" noChangeArrowheads="1"/>
-          </p:cNvPicPr>
-          <p:nvPr/>
-        </p:nvPicPr>
-        <p:blipFill rotWithShape="1">
-          <a:blip r:embed="rId19">
-            <a:extLst>
-              <a:ext uri="{28A0092B-C50C-407E-A947-70E740481C1C}">
-                <a14:useLocalDpi xmlns:a14="http://schemas.microsoft.com/office/drawing/2010/main" val="0"/>
-              </a:ext>
-            </a:extLst>
-          </a:blip>
-          <a:srcRect l="2280" t="6989" r="7992"/>
-          <a:stretch/>
-        </p:blipFill>
-        <p:spPr bwMode="auto">
-          <a:xfrm>
-            <a:off x="11494533" y="22739600"/>
-            <a:ext cx="7920000" cy="5642087"/>
-          </a:xfrm>
-          <a:prstGeom prst="rect">
-            <a:avLst/>
-          </a:prstGeom>
-          <a:noFill/>
-          <a:extLst>
-            <a:ext uri="{909E8E84-426E-40DD-AFC4-6F175D3DCCD1}">
-              <a14:hiddenFill xmlns:a14="http://schemas.microsoft.com/office/drawing/2010/main">
-                <a:solidFill>
-                  <a:srgbClr val="FFFFFF"/>
-                </a:solidFill>
-              </a14:hiddenFill>
-            </a:ext>
-          </a:extLst>
-        </p:spPr>
-      </p:pic>
-      <p:pic>
-        <p:nvPicPr>
           <p:cNvPr id="43" name="Picture 42"/>
           <p:cNvPicPr>
             <a:picLocks noChangeAspect="1"/>
@@ -8944,7 +8683,7 @@
           <p:nvPr/>
         </p:nvPicPr>
         <p:blipFill>
-          <a:blip r:embed="rId20" cstate="print">
+          <a:blip r:embed="rId15" cstate="print">
             <a:extLst>
               <a:ext uri="{28A0092B-C50C-407E-A947-70E740481C1C}">
                 <a14:useLocalDpi xmlns:a14="http://schemas.microsoft.com/office/drawing/2010/main" val="0"/>
@@ -8957,195 +8696,12 @@
         </p:blipFill>
         <p:spPr>
           <a:xfrm>
-            <a:off x="20614042" y="26955750"/>
+            <a:off x="20610000" y="26955750"/>
             <a:ext cx="8460000" cy="7138125"/>
           </a:xfrm>
           <a:prstGeom prst="rect">
             <a:avLst/>
           </a:prstGeom>
-        </p:spPr>
-      </p:pic>
-      <p:pic>
-        <p:nvPicPr>
-          <p:cNvPr id="1045" name="Picture 21" descr="D:\university\presentations\GRC2015\competition2.png"/>
-          <p:cNvPicPr>
-            <a:picLocks noChangeAspect="1" noChangeArrowheads="1"/>
-          </p:cNvPicPr>
-          <p:nvPr/>
-        </p:nvPicPr>
-        <p:blipFill rotWithShape="1">
-          <a:blip r:embed="rId21">
-            <a:extLst>
-              <a:ext uri="{28A0092B-C50C-407E-A947-70E740481C1C}">
-                <a14:useLocalDpi xmlns:a14="http://schemas.microsoft.com/office/drawing/2010/main" val="0"/>
-              </a:ext>
-            </a:extLst>
-          </a:blip>
-          <a:srcRect l="2456" t="6634" r="7665"/>
-          <a:stretch/>
-        </p:blipFill>
-        <p:spPr bwMode="auto">
-          <a:xfrm>
-            <a:off x="20909163" y="15298282"/>
-            <a:ext cx="7920000" cy="5654240"/>
-          </a:xfrm>
-          <a:prstGeom prst="rect">
-            <a:avLst/>
-          </a:prstGeom>
-          <a:noFill/>
-          <a:extLst>
-            <a:ext uri="{909E8E84-426E-40DD-AFC4-6F175D3DCCD1}">
-              <a14:hiddenFill xmlns:a14="http://schemas.microsoft.com/office/drawing/2010/main">
-                <a:solidFill>
-                  <a:srgbClr val="FFFFFF"/>
-                </a:solidFill>
-              </a14:hiddenFill>
-            </a:ext>
-          </a:extLst>
-        </p:spPr>
-      </p:pic>
-      <p:pic>
-        <p:nvPicPr>
-          <p:cNvPr id="1048" name="Picture 24" descr="D:\university\presentations\GRC2015\total_OD_comparison.png"/>
-          <p:cNvPicPr>
-            <a:picLocks noChangeAspect="1" noChangeArrowheads="1"/>
-          </p:cNvPicPr>
-          <p:nvPr/>
-        </p:nvPicPr>
-        <p:blipFill rotWithShape="1">
-          <a:blip r:embed="rId22">
-            <a:extLst>
-              <a:ext uri="{28A0092B-C50C-407E-A947-70E740481C1C}">
-                <a14:useLocalDpi xmlns:a14="http://schemas.microsoft.com/office/drawing/2010/main" val="0"/>
-              </a:ext>
-            </a:extLst>
-          </a:blip>
-          <a:srcRect l="4084" t="5686" r="7665"/>
-          <a:stretch/>
-        </p:blipFill>
-        <p:spPr bwMode="auto">
-          <a:xfrm>
-            <a:off x="20890858" y="20901025"/>
-            <a:ext cx="7920000" cy="5817011"/>
-          </a:xfrm>
-          <a:prstGeom prst="rect">
-            <a:avLst/>
-          </a:prstGeom>
-          <a:noFill/>
-          <a:extLst>
-            <a:ext uri="{909E8E84-426E-40DD-AFC4-6F175D3DCCD1}">
-              <a14:hiddenFill xmlns:a14="http://schemas.microsoft.com/office/drawing/2010/main">
-                <a:solidFill>
-                  <a:srgbClr val="FFFFFF"/>
-                </a:solidFill>
-              </a14:hiddenFill>
-            </a:ext>
-          </a:extLst>
-        </p:spPr>
-      </p:pic>
-      <p:pic>
-        <p:nvPicPr>
-          <p:cNvPr id="1050" name="Picture 26"/>
-          <p:cNvPicPr>
-            <a:picLocks noChangeAspect="1" noChangeArrowheads="1"/>
-          </p:cNvPicPr>
-          <p:nvPr/>
-        </p:nvPicPr>
-        <p:blipFill>
-          <a:blip r:embed="rId23">
-            <a:extLst>
-              <a:ext uri="{28A0092B-C50C-407E-A947-70E740481C1C}">
-                <a14:useLocalDpi xmlns:a14="http://schemas.microsoft.com/office/drawing/2010/main" val="0"/>
-              </a:ext>
-            </a:extLst>
-          </a:blip>
-          <a:srcRect/>
-          <a:stretch>
-            <a:fillRect/>
-          </a:stretch>
-        </p:blipFill>
-        <p:spPr bwMode="auto">
-          <a:xfrm>
-            <a:off x="26763602" y="16568171"/>
-            <a:ext cx="2103438" cy="1914525"/>
-          </a:xfrm>
-          <a:prstGeom prst="rect">
-            <a:avLst/>
-          </a:prstGeom>
-          <a:noFill/>
-          <a:ln>
-            <a:noFill/>
-          </a:ln>
-          <a:effectLst/>
-          <a:extLst>
-            <a:ext uri="{909E8E84-426E-40DD-AFC4-6F175D3DCCD1}">
-              <a14:hiddenFill xmlns:a14="http://schemas.microsoft.com/office/drawing/2010/main">
-                <a:solidFill>
-                  <a:schemeClr val="accent1"/>
-                </a:solidFill>
-              </a14:hiddenFill>
-            </a:ext>
-            <a:ext uri="{91240B29-F687-4F45-9708-019B960494DF}">
-              <a14:hiddenLine xmlns:a14="http://schemas.microsoft.com/office/drawing/2010/main" w="9525">
-                <a:solidFill>
-                  <a:schemeClr val="tx1"/>
-                </a:solidFill>
-                <a:miter lim="800000"/>
-                <a:headEnd/>
-                <a:tailEnd/>
-              </a14:hiddenLine>
-            </a:ext>
-            <a:ext uri="{AF507438-7753-43E0-B8FC-AC1667EBCBE1}">
-              <a14:hiddenEffects xmlns:a14="http://schemas.microsoft.com/office/drawing/2010/main">
-                <a:effectLst>
-                  <a:outerShdw dist="35921" dir="2700000" algn="ctr" rotWithShape="0">
-                    <a:schemeClr val="bg2"/>
-                  </a:outerShdw>
-                </a:effectLst>
-              </a14:hiddenEffects>
-            </a:ext>
-          </a:extLst>
-        </p:spPr>
-      </p:pic>
-      <p:pic>
-        <p:nvPicPr>
-          <p:cNvPr id="1043" name="Picture 19" descr="D:\university\presentations\GRC2015\plate.png"/>
-          <p:cNvPicPr>
-            <a:picLocks noChangeAspect="1" noChangeArrowheads="1"/>
-          </p:cNvPicPr>
-          <p:nvPr/>
-        </p:nvPicPr>
-        <p:blipFill>
-          <a:blip r:embed="rId24">
-            <a:extLst>
-              <a:ext uri="{28A0092B-C50C-407E-A947-70E740481C1C}">
-                <a14:useLocalDpi xmlns:a14="http://schemas.microsoft.com/office/drawing/2010/main" val="0"/>
-              </a:ext>
-            </a:extLst>
-          </a:blip>
-          <a:srcRect/>
-          <a:stretch>
-            <a:fillRect/>
-          </a:stretch>
-        </p:blipFill>
-        <p:spPr bwMode="auto">
-          <a:xfrm>
-            <a:off x="24551357" y="8593347"/>
-            <a:ext cx="4395788" cy="3200400"/>
-          </a:xfrm>
-          <a:prstGeom prst="rect">
-            <a:avLst/>
-          </a:prstGeom>
-          <a:noFill/>
-          <a:extLst>
-            <a:ext uri="{909E8E84-426E-40DD-AFC4-6F175D3DCCD1}">
-              <a14:hiddenFill xmlns:a14="http://schemas.microsoft.com/office/drawing/2010/main">
-                <a:solidFill>
-                  <a:srgbClr val="FFFFFF"/>
-                </a:solidFill>
-              </a14:hiddenFill>
-            </a:ext>
-          </a:extLst>
         </p:spPr>
       </p:pic>
       <p:pic>
@@ -9157,7 +8713,7 @@
           <p:nvPr/>
         </p:nvPicPr>
         <p:blipFill>
-          <a:blip r:embed="rId25">
+          <a:blip r:embed="rId16">
             <a:extLst>
               <a:ext uri="{28A0092B-C50C-407E-A947-70E740481C1C}">
                 <a14:useLocalDpi xmlns:a14="http://schemas.microsoft.com/office/drawing/2010/main" val="0"/>
@@ -9198,7 +8754,7 @@
           <p:nvPr/>
         </p:nvPicPr>
         <p:blipFill>
-          <a:blip r:embed="rId26">
+          <a:blip r:embed="rId17">
             <a:extLst>
               <a:ext uri="{28A0092B-C50C-407E-A947-70E740481C1C}">
                 <a14:useLocalDpi xmlns:a14="http://schemas.microsoft.com/office/drawing/2010/main" val="0"/>
@@ -9350,7 +8906,7 @@
                 <p:nvPr/>
               </p:nvPicPr>
               <p:blipFill>
-                <a:blip r:embed="rId27">
+                <a:blip r:embed="rId18">
                   <a:extLst>
                     <a:ext uri="{28A0092B-C50C-407E-A947-70E740481C1C}">
                       <a14:useLocalDpi xmlns:a14="http://schemas.microsoft.com/office/drawing/2010/main" val="0"/>
@@ -9414,7 +8970,7 @@
                 <p:nvPr/>
               </p:nvPicPr>
               <p:blipFill>
-                <a:blip r:embed="rId28">
+                <a:blip r:embed="rId19">
                   <a:extLst>
                     <a:ext uri="{28A0092B-C50C-407E-A947-70E740481C1C}">
                       <a14:useLocalDpi xmlns:a14="http://schemas.microsoft.com/office/drawing/2010/main" val="0"/>
@@ -9478,7 +9034,7 @@
                 <p:nvPr/>
               </p:nvPicPr>
               <p:blipFill>
-                <a:blip r:embed="rId29">
+                <a:blip r:embed="rId20">
                   <a:extLst>
                     <a:ext uri="{28A0092B-C50C-407E-A947-70E740481C1C}">
                       <a14:useLocalDpi xmlns:a14="http://schemas.microsoft.com/office/drawing/2010/main" val="0"/>
@@ -9638,7 +9194,7 @@
             <p:nvPr/>
           </p:nvPicPr>
           <p:blipFill>
-            <a:blip r:embed="rId30">
+            <a:blip r:embed="rId21">
               <a:extLst>
                 <a:ext uri="{28A0092B-C50C-407E-A947-70E740481C1C}">
                   <a14:useLocalDpi xmlns:a14="http://schemas.microsoft.com/office/drawing/2010/main" val="0"/>
@@ -9680,7 +9236,7 @@
           <p:nvPr/>
         </p:nvPicPr>
         <p:blipFill>
-          <a:blip r:embed="rId31">
+          <a:blip r:embed="rId22">
             <a:extLst>
               <a:ext uri="{28A0092B-C50C-407E-A947-70E740481C1C}">
                 <a14:useLocalDpi xmlns:a14="http://schemas.microsoft.com/office/drawing/2010/main" val="0"/>
@@ -9765,13 +9321,6 @@
               </a:rPr>
               <a:t>Ministry </a:t>
             </a:r>
-            <a:endParaRPr lang="en-US" altLang="he-IL" sz="2000" b="1" dirty="0" smtClean="0">
-              <a:solidFill>
-                <a:srgbClr val="0070C0"/>
-              </a:solidFill>
-              <a:latin typeface="Calibri" panose="020F0502020204030204" pitchFamily="34" charset="0"/>
-              <a:cs typeface="Consolas" panose="020B0609020204030204" pitchFamily="49" charset="0"/>
-            </a:endParaRPr>
           </a:p>
           <a:p>
             <a:pPr algn="ctr"/>
@@ -9785,13 +9334,6 @@
               </a:rPr>
               <a:t>of Science </a:t>
             </a:r>
-            <a:endParaRPr lang="en-US" altLang="he-IL" sz="2000" b="1" dirty="0" smtClean="0">
-              <a:solidFill>
-                <a:srgbClr val="0070C0"/>
-              </a:solidFill>
-              <a:latin typeface="Calibri" panose="020F0502020204030204" pitchFamily="34" charset="0"/>
-              <a:cs typeface="Consolas" panose="020B0609020204030204" pitchFamily="49" charset="0"/>
-            </a:endParaRPr>
           </a:p>
           <a:p>
             <a:pPr algn="ctr"/>
@@ -9805,13 +9347,6 @@
               </a:rPr>
               <a:t>and </a:t>
             </a:r>
-            <a:endParaRPr lang="en-US" altLang="he-IL" sz="2000" b="1" dirty="0" smtClean="0">
-              <a:solidFill>
-                <a:srgbClr val="0070C0"/>
-              </a:solidFill>
-              <a:latin typeface="Calibri" panose="020F0502020204030204" pitchFamily="34" charset="0"/>
-              <a:cs typeface="Consolas" panose="020B0609020204030204" pitchFamily="49" charset="0"/>
-            </a:endParaRPr>
           </a:p>
           <a:p>
             <a:pPr algn="ctr"/>
@@ -9835,6 +9370,375 @@
           </a:p>
         </p:txBody>
       </p:sp>
+      <p:pic>
+        <p:nvPicPr>
+          <p:cNvPr id="8" name="Picture 3" descr="D:\university\presentations\GRC 2015\G_models.png"/>
+          <p:cNvPicPr>
+            <a:picLocks noChangeAspect="1" noChangeArrowheads="1"/>
+          </p:cNvPicPr>
+          <p:nvPr/>
+        </p:nvPicPr>
+        <p:blipFill>
+          <a:blip r:embed="rId23">
+            <a:extLst>
+              <a:ext uri="{28A0092B-C50C-407E-A947-70E740481C1C}">
+                <a14:useLocalDpi xmlns:a14="http://schemas.microsoft.com/office/drawing/2010/main" val="0"/>
+              </a:ext>
+            </a:extLst>
+          </a:blip>
+          <a:srcRect/>
+          <a:stretch>
+            <a:fillRect/>
+          </a:stretch>
+        </p:blipFill>
+        <p:spPr bwMode="auto">
+          <a:xfrm>
+            <a:off x="1334118" y="24127367"/>
+            <a:ext cx="8332788" cy="3900487"/>
+          </a:xfrm>
+          <a:prstGeom prst="rect">
+            <a:avLst/>
+          </a:prstGeom>
+          <a:noFill/>
+          <a:extLst>
+            <a:ext uri="{909E8E84-426E-40DD-AFC4-6F175D3DCCD1}">
+              <a14:hiddenFill xmlns:a14="http://schemas.microsoft.com/office/drawing/2010/main">
+                <a:solidFill>
+                  <a:srgbClr val="FFFFFF"/>
+                </a:solidFill>
+              </a14:hiddenFill>
+            </a:ext>
+          </a:extLst>
+        </p:spPr>
+      </p:pic>
+      <p:pic>
+        <p:nvPicPr>
+          <p:cNvPr id="10" name="Picture 7" descr="D:\university\presentations\GRC 2015\frequency_fit.png"/>
+          <p:cNvPicPr>
+            <a:picLocks noChangeAspect="1" noChangeArrowheads="1"/>
+          </p:cNvPicPr>
+          <p:nvPr/>
+        </p:nvPicPr>
+        <p:blipFill>
+          <a:blip r:embed="rId24">
+            <a:extLst>
+              <a:ext uri="{28A0092B-C50C-407E-A947-70E740481C1C}">
+                <a14:useLocalDpi xmlns:a14="http://schemas.microsoft.com/office/drawing/2010/main" val="0"/>
+              </a:ext>
+            </a:extLst>
+          </a:blip>
+          <a:srcRect/>
+          <a:stretch>
+            <a:fillRect/>
+          </a:stretch>
+        </p:blipFill>
+        <p:spPr bwMode="auto">
+          <a:xfrm>
+            <a:off x="11304000" y="22957613"/>
+            <a:ext cx="7748587" cy="5310187"/>
+          </a:xfrm>
+          <a:prstGeom prst="rect">
+            <a:avLst/>
+          </a:prstGeom>
+          <a:noFill/>
+          <a:extLst>
+            <a:ext uri="{909E8E84-426E-40DD-AFC4-6F175D3DCCD1}">
+              <a14:hiddenFill xmlns:a14="http://schemas.microsoft.com/office/drawing/2010/main">
+                <a:solidFill>
+                  <a:srgbClr val="FFFFFF"/>
+                </a:solidFill>
+              </a14:hiddenFill>
+            </a:ext>
+          </a:extLst>
+        </p:spPr>
+      </p:pic>
+      <p:pic>
+        <p:nvPicPr>
+          <p:cNvPr id="1032" name="Picture 8" descr="D:\university\presentations\GRC 2015\all_curves.png"/>
+          <p:cNvPicPr>
+            <a:picLocks noChangeAspect="1" noChangeArrowheads="1"/>
+          </p:cNvPicPr>
+          <p:nvPr/>
+        </p:nvPicPr>
+        <p:blipFill>
+          <a:blip r:embed="rId25">
+            <a:extLst>
+              <a:ext uri="{28A0092B-C50C-407E-A947-70E740481C1C}">
+                <a14:useLocalDpi xmlns:a14="http://schemas.microsoft.com/office/drawing/2010/main" val="0"/>
+              </a:ext>
+            </a:extLst>
+          </a:blip>
+          <a:srcRect/>
+          <a:stretch>
+            <a:fillRect/>
+          </a:stretch>
+        </p:blipFill>
+        <p:spPr bwMode="auto">
+          <a:xfrm>
+            <a:off x="1630800" y="12708000"/>
+            <a:ext cx="7748588" cy="5157788"/>
+          </a:xfrm>
+          <a:prstGeom prst="rect">
+            <a:avLst/>
+          </a:prstGeom>
+          <a:noFill/>
+          <a:extLst>
+            <a:ext uri="{909E8E84-426E-40DD-AFC4-6F175D3DCCD1}">
+              <a14:hiddenFill xmlns:a14="http://schemas.microsoft.com/office/drawing/2010/main">
+                <a:solidFill>
+                  <a:srgbClr val="FFFFFF"/>
+                </a:solidFill>
+              </a14:hiddenFill>
+            </a:ext>
+          </a:extLst>
+        </p:spPr>
+      </p:pic>
+      <p:pic>
+        <p:nvPicPr>
+          <p:cNvPr id="1033" name="Picture 9" descr="D:\university\presentations\GRC 2015\model_fits.png"/>
+          <p:cNvPicPr>
+            <a:picLocks noChangeAspect="1" noChangeArrowheads="1"/>
+          </p:cNvPicPr>
+          <p:nvPr/>
+        </p:nvPicPr>
+        <p:blipFill>
+          <a:blip r:embed="rId26">
+            <a:extLst>
+              <a:ext uri="{28A0092B-C50C-407E-A947-70E740481C1C}">
+                <a14:useLocalDpi xmlns:a14="http://schemas.microsoft.com/office/drawing/2010/main" val="0"/>
+              </a:ext>
+            </a:extLst>
+          </a:blip>
+          <a:srcRect/>
+          <a:stretch>
+            <a:fillRect/>
+          </a:stretch>
+        </p:blipFill>
+        <p:spPr bwMode="auto">
+          <a:xfrm>
+            <a:off x="1630800" y="28610984"/>
+            <a:ext cx="7748587" cy="5297488"/>
+          </a:xfrm>
+          <a:prstGeom prst="rect">
+            <a:avLst/>
+          </a:prstGeom>
+          <a:noFill/>
+          <a:extLst>
+            <a:ext uri="{909E8E84-426E-40DD-AFC4-6F175D3DCCD1}">
+              <a14:hiddenFill xmlns:a14="http://schemas.microsoft.com/office/drawing/2010/main">
+                <a:solidFill>
+                  <a:srgbClr val="FFFFFF"/>
+                </a:solidFill>
+              </a14:hiddenFill>
+            </a:ext>
+          </a:extLst>
+        </p:spPr>
+      </p:pic>
+      <p:pic>
+        <p:nvPicPr>
+          <p:cNvPr id="14" name="Picture 10" descr="D:\university\presentations\GRC 2015\competition.png"/>
+          <p:cNvPicPr>
+            <a:picLocks noChangeAspect="1" noChangeArrowheads="1"/>
+          </p:cNvPicPr>
+          <p:nvPr/>
+        </p:nvPicPr>
+        <p:blipFill>
+          <a:blip r:embed="rId27">
+            <a:extLst>
+              <a:ext uri="{28A0092B-C50C-407E-A947-70E740481C1C}">
+                <a14:useLocalDpi xmlns:a14="http://schemas.microsoft.com/office/drawing/2010/main" val="0"/>
+              </a:ext>
+            </a:extLst>
+          </a:blip>
+          <a:srcRect/>
+          <a:stretch>
+            <a:fillRect/>
+          </a:stretch>
+        </p:blipFill>
+        <p:spPr bwMode="auto">
+          <a:xfrm>
+            <a:off x="11304000" y="12708000"/>
+            <a:ext cx="7748587" cy="5310187"/>
+          </a:xfrm>
+          <a:prstGeom prst="rect">
+            <a:avLst/>
+          </a:prstGeom>
+          <a:noFill/>
+          <a:extLst>
+            <a:ext uri="{909E8E84-426E-40DD-AFC4-6F175D3DCCD1}">
+              <a14:hiddenFill xmlns:a14="http://schemas.microsoft.com/office/drawing/2010/main">
+                <a:solidFill>
+                  <a:srgbClr val="FFFFFF"/>
+                </a:solidFill>
+              </a14:hiddenFill>
+            </a:ext>
+          </a:extLst>
+        </p:spPr>
+      </p:pic>
+      <p:pic>
+        <p:nvPicPr>
+          <p:cNvPr id="15" name="Picture 11" descr="D:\university\presentations\GRC 2015\plot_strains2.png"/>
+          <p:cNvPicPr>
+            <a:picLocks noChangeAspect="1" noChangeArrowheads="1"/>
+          </p:cNvPicPr>
+          <p:nvPr/>
+        </p:nvPicPr>
+        <p:blipFill>
+          <a:blip r:embed="rId28">
+            <a:extLst>
+              <a:ext uri="{28A0092B-C50C-407E-A947-70E740481C1C}">
+                <a14:useLocalDpi xmlns:a14="http://schemas.microsoft.com/office/drawing/2010/main" val="0"/>
+              </a:ext>
+            </a:extLst>
+          </a:blip>
+          <a:srcRect/>
+          <a:stretch>
+            <a:fillRect/>
+          </a:stretch>
+        </p:blipFill>
+        <p:spPr bwMode="auto">
+          <a:xfrm>
+            <a:off x="20970000" y="9876430"/>
+            <a:ext cx="7989887" cy="5081588"/>
+          </a:xfrm>
+          <a:prstGeom prst="rect">
+            <a:avLst/>
+          </a:prstGeom>
+          <a:noFill/>
+          <a:extLst>
+            <a:ext uri="{909E8E84-426E-40DD-AFC4-6F175D3DCCD1}">
+              <a14:hiddenFill xmlns:a14="http://schemas.microsoft.com/office/drawing/2010/main">
+                <a:solidFill>
+                  <a:srgbClr val="FFFFFF"/>
+                </a:solidFill>
+              </a14:hiddenFill>
+            </a:ext>
+          </a:extLst>
+        </p:spPr>
+      </p:pic>
+      <p:pic>
+        <p:nvPicPr>
+          <p:cNvPr id="1036" name="Picture 12" descr="D:\university\presentations\GRC 2015\competition2.png"/>
+          <p:cNvPicPr>
+            <a:picLocks noChangeAspect="1" noChangeArrowheads="1"/>
+          </p:cNvPicPr>
+          <p:nvPr/>
+        </p:nvPicPr>
+        <p:blipFill>
+          <a:blip r:embed="rId29">
+            <a:extLst>
+              <a:ext uri="{28A0092B-C50C-407E-A947-70E740481C1C}">
+                <a14:useLocalDpi xmlns:a14="http://schemas.microsoft.com/office/drawing/2010/main" val="0"/>
+              </a:ext>
+            </a:extLst>
+          </a:blip>
+          <a:srcRect/>
+          <a:stretch>
+            <a:fillRect/>
+          </a:stretch>
+        </p:blipFill>
+        <p:spPr bwMode="auto">
+          <a:xfrm>
+            <a:off x="20970000" y="15466145"/>
+            <a:ext cx="7748588" cy="5310188"/>
+          </a:xfrm>
+          <a:prstGeom prst="rect">
+            <a:avLst/>
+          </a:prstGeom>
+          <a:noFill/>
+          <a:extLst>
+            <a:ext uri="{909E8E84-426E-40DD-AFC4-6F175D3DCCD1}">
+              <a14:hiddenFill xmlns:a14="http://schemas.microsoft.com/office/drawing/2010/main">
+                <a:solidFill>
+                  <a:srgbClr val="FFFFFF"/>
+                </a:solidFill>
+              </a14:hiddenFill>
+            </a:ext>
+          </a:extLst>
+        </p:spPr>
+      </p:pic>
+      <p:pic>
+        <p:nvPicPr>
+          <p:cNvPr id="1037" name="Picture 13" descr="D:\university\presentations\GRC 2015\total_OD_comparison.png"/>
+          <p:cNvPicPr>
+            <a:picLocks noChangeAspect="1" noChangeArrowheads="1"/>
+          </p:cNvPicPr>
+          <p:nvPr/>
+        </p:nvPicPr>
+        <p:blipFill>
+          <a:blip r:embed="rId30">
+            <a:extLst>
+              <a:ext uri="{28A0092B-C50C-407E-A947-70E740481C1C}">
+                <a14:useLocalDpi xmlns:a14="http://schemas.microsoft.com/office/drawing/2010/main" val="0"/>
+              </a:ext>
+            </a:extLst>
+          </a:blip>
+          <a:srcRect/>
+          <a:stretch>
+            <a:fillRect/>
+          </a:stretch>
+        </p:blipFill>
+        <p:spPr bwMode="auto">
+          <a:xfrm>
+            <a:off x="20970000" y="21463720"/>
+            <a:ext cx="7748588" cy="5310188"/>
+          </a:xfrm>
+          <a:prstGeom prst="rect">
+            <a:avLst/>
+          </a:prstGeom>
+          <a:noFill/>
+          <a:extLst>
+            <a:ext uri="{909E8E84-426E-40DD-AFC4-6F175D3DCCD1}">
+              <a14:hiddenFill xmlns:a14="http://schemas.microsoft.com/office/drawing/2010/main">
+                <a:solidFill>
+                  <a:srgbClr val="FFFFFF"/>
+                </a:solidFill>
+              </a14:hiddenFill>
+            </a:ext>
+          </a:extLst>
+        </p:spPr>
+      </p:pic>
+      <p:pic>
+        <p:nvPicPr>
+          <p:cNvPr id="1043" name="Picture 19" descr="D:\university\presentations\GRC2015\plate.png"/>
+          <p:cNvPicPr>
+            <a:picLocks noChangeAspect="1" noChangeArrowheads="1"/>
+          </p:cNvPicPr>
+          <p:nvPr/>
+        </p:nvPicPr>
+        <p:blipFill>
+          <a:blip r:embed="rId31">
+            <a:extLst>
+              <a:ext uri="{28A0092B-C50C-407E-A947-70E740481C1C}">
+                <a14:useLocalDpi xmlns:a14="http://schemas.microsoft.com/office/drawing/2010/main" val="0"/>
+              </a:ext>
+            </a:extLst>
+          </a:blip>
+          <a:srcRect/>
+          <a:stretch>
+            <a:fillRect/>
+          </a:stretch>
+        </p:blipFill>
+        <p:spPr bwMode="auto">
+          <a:xfrm>
+            <a:off x="22233282" y="9259795"/>
+            <a:ext cx="2585357" cy="1882297"/>
+          </a:xfrm>
+          <a:prstGeom prst="rect">
+            <a:avLst/>
+          </a:prstGeom>
+          <a:noFill/>
+          <a:extLst>
+            <a:ext uri="{909E8E84-426E-40DD-AFC4-6F175D3DCCD1}">
+              <a14:hiddenFill xmlns:a14="http://schemas.microsoft.com/office/drawing/2010/main">
+                <a:solidFill>
+                  <a:srgbClr val="FFFFFF"/>
+                </a:solidFill>
+              </a14:hiddenFill>
+            </a:ext>
+          </a:extLst>
+        </p:spPr>
+      </p:pic>
     </p:spTree>
   </p:cSld>
   <p:clrMapOvr>

</xml_diff>

<commit_message>
added text, removed figures
</commit_message>
<xml_diff>
--- a/poster.pptx
+++ b/poster.pptx
@@ -4170,14 +4170,6 @@
 <file path=ppt/slides/slide1.xml><?xml version="1.0" encoding="utf-8"?>
 <p:sld xmlns:a="http://schemas.openxmlformats.org/drawingml/2006/main" xmlns:r="http://schemas.openxmlformats.org/officeDocument/2006/relationships" xmlns:p="http://schemas.openxmlformats.org/presentationml/2006/main">
   <p:cSld>
-    <p:bg>
-      <p:bgPr>
-        <a:solidFill>
-          <a:schemeClr val="bg1"/>
-        </a:solidFill>
-        <a:effectLst/>
-      </p:bgPr>
-    </p:bg>
     <p:spTree>
       <p:nvGrpSpPr>
         <p:cNvPr id="1" name=""/>
@@ -4410,7 +4402,7 @@
                 </a:solidFill>
                 <a:latin typeface="Calibri" pitchFamily="34" charset="0"/>
               </a:rPr>
-              <a:t>Testing the model</a:t>
+              <a:t>Experimental test</a:t>
             </a:r>
             <a:endParaRPr lang="en-US" altLang="he-IL" sz="3900" b="1" dirty="0">
               <a:solidFill>
@@ -4426,16 +4418,615 @@
               </a:spcBef>
             </a:pPr>
             <a:r>
-              <a:rPr lang="en-US" altLang="he-IL" sz="2500" dirty="0">
+              <a:rPr lang="en-US" altLang="he-IL" sz="2500" dirty="0" smtClean="0">
                 <a:latin typeface="Times New Roman" pitchFamily="18" charset="0"/>
               </a:rPr>
-              <a:t>Blah, blah, blah</a:t>
-            </a:r>
+              <a:t>To test the model prediction we grow two strains of </a:t>
+            </a:r>
+            <a:r>
+              <a:rPr lang="en-US" altLang="he-IL" sz="2500" i="1" dirty="0" smtClean="0">
+                <a:latin typeface="Times New Roman" pitchFamily="18" charset="0"/>
+              </a:rPr>
+              <a:t>E. coli</a:t>
+            </a:r>
+            <a:r>
+              <a:rPr lang="en-US" altLang="he-IL" sz="2500" dirty="0" smtClean="0">
+                <a:latin typeface="Times New Roman" pitchFamily="18" charset="0"/>
+              </a:rPr>
+              <a:t> </a:t>
+            </a:r>
+            <a:r>
+              <a:rPr lang="en-US" altLang="he-IL" sz="2500" dirty="0" smtClean="0">
+                <a:solidFill>
+                  <a:srgbClr val="00B050"/>
+                </a:solidFill>
+                <a:latin typeface="Times New Roman" pitchFamily="18" charset="0"/>
+              </a:rPr>
+              <a:t>separ</a:t>
+            </a:r>
+            <a:r>
+              <a:rPr lang="en-US" altLang="he-IL" sz="2500" dirty="0" smtClean="0">
+                <a:solidFill>
+                  <a:srgbClr val="FF0000"/>
+                </a:solidFill>
+                <a:latin typeface="Times New Roman" pitchFamily="18" charset="0"/>
+              </a:rPr>
+              <a:t>ately</a:t>
+            </a:r>
+            <a:r>
+              <a:rPr lang="en-US" altLang="he-IL" sz="2500" dirty="0" smtClean="0">
+                <a:latin typeface="Times New Roman" pitchFamily="18" charset="0"/>
+              </a:rPr>
+              <a:t> and in </a:t>
+            </a:r>
+            <a:r>
+              <a:rPr lang="en-US" altLang="he-IL" sz="2500" dirty="0" smtClean="0">
+                <a:solidFill>
+                  <a:srgbClr val="0000FF"/>
+                </a:solidFill>
+                <a:latin typeface="Times New Roman" pitchFamily="18" charset="0"/>
+              </a:rPr>
+              <a:t>competitions </a:t>
+            </a:r>
+            <a:r>
+              <a:rPr lang="en-US" altLang="he-IL" sz="2500" dirty="0" smtClean="0">
+                <a:latin typeface="Times New Roman" pitchFamily="18" charset="0"/>
+              </a:rPr>
+              <a:t>in a 96-well plate and measure their OD over time.</a:t>
+            </a:r>
+          </a:p>
+          <a:p>
+            <a:pPr eaLnBrk="1" hangingPunct="1">
+              <a:spcBef>
+                <a:spcPct val="10000"/>
+              </a:spcBef>
+            </a:pPr>
+            <a:endParaRPr lang="en-US" altLang="he-IL" sz="2500" dirty="0">
+              <a:latin typeface="Times New Roman" pitchFamily="18" charset="0"/>
+            </a:endParaRPr>
+          </a:p>
+          <a:p>
+            <a:pPr eaLnBrk="1" hangingPunct="1">
+              <a:spcBef>
+                <a:spcPct val="10000"/>
+              </a:spcBef>
+            </a:pPr>
+            <a:endParaRPr lang="en-US" altLang="he-IL" sz="2500" dirty="0" smtClean="0">
+              <a:latin typeface="Times New Roman" pitchFamily="18" charset="0"/>
+            </a:endParaRPr>
+          </a:p>
+          <a:p>
+            <a:pPr eaLnBrk="1" hangingPunct="1">
+              <a:spcBef>
+                <a:spcPct val="10000"/>
+              </a:spcBef>
+            </a:pPr>
+            <a:endParaRPr lang="en-US" altLang="he-IL" sz="2500" dirty="0">
+              <a:latin typeface="Times New Roman" pitchFamily="18" charset="0"/>
+            </a:endParaRPr>
+          </a:p>
+          <a:p>
+            <a:pPr eaLnBrk="1" hangingPunct="1">
+              <a:spcBef>
+                <a:spcPct val="10000"/>
+              </a:spcBef>
+            </a:pPr>
+            <a:endParaRPr lang="en-US" altLang="he-IL" sz="2500" dirty="0" smtClean="0">
+              <a:latin typeface="Times New Roman" pitchFamily="18" charset="0"/>
+            </a:endParaRPr>
+          </a:p>
+          <a:p>
+            <a:pPr eaLnBrk="1" hangingPunct="1">
+              <a:spcBef>
+                <a:spcPct val="10000"/>
+              </a:spcBef>
+            </a:pPr>
+            <a:endParaRPr lang="en-US" altLang="he-IL" sz="2500" dirty="0">
+              <a:latin typeface="Times New Roman" pitchFamily="18" charset="0"/>
+            </a:endParaRPr>
+          </a:p>
+          <a:p>
+            <a:pPr eaLnBrk="1" hangingPunct="1">
+              <a:spcBef>
+                <a:spcPct val="10000"/>
+              </a:spcBef>
+            </a:pPr>
+            <a:endParaRPr lang="en-US" altLang="he-IL" sz="2500" dirty="0" smtClean="0">
+              <a:latin typeface="Times New Roman" pitchFamily="18" charset="0"/>
+            </a:endParaRPr>
+          </a:p>
+          <a:p>
+            <a:pPr eaLnBrk="1" hangingPunct="1">
+              <a:spcBef>
+                <a:spcPct val="10000"/>
+              </a:spcBef>
+            </a:pPr>
+            <a:endParaRPr lang="en-US" altLang="he-IL" sz="2500" dirty="0">
+              <a:latin typeface="Times New Roman" pitchFamily="18" charset="0"/>
+            </a:endParaRPr>
+          </a:p>
+          <a:p>
+            <a:pPr eaLnBrk="1" hangingPunct="1">
+              <a:spcBef>
+                <a:spcPct val="10000"/>
+              </a:spcBef>
+            </a:pPr>
+            <a:endParaRPr lang="en-US" altLang="he-IL" sz="2500" dirty="0" smtClean="0">
+              <a:latin typeface="Times New Roman" pitchFamily="18" charset="0"/>
+            </a:endParaRPr>
+          </a:p>
+          <a:p>
+            <a:pPr eaLnBrk="1" hangingPunct="1">
+              <a:spcBef>
+                <a:spcPct val="10000"/>
+              </a:spcBef>
+            </a:pPr>
+            <a:endParaRPr lang="en-US" altLang="he-IL" sz="2500" dirty="0">
+              <a:latin typeface="Times New Roman" pitchFamily="18" charset="0"/>
+            </a:endParaRPr>
+          </a:p>
+          <a:p>
+            <a:pPr eaLnBrk="1" hangingPunct="1">
+              <a:spcBef>
+                <a:spcPct val="10000"/>
+              </a:spcBef>
+            </a:pPr>
+            <a:endParaRPr lang="en-US" altLang="he-IL" sz="2500" dirty="0" smtClean="0">
+              <a:latin typeface="Times New Roman" pitchFamily="18" charset="0"/>
+            </a:endParaRPr>
+          </a:p>
+          <a:p>
+            <a:pPr eaLnBrk="1" hangingPunct="1">
+              <a:spcBef>
+                <a:spcPct val="10000"/>
+              </a:spcBef>
+            </a:pPr>
+            <a:endParaRPr lang="en-US" altLang="he-IL" sz="2500" dirty="0">
+              <a:latin typeface="Times New Roman" pitchFamily="18" charset="0"/>
+            </a:endParaRPr>
+          </a:p>
+          <a:p>
+            <a:pPr eaLnBrk="1" hangingPunct="1">
+              <a:spcBef>
+                <a:spcPct val="10000"/>
+              </a:spcBef>
+            </a:pPr>
+            <a:endParaRPr lang="en-US" altLang="he-IL" sz="2500" dirty="0" smtClean="0">
+              <a:latin typeface="Times New Roman" pitchFamily="18" charset="0"/>
+            </a:endParaRPr>
+          </a:p>
+          <a:p>
+            <a:pPr eaLnBrk="1" hangingPunct="1">
+              <a:spcBef>
+                <a:spcPct val="10000"/>
+              </a:spcBef>
+            </a:pPr>
+            <a:endParaRPr lang="en-US" altLang="he-IL" sz="2500" dirty="0">
+              <a:latin typeface="Times New Roman" pitchFamily="18" charset="0"/>
+            </a:endParaRPr>
+          </a:p>
+          <a:p>
+            <a:pPr eaLnBrk="1" hangingPunct="1">
+              <a:spcBef>
+                <a:spcPct val="10000"/>
+              </a:spcBef>
+            </a:pPr>
+            <a:endParaRPr lang="en-US" altLang="he-IL" sz="2500" dirty="0" smtClean="0">
+              <a:latin typeface="Times New Roman" pitchFamily="18" charset="0"/>
+            </a:endParaRPr>
+          </a:p>
+          <a:p>
+            <a:pPr eaLnBrk="1" hangingPunct="1">
+              <a:spcBef>
+                <a:spcPct val="10000"/>
+              </a:spcBef>
+            </a:pPr>
+            <a:endParaRPr lang="en-US" altLang="he-IL" sz="2500" dirty="0">
+              <a:latin typeface="Times New Roman" pitchFamily="18" charset="0"/>
+            </a:endParaRPr>
+          </a:p>
+          <a:p>
+            <a:pPr eaLnBrk="1" hangingPunct="1">
+              <a:spcBef>
+                <a:spcPct val="10000"/>
+              </a:spcBef>
+            </a:pPr>
+            <a:endParaRPr lang="en-US" altLang="he-IL" sz="2500" dirty="0" smtClean="0">
+              <a:latin typeface="Times New Roman" pitchFamily="18" charset="0"/>
+            </a:endParaRPr>
+          </a:p>
+          <a:p>
+            <a:pPr eaLnBrk="1" hangingPunct="1">
+              <a:spcBef>
+                <a:spcPct val="10000"/>
+              </a:spcBef>
+            </a:pPr>
+            <a:endParaRPr lang="en-US" altLang="he-IL" sz="2500" dirty="0">
+              <a:latin typeface="Times New Roman" pitchFamily="18" charset="0"/>
+            </a:endParaRPr>
+          </a:p>
+          <a:p>
+            <a:pPr eaLnBrk="1" hangingPunct="1">
+              <a:spcBef>
+                <a:spcPct val="10000"/>
+              </a:spcBef>
+            </a:pPr>
+            <a:endParaRPr lang="en-US" altLang="he-IL" sz="2500" dirty="0" smtClean="0">
+              <a:latin typeface="Times New Roman" pitchFamily="18" charset="0"/>
+            </a:endParaRPr>
+          </a:p>
+          <a:p>
+            <a:pPr eaLnBrk="1" hangingPunct="1">
+              <a:spcBef>
+                <a:spcPct val="10000"/>
+              </a:spcBef>
+            </a:pPr>
+            <a:endParaRPr lang="en-US" altLang="he-IL" sz="2500" dirty="0">
+              <a:latin typeface="Times New Roman" pitchFamily="18" charset="0"/>
+            </a:endParaRPr>
+          </a:p>
+          <a:p>
+            <a:pPr eaLnBrk="1" hangingPunct="1">
+              <a:spcBef>
+                <a:spcPct val="10000"/>
+              </a:spcBef>
+            </a:pPr>
+            <a:endParaRPr lang="en-US" altLang="he-IL" sz="2500" dirty="0" smtClean="0">
+              <a:latin typeface="Times New Roman" pitchFamily="18" charset="0"/>
+            </a:endParaRPr>
+          </a:p>
+          <a:p>
+            <a:pPr eaLnBrk="1" hangingPunct="1">
+              <a:spcBef>
+                <a:spcPct val="10000"/>
+              </a:spcBef>
+            </a:pPr>
+            <a:endParaRPr lang="en-US" altLang="he-IL" sz="2500" dirty="0">
+              <a:latin typeface="Times New Roman" pitchFamily="18" charset="0"/>
+            </a:endParaRPr>
+          </a:p>
+          <a:p>
+            <a:pPr eaLnBrk="1" hangingPunct="1">
+              <a:spcBef>
+                <a:spcPct val="10000"/>
+              </a:spcBef>
+            </a:pPr>
+            <a:endParaRPr lang="en-US" altLang="he-IL" sz="2500" dirty="0" smtClean="0">
+              <a:latin typeface="Times New Roman" pitchFamily="18" charset="0"/>
+            </a:endParaRPr>
+          </a:p>
+          <a:p>
+            <a:pPr eaLnBrk="1" hangingPunct="1">
+              <a:spcBef>
+                <a:spcPct val="10000"/>
+              </a:spcBef>
+            </a:pPr>
+            <a:endParaRPr lang="en-US" altLang="he-IL" sz="2500" dirty="0">
+              <a:latin typeface="Times New Roman" pitchFamily="18" charset="0"/>
+            </a:endParaRPr>
+          </a:p>
+          <a:p>
+            <a:pPr eaLnBrk="1" hangingPunct="1">
+              <a:spcBef>
+                <a:spcPct val="10000"/>
+              </a:spcBef>
+            </a:pPr>
+            <a:endParaRPr lang="en-US" altLang="he-IL" sz="2500" dirty="0" smtClean="0">
+              <a:latin typeface="Times New Roman" pitchFamily="18" charset="0"/>
+            </a:endParaRPr>
+          </a:p>
+          <a:p>
+            <a:pPr eaLnBrk="1" hangingPunct="1">
+              <a:spcBef>
+                <a:spcPct val="10000"/>
+              </a:spcBef>
+            </a:pPr>
+            <a:endParaRPr lang="en-US" altLang="he-IL" sz="2500" dirty="0">
+              <a:latin typeface="Times New Roman" pitchFamily="18" charset="0"/>
+            </a:endParaRPr>
+          </a:p>
+          <a:p>
+            <a:pPr eaLnBrk="1" hangingPunct="1">
+              <a:spcBef>
+                <a:spcPct val="10000"/>
+              </a:spcBef>
+            </a:pPr>
+            <a:endParaRPr lang="en-US" altLang="he-IL" sz="2500" dirty="0" smtClean="0">
+              <a:latin typeface="Times New Roman" pitchFamily="18" charset="0"/>
+            </a:endParaRPr>
+          </a:p>
+          <a:p>
+            <a:pPr eaLnBrk="1" hangingPunct="1">
+              <a:spcBef>
+                <a:spcPct val="10000"/>
+              </a:spcBef>
+            </a:pPr>
+            <a:endParaRPr lang="en-US" altLang="he-IL" sz="2500" dirty="0">
+              <a:latin typeface="Times New Roman" pitchFamily="18" charset="0"/>
+            </a:endParaRPr>
+          </a:p>
+          <a:p>
+            <a:pPr eaLnBrk="1" hangingPunct="1">
+              <a:spcBef>
+                <a:spcPct val="10000"/>
+              </a:spcBef>
+            </a:pPr>
+            <a:endParaRPr lang="en-US" altLang="he-IL" sz="2500" dirty="0" smtClean="0">
+              <a:latin typeface="Times New Roman" pitchFamily="18" charset="0"/>
+            </a:endParaRPr>
+          </a:p>
+          <a:p>
+            <a:pPr eaLnBrk="1" hangingPunct="1">
+              <a:spcBef>
+                <a:spcPct val="10000"/>
+              </a:spcBef>
+            </a:pPr>
+            <a:endParaRPr lang="en-US" altLang="he-IL" sz="2500" dirty="0">
+              <a:latin typeface="Times New Roman" pitchFamily="18" charset="0"/>
+            </a:endParaRPr>
+          </a:p>
+          <a:p>
+            <a:pPr eaLnBrk="1" hangingPunct="1">
+              <a:spcBef>
+                <a:spcPct val="10000"/>
+              </a:spcBef>
+            </a:pPr>
+            <a:endParaRPr lang="en-US" altLang="he-IL" sz="2500" dirty="0" smtClean="0">
+              <a:latin typeface="Times New Roman" pitchFamily="18" charset="0"/>
+            </a:endParaRPr>
+          </a:p>
+          <a:p>
+            <a:pPr eaLnBrk="1" hangingPunct="1">
+              <a:spcBef>
+                <a:spcPct val="10000"/>
+              </a:spcBef>
+            </a:pPr>
+            <a:endParaRPr lang="en-US" altLang="he-IL" sz="2500" dirty="0">
+              <a:latin typeface="Times New Roman" pitchFamily="18" charset="0"/>
+            </a:endParaRPr>
+          </a:p>
+          <a:p>
+            <a:pPr eaLnBrk="1" hangingPunct="1">
+              <a:spcBef>
+                <a:spcPct val="10000"/>
+              </a:spcBef>
+            </a:pPr>
+            <a:endParaRPr lang="en-US" altLang="he-IL" sz="2500" dirty="0" smtClean="0">
+              <a:latin typeface="Times New Roman" pitchFamily="18" charset="0"/>
+            </a:endParaRPr>
+          </a:p>
+          <a:p>
+            <a:pPr eaLnBrk="1" hangingPunct="1">
+              <a:spcBef>
+                <a:spcPct val="10000"/>
+              </a:spcBef>
+            </a:pPr>
+            <a:endParaRPr lang="en-US" altLang="he-IL" sz="2500" dirty="0">
+              <a:latin typeface="Times New Roman" pitchFamily="18" charset="0"/>
+            </a:endParaRPr>
+          </a:p>
+          <a:p>
+            <a:pPr eaLnBrk="1" hangingPunct="1">
+              <a:spcBef>
+                <a:spcPct val="10000"/>
+              </a:spcBef>
+            </a:pPr>
+            <a:endParaRPr lang="en-US" altLang="he-IL" sz="2500" dirty="0" smtClean="0">
+              <a:latin typeface="Times New Roman" pitchFamily="18" charset="0"/>
+            </a:endParaRPr>
+          </a:p>
+          <a:p>
+            <a:pPr eaLnBrk="1" hangingPunct="1">
+              <a:spcBef>
+                <a:spcPct val="10000"/>
+              </a:spcBef>
+            </a:pPr>
+            <a:endParaRPr lang="en-US" altLang="he-IL" sz="2500" dirty="0">
+              <a:latin typeface="Times New Roman" pitchFamily="18" charset="0"/>
+            </a:endParaRPr>
+          </a:p>
+          <a:p>
+            <a:pPr eaLnBrk="1" hangingPunct="1">
+              <a:spcBef>
+                <a:spcPct val="10000"/>
+              </a:spcBef>
+            </a:pPr>
+            <a:endParaRPr lang="en-US" altLang="he-IL" sz="2500" dirty="0" smtClean="0">
+              <a:latin typeface="Times New Roman" pitchFamily="18" charset="0"/>
+            </a:endParaRPr>
+          </a:p>
+          <a:p>
+            <a:pPr eaLnBrk="1" hangingPunct="1">
+              <a:spcBef>
+                <a:spcPct val="10000"/>
+              </a:spcBef>
+            </a:pPr>
+            <a:endParaRPr lang="en-US" altLang="he-IL" sz="2500" dirty="0">
+              <a:latin typeface="Times New Roman" pitchFamily="18" charset="0"/>
+            </a:endParaRPr>
+          </a:p>
+          <a:p>
+            <a:pPr eaLnBrk="1" hangingPunct="1">
+              <a:spcBef>
+                <a:spcPct val="10000"/>
+              </a:spcBef>
+            </a:pPr>
+            <a:endParaRPr lang="en-US" altLang="he-IL" sz="2500" dirty="0" smtClean="0">
+              <a:latin typeface="Times New Roman" pitchFamily="18" charset="0"/>
+            </a:endParaRPr>
+          </a:p>
+          <a:p>
+            <a:pPr eaLnBrk="1" hangingPunct="1">
+              <a:spcBef>
+                <a:spcPct val="10000"/>
+              </a:spcBef>
+            </a:pPr>
+            <a:endParaRPr lang="en-US" altLang="he-IL" sz="2500" dirty="0">
+              <a:latin typeface="Times New Roman" pitchFamily="18" charset="0"/>
+            </a:endParaRPr>
+          </a:p>
+          <a:p>
+            <a:pPr eaLnBrk="1" hangingPunct="1">
+              <a:spcBef>
+                <a:spcPct val="10000"/>
+              </a:spcBef>
+            </a:pPr>
+            <a:endParaRPr lang="en-US" altLang="he-IL" sz="2500" dirty="0" smtClean="0">
+              <a:latin typeface="Times New Roman" pitchFamily="18" charset="0"/>
+            </a:endParaRPr>
+          </a:p>
+          <a:p>
+            <a:pPr eaLnBrk="1" hangingPunct="1">
+              <a:spcBef>
+                <a:spcPct val="10000"/>
+              </a:spcBef>
+            </a:pPr>
+            <a:endParaRPr lang="en-US" altLang="he-IL" sz="2500" dirty="0">
+              <a:latin typeface="Times New Roman" pitchFamily="18" charset="0"/>
+            </a:endParaRPr>
+          </a:p>
+          <a:p>
+            <a:pPr eaLnBrk="1" hangingPunct="1">
+              <a:spcBef>
+                <a:spcPct val="10000"/>
+              </a:spcBef>
+            </a:pPr>
+            <a:endParaRPr lang="en-US" altLang="he-IL" sz="2500" dirty="0" smtClean="0">
+              <a:latin typeface="Times New Roman" pitchFamily="18" charset="0"/>
+            </a:endParaRPr>
+          </a:p>
+          <a:p>
+            <a:pPr eaLnBrk="1" hangingPunct="1">
+              <a:spcBef>
+                <a:spcPct val="10000"/>
+              </a:spcBef>
+            </a:pPr>
+            <a:endParaRPr lang="en-US" altLang="he-IL" sz="2500" dirty="0" smtClean="0">
+              <a:latin typeface="Times New Roman" pitchFamily="18" charset="0"/>
+            </a:endParaRPr>
+          </a:p>
+          <a:p>
+            <a:pPr eaLnBrk="1" hangingPunct="1">
+              <a:spcBef>
+                <a:spcPct val="10000"/>
+              </a:spcBef>
+            </a:pPr>
+            <a:r>
+              <a:rPr lang="en-US" altLang="he-IL" sz="2500" dirty="0" smtClean="0">
+                <a:latin typeface="Times New Roman" pitchFamily="18" charset="0"/>
+              </a:rPr>
+              <a:t>The total OD in the predicted competitions (solid blue line) has a </a:t>
+            </a:r>
+            <a:r>
+              <a:rPr lang="en-US" altLang="he-IL" sz="2500" b="1" dirty="0" smtClean="0">
+                <a:latin typeface="Times New Roman" pitchFamily="18" charset="0"/>
+              </a:rPr>
+              <a:t>good fit with the observed </a:t>
+            </a:r>
+            <a:r>
+              <a:rPr lang="en-US" altLang="he-IL" sz="2500" dirty="0" smtClean="0">
+                <a:latin typeface="Times New Roman" pitchFamily="18" charset="0"/>
+              </a:rPr>
+              <a:t>total OD in experimental competitions (black markers).</a:t>
+            </a:r>
+          </a:p>
+          <a:p>
+            <a:pPr eaLnBrk="1" hangingPunct="1">
+              <a:spcBef>
+                <a:spcPct val="10000"/>
+              </a:spcBef>
+            </a:pPr>
+            <a:endParaRPr lang="en-US" altLang="he-IL" sz="2500" dirty="0" smtClean="0">
+              <a:latin typeface="Times New Roman" pitchFamily="18" charset="0"/>
+            </a:endParaRPr>
+          </a:p>
+          <a:p>
+            <a:pPr eaLnBrk="1" hangingPunct="1">
+              <a:spcBef>
+                <a:spcPct val="10000"/>
+              </a:spcBef>
+            </a:pPr>
+            <a:r>
+              <a:rPr lang="en-US" altLang="he-IL" sz="2500" dirty="0" smtClean="0">
+                <a:latin typeface="Times New Roman" pitchFamily="18" charset="0"/>
+              </a:rPr>
+              <a:t>Further validation will require measuring the frequency of the strains in experimental competitions. This will be achieved using fluorescent markers and flow cytometry or fluorescent microscopy.</a:t>
+            </a:r>
+          </a:p>
+          <a:p>
+            <a:pPr eaLnBrk="1" hangingPunct="1">
+              <a:spcBef>
+                <a:spcPct val="10000"/>
+              </a:spcBef>
+            </a:pPr>
+            <a:endParaRPr lang="en-US" altLang="he-IL" sz="2500" dirty="0">
+              <a:latin typeface="Times New Roman" pitchFamily="18" charset="0"/>
+            </a:endParaRPr>
+          </a:p>
+          <a:p>
+            <a:pPr eaLnBrk="1" hangingPunct="1">
+              <a:spcBef>
+                <a:spcPct val="10000"/>
+              </a:spcBef>
+            </a:pPr>
+            <a:endParaRPr lang="en-US" altLang="he-IL" sz="2500" dirty="0" smtClean="0">
+              <a:latin typeface="Times New Roman" pitchFamily="18" charset="0"/>
+            </a:endParaRPr>
+          </a:p>
+          <a:p>
+            <a:pPr eaLnBrk="1" hangingPunct="1">
+              <a:spcBef>
+                <a:spcPct val="10000"/>
+              </a:spcBef>
+            </a:pPr>
+            <a:endParaRPr lang="en-US" altLang="he-IL" sz="2500" dirty="0">
+              <a:latin typeface="Times New Roman" pitchFamily="18" charset="0"/>
+            </a:endParaRPr>
+          </a:p>
+          <a:p>
+            <a:pPr eaLnBrk="1" hangingPunct="1">
+              <a:spcBef>
+                <a:spcPct val="10000"/>
+              </a:spcBef>
+            </a:pPr>
+            <a:endParaRPr lang="en-US" altLang="he-IL" sz="2500" dirty="0" smtClean="0">
+              <a:latin typeface="Times New Roman" pitchFamily="18" charset="0"/>
+            </a:endParaRPr>
+          </a:p>
+          <a:p>
+            <a:pPr eaLnBrk="1" hangingPunct="1">
+              <a:spcBef>
+                <a:spcPct val="10000"/>
+              </a:spcBef>
+            </a:pPr>
+            <a:endParaRPr lang="en-US" altLang="he-IL" sz="2500" dirty="0">
+              <a:latin typeface="Times New Roman" pitchFamily="18" charset="0"/>
+            </a:endParaRPr>
+          </a:p>
+          <a:p>
+            <a:pPr eaLnBrk="1" hangingPunct="1">
+              <a:spcBef>
+                <a:spcPct val="10000"/>
+              </a:spcBef>
+            </a:pPr>
+            <a:endParaRPr lang="en-US" altLang="he-IL" sz="2500" dirty="0" smtClean="0">
+              <a:latin typeface="Times New Roman" pitchFamily="18" charset="0"/>
+            </a:endParaRPr>
+          </a:p>
+          <a:p>
+            <a:pPr eaLnBrk="1" hangingPunct="1">
+              <a:spcBef>
+                <a:spcPct val="10000"/>
+              </a:spcBef>
+            </a:pPr>
+            <a:endParaRPr lang="en-US" altLang="he-IL" sz="2500" dirty="0">
+              <a:latin typeface="Times New Roman" pitchFamily="18" charset="0"/>
+            </a:endParaRPr>
           </a:p>
         </p:txBody>
       </p:sp>
-      <mc:AlternateContent xmlns:mc="http://schemas.openxmlformats.org/markup-compatibility/2006">
-        <mc:Choice xmlns:a14="http://schemas.microsoft.com/office/drawing/2010/main" Requires="a14">
+      <mc:AlternateContent xmlns:mc="http://schemas.openxmlformats.org/markup-compatibility/2006" xmlns:a14="http://schemas.microsoft.com/office/drawing/2010/main">
+        <mc:Choice Requires="a14">
           <p:sp>
             <p:nvSpPr>
               <p:cNvPr id="51" name="Text Box 11"/>
@@ -5593,7 +6184,7 @@
             </p:txBody>
           </p:sp>
         </mc:Choice>
-        <mc:Fallback>
+        <mc:Fallback xmlns="">
           <p:sp>
             <p:nvSpPr>
               <p:cNvPr id="51" name="Text Box 11"/>
@@ -5651,7 +6242,7 @@
         <p:spPr bwMode="auto">
           <a:xfrm>
             <a:off x="1270000" y="7550151"/>
-            <a:ext cx="8458200" cy="10478294"/>
+            <a:ext cx="8458200" cy="4867073"/>
           </a:xfrm>
           <a:prstGeom prst="rect">
             <a:avLst/>
@@ -5814,7 +6405,7 @@
               <a:rPr lang="en-US" altLang="he-IL" sz="4200" b="1" dirty="0" smtClean="0">
                 <a:latin typeface="Calibri" pitchFamily="34" charset="0"/>
               </a:rPr>
-              <a:t>Growth curves</a:t>
+              <a:t>Introduction</a:t>
             </a:r>
             <a:endParaRPr lang="en-US" altLang="he-IL" sz="4200" b="1" dirty="0">
               <a:latin typeface="Calibri" pitchFamily="34" charset="0"/>
@@ -6176,8 +6767,8 @@
           </a:p>
         </p:txBody>
       </p:sp>
-      <mc:AlternateContent xmlns:mc="http://schemas.openxmlformats.org/markup-compatibility/2006" xmlns:a14="http://schemas.microsoft.com/office/drawing/2010/main">
-        <mc:Choice Requires="a14">
+      <mc:AlternateContent xmlns:mc="http://schemas.openxmlformats.org/markup-compatibility/2006">
+        <mc:Choice xmlns:a14="http://schemas.microsoft.com/office/drawing/2010/main" Requires="a14">
           <p:sp>
             <p:nvSpPr>
               <p:cNvPr id="14340" name="Text Box 11"/>
@@ -6188,8 +6779,8 @@
             </p:nvSpPr>
             <p:spPr bwMode="auto">
               <a:xfrm>
-                <a:off x="1270223" y="19716750"/>
-                <a:ext cx="8458200" cy="14363700"/>
+                <a:off x="1270223" y="14249400"/>
+                <a:ext cx="8458200" cy="19831050"/>
               </a:xfrm>
               <a:prstGeom prst="rect">
                 <a:avLst/>
@@ -6355,24 +6946,141 @@
                     </a:solidFill>
                     <a:latin typeface="Calibri" pitchFamily="34" charset="0"/>
                   </a:rPr>
-                  <a:t>Model selection</a:t>
-                </a:r>
-                <a:endParaRPr lang="en-US" altLang="he-IL" sz="2100" dirty="0">
+                  <a:t>Fitting growth models</a:t>
+                </a:r>
+              </a:p>
+              <a:p>
+                <a:pPr algn="just" eaLnBrk="1" hangingPunct="1">
+                  <a:spcBef>
+                    <a:spcPct val="50000"/>
+                  </a:spcBef>
+                </a:pPr>
+                <a:endParaRPr lang="en-US" altLang="he-IL" sz="3900" b="1" dirty="0">
+                  <a:solidFill>
+                    <a:srgbClr val="000000"/>
+                  </a:solidFill>
+                  <a:latin typeface="Calibri" pitchFamily="34" charset="0"/>
+                </a:endParaRPr>
+              </a:p>
+              <a:p>
+                <a:pPr algn="just" eaLnBrk="1" hangingPunct="1">
+                  <a:spcBef>
+                    <a:spcPct val="50000"/>
+                  </a:spcBef>
+                </a:pPr>
+                <a:endParaRPr lang="en-US" altLang="he-IL" sz="3900" b="1" dirty="0" smtClean="0">
+                  <a:solidFill>
+                    <a:srgbClr val="000000"/>
+                  </a:solidFill>
+                  <a:latin typeface="Calibri" pitchFamily="34" charset="0"/>
+                </a:endParaRPr>
+              </a:p>
+              <a:p>
+                <a:pPr algn="just" eaLnBrk="1" hangingPunct="1">
+                  <a:spcBef>
+                    <a:spcPct val="50000"/>
+                  </a:spcBef>
+                </a:pPr>
+                <a:endParaRPr lang="en-US" altLang="he-IL" sz="3900" b="1" dirty="0">
+                  <a:solidFill>
+                    <a:srgbClr val="000000"/>
+                  </a:solidFill>
+                  <a:latin typeface="Calibri" pitchFamily="34" charset="0"/>
+                </a:endParaRPr>
+              </a:p>
+              <a:p>
+                <a:pPr algn="just" eaLnBrk="1" hangingPunct="1">
+                  <a:spcBef>
+                    <a:spcPct val="50000"/>
+                  </a:spcBef>
+                </a:pPr>
+                <a:endParaRPr lang="en-US" altLang="he-IL" sz="3900" b="1" dirty="0" smtClean="0">
+                  <a:solidFill>
+                    <a:srgbClr val="000000"/>
+                  </a:solidFill>
+                  <a:latin typeface="Calibri" pitchFamily="34" charset="0"/>
+                </a:endParaRPr>
+              </a:p>
+              <a:p>
+                <a:pPr algn="just" eaLnBrk="1" hangingPunct="1">
+                  <a:spcBef>
+                    <a:spcPct val="50000"/>
+                  </a:spcBef>
+                </a:pPr>
+                <a:endParaRPr lang="en-US" altLang="he-IL" sz="3900" b="1" dirty="0">
+                  <a:solidFill>
+                    <a:srgbClr val="000000"/>
+                  </a:solidFill>
+                  <a:latin typeface="Calibri" pitchFamily="34" charset="0"/>
+                </a:endParaRPr>
+              </a:p>
+              <a:p>
+                <a:pPr algn="just" eaLnBrk="1" hangingPunct="1">
+                  <a:spcBef>
+                    <a:spcPct val="50000"/>
+                  </a:spcBef>
+                </a:pPr>
+                <a:endParaRPr lang="en-US" altLang="he-IL" sz="3900" b="1" dirty="0" smtClean="0">
+                  <a:solidFill>
+                    <a:srgbClr val="000000"/>
+                  </a:solidFill>
+                  <a:latin typeface="Calibri" pitchFamily="34" charset="0"/>
+                </a:endParaRPr>
+              </a:p>
+              <a:p>
+                <a:endParaRPr lang="en-US" sz="2500" dirty="0" smtClean="0">
                   <a:latin typeface="Times New Roman" pitchFamily="18" charset="0"/>
                 </a:endParaRPr>
               </a:p>
               <a:p>
-                <a:r>
-                  <a:rPr lang="en-US" sz="2500" dirty="0" err="1">
+                <a:endParaRPr lang="en-US" sz="2500" dirty="0">
+                  <a:latin typeface="Times New Roman" pitchFamily="18" charset="0"/>
+                </a:endParaRPr>
+              </a:p>
+              <a:p>
+                <a:endParaRPr lang="en-US" sz="2500" dirty="0" smtClean="0">
+                  <a:latin typeface="Times New Roman" pitchFamily="18" charset="0"/>
+                </a:endParaRPr>
+              </a:p>
+              <a:p>
+                <a:endParaRPr lang="en-US" sz="2500" dirty="0">
+                  <a:latin typeface="Times New Roman" pitchFamily="18" charset="0"/>
+                </a:endParaRPr>
+              </a:p>
+              <a:p>
+                <a:endParaRPr lang="en-US" sz="2500" dirty="0" smtClean="0">
+                  <a:latin typeface="Times New Roman" pitchFamily="18" charset="0"/>
+                </a:endParaRPr>
+              </a:p>
+              <a:p>
+                <a:endParaRPr lang="en-US" sz="2500" dirty="0">
+                  <a:latin typeface="Times New Roman" pitchFamily="18" charset="0"/>
+                </a:endParaRPr>
+              </a:p>
+              <a:p>
+                <a:r>
+                  <a:rPr lang="en-US" sz="2500" dirty="0" smtClean="0">
+                    <a:latin typeface="Times New Roman" pitchFamily="18" charset="0"/>
+                  </a:rPr>
+                  <a:t>\</a:t>
+                </a:r>
+                <a:r>
+                  <a:rPr lang="en-US" sz="2500" dirty="0" err="1" smtClean="0">
                     <a:latin typeface="Times New Roman" pitchFamily="18" charset="0"/>
                   </a:rPr>
                   <a:t>Baranyi</a:t>
                 </a:r>
                 <a:r>
+                  <a:rPr lang="en-US" sz="2500" dirty="0" smtClean="0">
+                    <a:latin typeface="Times New Roman" pitchFamily="18" charset="0"/>
+                  </a:rPr>
+                  <a:t>-Roberts </a:t>
+                </a:r>
+                <a:r>
                   <a:rPr lang="en-US" sz="2500" dirty="0">
                     <a:latin typeface="Times New Roman" pitchFamily="18" charset="0"/>
                   </a:rPr>
-                  <a:t>-Roberts model:</a:t>
+                  <a:t>model:</a:t>
                 </a:r>
               </a:p>
               <a:p>
@@ -6922,7 +7630,7 @@
             </p:txBody>
           </p:sp>
         </mc:Choice>
-        <mc:Fallback xmlns="">
+        <mc:Fallback>
           <p:sp>
             <p:nvSpPr>
               <p:cNvPr id="14340" name="Text Box 11"/>
@@ -6933,14 +7641,14 @@
             </p:nvSpPr>
             <p:spPr bwMode="auto">
               <a:xfrm>
-                <a:off x="1270223" y="19716750"/>
-                <a:ext cx="8458200" cy="14363700"/>
+                <a:off x="1270223" y="14249400"/>
+                <a:ext cx="8458200" cy="19831050"/>
               </a:xfrm>
               <a:prstGeom prst="rect">
                 <a:avLst/>
               </a:prstGeom>
               <a:blipFill rotWithShape="1">
-                <a:blip r:embed="rId8"/>
+                <a:blip r:embed="rId6"/>
                 <a:stretch>
                   <a:fillRect/>
                 </a:stretch>
@@ -6979,7 +7687,7 @@
         </p:nvSpPr>
         <p:spPr bwMode="auto">
           <a:xfrm>
-            <a:off x="11225433" y="35783839"/>
+            <a:off x="10956493" y="35783839"/>
             <a:ext cx="8458200" cy="3311668"/>
           </a:xfrm>
           <a:prstGeom prst="rect">
@@ -7517,8 +8225,23 @@
                     </a:solidFill>
                     <a:latin typeface="Calibri" pitchFamily="34" charset="0"/>
                   </a:rPr>
-                  <a:t>Competition simulation</a:t>
-                </a:r>
+                  <a:t>Competition </a:t>
+                </a:r>
+                <a:r>
+                  <a:rPr lang="en-US" altLang="he-IL" sz="4200" b="1" dirty="0" smtClean="0">
+                    <a:solidFill>
+                      <a:srgbClr val="000000"/>
+                    </a:solidFill>
+                    <a:latin typeface="Calibri" pitchFamily="34" charset="0"/>
+                  </a:rPr>
+                  <a:t>prediction</a:t>
+                </a:r>
+                <a:endParaRPr lang="en-US" altLang="he-IL" sz="4200" b="1" dirty="0" smtClean="0">
+                  <a:solidFill>
+                    <a:srgbClr val="000000"/>
+                  </a:solidFill>
+                  <a:latin typeface="Calibri" pitchFamily="34" charset="0"/>
+                </a:endParaRPr>
               </a:p>
               <a:p>
                 <a:pPr eaLnBrk="1" hangingPunct="1">
@@ -8163,7 +8886,7 @@
                 <a:avLst/>
               </a:prstGeom>
               <a:blipFill rotWithShape="1">
-                <a:blip r:embed="rId9"/>
+                <a:blip r:embed="rId7"/>
                 <a:stretch>
                   <a:fillRect/>
                 </a:stretch>
@@ -8481,13 +9204,7 @@
               <a:rPr lang="en-US" altLang="he-IL" sz="3600" spc="100" dirty="0" smtClean="0">
                 <a:latin typeface="Calibri" pitchFamily="34" charset="0"/>
               </a:rPr>
-              <a:t>Dept</a:t>
-            </a:r>
-            <a:r>
-              <a:rPr lang="en-US" altLang="he-IL" sz="3600" spc="100" dirty="0" smtClean="0">
-                <a:latin typeface="Calibri" pitchFamily="34" charset="0"/>
-              </a:rPr>
-              <a:t>. of Molecular Biology &amp; Ecology of Plants</a:t>
+              <a:t>Dept. of Molecular Biology &amp; Ecology of Plants</a:t>
             </a:r>
             <a:r>
               <a:rPr lang="en-US" altLang="he-IL" sz="3600" spc="100" baseline="30000" dirty="0" smtClean="0">
@@ -8549,7 +9266,7 @@
           </a:ln>
         </p:spPr>
         <p:txBody>
-          <a:bodyPr lIns="802806" tIns="401404" rIns="802806" bIns="802806" numCol="2" spcCol="802806"/>
+          <a:bodyPr lIns="802806" tIns="401404" rIns="802806" bIns="802806" numCol="1" spcCol="802806"/>
           <a:lstStyle/>
           <a:p>
             <a:pPr marL="439035" indent="-439035">
@@ -8572,441 +9289,224 @@
           </a:p>
           <a:p>
             <a:pPr marL="439035" indent="-439035">
-              <a:spcBef>
-                <a:spcPts val="1054"/>
-              </a:spcBef>
               <a:defRPr/>
             </a:pPr>
             <a:r>
-              <a:rPr lang="en-US" sz="2500" dirty="0" smtClean="0">
-                <a:latin typeface="Times New Roman" pitchFamily="-111" charset="0"/>
+              <a:rPr lang="en-US" sz="2300" dirty="0" err="1">
+                <a:latin typeface="+mn-lt"/>
+              </a:rPr>
+              <a:t>Baranyi</a:t>
+            </a:r>
+            <a:r>
+              <a:rPr lang="en-US" sz="2300" dirty="0">
+                <a:latin typeface="+mn-lt"/>
+              </a:rPr>
+              <a:t>, J., Roberts, T. A., 1994. </a:t>
+            </a:r>
+            <a:r>
+              <a:rPr lang="en-US" sz="2300" i="1" dirty="0">
+                <a:latin typeface="+mn-lt"/>
+              </a:rPr>
+              <a:t>A dynamic </a:t>
+            </a:r>
+            <a:r>
+              <a:rPr lang="en-US" sz="2300" i="1" dirty="0">
+                <a:latin typeface="+mn-lt"/>
+              </a:rPr>
+              <a:t>approach to </a:t>
+            </a:r>
+            <a:r>
+              <a:rPr lang="en-US" sz="2300" i="1" dirty="0">
+                <a:latin typeface="+mn-lt"/>
+              </a:rPr>
+              <a:t>predicting bacterial growth in food</a:t>
+            </a:r>
+            <a:r>
+              <a:rPr lang="en-US" sz="2300" dirty="0">
+                <a:latin typeface="+mn-lt"/>
+              </a:rPr>
+              <a:t>. Int. J. Food </a:t>
+            </a:r>
+            <a:r>
+              <a:rPr lang="en-US" sz="2300" dirty="0" err="1">
+                <a:latin typeface="+mn-lt"/>
+              </a:rPr>
+              <a:t>Microbiol</a:t>
+            </a:r>
+            <a:r>
+              <a:rPr lang="en-US" sz="2300" dirty="0">
+                <a:latin typeface="+mn-lt"/>
+              </a:rPr>
+              <a:t>. 23, 277–294.</a:t>
+            </a:r>
+          </a:p>
+          <a:p>
+            <a:pPr marL="439035" indent="-439035">
+              <a:defRPr/>
+            </a:pPr>
+            <a:r>
+              <a:rPr lang="en-US" sz="2300" dirty="0" err="1">
+                <a:latin typeface="+mn-lt"/>
+              </a:rPr>
+              <a:t>Chevin</a:t>
+            </a:r>
+            <a:r>
+              <a:rPr lang="en-US" sz="2300" dirty="0">
+                <a:latin typeface="+mn-lt"/>
+              </a:rPr>
+              <a:t>, L.-M., 2011. </a:t>
+            </a:r>
+            <a:r>
+              <a:rPr lang="en-US" sz="2300" i="1" dirty="0">
+                <a:latin typeface="+mn-lt"/>
+              </a:rPr>
+              <a:t>On measuring selection </a:t>
+            </a:r>
+            <a:r>
+              <a:rPr lang="en-US" sz="2300" i="1" dirty="0" smtClean="0">
+                <a:latin typeface="+mn-lt"/>
+              </a:rPr>
+              <a:t>in experimental </a:t>
+            </a:r>
+            <a:r>
+              <a:rPr lang="en-US" sz="2300" i="1" dirty="0">
+                <a:latin typeface="+mn-lt"/>
+              </a:rPr>
+              <a:t>evolution</a:t>
+            </a:r>
+            <a:r>
+              <a:rPr lang="en-US" sz="2300" dirty="0">
+                <a:latin typeface="+mn-lt"/>
+              </a:rPr>
+              <a:t>. </a:t>
+            </a:r>
+            <a:r>
+              <a:rPr lang="en-US" sz="2300" dirty="0">
+                <a:latin typeface="+mn-lt"/>
+              </a:rPr>
+              <a:t>Biol. Lett. 7, 210–3.</a:t>
+            </a:r>
+          </a:p>
+          <a:p>
+            <a:pPr marL="439035" indent="-439035">
+              <a:defRPr/>
+            </a:pPr>
+            <a:r>
+              <a:rPr lang="en-US" sz="2300" dirty="0">
+                <a:latin typeface="+mn-lt"/>
+              </a:rPr>
+              <a:t>Crow, J.F., Kimura, M., 1970. </a:t>
+            </a:r>
+            <a:r>
+              <a:rPr lang="en-US" sz="2300" i="1" dirty="0">
+                <a:latin typeface="+mn-lt"/>
+              </a:rPr>
+              <a:t>An introduction to population genetics theory</a:t>
+            </a:r>
+            <a:r>
+              <a:rPr lang="en-US" sz="2300" dirty="0">
+                <a:latin typeface="+mn-lt"/>
+              </a:rPr>
+              <a:t>. Burgess Pub. Co., Minneapolis.</a:t>
+            </a:r>
+          </a:p>
+          <a:p>
+            <a:pPr marL="439035" indent="-439035">
+              <a:defRPr/>
+            </a:pPr>
+            <a:r>
+              <a:rPr lang="en-US" sz="2300" dirty="0" err="1">
+                <a:latin typeface="+mn-lt"/>
+              </a:rPr>
+              <a:t>Masel</a:t>
+            </a:r>
+            <a:r>
+              <a:rPr lang="en-US" sz="2300" dirty="0">
+                <a:latin typeface="+mn-lt"/>
+              </a:rPr>
+              <a:t>, J., 2014. </a:t>
+            </a:r>
+            <a:r>
+              <a:rPr lang="en-US" sz="2300" i="1" dirty="0">
+                <a:latin typeface="+mn-lt"/>
+              </a:rPr>
+              <a:t>Eco-evolutionary “fitness” in 3 dimensions: absolute growth, absolute efficiency, and relative competitiveness</a:t>
+            </a:r>
+            <a:r>
+              <a:rPr lang="en-US" sz="2300" dirty="0">
+                <a:latin typeface="+mn-lt"/>
+              </a:rPr>
+              <a:t>. </a:t>
+            </a:r>
+            <a:r>
+              <a:rPr lang="en-US" sz="2300" dirty="0">
+                <a:latin typeface="+mn-lt"/>
+              </a:rPr>
+              <a:t>ArXiv:1407.1024</a:t>
+            </a:r>
+          </a:p>
+          <a:p>
+            <a:pPr marL="439035" indent="-439035">
+              <a:defRPr/>
+            </a:pPr>
+            <a:r>
+              <a:rPr lang="en-US" sz="2300" dirty="0">
+                <a:latin typeface="+mn-lt"/>
+              </a:rPr>
+              <a:t>Wiser</a:t>
+            </a:r>
+            <a:r>
+              <a:rPr lang="en-US" sz="2300" dirty="0">
+                <a:latin typeface="+mn-lt"/>
+              </a:rPr>
+              <a:t>, M.J., </a:t>
+            </a:r>
+            <a:r>
+              <a:rPr lang="en-US" sz="2300" dirty="0" err="1">
+                <a:latin typeface="+mn-lt"/>
+              </a:rPr>
+              <a:t>Lenski</a:t>
+            </a:r>
+            <a:r>
+              <a:rPr lang="en-US" sz="2300" dirty="0">
+                <a:latin typeface="+mn-lt"/>
+              </a:rPr>
+              <a:t>, R.E., 2015. </a:t>
+            </a:r>
+            <a:r>
+              <a:rPr lang="en-US" sz="2300" i="1" dirty="0">
+                <a:latin typeface="+mn-lt"/>
+              </a:rPr>
+              <a:t>A Comparison of Methods to Measure Fitness in </a:t>
+            </a:r>
+            <a:r>
+              <a:rPr lang="en-US" sz="2300" dirty="0">
+                <a:latin typeface="+mn-lt"/>
+              </a:rPr>
+              <a:t>Escherichia coli. </a:t>
+            </a:r>
+            <a:r>
+              <a:rPr lang="en-US" sz="2300" dirty="0" err="1">
+                <a:latin typeface="+mn-lt"/>
+              </a:rPr>
+              <a:t>PLoS</a:t>
+            </a:r>
+            <a:r>
+              <a:rPr lang="en-US" sz="2300" dirty="0">
+                <a:latin typeface="+mn-lt"/>
+              </a:rPr>
+              <a:t> One 10, e0126210</a:t>
+            </a:r>
+            <a:r>
+              <a:rPr lang="en-US" sz="2300" dirty="0" smtClean="0">
+                <a:latin typeface="+mn-lt"/>
                 <a:ea typeface="ＭＳ Ｐゴシック" pitchFamily="-111" charset="-128"/>
                 <a:cs typeface="ＭＳ Ｐゴシック" pitchFamily="-111" charset="-128"/>
               </a:rPr>
-              <a:t>Blah</a:t>
-            </a:r>
-            <a:r>
-              <a:rPr lang="en-US" sz="2500" dirty="0">
-                <a:latin typeface="Times New Roman" pitchFamily="-111" charset="0"/>
-                <a:ea typeface="ＭＳ Ｐゴシック" pitchFamily="-111" charset="-128"/>
-                <a:cs typeface="ＭＳ Ｐゴシック" pitchFamily="-111" charset="-128"/>
-              </a:rPr>
-              <a:t>, blah, and blah.  2012.  </a:t>
-            </a:r>
-            <a:r>
-              <a:rPr lang="en-US" sz="2500" dirty="0" err="1">
-                <a:latin typeface="Times New Roman" pitchFamily="-111" charset="0"/>
-                <a:ea typeface="ＭＳ Ｐゴシック" pitchFamily="-111" charset="-128"/>
-                <a:cs typeface="ＭＳ Ｐゴシック" pitchFamily="-111" charset="-128"/>
-              </a:rPr>
-              <a:t>Blahing</a:t>
-            </a:r>
-            <a:r>
-              <a:rPr lang="en-US" sz="2500" dirty="0">
-                <a:latin typeface="Times New Roman" pitchFamily="-111" charset="0"/>
-                <a:ea typeface="ＭＳ Ｐゴシック" pitchFamily="-111" charset="-128"/>
-                <a:cs typeface="ＭＳ Ｐゴシック" pitchFamily="-111" charset="-128"/>
-              </a:rPr>
-              <a:t>, </a:t>
-            </a:r>
-            <a:r>
-              <a:rPr lang="en-US" sz="2500" dirty="0" err="1">
-                <a:latin typeface="Times New Roman" pitchFamily="-111" charset="0"/>
-                <a:ea typeface="ＭＳ Ｐゴシック" pitchFamily="-111" charset="-128"/>
-                <a:cs typeface="ＭＳ Ｐゴシック" pitchFamily="-111" charset="-128"/>
-              </a:rPr>
-              <a:t>blahing</a:t>
-            </a:r>
-            <a:r>
-              <a:rPr lang="en-US" sz="2500" dirty="0">
-                <a:latin typeface="Times New Roman" pitchFamily="-111" charset="0"/>
-                <a:ea typeface="ＭＳ Ｐゴシック" pitchFamily="-111" charset="-128"/>
-                <a:cs typeface="ＭＳ Ｐゴシック" pitchFamily="-111" charset="-128"/>
-              </a:rPr>
-              <a:t>, and more </a:t>
-            </a:r>
-            <a:r>
-              <a:rPr lang="en-US" sz="2500" dirty="0" err="1">
-                <a:latin typeface="Times New Roman" pitchFamily="-111" charset="0"/>
-                <a:ea typeface="ＭＳ Ｐゴシック" pitchFamily="-111" charset="-128"/>
-                <a:cs typeface="ＭＳ Ｐゴシック" pitchFamily="-111" charset="-128"/>
-              </a:rPr>
-              <a:t>blahing</a:t>
-            </a:r>
-            <a:r>
-              <a:rPr lang="en-US" sz="2500" dirty="0">
-                <a:latin typeface="Times New Roman" pitchFamily="-111" charset="0"/>
-                <a:ea typeface="ＭＳ Ｐゴシック" pitchFamily="-111" charset="-128"/>
-                <a:cs typeface="ＭＳ Ｐゴシック" pitchFamily="-111" charset="-128"/>
-              </a:rPr>
-              <a:t>.  </a:t>
-            </a:r>
-            <a:r>
-              <a:rPr lang="en-US" sz="2500" i="1" dirty="0">
-                <a:latin typeface="Times New Roman" pitchFamily="-111" charset="0"/>
-                <a:ea typeface="ＭＳ Ｐゴシック" pitchFamily="-111" charset="-128"/>
-                <a:cs typeface="ＭＳ Ｐゴシック" pitchFamily="-111" charset="-128"/>
-              </a:rPr>
-              <a:t>Journal of </a:t>
-            </a:r>
-            <a:r>
-              <a:rPr lang="en-US" sz="2500" i="1" dirty="0" err="1">
-                <a:latin typeface="Times New Roman" pitchFamily="-111" charset="0"/>
-                <a:ea typeface="ＭＳ Ｐゴシック" pitchFamily="-111" charset="-128"/>
-                <a:cs typeface="ＭＳ Ｐゴシック" pitchFamily="-111" charset="-128"/>
-              </a:rPr>
-              <a:t>Blahology</a:t>
-            </a:r>
-            <a:r>
-              <a:rPr lang="en-US" sz="2500" dirty="0">
-                <a:latin typeface="Times New Roman" pitchFamily="-111" charset="0"/>
-                <a:ea typeface="ＭＳ Ｐゴシック" pitchFamily="-111" charset="-128"/>
-                <a:cs typeface="ＭＳ Ｐゴシック" pitchFamily="-111" charset="-128"/>
-              </a:rPr>
-              <a:t> 1:1-2.</a:t>
-            </a:r>
-          </a:p>
-          <a:p>
-            <a:pPr marL="439035" indent="-439035">
-              <a:defRPr/>
-            </a:pPr>
-            <a:r>
-              <a:rPr lang="en-US" sz="2500" dirty="0">
-                <a:latin typeface="Times New Roman" pitchFamily="-111" charset="0"/>
-                <a:ea typeface="ＭＳ Ｐゴシック" pitchFamily="-111" charset="-128"/>
-                <a:cs typeface="ＭＳ Ｐゴシック" pitchFamily="-111" charset="-128"/>
-              </a:rPr>
-              <a:t>Blah, blah, and blah.  2012.  </a:t>
-            </a:r>
-            <a:r>
-              <a:rPr lang="en-US" sz="2500" dirty="0" err="1">
-                <a:latin typeface="Times New Roman" pitchFamily="-111" charset="0"/>
-                <a:ea typeface="ＭＳ Ｐゴシック" pitchFamily="-111" charset="-128"/>
-                <a:cs typeface="ＭＳ Ｐゴシック" pitchFamily="-111" charset="-128"/>
-              </a:rPr>
-              <a:t>Blahing</a:t>
-            </a:r>
-            <a:r>
-              <a:rPr lang="en-US" sz="2500" dirty="0">
-                <a:latin typeface="Times New Roman" pitchFamily="-111" charset="0"/>
-                <a:ea typeface="ＭＳ Ｐゴシック" pitchFamily="-111" charset="-128"/>
-                <a:cs typeface="ＭＳ Ｐゴシック" pitchFamily="-111" charset="-128"/>
-              </a:rPr>
-              <a:t>, </a:t>
-            </a:r>
-            <a:r>
-              <a:rPr lang="en-US" sz="2500" dirty="0" err="1">
-                <a:latin typeface="Times New Roman" pitchFamily="-111" charset="0"/>
-                <a:ea typeface="ＭＳ Ｐゴシック" pitchFamily="-111" charset="-128"/>
-                <a:cs typeface="ＭＳ Ｐゴシック" pitchFamily="-111" charset="-128"/>
-              </a:rPr>
-              <a:t>blahing</a:t>
-            </a:r>
-            <a:r>
-              <a:rPr lang="en-US" sz="2500" dirty="0">
-                <a:latin typeface="Times New Roman" pitchFamily="-111" charset="0"/>
-                <a:ea typeface="ＭＳ Ｐゴシック" pitchFamily="-111" charset="-128"/>
-                <a:cs typeface="ＭＳ Ｐゴシック" pitchFamily="-111" charset="-128"/>
-              </a:rPr>
-              <a:t>, and more </a:t>
-            </a:r>
-            <a:r>
-              <a:rPr lang="en-US" sz="2500" dirty="0" err="1">
-                <a:latin typeface="Times New Roman" pitchFamily="-111" charset="0"/>
-                <a:ea typeface="ＭＳ Ｐゴシック" pitchFamily="-111" charset="-128"/>
-                <a:cs typeface="ＭＳ Ｐゴシック" pitchFamily="-111" charset="-128"/>
-              </a:rPr>
-              <a:t>blahing</a:t>
-            </a:r>
-            <a:r>
-              <a:rPr lang="en-US" sz="2500" dirty="0">
-                <a:latin typeface="Times New Roman" pitchFamily="-111" charset="0"/>
-                <a:ea typeface="ＭＳ Ｐゴシック" pitchFamily="-111" charset="-128"/>
-                <a:cs typeface="ＭＳ Ｐゴシック" pitchFamily="-111" charset="-128"/>
-              </a:rPr>
-              <a:t>.  </a:t>
-            </a:r>
-            <a:r>
-              <a:rPr lang="en-US" sz="2500" i="1" dirty="0">
-                <a:latin typeface="Times New Roman" pitchFamily="-111" charset="0"/>
-                <a:ea typeface="ＭＳ Ｐゴシック" pitchFamily="-111" charset="-128"/>
-                <a:cs typeface="ＭＳ Ｐゴシック" pitchFamily="-111" charset="-128"/>
-              </a:rPr>
-              <a:t>Journal of </a:t>
-            </a:r>
-            <a:r>
-              <a:rPr lang="en-US" sz="2500" i="1" dirty="0" err="1">
-                <a:latin typeface="Times New Roman" pitchFamily="-111" charset="0"/>
-                <a:ea typeface="ＭＳ Ｐゴシック" pitchFamily="-111" charset="-128"/>
-                <a:cs typeface="ＭＳ Ｐゴシック" pitchFamily="-111" charset="-128"/>
-              </a:rPr>
-              <a:t>Blahology</a:t>
-            </a:r>
-            <a:r>
-              <a:rPr lang="en-US" sz="2500" dirty="0">
-                <a:latin typeface="Times New Roman" pitchFamily="-111" charset="0"/>
-                <a:ea typeface="ＭＳ Ｐゴシック" pitchFamily="-111" charset="-128"/>
-                <a:cs typeface="ＭＳ Ｐゴシック" pitchFamily="-111" charset="-128"/>
-              </a:rPr>
-              <a:t> 1:1-2.</a:t>
-            </a:r>
-          </a:p>
-          <a:p>
-            <a:pPr marL="439035" indent="-439035">
-              <a:defRPr/>
-            </a:pPr>
-            <a:r>
-              <a:rPr lang="en-US" sz="2500" dirty="0">
-                <a:latin typeface="Times New Roman" pitchFamily="-111" charset="0"/>
-                <a:ea typeface="ＭＳ Ｐゴシック" pitchFamily="-111" charset="-128"/>
-                <a:cs typeface="ＭＳ Ｐゴシック" pitchFamily="-111" charset="-128"/>
-              </a:rPr>
-              <a:t>Blah, blah, and blah.  2012.  </a:t>
-            </a:r>
-            <a:r>
-              <a:rPr lang="en-US" sz="2500" dirty="0" err="1">
-                <a:latin typeface="Times New Roman" pitchFamily="-111" charset="0"/>
-                <a:ea typeface="ＭＳ Ｐゴシック" pitchFamily="-111" charset="-128"/>
-                <a:cs typeface="ＭＳ Ｐゴシック" pitchFamily="-111" charset="-128"/>
-              </a:rPr>
-              <a:t>Blahing</a:t>
-            </a:r>
-            <a:r>
-              <a:rPr lang="en-US" sz="2500" dirty="0">
-                <a:latin typeface="Times New Roman" pitchFamily="-111" charset="0"/>
-                <a:ea typeface="ＭＳ Ｐゴシック" pitchFamily="-111" charset="-128"/>
-                <a:cs typeface="ＭＳ Ｐゴシック" pitchFamily="-111" charset="-128"/>
-              </a:rPr>
-              <a:t>, </a:t>
-            </a:r>
-            <a:r>
-              <a:rPr lang="en-US" sz="2500" dirty="0" err="1">
-                <a:latin typeface="Times New Roman" pitchFamily="-111" charset="0"/>
-                <a:ea typeface="ＭＳ Ｐゴシック" pitchFamily="-111" charset="-128"/>
-                <a:cs typeface="ＭＳ Ｐゴシック" pitchFamily="-111" charset="-128"/>
-              </a:rPr>
-              <a:t>blahing</a:t>
-            </a:r>
-            <a:r>
-              <a:rPr lang="en-US" sz="2500" dirty="0">
-                <a:latin typeface="Times New Roman" pitchFamily="-111" charset="0"/>
-                <a:ea typeface="ＭＳ Ｐゴシック" pitchFamily="-111" charset="-128"/>
-                <a:cs typeface="ＭＳ Ｐゴシック" pitchFamily="-111" charset="-128"/>
-              </a:rPr>
-              <a:t>, and more </a:t>
-            </a:r>
-            <a:r>
-              <a:rPr lang="en-US" sz="2500" dirty="0" err="1">
-                <a:latin typeface="Times New Roman" pitchFamily="-111" charset="0"/>
-                <a:ea typeface="ＭＳ Ｐゴシック" pitchFamily="-111" charset="-128"/>
-                <a:cs typeface="ＭＳ Ｐゴシック" pitchFamily="-111" charset="-128"/>
-              </a:rPr>
-              <a:t>blahing</a:t>
-            </a:r>
-            <a:r>
-              <a:rPr lang="en-US" sz="2500" dirty="0">
-                <a:latin typeface="Times New Roman" pitchFamily="-111" charset="0"/>
-                <a:ea typeface="ＭＳ Ｐゴシック" pitchFamily="-111" charset="-128"/>
-                <a:cs typeface="ＭＳ Ｐゴシック" pitchFamily="-111" charset="-128"/>
-              </a:rPr>
-              <a:t>.  </a:t>
-            </a:r>
-            <a:r>
-              <a:rPr lang="en-US" sz="2500" i="1" dirty="0">
-                <a:latin typeface="Times New Roman" pitchFamily="-111" charset="0"/>
-                <a:ea typeface="ＭＳ Ｐゴシック" pitchFamily="-111" charset="-128"/>
-                <a:cs typeface="ＭＳ Ｐゴシック" pitchFamily="-111" charset="-128"/>
-              </a:rPr>
-              <a:t>Journal of </a:t>
-            </a:r>
-            <a:r>
-              <a:rPr lang="en-US" sz="2500" i="1" dirty="0" err="1">
-                <a:latin typeface="Times New Roman" pitchFamily="-111" charset="0"/>
-                <a:ea typeface="ＭＳ Ｐゴシック" pitchFamily="-111" charset="-128"/>
-                <a:cs typeface="ＭＳ Ｐゴシック" pitchFamily="-111" charset="-128"/>
-              </a:rPr>
-              <a:t>Blahology</a:t>
-            </a:r>
-            <a:r>
-              <a:rPr lang="en-US" sz="2500" dirty="0">
-                <a:latin typeface="Times New Roman" pitchFamily="-111" charset="0"/>
-                <a:ea typeface="ＭＳ Ｐゴシック" pitchFamily="-111" charset="-128"/>
-                <a:cs typeface="ＭＳ Ｐゴシック" pitchFamily="-111" charset="-128"/>
-              </a:rPr>
-              <a:t> 1:1-2.</a:t>
-            </a:r>
-          </a:p>
-          <a:p>
-            <a:pPr marL="439035" indent="-439035">
-              <a:defRPr/>
-            </a:pPr>
-            <a:r>
-              <a:rPr lang="en-US" sz="2500" dirty="0">
-                <a:latin typeface="Times New Roman" pitchFamily="-111" charset="0"/>
-                <a:ea typeface="ＭＳ Ｐゴシック" pitchFamily="-111" charset="-128"/>
-                <a:cs typeface="ＭＳ Ｐゴシック" pitchFamily="-111" charset="-128"/>
-              </a:rPr>
-              <a:t>Blah, blah, and blah.  2012.  </a:t>
-            </a:r>
-            <a:r>
-              <a:rPr lang="en-US" sz="2500" dirty="0" err="1">
-                <a:latin typeface="Times New Roman" pitchFamily="-111" charset="0"/>
-                <a:ea typeface="ＭＳ Ｐゴシック" pitchFamily="-111" charset="-128"/>
-                <a:cs typeface="ＭＳ Ｐゴシック" pitchFamily="-111" charset="-128"/>
-              </a:rPr>
-              <a:t>Blahing</a:t>
-            </a:r>
-            <a:r>
-              <a:rPr lang="en-US" sz="2500" dirty="0">
-                <a:latin typeface="Times New Roman" pitchFamily="-111" charset="0"/>
-                <a:ea typeface="ＭＳ Ｐゴシック" pitchFamily="-111" charset="-128"/>
-                <a:cs typeface="ＭＳ Ｐゴシック" pitchFamily="-111" charset="-128"/>
-              </a:rPr>
-              <a:t>, </a:t>
-            </a:r>
-            <a:r>
-              <a:rPr lang="en-US" sz="2500" dirty="0" err="1">
-                <a:latin typeface="Times New Roman" pitchFamily="-111" charset="0"/>
-                <a:ea typeface="ＭＳ Ｐゴシック" pitchFamily="-111" charset="-128"/>
-                <a:cs typeface="ＭＳ Ｐゴシック" pitchFamily="-111" charset="-128"/>
-              </a:rPr>
-              <a:t>blahing</a:t>
-            </a:r>
-            <a:r>
-              <a:rPr lang="en-US" sz="2500" dirty="0">
-                <a:latin typeface="Times New Roman" pitchFamily="-111" charset="0"/>
-                <a:ea typeface="ＭＳ Ｐゴシック" pitchFamily="-111" charset="-128"/>
-                <a:cs typeface="ＭＳ Ｐゴシック" pitchFamily="-111" charset="-128"/>
-              </a:rPr>
-              <a:t>, and more </a:t>
-            </a:r>
-            <a:r>
-              <a:rPr lang="en-US" sz="2500" dirty="0" err="1">
-                <a:latin typeface="Times New Roman" pitchFamily="-111" charset="0"/>
-                <a:ea typeface="ＭＳ Ｐゴシック" pitchFamily="-111" charset="-128"/>
-                <a:cs typeface="ＭＳ Ｐゴシック" pitchFamily="-111" charset="-128"/>
-              </a:rPr>
-              <a:t>blahing</a:t>
-            </a:r>
-            <a:r>
-              <a:rPr lang="en-US" sz="2500" dirty="0">
-                <a:latin typeface="Times New Roman" pitchFamily="-111" charset="0"/>
-                <a:ea typeface="ＭＳ Ｐゴシック" pitchFamily="-111" charset="-128"/>
-                <a:cs typeface="ＭＳ Ｐゴシック" pitchFamily="-111" charset="-128"/>
-              </a:rPr>
-              <a:t>.  </a:t>
-            </a:r>
-            <a:r>
-              <a:rPr lang="en-US" sz="2500" i="1" dirty="0">
-                <a:latin typeface="Times New Roman" pitchFamily="-111" charset="0"/>
-                <a:ea typeface="ＭＳ Ｐゴシック" pitchFamily="-111" charset="-128"/>
-                <a:cs typeface="ＭＳ Ｐゴシック" pitchFamily="-111" charset="-128"/>
-              </a:rPr>
-              <a:t>Journal of </a:t>
-            </a:r>
-            <a:r>
-              <a:rPr lang="en-US" sz="2500" i="1" dirty="0" err="1">
-                <a:latin typeface="Times New Roman" pitchFamily="-111" charset="0"/>
-                <a:ea typeface="ＭＳ Ｐゴシック" pitchFamily="-111" charset="-128"/>
-                <a:cs typeface="ＭＳ Ｐゴシック" pitchFamily="-111" charset="-128"/>
-              </a:rPr>
-              <a:t>Blahology</a:t>
-            </a:r>
-            <a:r>
-              <a:rPr lang="en-US" sz="2500" dirty="0">
-                <a:latin typeface="Times New Roman" pitchFamily="-111" charset="0"/>
-                <a:ea typeface="ＭＳ Ｐゴシック" pitchFamily="-111" charset="-128"/>
-                <a:cs typeface="ＭＳ Ｐゴシック" pitchFamily="-111" charset="-128"/>
-              </a:rPr>
-              <a:t> 1:1-2.</a:t>
-            </a:r>
-          </a:p>
-          <a:p>
-            <a:pPr marL="439035" indent="-439035">
-              <a:defRPr/>
-            </a:pPr>
-            <a:r>
-              <a:rPr lang="en-US" sz="2500" dirty="0" smtClean="0">
-                <a:latin typeface="Times New Roman" pitchFamily="-111" charset="0"/>
-                <a:ea typeface="ＭＳ Ｐゴシック" pitchFamily="-111" charset="-128"/>
-                <a:cs typeface="ＭＳ Ｐゴシック" pitchFamily="-111" charset="-128"/>
-              </a:rPr>
-              <a:t>Blah, blah, and blah.  2012.  </a:t>
-            </a:r>
-            <a:r>
-              <a:rPr lang="en-US" sz="2500" dirty="0" err="1" smtClean="0">
-                <a:latin typeface="Times New Roman" pitchFamily="-111" charset="0"/>
-                <a:ea typeface="ＭＳ Ｐゴシック" pitchFamily="-111" charset="-128"/>
-                <a:cs typeface="ＭＳ Ｐゴシック" pitchFamily="-111" charset="-128"/>
-              </a:rPr>
-              <a:t>Blahing</a:t>
-            </a:r>
-            <a:r>
-              <a:rPr lang="en-US" sz="2500" dirty="0" smtClean="0">
-                <a:latin typeface="Times New Roman" pitchFamily="-111" charset="0"/>
-                <a:ea typeface="ＭＳ Ｐゴシック" pitchFamily="-111" charset="-128"/>
-                <a:cs typeface="ＭＳ Ｐゴシック" pitchFamily="-111" charset="-128"/>
-              </a:rPr>
-              <a:t>, </a:t>
-            </a:r>
-            <a:r>
-              <a:rPr lang="en-US" sz="2500" dirty="0" err="1" smtClean="0">
-                <a:latin typeface="Times New Roman" pitchFamily="-111" charset="0"/>
-                <a:ea typeface="ＭＳ Ｐゴシック" pitchFamily="-111" charset="-128"/>
-                <a:cs typeface="ＭＳ Ｐゴシック" pitchFamily="-111" charset="-128"/>
-              </a:rPr>
-              <a:t>blahing</a:t>
-            </a:r>
-            <a:r>
-              <a:rPr lang="en-US" sz="2500" dirty="0" smtClean="0">
-                <a:latin typeface="Times New Roman" pitchFamily="-111" charset="0"/>
-                <a:ea typeface="ＭＳ Ｐゴシック" pitchFamily="-111" charset="-128"/>
-                <a:cs typeface="ＭＳ Ｐゴシック" pitchFamily="-111" charset="-128"/>
-              </a:rPr>
-              <a:t>, and more </a:t>
-            </a:r>
-            <a:r>
-              <a:rPr lang="en-US" sz="2500" dirty="0" err="1" smtClean="0">
-                <a:latin typeface="Times New Roman" pitchFamily="-111" charset="0"/>
-                <a:ea typeface="ＭＳ Ｐゴシック" pitchFamily="-111" charset="-128"/>
-                <a:cs typeface="ＭＳ Ｐゴシック" pitchFamily="-111" charset="-128"/>
-              </a:rPr>
-              <a:t>blahing</a:t>
-            </a:r>
-            <a:r>
-              <a:rPr lang="en-US" sz="2500" dirty="0" smtClean="0">
-                <a:latin typeface="Times New Roman" pitchFamily="-111" charset="0"/>
-                <a:ea typeface="ＭＳ Ｐゴシック" pitchFamily="-111" charset="-128"/>
-                <a:cs typeface="ＭＳ Ｐゴシック" pitchFamily="-111" charset="-128"/>
-              </a:rPr>
-              <a:t>.  </a:t>
-            </a:r>
-            <a:r>
-              <a:rPr lang="en-US" sz="2500" i="1" dirty="0" smtClean="0">
-                <a:latin typeface="Times New Roman" pitchFamily="-111" charset="0"/>
-                <a:ea typeface="ＭＳ Ｐゴシック" pitchFamily="-111" charset="-128"/>
-                <a:cs typeface="ＭＳ Ｐゴシック" pitchFamily="-111" charset="-128"/>
-              </a:rPr>
-              <a:t>Journal of </a:t>
-            </a:r>
-            <a:r>
-              <a:rPr lang="en-US" sz="2500" i="1" dirty="0" err="1" smtClean="0">
-                <a:latin typeface="Times New Roman" pitchFamily="-111" charset="0"/>
-                <a:ea typeface="ＭＳ Ｐゴシック" pitchFamily="-111" charset="-128"/>
-                <a:cs typeface="ＭＳ Ｐゴシック" pitchFamily="-111" charset="-128"/>
-              </a:rPr>
-              <a:t>Blahology</a:t>
-            </a:r>
-            <a:r>
-              <a:rPr lang="en-US" sz="2500" dirty="0" smtClean="0">
-                <a:latin typeface="Times New Roman" pitchFamily="-111" charset="0"/>
-                <a:ea typeface="ＭＳ Ｐゴシック" pitchFamily="-111" charset="-128"/>
-                <a:cs typeface="ＭＳ Ｐゴシック" pitchFamily="-111" charset="-128"/>
-              </a:rPr>
-              <a:t> 1:1-2.</a:t>
-            </a:r>
-            <a:endParaRPr lang="en-US" sz="2500" dirty="0">
-              <a:latin typeface="Times New Roman" pitchFamily="-111" charset="0"/>
+              <a:t>.</a:t>
+            </a:r>
+            <a:endParaRPr lang="en-US" sz="2300" dirty="0">
+              <a:latin typeface="+mn-lt"/>
               <a:ea typeface="ＭＳ Ｐゴシック" pitchFamily="-111" charset="-128"/>
               <a:cs typeface="ＭＳ Ｐゴシック" pitchFamily="-111" charset="-128"/>
             </a:endParaRPr>
@@ -9587,7 +10087,7 @@
           <p:nvPr/>
         </p:nvPicPr>
         <p:blipFill>
-          <a:blip r:embed="rId10">
+          <a:blip r:embed="rId8">
             <a:extLst>
               <a:ext uri="{28A0092B-C50C-407E-A947-70E740481C1C}">
                 <a14:useLocalDpi xmlns:a14="http://schemas.microsoft.com/office/drawing/2010/main" val="0"/>
@@ -9628,7 +10128,7 @@
           <p:nvPr/>
         </p:nvPicPr>
         <p:blipFill>
-          <a:blip r:embed="rId11">
+          <a:blip r:embed="rId9">
             <a:extLst>
               <a:ext uri="{28A0092B-C50C-407E-A947-70E740481C1C}">
                 <a14:useLocalDpi xmlns:a14="http://schemas.microsoft.com/office/drawing/2010/main" val="0"/>
@@ -9669,7 +10169,7 @@
           <p:nvPr/>
         </p:nvPicPr>
         <p:blipFill rotWithShape="1">
-          <a:blip r:embed="rId12">
+          <a:blip r:embed="rId10">
             <a:extLst>
               <a:ext uri="{28A0092B-C50C-407E-A947-70E740481C1C}">
                 <a14:useLocalDpi xmlns:a14="http://schemas.microsoft.com/office/drawing/2010/main" val="0"/>
@@ -9731,7 +10231,7 @@
           <p:nvPr/>
         </p:nvPicPr>
         <p:blipFill>
-          <a:blip r:embed="rId13">
+          <a:blip r:embed="rId11">
             <a:extLst>
               <a:ext uri="{28A0092B-C50C-407E-A947-70E740481C1C}">
                 <a14:useLocalDpi xmlns:a14="http://schemas.microsoft.com/office/drawing/2010/main" val="0"/>
@@ -9785,7 +10285,7 @@
           <p:nvPr/>
         </p:nvPicPr>
         <p:blipFill>
-          <a:blip r:embed="rId14">
+          <a:blip r:embed="rId12">
             <a:extLst>
               <a:ext uri="{28A0092B-C50C-407E-A947-70E740481C1C}">
                 <a14:useLocalDpi xmlns:a14="http://schemas.microsoft.com/office/drawing/2010/main" val="0"/>
@@ -9832,36 +10332,6 @@
       </p:pic>
       <p:pic>
         <p:nvPicPr>
-          <p:cNvPr id="43" name="Picture 42"/>
-          <p:cNvPicPr>
-            <a:picLocks noChangeAspect="1"/>
-          </p:cNvPicPr>
-          <p:nvPr/>
-        </p:nvPicPr>
-        <p:blipFill>
-          <a:blip r:embed="rId15" cstate="print">
-            <a:extLst>
-              <a:ext uri="{28A0092B-C50C-407E-A947-70E740481C1C}">
-                <a14:useLocalDpi xmlns:a14="http://schemas.microsoft.com/office/drawing/2010/main" val="0"/>
-              </a:ext>
-            </a:extLst>
-          </a:blip>
-          <a:stretch>
-            <a:fillRect/>
-          </a:stretch>
-        </p:blipFill>
-        <p:spPr>
-          <a:xfrm>
-            <a:off x="20610000" y="26955750"/>
-            <a:ext cx="8460000" cy="7138125"/>
-          </a:xfrm>
-          <a:prstGeom prst="rect">
-            <a:avLst/>
-          </a:prstGeom>
-        </p:spPr>
-      </p:pic>
-      <p:pic>
-        <p:nvPicPr>
           <p:cNvPr id="1053" name="Picture 29" descr="D:\workspace\curveball_project\Plato\public\plato.png"/>
           <p:cNvPicPr>
             <a:picLocks noChangeAspect="1" noChangeArrowheads="1"/>
@@ -9869,7 +10339,7 @@
           <p:nvPr/>
         </p:nvPicPr>
         <p:blipFill>
-          <a:blip r:embed="rId16">
+          <a:blip r:embed="rId13">
             <a:extLst>
               <a:ext uri="{28A0092B-C50C-407E-A947-70E740481C1C}">
                 <a14:useLocalDpi xmlns:a14="http://schemas.microsoft.com/office/drawing/2010/main" val="0"/>
@@ -9910,7 +10380,7 @@
           <p:nvPr/>
         </p:nvPicPr>
         <p:blipFill>
-          <a:blip r:embed="rId17">
+          <a:blip r:embed="rId14">
             <a:extLst>
               <a:ext uri="{28A0092B-C50C-407E-A947-70E740481C1C}">
                 <a14:useLocalDpi xmlns:a14="http://schemas.microsoft.com/office/drawing/2010/main" val="0"/>
@@ -10062,7 +10532,7 @@
                 <p:nvPr/>
               </p:nvPicPr>
               <p:blipFill>
-                <a:blip r:embed="rId18">
+                <a:blip r:embed="rId15">
                   <a:extLst>
                     <a:ext uri="{28A0092B-C50C-407E-A947-70E740481C1C}">
                       <a14:useLocalDpi xmlns:a14="http://schemas.microsoft.com/office/drawing/2010/main" val="0"/>
@@ -10126,7 +10596,7 @@
                 <p:nvPr/>
               </p:nvPicPr>
               <p:blipFill>
-                <a:blip r:embed="rId19">
+                <a:blip r:embed="rId16">
                   <a:extLst>
                     <a:ext uri="{28A0092B-C50C-407E-A947-70E740481C1C}">
                       <a14:useLocalDpi xmlns:a14="http://schemas.microsoft.com/office/drawing/2010/main" val="0"/>
@@ -10190,7 +10660,7 @@
                 <p:nvPr/>
               </p:nvPicPr>
               <p:blipFill>
-                <a:blip r:embed="rId20">
+                <a:blip r:embed="rId17">
                   <a:extLst>
                     <a:ext uri="{28A0092B-C50C-407E-A947-70E740481C1C}">
                       <a14:useLocalDpi xmlns:a14="http://schemas.microsoft.com/office/drawing/2010/main" val="0"/>
@@ -10350,7 +10820,7 @@
             <p:nvPr/>
           </p:nvPicPr>
           <p:blipFill>
-            <a:blip r:embed="rId21">
+            <a:blip r:embed="rId18">
               <a:extLst>
                 <a:ext uri="{28A0092B-C50C-407E-A947-70E740481C1C}">
                   <a14:useLocalDpi xmlns:a14="http://schemas.microsoft.com/office/drawing/2010/main" val="0"/>
@@ -10392,7 +10862,7 @@
           <p:nvPr/>
         </p:nvPicPr>
         <p:blipFill>
-          <a:blip r:embed="rId22">
+          <a:blip r:embed="rId19">
             <a:extLst>
               <a:ext uri="{28A0092B-C50C-407E-A947-70E740481C1C}">
                 <a14:useLocalDpi xmlns:a14="http://schemas.microsoft.com/office/drawing/2010/main" val="0"/>
@@ -10528,47 +10998,6 @@
       </p:sp>
       <p:pic>
         <p:nvPicPr>
-          <p:cNvPr id="8" name="Picture 3" descr="D:\university\presentations\GRC 2015\G_models.png"/>
-          <p:cNvPicPr>
-            <a:picLocks noChangeAspect="1" noChangeArrowheads="1"/>
-          </p:cNvPicPr>
-          <p:nvPr/>
-        </p:nvPicPr>
-        <p:blipFill>
-          <a:blip r:embed="rId23">
-            <a:extLst>
-              <a:ext uri="{28A0092B-C50C-407E-A947-70E740481C1C}">
-                <a14:useLocalDpi xmlns:a14="http://schemas.microsoft.com/office/drawing/2010/main" val="0"/>
-              </a:ext>
-            </a:extLst>
-          </a:blip>
-          <a:srcRect/>
-          <a:stretch>
-            <a:fillRect/>
-          </a:stretch>
-        </p:blipFill>
-        <p:spPr bwMode="auto">
-          <a:xfrm>
-            <a:off x="1334118" y="24127367"/>
-            <a:ext cx="8332788" cy="3900487"/>
-          </a:xfrm>
-          <a:prstGeom prst="rect">
-            <a:avLst/>
-          </a:prstGeom>
-          <a:noFill/>
-          <a:extLst>
-            <a:ext uri="{909E8E84-426E-40DD-AFC4-6F175D3DCCD1}">
-              <a14:hiddenFill xmlns:a14="http://schemas.microsoft.com/office/drawing/2010/main">
-                <a:solidFill>
-                  <a:srgbClr val="FFFFFF"/>
-                </a:solidFill>
-              </a14:hiddenFill>
-            </a:ext>
-          </a:extLst>
-        </p:spPr>
-      </p:pic>
-      <p:pic>
-        <p:nvPicPr>
           <p:cNvPr id="10" name="Picture 7" descr="D:\university\presentations\GRC 2015\frequency_fit.png"/>
           <p:cNvPicPr>
             <a:picLocks noChangeAspect="1" noChangeArrowheads="1"/>
@@ -10576,7 +11005,7 @@
           <p:nvPr/>
         </p:nvPicPr>
         <p:blipFill>
-          <a:blip r:embed="rId24">
+          <a:blip r:embed="rId20">
             <a:extLst>
               <a:ext uri="{28A0092B-C50C-407E-A947-70E740481C1C}">
                 <a14:useLocalDpi xmlns:a14="http://schemas.microsoft.com/office/drawing/2010/main" val="0"/>
@@ -10617,7 +11046,7 @@
           <p:nvPr/>
         </p:nvPicPr>
         <p:blipFill>
-          <a:blip r:embed="rId25">
+          <a:blip r:embed="rId21">
             <a:extLst>
               <a:ext uri="{28A0092B-C50C-407E-A947-70E740481C1C}">
                 <a14:useLocalDpi xmlns:a14="http://schemas.microsoft.com/office/drawing/2010/main" val="0"/>
@@ -10631,7 +11060,7 @@
         </p:blipFill>
         <p:spPr bwMode="auto">
           <a:xfrm>
-            <a:off x="1630800" y="12708000"/>
+            <a:off x="1630800" y="17483200"/>
             <a:ext cx="7748588" cy="5157788"/>
           </a:xfrm>
           <a:prstGeom prst="rect">
@@ -10658,7 +11087,7 @@
           <p:nvPr/>
         </p:nvPicPr>
         <p:blipFill>
-          <a:blip r:embed="rId26">
+          <a:blip r:embed="rId22">
             <a:extLst>
               <a:ext uri="{28A0092B-C50C-407E-A947-70E740481C1C}">
                 <a14:useLocalDpi xmlns:a14="http://schemas.microsoft.com/office/drawing/2010/main" val="0"/>
@@ -10692,14 +11121,14 @@
       </p:pic>
       <p:pic>
         <p:nvPicPr>
-          <p:cNvPr id="14" name="Picture 10" descr="D:\university\presentations\GRC 2015\competition.png"/>
+          <p:cNvPr id="1037" name="Picture 13" descr="D:\university\presentations\GRC 2015\total_OD_comparison.png"/>
           <p:cNvPicPr>
             <a:picLocks noChangeAspect="1" noChangeArrowheads="1"/>
           </p:cNvPicPr>
           <p:nvPr/>
         </p:nvPicPr>
         <p:blipFill>
-          <a:blip r:embed="rId27">
+          <a:blip r:embed="rId23">
             <a:extLst>
               <a:ext uri="{28A0092B-C50C-407E-A947-70E740481C1C}">
                 <a14:useLocalDpi xmlns:a14="http://schemas.microsoft.com/office/drawing/2010/main" val="0"/>
@@ -10713,130 +11142,7 @@
         </p:blipFill>
         <p:spPr bwMode="auto">
           <a:xfrm>
-            <a:off x="11304000" y="12708000"/>
-            <a:ext cx="7748587" cy="5310187"/>
-          </a:xfrm>
-          <a:prstGeom prst="rect">
-            <a:avLst/>
-          </a:prstGeom>
-          <a:noFill/>
-          <a:extLst>
-            <a:ext uri="{909E8E84-426E-40DD-AFC4-6F175D3DCCD1}">
-              <a14:hiddenFill xmlns:a14="http://schemas.microsoft.com/office/drawing/2010/main">
-                <a:solidFill>
-                  <a:srgbClr val="FFFFFF"/>
-                </a:solidFill>
-              </a14:hiddenFill>
-            </a:ext>
-          </a:extLst>
-        </p:spPr>
-      </p:pic>
-      <p:pic>
-        <p:nvPicPr>
-          <p:cNvPr id="15" name="Picture 11" descr="D:\university\presentations\GRC 2015\plot_strains2.png"/>
-          <p:cNvPicPr>
-            <a:picLocks noChangeAspect="1" noChangeArrowheads="1"/>
-          </p:cNvPicPr>
-          <p:nvPr/>
-        </p:nvPicPr>
-        <p:blipFill>
-          <a:blip r:embed="rId28">
-            <a:extLst>
-              <a:ext uri="{28A0092B-C50C-407E-A947-70E740481C1C}">
-                <a14:useLocalDpi xmlns:a14="http://schemas.microsoft.com/office/drawing/2010/main" val="0"/>
-              </a:ext>
-            </a:extLst>
-          </a:blip>
-          <a:srcRect/>
-          <a:stretch>
-            <a:fillRect/>
-          </a:stretch>
-        </p:blipFill>
-        <p:spPr bwMode="auto">
-          <a:xfrm>
-            <a:off x="20970000" y="9876430"/>
-            <a:ext cx="7989887" cy="5081588"/>
-          </a:xfrm>
-          <a:prstGeom prst="rect">
-            <a:avLst/>
-          </a:prstGeom>
-          <a:noFill/>
-          <a:extLst>
-            <a:ext uri="{909E8E84-426E-40DD-AFC4-6F175D3DCCD1}">
-              <a14:hiddenFill xmlns:a14="http://schemas.microsoft.com/office/drawing/2010/main">
-                <a:solidFill>
-                  <a:srgbClr val="FFFFFF"/>
-                </a:solidFill>
-              </a14:hiddenFill>
-            </a:ext>
-          </a:extLst>
-        </p:spPr>
-      </p:pic>
-      <p:pic>
-        <p:nvPicPr>
-          <p:cNvPr id="1036" name="Picture 12" descr="D:\university\presentations\GRC 2015\competition2.png"/>
-          <p:cNvPicPr>
-            <a:picLocks noChangeAspect="1" noChangeArrowheads="1"/>
-          </p:cNvPicPr>
-          <p:nvPr/>
-        </p:nvPicPr>
-        <p:blipFill>
-          <a:blip r:embed="rId29">
-            <a:extLst>
-              <a:ext uri="{28A0092B-C50C-407E-A947-70E740481C1C}">
-                <a14:useLocalDpi xmlns:a14="http://schemas.microsoft.com/office/drawing/2010/main" val="0"/>
-              </a:ext>
-            </a:extLst>
-          </a:blip>
-          <a:srcRect/>
-          <a:stretch>
-            <a:fillRect/>
-          </a:stretch>
-        </p:blipFill>
-        <p:spPr bwMode="auto">
-          <a:xfrm>
-            <a:off x="20970000" y="15466145"/>
-            <a:ext cx="7748588" cy="5310188"/>
-          </a:xfrm>
-          <a:prstGeom prst="rect">
-            <a:avLst/>
-          </a:prstGeom>
-          <a:noFill/>
-          <a:extLst>
-            <a:ext uri="{909E8E84-426E-40DD-AFC4-6F175D3DCCD1}">
-              <a14:hiddenFill xmlns:a14="http://schemas.microsoft.com/office/drawing/2010/main">
-                <a:solidFill>
-                  <a:srgbClr val="FFFFFF"/>
-                </a:solidFill>
-              </a14:hiddenFill>
-            </a:ext>
-          </a:extLst>
-        </p:spPr>
-      </p:pic>
-      <p:pic>
-        <p:nvPicPr>
-          <p:cNvPr id="1037" name="Picture 13" descr="D:\university\presentations\GRC 2015\total_OD_comparison.png"/>
-          <p:cNvPicPr>
-            <a:picLocks noChangeAspect="1" noChangeArrowheads="1"/>
-          </p:cNvPicPr>
-          <p:nvPr/>
-        </p:nvPicPr>
-        <p:blipFill>
-          <a:blip r:embed="rId30">
-            <a:extLst>
-              <a:ext uri="{28A0092B-C50C-407E-A947-70E740481C1C}">
-                <a14:useLocalDpi xmlns:a14="http://schemas.microsoft.com/office/drawing/2010/main" val="0"/>
-              </a:ext>
-            </a:extLst>
-          </a:blip>
-          <a:srcRect/>
-          <a:stretch>
-            <a:fillRect/>
-          </a:stretch>
-        </p:blipFill>
-        <p:spPr bwMode="auto">
-          <a:xfrm>
-            <a:off x="20970000" y="21463720"/>
+            <a:off x="20970000" y="22263150"/>
             <a:ext cx="7748588" cy="5310188"/>
           </a:xfrm>
           <a:prstGeom prst="rect">
@@ -10863,7 +11169,7 @@
           <p:nvPr/>
         </p:nvPicPr>
         <p:blipFill>
-          <a:blip r:embed="rId31">
+          <a:blip r:embed="rId24">
             <a:extLst>
               <a:ext uri="{28A0092B-C50C-407E-A947-70E740481C1C}">
                 <a14:useLocalDpi xmlns:a14="http://schemas.microsoft.com/office/drawing/2010/main" val="0"/>
@@ -10877,8 +11183,297 @@
         </p:blipFill>
         <p:spPr bwMode="auto">
           <a:xfrm>
-            <a:off x="22233282" y="9259795"/>
-            <a:ext cx="2585357" cy="1882297"/>
+            <a:off x="22817123" y="9926537"/>
+            <a:ext cx="4274600" cy="3112168"/>
+          </a:xfrm>
+          <a:prstGeom prst="rect">
+            <a:avLst/>
+          </a:prstGeom>
+          <a:noFill/>
+          <a:extLst>
+            <a:ext uri="{909E8E84-426E-40DD-AFC4-6F175D3DCCD1}">
+              <a14:hiddenFill xmlns:a14="http://schemas.microsoft.com/office/drawing/2010/main">
+                <a:solidFill>
+                  <a:srgbClr val="FFFFFF"/>
+                </a:solidFill>
+              </a14:hiddenFill>
+            </a:ext>
+          </a:extLst>
+        </p:spPr>
+      </p:pic>
+      <p:cxnSp>
+        <p:nvCxnSpPr>
+          <p:cNvPr id="9" name="Straight Arrow Connector 8"/>
+          <p:cNvCxnSpPr/>
+          <p:nvPr/>
+        </p:nvCxnSpPr>
+        <p:spPr>
+          <a:xfrm>
+            <a:off x="24933411" y="18270724"/>
+            <a:ext cx="0" cy="843328"/>
+          </a:xfrm>
+          <a:prstGeom prst="straightConnector1">
+            <a:avLst/>
+          </a:prstGeom>
+          <a:ln>
+            <a:tailEnd type="arrow"/>
+          </a:ln>
+        </p:spPr>
+        <p:style>
+          <a:lnRef idx="3">
+            <a:schemeClr val="dk1"/>
+          </a:lnRef>
+          <a:fillRef idx="0">
+            <a:schemeClr val="dk1"/>
+          </a:fillRef>
+          <a:effectRef idx="2">
+            <a:schemeClr val="dk1"/>
+          </a:effectRef>
+          <a:fontRef idx="minor">
+            <a:schemeClr val="tx1"/>
+          </a:fontRef>
+        </p:style>
+      </p:cxnSp>
+      <p:sp>
+        <p:nvSpPr>
+          <p:cNvPr id="56" name="TextBox 55"/>
+          <p:cNvSpPr txBox="1"/>
+          <p:nvPr/>
+        </p:nvSpPr>
+        <p:spPr>
+          <a:xfrm>
+            <a:off x="23281307" y="20901733"/>
+            <a:ext cx="3568348" cy="523220"/>
+          </a:xfrm>
+          <a:prstGeom prst="rect">
+            <a:avLst/>
+          </a:prstGeom>
+          <a:effectLst>
+            <a:outerShdw blurRad="50800" dist="38100" dir="2700000" algn="tl" rotWithShape="0">
+              <a:prstClr val="black">
+                <a:alpha val="40000"/>
+              </a:prstClr>
+            </a:outerShdw>
+          </a:effectLst>
+        </p:spPr>
+        <p:style>
+          <a:lnRef idx="1">
+            <a:schemeClr val="accent2"/>
+          </a:lnRef>
+          <a:fillRef idx="2">
+            <a:schemeClr val="accent2"/>
+          </a:fillRef>
+          <a:effectRef idx="1">
+            <a:schemeClr val="accent2"/>
+          </a:effectRef>
+          <a:fontRef idx="minor">
+            <a:schemeClr val="dk1"/>
+          </a:fontRef>
+        </p:style>
+        <p:txBody>
+          <a:bodyPr wrap="none" rtlCol="1">
+            <a:spAutoFit/>
+          </a:bodyPr>
+          <a:lstStyle/>
+          <a:p>
+            <a:r>
+              <a:rPr lang="en-US" dirty="0" smtClean="0">
+                <a:latin typeface="Calibri" panose="020F0502020204030204" pitchFamily="34" charset="0"/>
+              </a:rPr>
+              <a:t>Competition Prediction</a:t>
+            </a:r>
+            <a:endParaRPr lang="he-IL" dirty="0">
+              <a:latin typeface="Calibri" panose="020F0502020204030204" pitchFamily="34" charset="0"/>
+            </a:endParaRPr>
+          </a:p>
+        </p:txBody>
+      </p:sp>
+      <p:sp>
+        <p:nvSpPr>
+          <p:cNvPr id="57" name="TextBox 56"/>
+          <p:cNvSpPr txBox="1"/>
+          <p:nvPr/>
+        </p:nvSpPr>
+        <p:spPr>
+          <a:xfrm>
+            <a:off x="23722095" y="19256861"/>
+            <a:ext cx="2544286" cy="523220"/>
+          </a:xfrm>
+          <a:prstGeom prst="rect">
+            <a:avLst/>
+          </a:prstGeom>
+          <a:effectLst>
+            <a:outerShdw blurRad="50800" dist="38100" dir="2700000" algn="tl" rotWithShape="0">
+              <a:prstClr val="black">
+                <a:alpha val="40000"/>
+              </a:prstClr>
+            </a:outerShdw>
+          </a:effectLst>
+        </p:spPr>
+        <p:style>
+          <a:lnRef idx="1">
+            <a:schemeClr val="accent2"/>
+          </a:lnRef>
+          <a:fillRef idx="2">
+            <a:schemeClr val="accent2"/>
+          </a:fillRef>
+          <a:effectRef idx="1">
+            <a:schemeClr val="accent2"/>
+          </a:effectRef>
+          <a:fontRef idx="minor">
+            <a:schemeClr val="dk1"/>
+          </a:fontRef>
+        </p:style>
+        <p:txBody>
+          <a:bodyPr wrap="none" rtlCol="1">
+            <a:spAutoFit/>
+          </a:bodyPr>
+          <a:lstStyle/>
+          <a:p>
+            <a:r>
+              <a:rPr lang="en-US" dirty="0">
+                <a:latin typeface="Calibri" panose="020F0502020204030204" pitchFamily="34" charset="0"/>
+              </a:rPr>
+              <a:t>Model Selection</a:t>
+            </a:r>
+            <a:endParaRPr lang="he-IL" dirty="0">
+              <a:latin typeface="Calibri" panose="020F0502020204030204" pitchFamily="34" charset="0"/>
+            </a:endParaRPr>
+          </a:p>
+        </p:txBody>
+      </p:sp>
+      <p:cxnSp>
+        <p:nvCxnSpPr>
+          <p:cNvPr id="58" name="Straight Arrow Connector 57"/>
+          <p:cNvCxnSpPr/>
+          <p:nvPr/>
+        </p:nvCxnSpPr>
+        <p:spPr>
+          <a:xfrm>
+            <a:off x="24959683" y="19952426"/>
+            <a:ext cx="0" cy="843328"/>
+          </a:xfrm>
+          <a:prstGeom prst="straightConnector1">
+            <a:avLst/>
+          </a:prstGeom>
+          <a:ln>
+            <a:tailEnd type="arrow"/>
+          </a:ln>
+        </p:spPr>
+        <p:style>
+          <a:lnRef idx="3">
+            <a:schemeClr val="dk1"/>
+          </a:lnRef>
+          <a:fillRef idx="0">
+            <a:schemeClr val="dk1"/>
+          </a:fillRef>
+          <a:effectRef idx="2">
+            <a:schemeClr val="dk1"/>
+          </a:effectRef>
+          <a:fontRef idx="minor">
+            <a:schemeClr val="tx1"/>
+          </a:fontRef>
+        </p:style>
+      </p:cxnSp>
+      <p:cxnSp>
+        <p:nvCxnSpPr>
+          <p:cNvPr id="59" name="Straight Arrow Connector 58"/>
+          <p:cNvCxnSpPr/>
+          <p:nvPr/>
+        </p:nvCxnSpPr>
+        <p:spPr>
+          <a:xfrm>
+            <a:off x="24954423" y="21618362"/>
+            <a:ext cx="0" cy="843328"/>
+          </a:xfrm>
+          <a:prstGeom prst="straightConnector1">
+            <a:avLst/>
+          </a:prstGeom>
+          <a:ln>
+            <a:tailEnd type="arrow"/>
+          </a:ln>
+        </p:spPr>
+        <p:style>
+          <a:lnRef idx="3">
+            <a:schemeClr val="dk1"/>
+          </a:lnRef>
+          <a:fillRef idx="0">
+            <a:schemeClr val="dk1"/>
+          </a:fillRef>
+          <a:effectRef idx="2">
+            <a:schemeClr val="dk1"/>
+          </a:effectRef>
+          <a:fontRef idx="minor">
+            <a:schemeClr val="tx1"/>
+          </a:fontRef>
+        </p:style>
+      </p:cxnSp>
+      <p:pic>
+        <p:nvPicPr>
+          <p:cNvPr id="29" name="Picture 2" descr="D:\university\presentations\GRC 2015\plot_strains2.png"/>
+          <p:cNvPicPr>
+            <a:picLocks noChangeAspect="1" noChangeArrowheads="1"/>
+          </p:cNvPicPr>
+          <p:nvPr/>
+        </p:nvPicPr>
+        <p:blipFill>
+          <a:blip r:embed="rId25">
+            <a:extLst>
+              <a:ext uri="{28A0092B-C50C-407E-A947-70E740481C1C}">
+                <a14:useLocalDpi xmlns:a14="http://schemas.microsoft.com/office/drawing/2010/main" val="0"/>
+              </a:ext>
+            </a:extLst>
+          </a:blip>
+          <a:srcRect/>
+          <a:stretch>
+            <a:fillRect/>
+          </a:stretch>
+        </p:blipFill>
+        <p:spPr bwMode="auto">
+          <a:xfrm>
+            <a:off x="20970000" y="13140378"/>
+            <a:ext cx="7989888" cy="5081588"/>
+          </a:xfrm>
+          <a:prstGeom prst="rect">
+            <a:avLst/>
+          </a:prstGeom>
+          <a:noFill/>
+          <a:extLst>
+            <a:ext uri="{909E8E84-426E-40DD-AFC4-6F175D3DCCD1}">
+              <a14:hiddenFill xmlns:a14="http://schemas.microsoft.com/office/drawing/2010/main">
+                <a:solidFill>
+                  <a:srgbClr val="FFFFFF"/>
+                </a:solidFill>
+              </a14:hiddenFill>
+            </a:ext>
+          </a:extLst>
+        </p:spPr>
+      </p:pic>
+      <p:pic>
+        <p:nvPicPr>
+          <p:cNvPr id="30" name="Picture 3" descr="D:\university\presentations\GRC 2015\competition.png"/>
+          <p:cNvPicPr>
+            <a:picLocks noChangeAspect="1" noChangeArrowheads="1"/>
+          </p:cNvPicPr>
+          <p:nvPr/>
+        </p:nvPicPr>
+        <p:blipFill>
+          <a:blip r:embed="rId26">
+            <a:extLst>
+              <a:ext uri="{28A0092B-C50C-407E-A947-70E740481C1C}">
+                <a14:useLocalDpi xmlns:a14="http://schemas.microsoft.com/office/drawing/2010/main" val="0"/>
+              </a:ext>
+            </a:extLst>
+          </a:blip>
+          <a:srcRect/>
+          <a:stretch>
+            <a:fillRect/>
+          </a:stretch>
+        </p:blipFill>
+        <p:spPr bwMode="auto">
+          <a:xfrm>
+            <a:off x="11304000" y="12636500"/>
+            <a:ext cx="7748588" cy="5310188"/>
           </a:xfrm>
           <a:prstGeom prst="rect">
             <a:avLst/>

</xml_diff>

<commit_message>
more text, changed legends
</commit_message>
<xml_diff>
--- a/poster.pptx
+++ b/poster.pptx
@@ -254,7 +254,7 @@
             <a:fld id="{4DB31F7E-24C3-4F74-B155-4FAB7B65A36F}" type="datetime1">
               <a:rPr lang="en-US" altLang="he-IL"/>
               <a:pPr/>
-              <a:t>6/10/2015</a:t>
+              <a:t>6/11/2015</a:t>
             </a:fld>
             <a:endParaRPr lang="en-US" altLang="he-IL"/>
           </a:p>
@@ -4915,19 +4915,55 @@
               <a:rPr lang="en-US" altLang="he-IL" sz="2500" dirty="0" smtClean="0">
                 <a:latin typeface="Times New Roman" pitchFamily="18" charset="0"/>
               </a:rPr>
-              <a:t>The total OD in the predicted competitions (solid blue line) has a </a:t>
+              <a:t>The total OD in the </a:t>
+            </a:r>
+            <a:r>
+              <a:rPr lang="en-US" altLang="he-IL" sz="2500" dirty="0" smtClean="0">
+                <a:latin typeface="Times New Roman" pitchFamily="18" charset="0"/>
+              </a:rPr>
+              <a:t>model predictions </a:t>
+            </a:r>
+            <a:r>
+              <a:rPr lang="en-US" altLang="he-IL" sz="2500" dirty="0" smtClean="0">
+                <a:latin typeface="Times New Roman" pitchFamily="18" charset="0"/>
+              </a:rPr>
+              <a:t>(solid blue line) has a </a:t>
             </a:r>
             <a:r>
               <a:rPr lang="en-US" altLang="he-IL" sz="2500" b="1" dirty="0" smtClean="0">
                 <a:latin typeface="Times New Roman" pitchFamily="18" charset="0"/>
               </a:rPr>
-              <a:t>good fit with the observed </a:t>
+              <a:t>good fit </a:t>
             </a:r>
             <a:r>
               <a:rPr lang="en-US" altLang="he-IL" sz="2500" dirty="0" smtClean="0">
                 <a:latin typeface="Times New Roman" pitchFamily="18" charset="0"/>
               </a:rPr>
-              <a:t>total OD in experimental competitions (black markers).</a:t>
+              <a:t>with the </a:t>
+            </a:r>
+            <a:r>
+              <a:rPr lang="en-US" altLang="he-IL" sz="2500" dirty="0" smtClean="0">
+                <a:latin typeface="Times New Roman" pitchFamily="18" charset="0"/>
+              </a:rPr>
+              <a:t>total </a:t>
+            </a:r>
+            <a:r>
+              <a:rPr lang="en-US" altLang="he-IL" sz="2500" dirty="0" smtClean="0">
+                <a:latin typeface="Times New Roman" pitchFamily="18" charset="0"/>
+              </a:rPr>
+              <a:t>OD in </a:t>
+            </a:r>
+            <a:r>
+              <a:rPr lang="en-US" altLang="he-IL" sz="2500" smtClean="0">
+                <a:latin typeface="Times New Roman" pitchFamily="18" charset="0"/>
+              </a:rPr>
+              <a:t>competition experiments </a:t>
+            </a:r>
+            <a:r>
+              <a:rPr lang="en-US" altLang="he-IL" sz="2500" dirty="0" smtClean="0">
+                <a:latin typeface="Times New Roman" pitchFamily="18" charset="0"/>
+              </a:rPr>
+              <a:t>(black markers).</a:t>
             </a:r>
           </a:p>
           <a:p>
@@ -6418,351 +6454,169 @@
               </a:spcBef>
             </a:pPr>
             <a:r>
-              <a:rPr lang="en-GB" sz="2400" dirty="0" err="1"/>
-              <a:t>Vivamus</a:t>
-            </a:r>
-            <a:r>
-              <a:rPr lang="en-GB" sz="2400" dirty="0"/>
-              <a:t> </a:t>
-            </a:r>
-            <a:r>
-              <a:rPr lang="en-GB" sz="2400" dirty="0" err="1"/>
-              <a:t>fermentum</a:t>
-            </a:r>
-            <a:r>
-              <a:rPr lang="en-GB" sz="2400" dirty="0"/>
-              <a:t> semper porta. </a:t>
-            </a:r>
-            <a:r>
-              <a:rPr lang="en-GB" sz="2400" dirty="0" err="1"/>
-              <a:t>Nunc</a:t>
-            </a:r>
-            <a:r>
-              <a:rPr lang="en-GB" sz="2400" dirty="0"/>
-              <a:t> </a:t>
-            </a:r>
-            <a:r>
-              <a:rPr lang="en-GB" sz="2400" dirty="0" err="1"/>
-              <a:t>diam</a:t>
-            </a:r>
-            <a:r>
-              <a:rPr lang="en-GB" sz="2400" dirty="0"/>
-              <a:t> </a:t>
-            </a:r>
-            <a:r>
-              <a:rPr lang="en-GB" sz="2400" dirty="0" err="1"/>
-              <a:t>velit</a:t>
-            </a:r>
-            <a:r>
-              <a:rPr lang="en-GB" sz="2400" dirty="0"/>
-              <a:t>, </a:t>
-            </a:r>
-            <a:r>
-              <a:rPr lang="en-GB" sz="2400" dirty="0" err="1"/>
-              <a:t>adipiscing</a:t>
-            </a:r>
-            <a:r>
-              <a:rPr lang="en-GB" sz="2400" dirty="0"/>
-              <a:t> </a:t>
-            </a:r>
-            <a:r>
-              <a:rPr lang="en-GB" sz="2400" dirty="0" err="1"/>
-              <a:t>ut</a:t>
-            </a:r>
-            <a:r>
-              <a:rPr lang="en-GB" sz="2400" dirty="0"/>
-              <a:t> </a:t>
-            </a:r>
-            <a:r>
-              <a:rPr lang="en-GB" sz="2400" dirty="0" err="1"/>
-              <a:t>tristique</a:t>
-            </a:r>
-            <a:r>
-              <a:rPr lang="en-GB" sz="2400" dirty="0"/>
-              <a:t> vitae, </a:t>
-            </a:r>
-            <a:r>
-              <a:rPr lang="en-GB" sz="2400" dirty="0" err="1"/>
-              <a:t>sagittis</a:t>
-            </a:r>
-            <a:r>
-              <a:rPr lang="en-GB" sz="2400" dirty="0"/>
-              <a:t> </a:t>
-            </a:r>
-            <a:r>
-              <a:rPr lang="en-GB" sz="2400" dirty="0" err="1"/>
-              <a:t>vel</a:t>
-            </a:r>
-            <a:r>
-              <a:rPr lang="en-GB" sz="2400" dirty="0"/>
-              <a:t> </a:t>
-            </a:r>
-            <a:r>
-              <a:rPr lang="en-GB" sz="2400" dirty="0" err="1"/>
-              <a:t>odio</a:t>
-            </a:r>
-            <a:r>
-              <a:rPr lang="en-GB" sz="2400" dirty="0"/>
-              <a:t>. Maecenas </a:t>
-            </a:r>
-            <a:r>
-              <a:rPr lang="en-GB" sz="2400" dirty="0" err="1"/>
-              <a:t>convallis</a:t>
-            </a:r>
-            <a:r>
-              <a:rPr lang="en-GB" sz="2400" dirty="0"/>
-              <a:t> </a:t>
-            </a:r>
-            <a:r>
-              <a:rPr lang="en-GB" sz="2400" dirty="0" err="1"/>
-              <a:t>ullamcorper</a:t>
-            </a:r>
-            <a:r>
-              <a:rPr lang="en-GB" sz="2400" dirty="0"/>
-              <a:t> </a:t>
-            </a:r>
-            <a:r>
-              <a:rPr lang="en-GB" sz="2400" dirty="0" err="1"/>
-              <a:t>ultricies</a:t>
-            </a:r>
-            <a:r>
-              <a:rPr lang="en-GB" sz="2400" dirty="0"/>
+              <a:rPr lang="en-US" sz="2400" dirty="0" smtClean="0">
+                <a:latin typeface="+mn-lt"/>
+              </a:rPr>
+              <a:t>Experiments </a:t>
+            </a:r>
+            <a:r>
+              <a:rPr lang="en-US" sz="2400" dirty="0">
+                <a:latin typeface="+mn-lt"/>
+              </a:rPr>
+              <a:t>often use </a:t>
+            </a:r>
+            <a:r>
+              <a:rPr lang="en-US" sz="2400" b="1" dirty="0">
+                <a:latin typeface="+mn-lt"/>
+              </a:rPr>
+              <a:t>growth curves </a:t>
+            </a:r>
+            <a:r>
+              <a:rPr lang="en-US" sz="2400" dirty="0">
+                <a:latin typeface="+mn-lt"/>
+              </a:rPr>
+              <a:t>to estimate the growth </a:t>
+            </a:r>
+            <a:r>
+              <a:rPr lang="en-US" sz="2400" dirty="0" smtClean="0">
+                <a:latin typeface="+mn-lt"/>
+              </a:rPr>
+              <a:t>rate as </a:t>
+            </a:r>
+            <a:r>
+              <a:rPr lang="en-US" sz="2400" dirty="0">
+                <a:latin typeface="+mn-lt"/>
+              </a:rPr>
+              <a:t>a proxy of fitness; </a:t>
+            </a:r>
+            <a:r>
+              <a:rPr lang="en-US" sz="2400" dirty="0" smtClean="0">
+                <a:latin typeface="+mn-lt"/>
+              </a:rPr>
+              <a:t>however, evolutionary models </a:t>
+            </a:r>
+            <a:r>
+              <a:rPr lang="en-US" sz="2400" dirty="0">
+                <a:latin typeface="+mn-lt"/>
+              </a:rPr>
+              <a:t>use </a:t>
+            </a:r>
+            <a:r>
+              <a:rPr lang="en-US" sz="2400" b="1" dirty="0" smtClean="0">
+                <a:latin typeface="+mn-lt"/>
+              </a:rPr>
+              <a:t>selection coefficients </a:t>
+            </a:r>
+            <a:r>
+              <a:rPr lang="en-US" sz="2400" dirty="0">
+                <a:latin typeface="+mn-lt"/>
+              </a:rPr>
+              <a:t>to model the relative fitness of </a:t>
+            </a:r>
+            <a:r>
+              <a:rPr lang="en-US" sz="2400" dirty="0" smtClean="0">
+                <a:latin typeface="+mn-lt"/>
+              </a:rPr>
+              <a:t>genotypes</a:t>
+            </a:r>
+            <a:r>
+              <a:rPr lang="en-US" sz="2400" dirty="0">
+                <a:latin typeface="+mn-lt"/>
+              </a:rPr>
+              <a:t>. The only </a:t>
+            </a:r>
+            <a:r>
+              <a:rPr lang="en-US" sz="2400" dirty="0" smtClean="0">
+                <a:latin typeface="+mn-lt"/>
+              </a:rPr>
+              <a:t>existing “</a:t>
+            </a:r>
+            <a:r>
+              <a:rPr lang="en-US" sz="2400" dirty="0">
+                <a:latin typeface="+mn-lt"/>
+              </a:rPr>
+              <a:t>bridge” between experiments and theory are </a:t>
+            </a:r>
+            <a:r>
+              <a:rPr lang="en-US" sz="2400" b="1" dirty="0">
+                <a:latin typeface="+mn-lt"/>
+              </a:rPr>
+              <a:t>competitions assays</a:t>
+            </a:r>
+            <a:r>
+              <a:rPr lang="en-US" sz="2400" dirty="0">
+                <a:latin typeface="+mn-lt"/>
+              </a:rPr>
               <a:t>. </a:t>
             </a:r>
             <a:r>
-              <a:rPr lang="en-GB" sz="2400" dirty="0" err="1"/>
-              <a:t>Curabitur</a:t>
-            </a:r>
-            <a:r>
-              <a:rPr lang="en-GB" sz="2400" dirty="0"/>
-              <a:t> </a:t>
-            </a:r>
-            <a:r>
-              <a:rPr lang="en-GB" sz="2400" dirty="0" err="1"/>
-              <a:t>ornare</a:t>
-            </a:r>
-            <a:r>
-              <a:rPr lang="en-GB" sz="2400" dirty="0"/>
-              <a:t>, ligula semper </a:t>
-            </a:r>
-            <a:r>
-              <a:rPr lang="en-GB" sz="2400" dirty="0" err="1"/>
-              <a:t>consectetur</a:t>
-            </a:r>
-            <a:r>
-              <a:rPr lang="en-GB" sz="2400" dirty="0"/>
-              <a:t> </a:t>
-            </a:r>
-            <a:r>
-              <a:rPr lang="en-GB" sz="2400" dirty="0" err="1"/>
-              <a:t>sagittis</a:t>
-            </a:r>
-            <a:r>
-              <a:rPr lang="en-GB" sz="2400" dirty="0"/>
-              <a:t>, nisi </a:t>
-            </a:r>
-            <a:r>
-              <a:rPr lang="en-GB" sz="2400" dirty="0" err="1"/>
-              <a:t>diam</a:t>
-            </a:r>
-            <a:r>
-              <a:rPr lang="en-GB" sz="2400" dirty="0"/>
-              <a:t> </a:t>
-            </a:r>
-            <a:r>
-              <a:rPr lang="en-GB" sz="2400" dirty="0" err="1"/>
-              <a:t>iaculis</a:t>
-            </a:r>
-            <a:r>
-              <a:rPr lang="en-GB" sz="2400" dirty="0"/>
-              <a:t> </a:t>
-            </a:r>
-            <a:r>
-              <a:rPr lang="en-GB" sz="2400" dirty="0" err="1"/>
-              <a:t>velit</a:t>
-            </a:r>
-            <a:r>
-              <a:rPr lang="en-GB" sz="2400" dirty="0"/>
-              <a:t>, id </a:t>
-            </a:r>
-            <a:r>
-              <a:rPr lang="en-GB" sz="2400" dirty="0" err="1"/>
-              <a:t>fringilla</a:t>
-            </a:r>
-            <a:r>
-              <a:rPr lang="en-GB" sz="2400" dirty="0"/>
-              <a:t> </a:t>
-            </a:r>
-            <a:r>
-              <a:rPr lang="en-GB" sz="2400" dirty="0" err="1"/>
-              <a:t>sem</a:t>
-            </a:r>
-            <a:r>
-              <a:rPr lang="en-GB" sz="2400" dirty="0"/>
-              <a:t> </a:t>
-            </a:r>
-            <a:r>
-              <a:rPr lang="en-GB" sz="2400" dirty="0" err="1"/>
-              <a:t>nunc</a:t>
-            </a:r>
-            <a:r>
-              <a:rPr lang="en-GB" sz="2400" dirty="0"/>
-              <a:t> </a:t>
-            </a:r>
-            <a:r>
-              <a:rPr lang="en-GB" sz="2400" dirty="0" err="1"/>
-              <a:t>vel</a:t>
-            </a:r>
-            <a:r>
-              <a:rPr lang="en-GB" sz="2400" dirty="0"/>
-              <a:t> mi. Nam dictum, </a:t>
-            </a:r>
-            <a:r>
-              <a:rPr lang="en-GB" sz="2400" dirty="0" err="1"/>
-              <a:t>odio</a:t>
-            </a:r>
-            <a:r>
-              <a:rPr lang="en-GB" sz="2400" dirty="0"/>
-              <a:t> </a:t>
-            </a:r>
-            <a:r>
-              <a:rPr lang="en-GB" sz="2400" dirty="0" err="1"/>
-              <a:t>nec</a:t>
-            </a:r>
-            <a:r>
-              <a:rPr lang="en-GB" sz="2400" dirty="0"/>
-              <a:t> </a:t>
-            </a:r>
-            <a:r>
-              <a:rPr lang="en-GB" sz="2400" dirty="0" err="1"/>
-              <a:t>pretium</a:t>
-            </a:r>
-            <a:r>
-              <a:rPr lang="en-GB" sz="2400" dirty="0"/>
-              <a:t> </a:t>
-            </a:r>
-            <a:r>
-              <a:rPr lang="en-GB" sz="2400" dirty="0" err="1"/>
-              <a:t>volutpat</a:t>
-            </a:r>
-            <a:r>
-              <a:rPr lang="en-GB" sz="2400" dirty="0"/>
-              <a:t>, </a:t>
-            </a:r>
-            <a:r>
-              <a:rPr lang="en-GB" sz="2400" dirty="0" err="1"/>
-              <a:t>arcu</a:t>
-            </a:r>
-            <a:r>
-              <a:rPr lang="en-GB" sz="2400" dirty="0"/>
-              <a:t> ante </a:t>
-            </a:r>
-            <a:r>
-              <a:rPr lang="en-GB" sz="2400" dirty="0" err="1"/>
-              <a:t>placerat</a:t>
-            </a:r>
-            <a:r>
-              <a:rPr lang="en-GB" sz="2400" dirty="0"/>
-              <a:t> </a:t>
-            </a:r>
-            <a:r>
-              <a:rPr lang="en-GB" sz="2400" dirty="0" err="1"/>
-              <a:t>erat</a:t>
-            </a:r>
-            <a:r>
-              <a:rPr lang="en-GB" sz="2400" dirty="0"/>
-              <a:t>, non </a:t>
-            </a:r>
-            <a:r>
-              <a:rPr lang="en-GB" sz="2400" dirty="0" err="1"/>
-              <a:t>tristique</a:t>
-            </a:r>
-            <a:r>
-              <a:rPr lang="en-GB" sz="2400" dirty="0"/>
-              <a:t> </a:t>
-            </a:r>
-            <a:r>
-              <a:rPr lang="en-GB" sz="2400" dirty="0" err="1"/>
-              <a:t>elit</a:t>
-            </a:r>
-            <a:r>
-              <a:rPr lang="en-GB" sz="2400" dirty="0"/>
-              <a:t> </a:t>
-            </a:r>
-            <a:r>
-              <a:rPr lang="en-GB" sz="2400" dirty="0" err="1"/>
-              <a:t>urna</a:t>
-            </a:r>
-            <a:r>
-              <a:rPr lang="en-GB" sz="2400" dirty="0"/>
-              <a:t> et </a:t>
-            </a:r>
-            <a:r>
-              <a:rPr lang="en-GB" sz="2400" dirty="0" err="1"/>
-              <a:t>turpis</a:t>
-            </a:r>
-            <a:r>
-              <a:rPr lang="en-GB" sz="2400" dirty="0"/>
-              <a:t>. </a:t>
-            </a:r>
-            <a:r>
-              <a:rPr lang="en-GB" sz="2400" dirty="0" err="1"/>
-              <a:t>Quisque</a:t>
-            </a:r>
-            <a:r>
-              <a:rPr lang="en-GB" sz="2400" dirty="0"/>
-              <a:t> mi </a:t>
-            </a:r>
-            <a:r>
-              <a:rPr lang="en-GB" sz="2400" dirty="0" err="1"/>
-              <a:t>metus</a:t>
-            </a:r>
-            <a:r>
-              <a:rPr lang="en-GB" sz="2400" dirty="0"/>
-              <a:t>, </a:t>
-            </a:r>
-            <a:r>
-              <a:rPr lang="en-GB" sz="2400" dirty="0" err="1"/>
-              <a:t>ornare</a:t>
-            </a:r>
-            <a:r>
-              <a:rPr lang="en-GB" sz="2400" dirty="0"/>
-              <a:t> sit </a:t>
-            </a:r>
-            <a:r>
-              <a:rPr lang="en-GB" sz="2400" dirty="0" err="1"/>
-              <a:t>amet</a:t>
-            </a:r>
-            <a:r>
-              <a:rPr lang="en-GB" sz="2400" dirty="0"/>
-              <a:t> </a:t>
-            </a:r>
-            <a:r>
-              <a:rPr lang="en-GB" sz="2400" dirty="0" err="1"/>
-              <a:t>fermentum</a:t>
-            </a:r>
-            <a:r>
-              <a:rPr lang="en-GB" sz="2400" dirty="0"/>
-              <a:t> et, </a:t>
-            </a:r>
-            <a:r>
-              <a:rPr lang="en-GB" sz="2400" dirty="0" err="1"/>
-              <a:t>tincidunt</a:t>
-            </a:r>
-            <a:r>
-              <a:rPr lang="en-GB" sz="2400" dirty="0"/>
-              <a:t> et </a:t>
-            </a:r>
-            <a:r>
-              <a:rPr lang="en-GB" sz="2400" dirty="0" err="1"/>
-              <a:t>orci</a:t>
-            </a:r>
-            <a:r>
-              <a:rPr lang="en-GB" sz="2400" dirty="0"/>
-              <a:t>. </a:t>
+              <a:rPr lang="en-US" sz="2400" dirty="0" smtClean="0">
+                <a:latin typeface="+mn-lt"/>
+              </a:rPr>
+              <a:t>But these assays </a:t>
+            </a:r>
+            <a:r>
+              <a:rPr lang="en-US" sz="2400" dirty="0">
+                <a:latin typeface="+mn-lt"/>
+              </a:rPr>
+              <a:t>are expensive and </a:t>
+            </a:r>
+            <a:r>
+              <a:rPr lang="en-US" sz="2400" dirty="0" smtClean="0">
+                <a:latin typeface="+mn-lt"/>
+              </a:rPr>
+              <a:t>laborious. </a:t>
+            </a:r>
+            <a:r>
+              <a:rPr lang="en-US" sz="2400" dirty="0">
+                <a:latin typeface="+mn-lt"/>
+              </a:rPr>
+              <a:t>Therefore</a:t>
+            </a:r>
+            <a:r>
+              <a:rPr lang="en-US" sz="2400" dirty="0" smtClean="0">
+                <a:latin typeface="+mn-lt"/>
+              </a:rPr>
+              <a:t>, many </a:t>
+            </a:r>
+            <a:r>
+              <a:rPr lang="en-US" sz="2400" dirty="0">
+                <a:latin typeface="+mn-lt"/>
+              </a:rPr>
+              <a:t>investigators do without competition assays entirely. An </a:t>
+            </a:r>
+            <a:r>
+              <a:rPr lang="en-US" sz="2400" b="1" dirty="0" smtClean="0">
+                <a:latin typeface="+mn-lt"/>
+              </a:rPr>
+              <a:t>alternative method </a:t>
+            </a:r>
+            <a:r>
+              <a:rPr lang="en-US" sz="2400" dirty="0">
+                <a:latin typeface="+mn-lt"/>
+              </a:rPr>
+              <a:t>is required, one that can be used to estimate </a:t>
+            </a:r>
+            <a:r>
+              <a:rPr lang="en-US" sz="2400" dirty="0" smtClean="0">
+                <a:latin typeface="+mn-lt"/>
+              </a:rPr>
+              <a:t>fitness from </a:t>
+            </a:r>
+            <a:r>
+              <a:rPr lang="en-US" sz="2400" dirty="0">
+                <a:latin typeface="+mn-lt"/>
+              </a:rPr>
+              <a:t>growth </a:t>
+            </a:r>
+            <a:r>
+              <a:rPr lang="en-US" sz="2400" dirty="0" smtClean="0">
+                <a:latin typeface="+mn-lt"/>
+              </a:rPr>
+              <a:t>curves.</a:t>
             </a:r>
             <a:endParaRPr lang="en-US" altLang="he-IL" sz="2500" dirty="0">
-              <a:latin typeface="Times New Roman" pitchFamily="18" charset="0"/>
+              <a:latin typeface="+mn-lt"/>
             </a:endParaRPr>
           </a:p>
         </p:txBody>
@@ -6955,11 +6809,63 @@
                     <a:spcPct val="50000"/>
                   </a:spcBef>
                 </a:pPr>
-                <a:endParaRPr lang="en-US" altLang="he-IL" sz="3900" b="1" dirty="0">
+                <a:r>
+                  <a:rPr lang="en-US" sz="2400" dirty="0" smtClean="0">
+                    <a:solidFill>
+                      <a:srgbClr val="000000"/>
+                    </a:solidFill>
+                    <a:latin typeface="Times New Roman"/>
+                  </a:rPr>
+                  <a:t>These are 84 growth curves of two different yeast species (</a:t>
+                </a:r>
+                <a:r>
+                  <a:rPr lang="en-US" sz="2400" dirty="0" smtClean="0">
+                    <a:solidFill>
+                      <a:srgbClr val="FF0000"/>
+                    </a:solidFill>
+                    <a:latin typeface="Times New Roman"/>
+                  </a:rPr>
+                  <a:t>red</a:t>
+                </a:r>
+                <a:r>
+                  <a:rPr lang="en-US" sz="2400" dirty="0" smtClean="0">
+                    <a:solidFill>
+                      <a:srgbClr val="000000"/>
+                    </a:solidFill>
+                    <a:latin typeface="Times New Roman"/>
+                  </a:rPr>
+                  <a:t> and </a:t>
+                </a:r>
+                <a:r>
+                  <a:rPr lang="en-US" sz="2400" dirty="0" smtClean="0">
+                    <a:solidFill>
+                      <a:srgbClr val="00B050"/>
+                    </a:solidFill>
+                    <a:latin typeface="Times New Roman"/>
+                  </a:rPr>
+                  <a:t>green</a:t>
+                </a:r>
+                <a:r>
+                  <a:rPr lang="en-US" sz="2400" dirty="0" smtClean="0">
+                    <a:solidFill>
+                      <a:srgbClr val="000000"/>
+                    </a:solidFill>
+                    <a:latin typeface="Times New Roman"/>
+                  </a:rPr>
+                  <a:t>):</a:t>
+                </a:r>
+              </a:p>
+              <a:p>
+                <a:pPr algn="just" eaLnBrk="1" hangingPunct="1">
+                  <a:spcBef>
+                    <a:spcPct val="50000"/>
+                  </a:spcBef>
+                </a:pPr>
+                <a:endParaRPr lang="en-US" altLang="he-IL" sz="2400" b="1" dirty="0">
                   <a:solidFill>
                     <a:srgbClr val="000000"/>
                   </a:solidFill>
-                  <a:latin typeface="Calibri" pitchFamily="34" charset="0"/>
+                  <a:latin typeface="Times New Roman"/>
                 </a:endParaRPr>
               </a:p>
               <a:p>
@@ -6968,11 +6874,11 @@
                     <a:spcPct val="50000"/>
                   </a:spcBef>
                 </a:pPr>
-                <a:endParaRPr lang="en-US" altLang="he-IL" sz="3900" b="1" dirty="0" smtClean="0">
+                <a:endParaRPr lang="en-US" altLang="he-IL" sz="2400" b="1" dirty="0" smtClean="0">
                   <a:solidFill>
                     <a:srgbClr val="000000"/>
                   </a:solidFill>
-                  <a:latin typeface="Calibri" pitchFamily="34" charset="0"/>
+                  <a:latin typeface="Times New Roman"/>
                 </a:endParaRPr>
               </a:p>
               <a:p>
@@ -6981,11 +6887,11 @@
                     <a:spcPct val="50000"/>
                   </a:spcBef>
                 </a:pPr>
-                <a:endParaRPr lang="en-US" altLang="he-IL" sz="3900" b="1" dirty="0">
+                <a:endParaRPr lang="en-US" altLang="he-IL" sz="2400" b="1" dirty="0">
                   <a:solidFill>
                     <a:srgbClr val="000000"/>
                   </a:solidFill>
-                  <a:latin typeface="Calibri" pitchFamily="34" charset="0"/>
+                  <a:latin typeface="Times New Roman"/>
                 </a:endParaRPr>
               </a:p>
               <a:p>
@@ -6994,11 +6900,11 @@
                     <a:spcPct val="50000"/>
                   </a:spcBef>
                 </a:pPr>
-                <a:endParaRPr lang="en-US" altLang="he-IL" sz="3900" b="1" dirty="0" smtClean="0">
+                <a:endParaRPr lang="en-US" altLang="he-IL" sz="2400" b="1" dirty="0" smtClean="0">
                   <a:solidFill>
                     <a:srgbClr val="000000"/>
                   </a:solidFill>
-                  <a:latin typeface="Calibri" pitchFamily="34" charset="0"/>
+                  <a:latin typeface="Times New Roman"/>
                 </a:endParaRPr>
               </a:p>
               <a:p>
@@ -7007,11 +6913,11 @@
                     <a:spcPct val="50000"/>
                   </a:spcBef>
                 </a:pPr>
-                <a:endParaRPr lang="en-US" altLang="he-IL" sz="3900" b="1" dirty="0">
+                <a:endParaRPr lang="en-US" altLang="he-IL" sz="2400" b="1" dirty="0">
                   <a:solidFill>
                     <a:srgbClr val="000000"/>
                   </a:solidFill>
-                  <a:latin typeface="Calibri" pitchFamily="34" charset="0"/>
+                  <a:latin typeface="Times New Roman"/>
                 </a:endParaRPr>
               </a:p>
               <a:p>
@@ -7020,11 +6926,50 @@
                     <a:spcPct val="50000"/>
                   </a:spcBef>
                 </a:pPr>
-                <a:endParaRPr lang="en-US" altLang="he-IL" sz="3900" b="1" dirty="0" smtClean="0">
+                <a:endParaRPr lang="en-US" altLang="he-IL" sz="2400" b="1" dirty="0" smtClean="0">
                   <a:solidFill>
                     <a:srgbClr val="000000"/>
                   </a:solidFill>
-                  <a:latin typeface="Calibri" pitchFamily="34" charset="0"/>
+                  <a:latin typeface="Times New Roman"/>
+                </a:endParaRPr>
+              </a:p>
+              <a:p>
+                <a:pPr algn="just" eaLnBrk="1" hangingPunct="1">
+                  <a:spcBef>
+                    <a:spcPct val="50000"/>
+                  </a:spcBef>
+                </a:pPr>
+                <a:endParaRPr lang="en-US" altLang="he-IL" sz="2400" b="1" dirty="0">
+                  <a:solidFill>
+                    <a:srgbClr val="000000"/>
+                  </a:solidFill>
+                  <a:latin typeface="Times New Roman"/>
+                </a:endParaRPr>
+              </a:p>
+              <a:p>
+                <a:pPr algn="just" eaLnBrk="1" hangingPunct="1">
+                  <a:spcBef>
+                    <a:spcPct val="50000"/>
+                  </a:spcBef>
+                </a:pPr>
+                <a:endParaRPr lang="en-US" altLang="he-IL" sz="2400" b="1" dirty="0" smtClean="0">
+                  <a:solidFill>
+                    <a:srgbClr val="000000"/>
+                  </a:solidFill>
+                  <a:latin typeface="Times New Roman"/>
+                </a:endParaRPr>
+              </a:p>
+              <a:p>
+                <a:pPr algn="just" eaLnBrk="1" hangingPunct="1">
+                  <a:spcBef>
+                    <a:spcPct val="50000"/>
+                  </a:spcBef>
+                </a:pPr>
+                <a:endParaRPr lang="en-US" altLang="he-IL" sz="2400" b="1" dirty="0">
+                  <a:solidFill>
+                    <a:srgbClr val="000000"/>
+                  </a:solidFill>
+                  <a:latin typeface="Times New Roman"/>
                 </a:endParaRPr>
               </a:p>
               <a:p>
@@ -7033,55 +6978,51 @@
                 </a:endParaRPr>
               </a:p>
               <a:p>
+                <a:r>
+                  <a:rPr lang="en-US" sz="2500" dirty="0" smtClean="0">
+                    <a:latin typeface="Times New Roman" pitchFamily="18" charset="0"/>
+                  </a:rPr>
+                  <a:t>We use an extension of the </a:t>
+                </a:r>
+                <a:r>
+                  <a:rPr lang="en-US" sz="2500" b="1" dirty="0" smtClean="0">
+                    <a:latin typeface="Times New Roman" pitchFamily="18" charset="0"/>
+                  </a:rPr>
+                  <a:t>logistic model </a:t>
+                </a:r>
+                <a:r>
+                  <a:rPr lang="en-US" sz="2500" dirty="0" smtClean="0">
+                    <a:latin typeface="Times New Roman" pitchFamily="18" charset="0"/>
+                  </a:rPr>
+                  <a:t>– the </a:t>
+                </a:r>
+                <a:r>
+                  <a:rPr lang="en-US" sz="2500" b="1" dirty="0" err="1" smtClean="0">
+                    <a:latin typeface="Times New Roman" pitchFamily="18" charset="0"/>
+                  </a:rPr>
+                  <a:t>Baranyi</a:t>
+                </a:r>
+                <a:r>
+                  <a:rPr lang="en-US" sz="2500" b="1" dirty="0" smtClean="0">
+                    <a:latin typeface="Times New Roman" pitchFamily="18" charset="0"/>
+                  </a:rPr>
+                  <a:t>-Roberts model</a:t>
+                </a:r>
+                <a:r>
+                  <a:rPr lang="en-US" sz="2500" baseline="30000" dirty="0" smtClean="0">
+                    <a:latin typeface="Times New Roman" pitchFamily="18" charset="0"/>
+                  </a:rPr>
+                  <a:t>1</a:t>
+                </a:r>
+                <a:r>
+                  <a:rPr lang="en-US" sz="2500" dirty="0" smtClean="0">
+                    <a:latin typeface="Times New Roman" pitchFamily="18" charset="0"/>
+                  </a:rPr>
+                  <a:t>:</a:t>
+                </a:r>
                 <a:endParaRPr lang="en-US" sz="2500" dirty="0">
                   <a:latin typeface="Times New Roman" pitchFamily="18" charset="0"/>
                 </a:endParaRPr>
-              </a:p>
-              <a:p>
-                <a:endParaRPr lang="en-US" sz="2500" dirty="0" smtClean="0">
-                  <a:latin typeface="Times New Roman" pitchFamily="18" charset="0"/>
-                </a:endParaRPr>
-              </a:p>
-              <a:p>
-                <a:endParaRPr lang="en-US" sz="2500" dirty="0">
-                  <a:latin typeface="Times New Roman" pitchFamily="18" charset="0"/>
-                </a:endParaRPr>
-              </a:p>
-              <a:p>
-                <a:endParaRPr lang="en-US" sz="2500" dirty="0" smtClean="0">
-                  <a:latin typeface="Times New Roman" pitchFamily="18" charset="0"/>
-                </a:endParaRPr>
-              </a:p>
-              <a:p>
-                <a:endParaRPr lang="en-US" sz="2500" dirty="0">
-                  <a:latin typeface="Times New Roman" pitchFamily="18" charset="0"/>
-                </a:endParaRPr>
-              </a:p>
-              <a:p>
-                <a:r>
-                  <a:rPr lang="en-US" sz="2500" dirty="0" smtClean="0">
-                    <a:latin typeface="Times New Roman" pitchFamily="18" charset="0"/>
-                  </a:rPr>
-                  <a:t>\</a:t>
-                </a:r>
-                <a:r>
-                  <a:rPr lang="en-US" sz="2500" dirty="0" err="1" smtClean="0">
-                    <a:latin typeface="Times New Roman" pitchFamily="18" charset="0"/>
-                  </a:rPr>
-                  <a:t>Baranyi</a:t>
-                </a:r>
-                <a:r>
-                  <a:rPr lang="en-US" sz="2500" dirty="0" smtClean="0">
-                    <a:latin typeface="Times New Roman" pitchFamily="18" charset="0"/>
-                  </a:rPr>
-                  <a:t>-Roberts </a:t>
-                </a:r>
-                <a:r>
-                  <a:rPr lang="en-US" sz="2500" dirty="0">
-                    <a:latin typeface="Times New Roman" pitchFamily="18" charset="0"/>
-                  </a:rPr>
-                  <a:t>model:</a:t>
-                </a:r>
               </a:p>
               <a:p>
                 <a:endParaRPr lang="en-US" sz="2400" i="1" dirty="0">
@@ -7406,8 +7347,18 @@
                   </m:oMathPara>
                 </a14:m>
                 <a:endParaRPr lang="en-US" sz="2500" b="0" dirty="0" smtClean="0">
-                  <a:latin typeface="Cambria Math" panose="02040503050406030204" pitchFamily="18" charset="0"/>
+                  <a:latin typeface="Calibri" panose="020F0502020204030204" pitchFamily="34" charset="0"/>
                   <a:ea typeface="Cambria Math" panose="02040503050406030204" pitchFamily="18" charset="0"/>
+                </a:endParaRPr>
+              </a:p>
+              <a:p>
+                <a:pPr eaLnBrk="1" hangingPunct="1">
+                  <a:spcBef>
+                    <a:spcPct val="10000"/>
+                  </a:spcBef>
+                </a:pPr>
+                <a:endParaRPr lang="en-US" altLang="he-IL" sz="2000" i="1" dirty="0" smtClean="0">
+                  <a:latin typeface="Cambria Math"/>
                 </a:endParaRPr>
               </a:p>
               <a:p>
@@ -7420,7 +7371,8 @@
                   <m:oMath xmlns:m="http://schemas.openxmlformats.org/officeDocument/2006/math">
                     <m:r>
                       <a:rPr lang="en-US" altLang="he-IL" sz="2000" i="1">
-                        <a:latin typeface="Cambria Math"/>
+                        <a:latin typeface="Cambria Math" panose="02040503050406030204" pitchFamily="18" charset="0"/>
+                        <a:ea typeface="Cambria Math" panose="02040503050406030204" pitchFamily="18" charset="0"/>
                       </a:rPr>
                       <m:t>𝑁</m:t>
                     </m:r>
@@ -7428,7 +7380,8 @@
                 </a14:m>
                 <a:r>
                   <a:rPr lang="en-US" altLang="he-IL" sz="2000" dirty="0" smtClean="0">
-                    <a:latin typeface="Times New Roman" pitchFamily="18" charset="0"/>
+                    <a:latin typeface="Cambria Math" panose="02040503050406030204" pitchFamily="18" charset="0"/>
+                    <a:ea typeface="Cambria Math" panose="02040503050406030204" pitchFamily="18" charset="0"/>
                   </a:rPr>
                   <a:t> – population density		</a:t>
                 </a:r>
@@ -7436,7 +7389,8 @@
                   <m:oMath xmlns:m="http://schemas.openxmlformats.org/officeDocument/2006/math">
                     <m:r>
                       <a:rPr lang="en-US" altLang="he-IL" sz="2000" i="1">
-                        <a:latin typeface="Cambria Math"/>
+                        <a:latin typeface="Cambria Math" panose="02040503050406030204" pitchFamily="18" charset="0"/>
+                        <a:ea typeface="Cambria Math" panose="02040503050406030204" pitchFamily="18" charset="0"/>
                       </a:rPr>
                       <m:t>𝐾</m:t>
                     </m:r>
@@ -7444,7 +7398,8 @@
                 </a14:m>
                 <a:r>
                   <a:rPr lang="en-US" altLang="he-IL" sz="2000" dirty="0">
-                    <a:latin typeface="Times New Roman" pitchFamily="18" charset="0"/>
+                    <a:latin typeface="Cambria Math" panose="02040503050406030204" pitchFamily="18" charset="0"/>
+                    <a:ea typeface="Cambria Math" panose="02040503050406030204" pitchFamily="18" charset="0"/>
                   </a:rPr>
                   <a:t> – maximum density</a:t>
                 </a:r>
@@ -7459,7 +7414,8 @@
                   <m:oMath xmlns:m="http://schemas.openxmlformats.org/officeDocument/2006/math">
                     <m:r>
                       <a:rPr lang="en-US" altLang="he-IL" sz="2000" i="1">
-                        <a:latin typeface="Cambria Math"/>
+                        <a:latin typeface="Cambria Math" panose="02040503050406030204" pitchFamily="18" charset="0"/>
+                        <a:ea typeface="Cambria Math" panose="02040503050406030204" pitchFamily="18" charset="0"/>
                       </a:rPr>
                       <m:t>𝑟</m:t>
                     </m:r>
@@ -7467,19 +7423,22 @@
                 </a14:m>
                 <a:r>
                   <a:rPr lang="en-US" altLang="he-IL" sz="2000" dirty="0" smtClean="0">
-                    <a:latin typeface="Times New Roman" pitchFamily="18" charset="0"/>
+                    <a:latin typeface="Cambria Math" panose="02040503050406030204" pitchFamily="18" charset="0"/>
+                    <a:ea typeface="Cambria Math" panose="02040503050406030204" pitchFamily="18" charset="0"/>
                   </a:rPr>
                   <a:t> – growth rate </a:t>
                 </a:r>
                 <a:r>
                   <a:rPr lang="en-US" altLang="he-IL" sz="2000" dirty="0">
-                    <a:latin typeface="Times New Roman" pitchFamily="18" charset="0"/>
+                    <a:latin typeface="Cambria Math" panose="02040503050406030204" pitchFamily="18" charset="0"/>
+                    <a:ea typeface="Cambria Math" panose="02040503050406030204" pitchFamily="18" charset="0"/>
                   </a:rPr>
                   <a:t>(</a:t>
                 </a:r>
                 <a:r>
                   <a:rPr lang="en-US" altLang="he-IL" sz="2000" dirty="0" smtClean="0">
-                    <a:latin typeface="Times New Roman" pitchFamily="18" charset="0"/>
+                    <a:latin typeface="Cambria Math" panose="02040503050406030204" pitchFamily="18" charset="0"/>
+                    <a:ea typeface="Cambria Math" panose="02040503050406030204" pitchFamily="18" charset="0"/>
                   </a:rPr>
                   <a:t>low density)	</a:t>
                 </a:r>
@@ -7487,7 +7446,8 @@
                   <m:oMath xmlns:m="http://schemas.openxmlformats.org/officeDocument/2006/math">
                     <m:r>
                       <a:rPr lang="en-US" altLang="he-IL" sz="2000" i="1">
-                        <a:latin typeface="Cambria Math"/>
+                        <a:latin typeface="Cambria Math" panose="02040503050406030204" pitchFamily="18" charset="0"/>
+                        <a:ea typeface="Cambria Math" panose="02040503050406030204" pitchFamily="18" charset="0"/>
                       </a:rPr>
                       <m:t>𝜈</m:t>
                     </m:r>
@@ -7495,7 +7455,8 @@
                 </a14:m>
                 <a:r>
                   <a:rPr lang="en-US" altLang="he-IL" sz="2000" dirty="0" smtClean="0">
-                    <a:latin typeface="Times New Roman" pitchFamily="18" charset="0"/>
+                    <a:latin typeface="Cambria Math" panose="02040503050406030204" pitchFamily="18" charset="0"/>
+                    <a:ea typeface="Cambria Math" panose="02040503050406030204" pitchFamily="18" charset="0"/>
                   </a:rPr>
                   <a:t> – growth deceleration</a:t>
                 </a:r>
@@ -7510,7 +7471,7 @@
                   <m:oMath xmlns:m="http://schemas.openxmlformats.org/officeDocument/2006/math">
                     <m:r>
                       <a:rPr lang="en-US" sz="2000" i="1">
-                        <a:latin typeface="Cambria Math"/>
+                        <a:latin typeface="Cambria Math" panose="02040503050406030204" pitchFamily="18" charset="0"/>
                         <a:ea typeface="Cambria Math" panose="02040503050406030204" pitchFamily="18" charset="0"/>
                       </a:rPr>
                       <m:t>𝛼</m:t>
@@ -7519,7 +7480,7 @@
                       <m:dPr>
                         <m:ctrlPr>
                           <a:rPr lang="en-US" sz="2000" i="1">
-                            <a:latin typeface="Cambria Math"/>
+                            <a:latin typeface="Cambria Math" panose="02040503050406030204" pitchFamily="18" charset="0"/>
                             <a:ea typeface="Cambria Math" panose="02040503050406030204" pitchFamily="18" charset="0"/>
                           </a:rPr>
                         </m:ctrlPr>
@@ -7538,7 +7499,8 @@
                 </a14:m>
                 <a:r>
                   <a:rPr lang="en-US" altLang="he-IL" sz="2000" dirty="0" smtClean="0">
-                    <a:latin typeface="Times New Roman" pitchFamily="18" charset="0"/>
+                    <a:latin typeface="Cambria Math" panose="02040503050406030204" pitchFamily="18" charset="0"/>
+                    <a:ea typeface="Cambria Math" panose="02040503050406030204" pitchFamily="18" charset="0"/>
                   </a:rPr>
                   <a:t> - physiological adjustment function</a:t>
                 </a:r>
@@ -7555,7 +7517,7 @@
                       <m:sSubPr>
                         <m:ctrlPr>
                           <a:rPr lang="en-US" sz="2000" i="1">
-                            <a:latin typeface="Cambria Math"/>
+                            <a:latin typeface="Cambria Math" panose="02040503050406030204" pitchFamily="18" charset="0"/>
                             <a:ea typeface="Cambria Math" panose="02040503050406030204" pitchFamily="18" charset="0"/>
                           </a:rPr>
                         </m:ctrlPr>
@@ -7563,7 +7525,7 @@
                       <m:e>
                         <m:r>
                           <a:rPr lang="en-US" sz="2000" i="1">
-                            <a:latin typeface="Cambria Math"/>
+                            <a:latin typeface="Cambria Math" panose="02040503050406030204" pitchFamily="18" charset="0"/>
                             <a:ea typeface="Cambria Math" panose="02040503050406030204" pitchFamily="18" charset="0"/>
                           </a:rPr>
                           <m:t>𝑞</m:t>
@@ -7572,7 +7534,7 @@
                       <m:sub>
                         <m:r>
                           <a:rPr lang="en-US" sz="2000" i="1">
-                            <a:latin typeface="Cambria Math"/>
+                            <a:latin typeface="Cambria Math" panose="02040503050406030204" pitchFamily="18" charset="0"/>
                             <a:ea typeface="Cambria Math" panose="02040503050406030204" pitchFamily="18" charset="0"/>
                           </a:rPr>
                           <m:t>0</m:t>
@@ -7583,7 +7545,8 @@
                 </a14:m>
                 <a:r>
                   <a:rPr lang="en-US" altLang="he-IL" sz="2000" dirty="0" smtClean="0">
-                    <a:latin typeface="Times New Roman" pitchFamily="18" charset="0"/>
+                    <a:latin typeface="Cambria Math" panose="02040503050406030204" pitchFamily="18" charset="0"/>
+                    <a:ea typeface="Cambria Math" panose="02040503050406030204" pitchFamily="18" charset="0"/>
                   </a:rPr>
                   <a:t> - initial physiological state	</a:t>
                 </a:r>
@@ -7591,7 +7554,7 @@
                   <m:oMath xmlns:m="http://schemas.openxmlformats.org/officeDocument/2006/math">
                     <m:r>
                       <a:rPr lang="en-US" sz="2000" i="1">
-                        <a:latin typeface="Cambria Math"/>
+                        <a:latin typeface="Cambria Math" panose="02040503050406030204" pitchFamily="18" charset="0"/>
                         <a:ea typeface="Cambria Math" panose="02040503050406030204" pitchFamily="18" charset="0"/>
                       </a:rPr>
                       <m:t>𝑚</m:t>
@@ -7600,22 +7563,35 @@
                 </a14:m>
                 <a:r>
                   <a:rPr lang="en-US" altLang="he-IL" sz="2000" dirty="0" smtClean="0">
-                    <a:latin typeface="Times New Roman" pitchFamily="18" charset="0"/>
+                    <a:latin typeface="Cambria Math" panose="02040503050406030204" pitchFamily="18" charset="0"/>
+                    <a:ea typeface="Cambria Math" panose="02040503050406030204" pitchFamily="18" charset="0"/>
                   </a:rPr>
                   <a:t> – </a:t>
                 </a:r>
                 <a:r>
                   <a:rPr lang="en-US" altLang="he-IL" sz="2000" dirty="0" err="1" smtClean="0">
-                    <a:latin typeface="Times New Roman" pitchFamily="18" charset="0"/>
+                    <a:latin typeface="Cambria Math" panose="02040503050406030204" pitchFamily="18" charset="0"/>
+                    <a:ea typeface="Cambria Math" panose="02040503050406030204" pitchFamily="18" charset="0"/>
                   </a:rPr>
                   <a:t>physio</a:t>
                 </a:r>
                 <a:r>
                   <a:rPr lang="en-US" altLang="he-IL" sz="2000" dirty="0" smtClean="0">
-                    <a:latin typeface="Times New Roman" pitchFamily="18" charset="0"/>
+                    <a:latin typeface="Cambria Math" panose="02040503050406030204" pitchFamily="18" charset="0"/>
+                    <a:ea typeface="Cambria Math" panose="02040503050406030204" pitchFamily="18" charset="0"/>
                   </a:rPr>
                   <a:t>. adjustment rate</a:t>
                 </a:r>
+              </a:p>
+              <a:p>
+                <a:pPr eaLnBrk="1" hangingPunct="1">
+                  <a:spcBef>
+                    <a:spcPct val="10000"/>
+                  </a:spcBef>
+                </a:pPr>
+                <a:endParaRPr lang="en-US" altLang="he-IL" sz="2500" dirty="0" smtClean="0">
+                  <a:latin typeface="Times New Roman" pitchFamily="18" charset="0"/>
+                </a:endParaRPr>
               </a:p>
               <a:p>
                 <a:pPr eaLnBrk="1" hangingPunct="1">
@@ -8225,23 +8201,8 @@
                     </a:solidFill>
                     <a:latin typeface="Calibri" pitchFamily="34" charset="0"/>
                   </a:rPr>
-                  <a:t>Competition </a:t>
-                </a:r>
-                <a:r>
-                  <a:rPr lang="en-US" altLang="he-IL" sz="4200" b="1" dirty="0" smtClean="0">
-                    <a:solidFill>
-                      <a:srgbClr val="000000"/>
-                    </a:solidFill>
-                    <a:latin typeface="Calibri" pitchFamily="34" charset="0"/>
-                  </a:rPr>
-                  <a:t>prediction</a:t>
-                </a:r>
-                <a:endParaRPr lang="en-US" altLang="he-IL" sz="4200" b="1" dirty="0" smtClean="0">
-                  <a:solidFill>
-                    <a:srgbClr val="000000"/>
-                  </a:solidFill>
-                  <a:latin typeface="Calibri" pitchFamily="34" charset="0"/>
-                </a:endParaRPr>
+                  <a:t>Competition prediction</a:t>
+                </a:r>
               </a:p>
               <a:p>
                 <a:pPr eaLnBrk="1" hangingPunct="1">
@@ -8250,344 +8211,83 @@
                   </a:spcBef>
                 </a:pPr>
                 <a:r>
+                  <a:rPr lang="en-US" sz="2400" dirty="0" smtClean="0">
+                    <a:latin typeface="+mn-lt"/>
+                  </a:rPr>
+                  <a:t>Competitions </a:t>
+                </a:r>
+                <a:r>
+                  <a:rPr lang="en-US" sz="2400" dirty="0">
+                    <a:latin typeface="+mn-lt"/>
+                  </a:rPr>
+                  <a:t>will </a:t>
+                </a:r>
+                <a:r>
+                  <a:rPr lang="en-US" sz="2400" dirty="0" smtClean="0">
+                    <a:latin typeface="+mn-lt"/>
+                  </a:rPr>
+                  <a:t>be </a:t>
+                </a:r>
+                <a:r>
+                  <a:rPr lang="en-US" sz="2400" dirty="0">
+                    <a:latin typeface="+mn-lt"/>
+                  </a:rPr>
+                  <a:t>simulated by integrating a two-species ordinary differential equation (ODE</a:t>
+                </a:r>
+                <a:r>
+                  <a:rPr lang="en-US" sz="2400" dirty="0" smtClean="0">
+                    <a:latin typeface="+mn-lt"/>
+                  </a:rPr>
+                  <a:t>). For example, the </a:t>
+                </a:r>
+                <a:r>
+                  <a:rPr lang="en-US" altLang="he-IL" sz="2500" b="1" dirty="0" smtClean="0">
+                    <a:latin typeface="Times New Roman" pitchFamily="18" charset="0"/>
+                  </a:rPr>
+                  <a:t>two-strain </a:t>
+                </a:r>
+                <a:r>
+                  <a:rPr lang="en-US" altLang="he-IL" sz="2500" b="1" dirty="0">
+                    <a:latin typeface="Times New Roman" pitchFamily="18" charset="0"/>
+                  </a:rPr>
+                  <a:t>ordinary differential </a:t>
+                </a:r>
+                <a:r>
+                  <a:rPr lang="en-US" altLang="he-IL" sz="2500" b="1" dirty="0" smtClean="0">
+                    <a:latin typeface="Times New Roman" pitchFamily="18" charset="0"/>
+                  </a:rPr>
+                  <a:t>equation </a:t>
+                </a:r>
+                <a:r>
                   <a:rPr lang="en-US" altLang="he-IL" sz="2500" dirty="0" smtClean="0">
                     <a:latin typeface="Times New Roman" pitchFamily="18" charset="0"/>
                   </a:rPr>
-                  <a:t>Two-strain ordinary differential equation:</a:t>
-                </a:r>
-              </a:p>
-              <a:p>
-                <a:pPr eaLnBrk="1" hangingPunct="1">
-                  <a:spcBef>
-                    <a:spcPct val="10000"/>
-                  </a:spcBef>
-                </a:pPr>
-                <a14:m>
-                  <m:oMathPara xmlns:m="http://schemas.openxmlformats.org/officeDocument/2006/math">
-                    <m:oMathParaPr>
-                      <m:jc m:val="centerGroup"/>
-                    </m:oMathParaPr>
-                    <m:oMath xmlns:m="http://schemas.openxmlformats.org/officeDocument/2006/math">
-                      <m:f>
-                        <m:fPr>
-                          <m:ctrlPr>
-                            <a:rPr lang="en-US" altLang="he-IL" sz="2500" b="0" i="1" smtClean="0">
-                              <a:latin typeface="Cambria Math"/>
-                            </a:rPr>
-                          </m:ctrlPr>
-                        </m:fPr>
-                        <m:num>
-                          <m:r>
-                            <a:rPr lang="en-US" altLang="he-IL" sz="2500" b="0" i="1" smtClean="0">
-                              <a:latin typeface="Cambria Math"/>
-                            </a:rPr>
-                            <m:t>𝑑</m:t>
-                          </m:r>
-                          <m:sSub>
-                            <m:sSubPr>
-                              <m:ctrlPr>
-                                <a:rPr lang="en-US" altLang="he-IL" sz="2500" b="0" i="1" smtClean="0">
-                                  <a:latin typeface="Cambria Math"/>
-                                </a:rPr>
-                              </m:ctrlPr>
-                            </m:sSubPr>
-                            <m:e>
-                              <m:r>
-                                <a:rPr lang="en-US" altLang="he-IL" sz="2500" b="0" i="1" smtClean="0">
-                                  <a:latin typeface="Cambria Math"/>
-                                </a:rPr>
-                                <m:t>𝑁</m:t>
-                              </m:r>
-                            </m:e>
-                            <m:sub>
-                              <m:r>
-                                <a:rPr lang="en-US" altLang="he-IL" sz="2500" b="0" i="1" smtClean="0">
-                                  <a:latin typeface="Cambria Math"/>
-                                </a:rPr>
-                                <m:t>𝑖</m:t>
-                              </m:r>
-                            </m:sub>
-                          </m:sSub>
-                        </m:num>
-                        <m:den>
-                          <m:r>
-                            <a:rPr lang="en-US" altLang="he-IL" sz="2500" b="0" i="1" smtClean="0">
-                              <a:latin typeface="Cambria Math"/>
-                            </a:rPr>
-                            <m:t>𝑑𝑡</m:t>
-                          </m:r>
-                        </m:den>
-                      </m:f>
-                      <m:r>
-                        <a:rPr lang="en-US" altLang="he-IL" sz="2500" b="0" i="1" smtClean="0">
-                          <a:latin typeface="Cambria Math"/>
-                        </a:rPr>
-                        <m:t>=</m:t>
-                      </m:r>
-                      <m:sSub>
-                        <m:sSubPr>
-                          <m:ctrlPr>
-                            <a:rPr lang="en-US" altLang="he-IL" sz="2500" b="0" i="1" smtClean="0">
-                              <a:latin typeface="Cambria Math"/>
-                            </a:rPr>
-                          </m:ctrlPr>
-                        </m:sSubPr>
-                        <m:e>
-                          <m:r>
-                            <a:rPr lang="en-US" altLang="he-IL" sz="2500" b="0" i="1" smtClean="0">
-                              <a:latin typeface="Cambria Math"/>
-                            </a:rPr>
-                            <m:t>𝑟</m:t>
-                          </m:r>
-                        </m:e>
-                        <m:sub>
-                          <m:r>
-                            <a:rPr lang="en-US" altLang="he-IL" sz="2500" b="0" i="1" smtClean="0">
-                              <a:latin typeface="Cambria Math"/>
-                            </a:rPr>
-                            <m:t>𝑖</m:t>
-                          </m:r>
-                        </m:sub>
-                      </m:sSub>
-                      <m:sSub>
-                        <m:sSubPr>
-                          <m:ctrlPr>
-                            <a:rPr lang="en-US" altLang="he-IL" sz="2500" b="0" i="1" smtClean="0">
-                              <a:latin typeface="Cambria Math"/>
-                            </a:rPr>
-                          </m:ctrlPr>
-                        </m:sSubPr>
-                        <m:e>
-                          <m:r>
-                            <a:rPr lang="en-US" altLang="he-IL" sz="2500" b="0" i="1" smtClean="0">
-                              <a:latin typeface="Cambria Math"/>
-                            </a:rPr>
-                            <m:t>𝛼</m:t>
-                          </m:r>
-                        </m:e>
-                        <m:sub>
-                          <m:r>
-                            <a:rPr lang="en-US" altLang="he-IL" sz="2500" b="0" i="1" smtClean="0">
-                              <a:latin typeface="Cambria Math"/>
-                            </a:rPr>
-                            <m:t>𝑖</m:t>
-                          </m:r>
-                        </m:sub>
-                      </m:sSub>
-                      <m:d>
-                        <m:dPr>
-                          <m:ctrlPr>
-                            <a:rPr lang="en-US" altLang="he-IL" sz="2500" b="0" i="1" smtClean="0">
-                              <a:latin typeface="Cambria Math"/>
-                            </a:rPr>
-                          </m:ctrlPr>
-                        </m:dPr>
-                        <m:e>
-                          <m:r>
-                            <a:rPr lang="en-US" altLang="he-IL" sz="2500" b="0" i="1" smtClean="0">
-                              <a:latin typeface="Cambria Math"/>
-                            </a:rPr>
-                            <m:t>𝑡</m:t>
-                          </m:r>
-                        </m:e>
-                      </m:d>
-                      <m:sSub>
-                        <m:sSubPr>
-                          <m:ctrlPr>
-                            <a:rPr lang="en-US" altLang="he-IL" sz="2500" b="0" i="1" smtClean="0">
-                              <a:latin typeface="Cambria Math"/>
-                            </a:rPr>
-                          </m:ctrlPr>
-                        </m:sSubPr>
-                        <m:e>
-                          <m:r>
-                            <a:rPr lang="en-US" altLang="he-IL" sz="2500" b="0" i="1" smtClean="0">
-                              <a:latin typeface="Cambria Math"/>
-                            </a:rPr>
-                            <m:t>𝑁</m:t>
-                          </m:r>
-                        </m:e>
-                        <m:sub>
-                          <m:r>
-                            <a:rPr lang="en-US" altLang="he-IL" sz="2500" b="0" i="1" smtClean="0">
-                              <a:latin typeface="Cambria Math"/>
-                            </a:rPr>
-                            <m:t>𝑖</m:t>
-                          </m:r>
-                        </m:sub>
-                      </m:sSub>
-                      <m:d>
-                        <m:dPr>
-                          <m:ctrlPr>
-                            <a:rPr lang="en-US" altLang="he-IL" sz="2500" b="0" i="1" smtClean="0">
-                              <a:latin typeface="Cambria Math"/>
-                            </a:rPr>
-                          </m:ctrlPr>
-                        </m:dPr>
-                        <m:e>
-                          <m:r>
-                            <a:rPr lang="en-US" altLang="he-IL" sz="2500" b="0" i="1" smtClean="0">
-                              <a:latin typeface="Cambria Math"/>
-                            </a:rPr>
-                            <m:t>1</m:t>
-                          </m:r>
-                          <m:r>
-                            <a:rPr lang="en-US" altLang="he-IL" sz="2500" b="0" i="1" smtClean="0">
-                              <a:latin typeface="Cambria Math"/>
-                            </a:rPr>
-                            <m:t>−</m:t>
-                          </m:r>
-                          <m:sSup>
-                            <m:sSupPr>
-                              <m:ctrlPr>
-                                <a:rPr lang="en-US" altLang="he-IL" sz="2500" b="0" i="1" smtClean="0">
-                                  <a:latin typeface="Cambria Math"/>
-                                </a:rPr>
-                              </m:ctrlPr>
-                            </m:sSupPr>
-                            <m:e>
-                              <m:d>
-                                <m:dPr>
-                                  <m:ctrlPr>
-                                    <a:rPr lang="en-US" altLang="he-IL" sz="2500" b="0" i="1" smtClean="0">
-                                      <a:latin typeface="Cambria Math"/>
-                                    </a:rPr>
-                                  </m:ctrlPr>
-                                </m:dPr>
-                                <m:e>
-                                  <m:f>
-                                    <m:fPr>
-                                      <m:ctrlPr>
-                                        <a:rPr lang="en-US" altLang="he-IL" sz="2500" b="0" i="1" smtClean="0">
-                                          <a:latin typeface="Cambria Math"/>
-                                        </a:rPr>
-                                      </m:ctrlPr>
-                                    </m:fPr>
-                                    <m:num>
-                                      <m:sSub>
-                                        <m:sSubPr>
-                                          <m:ctrlPr>
-                                            <a:rPr lang="en-US" altLang="he-IL" sz="2500" b="0" i="1" smtClean="0">
-                                              <a:latin typeface="Cambria Math"/>
-                                            </a:rPr>
-                                          </m:ctrlPr>
-                                        </m:sSubPr>
-                                        <m:e>
-                                          <m:r>
-                                            <a:rPr lang="en-US" altLang="he-IL" sz="2500" b="0" i="1" smtClean="0">
-                                              <a:latin typeface="Cambria Math"/>
-                                            </a:rPr>
-                                            <m:t>𝑁</m:t>
-                                          </m:r>
-                                        </m:e>
-                                        <m:sub>
-                                          <m:r>
-                                            <a:rPr lang="en-US" altLang="he-IL" sz="2500" b="0" i="1" smtClean="0">
-                                              <a:latin typeface="Cambria Math"/>
-                                            </a:rPr>
-                                            <m:t>𝐺</m:t>
-                                          </m:r>
-                                        </m:sub>
-                                      </m:sSub>
-                                      <m:r>
-                                        <a:rPr lang="en-US" altLang="he-IL" sz="2500" b="0" i="1" smtClean="0">
-                                          <a:latin typeface="Cambria Math"/>
-                                        </a:rPr>
-                                        <m:t>+</m:t>
-                                      </m:r>
-                                      <m:sSub>
-                                        <m:sSubPr>
-                                          <m:ctrlPr>
-                                            <a:rPr lang="en-US" altLang="he-IL" sz="2500" b="0" i="1" smtClean="0">
-                                              <a:latin typeface="Cambria Math"/>
-                                            </a:rPr>
-                                          </m:ctrlPr>
-                                        </m:sSubPr>
-                                        <m:e>
-                                          <m:r>
-                                            <a:rPr lang="en-US" altLang="he-IL" sz="2500" b="0" i="1" smtClean="0">
-                                              <a:latin typeface="Cambria Math"/>
-                                            </a:rPr>
-                                            <m:t>𝑁</m:t>
-                                          </m:r>
-                                        </m:e>
-                                        <m:sub>
-                                          <m:r>
-                                            <a:rPr lang="en-US" altLang="he-IL" sz="2500" b="0" i="1" smtClean="0">
-                                              <a:latin typeface="Cambria Math"/>
-                                            </a:rPr>
-                                            <m:t>𝑅</m:t>
-                                          </m:r>
-                                        </m:sub>
-                                      </m:sSub>
-                                    </m:num>
-                                    <m:den>
-                                      <m:sSub>
-                                        <m:sSubPr>
-                                          <m:ctrlPr>
-                                            <a:rPr lang="en-US" altLang="he-IL" sz="2500" b="0" i="1" smtClean="0">
-                                              <a:latin typeface="Cambria Math"/>
-                                            </a:rPr>
-                                          </m:ctrlPr>
-                                        </m:sSubPr>
-                                        <m:e>
-                                          <m:r>
-                                            <a:rPr lang="en-US" altLang="he-IL" sz="2500" b="0" i="1" smtClean="0">
-                                              <a:latin typeface="Cambria Math"/>
-                                            </a:rPr>
-                                            <m:t>𝐾</m:t>
-                                          </m:r>
-                                        </m:e>
-                                        <m:sub>
-                                          <m:r>
-                                            <a:rPr lang="en-US" altLang="he-IL" sz="2500" b="0" i="1" smtClean="0">
-                                              <a:latin typeface="Cambria Math"/>
-                                            </a:rPr>
-                                            <m:t>𝑖</m:t>
-                                          </m:r>
-                                        </m:sub>
-                                      </m:sSub>
-                                    </m:den>
-                                  </m:f>
-                                </m:e>
-                              </m:d>
-                            </m:e>
-                            <m:sup>
-                              <m:sSub>
-                                <m:sSubPr>
-                                  <m:ctrlPr>
-                                    <a:rPr lang="en-US" altLang="he-IL" sz="2500" b="0" i="1" smtClean="0">
-                                      <a:latin typeface="Cambria Math"/>
-                                    </a:rPr>
-                                  </m:ctrlPr>
-                                </m:sSubPr>
-                                <m:e>
-                                  <m:r>
-                                    <a:rPr lang="en-US" altLang="he-IL" sz="2500" b="0" i="1" smtClean="0">
-                                      <a:latin typeface="Cambria Math"/>
-                                    </a:rPr>
-                                    <m:t>𝜈</m:t>
-                                  </m:r>
-                                </m:e>
-                                <m:sub>
-                                  <m:r>
-                                    <a:rPr lang="en-US" altLang="he-IL" sz="2500" b="0" i="1" smtClean="0">
-                                      <a:latin typeface="Cambria Math"/>
-                                    </a:rPr>
-                                    <m:t>𝑖</m:t>
-                                  </m:r>
-                                </m:sub>
-                              </m:sSub>
-                            </m:sup>
-                          </m:sSup>
-                        </m:e>
-                      </m:d>
-                    </m:oMath>
-                  </m:oMathPara>
-                </a14:m>
-                <a:endParaRPr lang="en-US" altLang="he-IL" sz="2500" dirty="0" smtClean="0">
-                  <a:latin typeface="Times New Roman" pitchFamily="18" charset="0"/>
-                </a:endParaRPr>
+                  <a:t>for the </a:t>
+                </a:r>
+                <a:r>
+                  <a:rPr lang="en-US" altLang="he-IL" sz="2500" dirty="0" err="1" smtClean="0">
+                    <a:latin typeface="Times New Roman" pitchFamily="18" charset="0"/>
+                  </a:rPr>
+                  <a:t>Baranyi</a:t>
+                </a:r>
+                <a:r>
+                  <a:rPr lang="en-US" altLang="he-IL" sz="2500" dirty="0" smtClean="0">
+                    <a:latin typeface="Times New Roman" pitchFamily="18" charset="0"/>
+                  </a:rPr>
+                  <a:t>-Roberts model is</a:t>
+                </a:r>
+                <a:r>
+                  <a:rPr lang="en-US" altLang="he-IL" sz="2500" baseline="30000" dirty="0" smtClean="0">
+                    <a:latin typeface="Times New Roman" pitchFamily="18" charset="0"/>
+                  </a:rPr>
+                  <a:t>1,4</a:t>
+                </a:r>
+                <a:r>
+                  <a:rPr lang="en-US" altLang="he-IL" sz="2500" dirty="0" smtClean="0">
+                    <a:latin typeface="Times New Roman" pitchFamily="18" charset="0"/>
+                  </a:rPr>
+                  <a:t>:</a:t>
+                </a:r>
               </a:p>
               <a:p>
                 <a:pPr eaLnBrk="1" hangingPunct="1">
@@ -8605,264 +8305,375 @@
                     <a:spcPct val="10000"/>
                   </a:spcBef>
                 </a:pPr>
-                <a:r>
-                  <a:rPr lang="en-GB" sz="2400" dirty="0" err="1"/>
-                  <a:t>Suspendisse</a:t>
-                </a:r>
-                <a:r>
-                  <a:rPr lang="en-GB" sz="2400" dirty="0"/>
-                  <a:t> </a:t>
-                </a:r>
-                <a:r>
-                  <a:rPr lang="en-GB" sz="2400" dirty="0" err="1"/>
-                  <a:t>lectus</a:t>
-                </a:r>
-                <a:r>
-                  <a:rPr lang="en-GB" sz="2400" dirty="0"/>
-                  <a:t> </a:t>
-                </a:r>
-                <a:r>
-                  <a:rPr lang="en-GB" sz="2400" dirty="0" err="1"/>
-                  <a:t>leo</a:t>
-                </a:r>
-                <a:r>
-                  <a:rPr lang="en-GB" sz="2400" dirty="0"/>
-                  <a:t>, </a:t>
-                </a:r>
-                <a:r>
-                  <a:rPr lang="en-GB" sz="2400" dirty="0" err="1"/>
-                  <a:t>consectetur</a:t>
-                </a:r>
-                <a:r>
-                  <a:rPr lang="en-GB" sz="2400" dirty="0"/>
-                  <a:t> in </a:t>
-                </a:r>
-                <a:r>
-                  <a:rPr lang="en-GB" sz="2400" dirty="0" err="1"/>
-                  <a:t>tempor</a:t>
-                </a:r>
-                <a:r>
-                  <a:rPr lang="en-GB" sz="2400" dirty="0"/>
-                  <a:t> sit </a:t>
-                </a:r>
-                <a:r>
-                  <a:rPr lang="en-GB" sz="2400" dirty="0" err="1"/>
-                  <a:t>amet</a:t>
-                </a:r>
-                <a:r>
-                  <a:rPr lang="en-GB" sz="2400" dirty="0"/>
-                  <a:t>, </a:t>
-                </a:r>
-                <a:r>
-                  <a:rPr lang="en-GB" sz="2400" dirty="0" err="1"/>
-                  <a:t>placerat</a:t>
-                </a:r>
-                <a:r>
-                  <a:rPr lang="en-GB" sz="2400" dirty="0"/>
-                  <a:t> </a:t>
-                </a:r>
-                <a:r>
-                  <a:rPr lang="en-GB" sz="2400" dirty="0" err="1"/>
-                  <a:t>quis</a:t>
-                </a:r>
-                <a:r>
-                  <a:rPr lang="en-GB" sz="2400" dirty="0"/>
-                  <a:t> </a:t>
-                </a:r>
-                <a:r>
-                  <a:rPr lang="en-GB" sz="2400" dirty="0" err="1"/>
-                  <a:t>neque</a:t>
-                </a:r>
-                <a:r>
-                  <a:rPr lang="en-GB" sz="2400" dirty="0"/>
-                  <a:t>. </a:t>
-                </a:r>
-                <a:r>
-                  <a:rPr lang="en-GB" sz="2400" dirty="0" err="1"/>
-                  <a:t>Etiam</a:t>
-                </a:r>
-                <a:r>
-                  <a:rPr lang="en-GB" sz="2400" dirty="0"/>
-                  <a:t> </a:t>
-                </a:r>
-                <a:r>
-                  <a:rPr lang="en-GB" sz="2400" dirty="0" err="1"/>
-                  <a:t>luctus</a:t>
-                </a:r>
-                <a:r>
-                  <a:rPr lang="en-GB" sz="2400" dirty="0"/>
-                  <a:t> </a:t>
-                </a:r>
-                <a:r>
-                  <a:rPr lang="en-GB" sz="2400" dirty="0" err="1"/>
-                  <a:t>porttitor</a:t>
-                </a:r>
-                <a:r>
-                  <a:rPr lang="en-GB" sz="2400" dirty="0"/>
-                  <a:t> lorem, </a:t>
-                </a:r>
-                <a:r>
-                  <a:rPr lang="en-GB" sz="2400" dirty="0" err="1"/>
-                  <a:t>sed</a:t>
-                </a:r>
-                <a:r>
-                  <a:rPr lang="en-GB" sz="2400" dirty="0"/>
-                  <a:t> </a:t>
-                </a:r>
-                <a:r>
-                  <a:rPr lang="en-GB" sz="2400" dirty="0" err="1"/>
-                  <a:t>suscipit</a:t>
-                </a:r>
-                <a:r>
-                  <a:rPr lang="en-GB" sz="2400" dirty="0"/>
-                  <a:t> </a:t>
-                </a:r>
-                <a:r>
-                  <a:rPr lang="en-GB" sz="2400" dirty="0" err="1"/>
-                  <a:t>est</a:t>
-                </a:r>
-                <a:r>
-                  <a:rPr lang="en-GB" sz="2400" dirty="0"/>
-                  <a:t> </a:t>
-                </a:r>
-                <a:r>
-                  <a:rPr lang="en-GB" sz="2400" dirty="0" err="1"/>
-                  <a:t>rutrum</a:t>
-                </a:r>
-                <a:r>
-                  <a:rPr lang="en-GB" sz="2400" dirty="0"/>
-                  <a:t> non. </a:t>
-                </a:r>
-                <a:r>
-                  <a:rPr lang="en-GB" sz="2400" dirty="0" err="1"/>
-                  <a:t>Curabitur</a:t>
-                </a:r>
-                <a:r>
-                  <a:rPr lang="en-GB" sz="2400" dirty="0"/>
-                  <a:t> </a:t>
-                </a:r>
-                <a:r>
-                  <a:rPr lang="en-GB" sz="2400" dirty="0" err="1"/>
-                  <a:t>lobortis</a:t>
-                </a:r>
-                <a:r>
-                  <a:rPr lang="en-GB" sz="2400" dirty="0"/>
-                  <a:t> </a:t>
-                </a:r>
-                <a:r>
-                  <a:rPr lang="en-GB" sz="2400" dirty="0" err="1"/>
-                  <a:t>nisl</a:t>
-                </a:r>
-                <a:r>
-                  <a:rPr lang="en-GB" sz="2400" dirty="0"/>
-                  <a:t> a </a:t>
-                </a:r>
-                <a:r>
-                  <a:rPr lang="en-GB" sz="2400" dirty="0" err="1"/>
-                  <a:t>enim</a:t>
-                </a:r>
-                <a:r>
-                  <a:rPr lang="en-GB" sz="2400" dirty="0"/>
-                  <a:t> </a:t>
-                </a:r>
-                <a:r>
-                  <a:rPr lang="en-GB" sz="2400" dirty="0" err="1"/>
-                  <a:t>congue</a:t>
-                </a:r>
-                <a:r>
-                  <a:rPr lang="en-GB" sz="2400" dirty="0"/>
-                  <a:t> semper. </a:t>
-                </a:r>
-                <a:r>
-                  <a:rPr lang="en-GB" sz="2400" dirty="0" err="1"/>
-                  <a:t>Aenean</a:t>
-                </a:r>
-                <a:r>
-                  <a:rPr lang="en-GB" sz="2400" dirty="0"/>
-                  <a:t> </a:t>
-                </a:r>
-                <a:r>
-                  <a:rPr lang="en-GB" sz="2400" dirty="0" err="1"/>
-                  <a:t>commodo</a:t>
-                </a:r>
-                <a:r>
-                  <a:rPr lang="en-GB" sz="2400" dirty="0"/>
-                  <a:t> </a:t>
-                </a:r>
-                <a:r>
-                  <a:rPr lang="en-GB" sz="2400" dirty="0" err="1"/>
-                  <a:t>ultrices</a:t>
-                </a:r>
-                <a:r>
-                  <a:rPr lang="en-GB" sz="2400" dirty="0"/>
-                  <a:t> </a:t>
-                </a:r>
-                <a:r>
-                  <a:rPr lang="en-GB" sz="2400" dirty="0" err="1"/>
-                  <a:t>imperdiet</a:t>
-                </a:r>
-                <a:r>
-                  <a:rPr lang="en-GB" sz="2400" dirty="0"/>
-                  <a:t>. </a:t>
-                </a:r>
-                <a:r>
-                  <a:rPr lang="en-GB" sz="2400" dirty="0" err="1"/>
-                  <a:t>Vestibulum</a:t>
-                </a:r>
-                <a:r>
-                  <a:rPr lang="en-GB" sz="2400" dirty="0"/>
-                  <a:t> </a:t>
-                </a:r>
-                <a:r>
-                  <a:rPr lang="en-GB" sz="2400" dirty="0" err="1"/>
-                  <a:t>ut</a:t>
-                </a:r>
-                <a:r>
-                  <a:rPr lang="en-GB" sz="2400" dirty="0"/>
-                  <a:t> </a:t>
-                </a:r>
-                <a:r>
-                  <a:rPr lang="en-GB" sz="2400" dirty="0" err="1"/>
-                  <a:t>justo</a:t>
-                </a:r>
-                <a:r>
-                  <a:rPr lang="en-GB" sz="2400" dirty="0"/>
-                  <a:t> </a:t>
-                </a:r>
-                <a:r>
-                  <a:rPr lang="en-GB" sz="2400" dirty="0" err="1"/>
-                  <a:t>vel</a:t>
-                </a:r>
-                <a:r>
-                  <a:rPr lang="en-GB" sz="2400" dirty="0"/>
-                  <a:t> </a:t>
-                </a:r>
-                <a:r>
-                  <a:rPr lang="en-GB" sz="2400" dirty="0" err="1"/>
-                  <a:t>sapien</a:t>
-                </a:r>
-                <a:r>
-                  <a:rPr lang="en-GB" sz="2400" dirty="0"/>
-                  <a:t> </a:t>
-                </a:r>
-                <a:r>
-                  <a:rPr lang="en-GB" sz="2400" dirty="0" err="1"/>
-                  <a:t>venenatis</a:t>
-                </a:r>
-                <a:r>
-                  <a:rPr lang="en-GB" sz="2400" dirty="0"/>
-                  <a:t> </a:t>
-                </a:r>
-                <a:r>
-                  <a:rPr lang="en-GB" sz="2400" dirty="0" err="1"/>
-                  <a:t>tincidunt</a:t>
-                </a:r>
-                <a:r>
-                  <a:rPr lang="en-GB" sz="2400" dirty="0" smtClean="0"/>
-                  <a:t>.</a:t>
-                </a:r>
+                <a14:m>
+                  <m:oMathPara xmlns:m="http://schemas.openxmlformats.org/officeDocument/2006/math">
+                    <m:oMathParaPr>
+                      <m:jc m:val="centerGroup"/>
+                    </m:oMathParaPr>
+                    <m:oMath xmlns:m="http://schemas.openxmlformats.org/officeDocument/2006/math">
+                      <m:f>
+                        <m:fPr>
+                          <m:ctrlPr>
+                            <a:rPr lang="en-US" altLang="he-IL" sz="2500" i="1">
+                              <a:latin typeface="Cambria Math"/>
+                            </a:rPr>
+                          </m:ctrlPr>
+                        </m:fPr>
+                        <m:num>
+                          <m:r>
+                            <a:rPr lang="en-US" altLang="he-IL" sz="2500" i="1">
+                              <a:latin typeface="Cambria Math"/>
+                            </a:rPr>
+                            <m:t>𝑑</m:t>
+                          </m:r>
+                          <m:sSub>
+                            <m:sSubPr>
+                              <m:ctrlPr>
+                                <a:rPr lang="en-US" altLang="he-IL" sz="2500" i="1">
+                                  <a:latin typeface="Cambria Math"/>
+                                </a:rPr>
+                              </m:ctrlPr>
+                            </m:sSubPr>
+                            <m:e>
+                              <m:r>
+                                <a:rPr lang="en-US" altLang="he-IL" sz="2500" i="1">
+                                  <a:latin typeface="Cambria Math"/>
+                                </a:rPr>
+                                <m:t>𝑁</m:t>
+                              </m:r>
+                            </m:e>
+                            <m:sub>
+                              <m:r>
+                                <a:rPr lang="en-US" altLang="he-IL" sz="2500" i="1">
+                                  <a:latin typeface="Cambria Math"/>
+                                </a:rPr>
+                                <m:t>𝑖</m:t>
+                              </m:r>
+                            </m:sub>
+                          </m:sSub>
+                        </m:num>
+                        <m:den>
+                          <m:r>
+                            <a:rPr lang="en-US" altLang="he-IL" sz="2500" i="1">
+                              <a:latin typeface="Cambria Math"/>
+                            </a:rPr>
+                            <m:t>𝑑𝑡</m:t>
+                          </m:r>
+                        </m:den>
+                      </m:f>
+                      <m:r>
+                        <a:rPr lang="en-US" altLang="he-IL" sz="2500" i="1">
+                          <a:latin typeface="Cambria Math"/>
+                        </a:rPr>
+                        <m:t>=</m:t>
+                      </m:r>
+                      <m:sSub>
+                        <m:sSubPr>
+                          <m:ctrlPr>
+                            <a:rPr lang="en-US" altLang="he-IL" sz="2500" i="1">
+                              <a:latin typeface="Cambria Math"/>
+                            </a:rPr>
+                          </m:ctrlPr>
+                        </m:sSubPr>
+                        <m:e>
+                          <m:r>
+                            <a:rPr lang="en-US" altLang="he-IL" sz="2500" i="1">
+                              <a:latin typeface="Cambria Math"/>
+                            </a:rPr>
+                            <m:t>𝑟</m:t>
+                          </m:r>
+                        </m:e>
+                        <m:sub>
+                          <m:r>
+                            <a:rPr lang="en-US" altLang="he-IL" sz="2500" i="1">
+                              <a:latin typeface="Cambria Math"/>
+                            </a:rPr>
+                            <m:t>𝑖</m:t>
+                          </m:r>
+                        </m:sub>
+                      </m:sSub>
+                      <m:sSub>
+                        <m:sSubPr>
+                          <m:ctrlPr>
+                            <a:rPr lang="en-US" altLang="he-IL" sz="2500" i="1">
+                              <a:latin typeface="Cambria Math"/>
+                            </a:rPr>
+                          </m:ctrlPr>
+                        </m:sSubPr>
+                        <m:e>
+                          <m:r>
+                            <a:rPr lang="en-US" altLang="he-IL" sz="2500" i="1">
+                              <a:latin typeface="Cambria Math"/>
+                            </a:rPr>
+                            <m:t>𝛼</m:t>
+                          </m:r>
+                        </m:e>
+                        <m:sub>
+                          <m:r>
+                            <a:rPr lang="en-US" altLang="he-IL" sz="2500" i="1">
+                              <a:latin typeface="Cambria Math"/>
+                            </a:rPr>
+                            <m:t>𝑖</m:t>
+                          </m:r>
+                        </m:sub>
+                      </m:sSub>
+                      <m:d>
+                        <m:dPr>
+                          <m:ctrlPr>
+                            <a:rPr lang="en-US" altLang="he-IL" sz="2500" i="1">
+                              <a:latin typeface="Cambria Math"/>
+                            </a:rPr>
+                          </m:ctrlPr>
+                        </m:dPr>
+                        <m:e>
+                          <m:r>
+                            <a:rPr lang="en-US" altLang="he-IL" sz="2500" i="1">
+                              <a:latin typeface="Cambria Math"/>
+                            </a:rPr>
+                            <m:t>𝑡</m:t>
+                          </m:r>
+                        </m:e>
+                      </m:d>
+                      <m:sSub>
+                        <m:sSubPr>
+                          <m:ctrlPr>
+                            <a:rPr lang="en-US" altLang="he-IL" sz="2500" i="1">
+                              <a:latin typeface="Cambria Math"/>
+                            </a:rPr>
+                          </m:ctrlPr>
+                        </m:sSubPr>
+                        <m:e>
+                          <m:r>
+                            <a:rPr lang="en-US" altLang="he-IL" sz="2500" i="1">
+                              <a:latin typeface="Cambria Math"/>
+                            </a:rPr>
+                            <m:t>𝑁</m:t>
+                          </m:r>
+                        </m:e>
+                        <m:sub>
+                          <m:r>
+                            <a:rPr lang="en-US" altLang="he-IL" sz="2500" i="1">
+                              <a:latin typeface="Cambria Math"/>
+                            </a:rPr>
+                            <m:t>𝑖</m:t>
+                          </m:r>
+                        </m:sub>
+                      </m:sSub>
+                      <m:d>
+                        <m:dPr>
+                          <m:ctrlPr>
+                            <a:rPr lang="en-US" altLang="he-IL" sz="2500" i="1">
+                              <a:latin typeface="Cambria Math"/>
+                            </a:rPr>
+                          </m:ctrlPr>
+                        </m:dPr>
+                        <m:e>
+                          <m:r>
+                            <a:rPr lang="en-US" altLang="he-IL" sz="2500" i="1">
+                              <a:latin typeface="Cambria Math"/>
+                            </a:rPr>
+                            <m:t>1</m:t>
+                          </m:r>
+                          <m:r>
+                            <a:rPr lang="en-US" altLang="he-IL" sz="2500" i="1">
+                              <a:latin typeface="Cambria Math"/>
+                            </a:rPr>
+                            <m:t>−</m:t>
+                          </m:r>
+                          <m:sSup>
+                            <m:sSupPr>
+                              <m:ctrlPr>
+                                <a:rPr lang="en-US" altLang="he-IL" sz="2500" i="1">
+                                  <a:latin typeface="Cambria Math"/>
+                                </a:rPr>
+                              </m:ctrlPr>
+                            </m:sSupPr>
+                            <m:e>
+                              <m:d>
+                                <m:dPr>
+                                  <m:ctrlPr>
+                                    <a:rPr lang="en-US" altLang="he-IL" sz="2500" i="1">
+                                      <a:latin typeface="Cambria Math"/>
+                                    </a:rPr>
+                                  </m:ctrlPr>
+                                </m:dPr>
+                                <m:e>
+                                  <m:f>
+                                    <m:fPr>
+                                      <m:ctrlPr>
+                                        <a:rPr lang="en-US" altLang="he-IL" sz="2500" i="1">
+                                          <a:latin typeface="Cambria Math"/>
+                                        </a:rPr>
+                                      </m:ctrlPr>
+                                    </m:fPr>
+                                    <m:num>
+                                      <m:sSub>
+                                        <m:sSubPr>
+                                          <m:ctrlPr>
+                                            <a:rPr lang="en-US" altLang="he-IL" sz="2500" i="1">
+                                              <a:latin typeface="Cambria Math"/>
+                                            </a:rPr>
+                                          </m:ctrlPr>
+                                        </m:sSubPr>
+                                        <m:e>
+                                          <m:r>
+                                            <a:rPr lang="en-US" altLang="he-IL" sz="2500" i="1">
+                                              <a:latin typeface="Cambria Math"/>
+                                            </a:rPr>
+                                            <m:t>𝑁</m:t>
+                                          </m:r>
+                                        </m:e>
+                                        <m:sub>
+                                          <m:r>
+                                            <a:rPr lang="en-US" altLang="he-IL" sz="2500" i="1">
+                                              <a:latin typeface="Cambria Math"/>
+                                            </a:rPr>
+                                            <m:t>𝐺</m:t>
+                                          </m:r>
+                                        </m:sub>
+                                      </m:sSub>
+                                      <m:r>
+                                        <a:rPr lang="en-US" altLang="he-IL" sz="2500" i="1">
+                                          <a:latin typeface="Cambria Math"/>
+                                        </a:rPr>
+                                        <m:t>+</m:t>
+                                      </m:r>
+                                      <m:sSub>
+                                        <m:sSubPr>
+                                          <m:ctrlPr>
+                                            <a:rPr lang="en-US" altLang="he-IL" sz="2500" i="1">
+                                              <a:latin typeface="Cambria Math"/>
+                                            </a:rPr>
+                                          </m:ctrlPr>
+                                        </m:sSubPr>
+                                        <m:e>
+                                          <m:r>
+                                            <a:rPr lang="en-US" altLang="he-IL" sz="2500" i="1">
+                                              <a:latin typeface="Cambria Math"/>
+                                            </a:rPr>
+                                            <m:t>𝑁</m:t>
+                                          </m:r>
+                                        </m:e>
+                                        <m:sub>
+                                          <m:r>
+                                            <a:rPr lang="en-US" altLang="he-IL" sz="2500" i="1">
+                                              <a:latin typeface="Cambria Math"/>
+                                            </a:rPr>
+                                            <m:t>𝑅</m:t>
+                                          </m:r>
+                                        </m:sub>
+                                      </m:sSub>
+                                    </m:num>
+                                    <m:den>
+                                      <m:sSub>
+                                        <m:sSubPr>
+                                          <m:ctrlPr>
+                                            <a:rPr lang="en-US" altLang="he-IL" sz="2500" i="1">
+                                              <a:latin typeface="Cambria Math"/>
+                                            </a:rPr>
+                                          </m:ctrlPr>
+                                        </m:sSubPr>
+                                        <m:e>
+                                          <m:r>
+                                            <a:rPr lang="en-US" altLang="he-IL" sz="2500" i="1">
+                                              <a:latin typeface="Cambria Math"/>
+                                            </a:rPr>
+                                            <m:t>𝐾</m:t>
+                                          </m:r>
+                                        </m:e>
+                                        <m:sub>
+                                          <m:r>
+                                            <a:rPr lang="en-US" altLang="he-IL" sz="2500" i="1">
+                                              <a:latin typeface="Cambria Math"/>
+                                            </a:rPr>
+                                            <m:t>𝑖</m:t>
+                                          </m:r>
+                                        </m:sub>
+                                      </m:sSub>
+                                    </m:den>
+                                  </m:f>
+                                </m:e>
+                              </m:d>
+                            </m:e>
+                            <m:sup>
+                              <m:sSub>
+                                <m:sSubPr>
+                                  <m:ctrlPr>
+                                    <a:rPr lang="en-US" altLang="he-IL" sz="2500" i="1">
+                                      <a:latin typeface="Cambria Math"/>
+                                    </a:rPr>
+                                  </m:ctrlPr>
+                                </m:sSubPr>
+                                <m:e>
+                                  <m:r>
+                                    <a:rPr lang="en-US" altLang="he-IL" sz="2500" i="1">
+                                      <a:latin typeface="Cambria Math"/>
+                                    </a:rPr>
+                                    <m:t>𝜈</m:t>
+                                  </m:r>
+                                </m:e>
+                                <m:sub>
+                                  <m:r>
+                                    <a:rPr lang="en-US" altLang="he-IL" sz="2500" i="1">
+                                      <a:latin typeface="Cambria Math"/>
+                                    </a:rPr>
+                                    <m:t>𝑖</m:t>
+                                  </m:r>
+                                </m:sub>
+                              </m:sSub>
+                            </m:sup>
+                          </m:sSup>
+                        </m:e>
+                      </m:d>
+                    </m:oMath>
+                  </m:oMathPara>
+                </a14:m>
                 <a:endParaRPr lang="en-US" altLang="he-IL" sz="2500" dirty="0">
                   <a:latin typeface="Times New Roman" pitchFamily="18" charset="0"/>
+                </a:endParaRPr>
+              </a:p>
+              <a:p>
+                <a:pPr eaLnBrk="1" hangingPunct="1">
+                  <a:spcBef>
+                    <a:spcPct val="10000"/>
+                  </a:spcBef>
+                </a:pPr>
+                <a:endParaRPr lang="en-US" altLang="he-IL" sz="2500" dirty="0" smtClean="0">
+                  <a:latin typeface="+mn-lt"/>
+                </a:endParaRPr>
+              </a:p>
+              <a:p>
+                <a:pPr eaLnBrk="1" hangingPunct="1">
+                  <a:spcBef>
+                    <a:spcPct val="10000"/>
+                  </a:spcBef>
+                </a:pPr>
+                <a:r>
+                  <a:rPr lang="en-US" altLang="he-IL" sz="2500" dirty="0" smtClean="0">
+                    <a:latin typeface="+mn-lt"/>
+                  </a:rPr>
+                  <a:t>We assume that the only interaction between strains in </a:t>
+                </a:r>
+                <a:r>
+                  <a:rPr lang="en-US" altLang="he-IL" sz="2500" b="1" dirty="0" smtClean="0">
+                    <a:latin typeface="+mn-lt"/>
+                  </a:rPr>
+                  <a:t>resource competition</a:t>
+                </a:r>
+                <a:r>
+                  <a:rPr lang="en-US" altLang="he-IL" sz="2500" baseline="30000" dirty="0" smtClean="0">
+                    <a:latin typeface="+mn-lt"/>
+                  </a:rPr>
+                  <a:t>2,4</a:t>
+                </a:r>
+                <a:r>
+                  <a:rPr lang="en-US" altLang="he-IL" sz="2500" dirty="0" smtClean="0">
+                    <a:latin typeface="+mn-lt"/>
+                  </a:rPr>
+                  <a:t>.</a:t>
+                </a:r>
+                <a:endParaRPr lang="en-US" altLang="he-IL" sz="2500" dirty="0">
+                  <a:latin typeface="+mn-lt"/>
                 </a:endParaRPr>
               </a:p>
             </p:txBody>
@@ -9288,224 +9099,204 @@
             </a:r>
           </a:p>
           <a:p>
-            <a:pPr marL="439035" indent="-439035">
+            <a:pPr marL="457200" indent="-457200">
+              <a:buFont typeface="+mj-lt"/>
+              <a:buAutoNum type="arabicPeriod"/>
               <a:defRPr/>
             </a:pPr>
             <a:r>
-              <a:rPr lang="en-US" sz="2300" dirty="0" err="1">
+              <a:rPr lang="en-US" sz="2200" dirty="0" err="1" smtClean="0">
                 <a:latin typeface="+mn-lt"/>
               </a:rPr>
               <a:t>Baranyi</a:t>
             </a:r>
             <a:r>
-              <a:rPr lang="en-US" sz="2300" dirty="0">
+              <a:rPr lang="en-US" sz="2200" dirty="0">
                 <a:latin typeface="+mn-lt"/>
               </a:rPr>
               <a:t>, J., Roberts, T. A., 1994. </a:t>
             </a:r>
             <a:r>
-              <a:rPr lang="en-US" sz="2300" i="1" dirty="0">
+              <a:rPr lang="en-US" sz="2200" i="1" dirty="0">
                 <a:latin typeface="+mn-lt"/>
               </a:rPr>
-              <a:t>A dynamic </a:t>
-            </a:r>
-            <a:r>
-              <a:rPr lang="en-US" sz="2300" i="1" dirty="0">
-                <a:latin typeface="+mn-lt"/>
-              </a:rPr>
-              <a:t>approach to </a:t>
-            </a:r>
-            <a:r>
-              <a:rPr lang="en-US" sz="2300" i="1" dirty="0">
-                <a:latin typeface="+mn-lt"/>
-              </a:rPr>
-              <a:t>predicting bacterial growth in food</a:t>
-            </a:r>
-            <a:r>
-              <a:rPr lang="en-US" sz="2300" dirty="0">
+              <a:t>A dynamic approach to predicting bacterial growth in food</a:t>
+            </a:r>
+            <a:r>
+              <a:rPr lang="en-US" sz="2200" dirty="0">
                 <a:latin typeface="+mn-lt"/>
               </a:rPr>
               <a:t>. Int. J. Food </a:t>
             </a:r>
             <a:r>
-              <a:rPr lang="en-US" sz="2300" dirty="0" err="1">
+              <a:rPr lang="en-US" sz="2200" dirty="0" err="1">
                 <a:latin typeface="+mn-lt"/>
               </a:rPr>
               <a:t>Microbiol</a:t>
             </a:r>
             <a:r>
-              <a:rPr lang="en-US" sz="2300" dirty="0">
+              <a:rPr lang="en-US" sz="2200" dirty="0">
                 <a:latin typeface="+mn-lt"/>
               </a:rPr>
               <a:t>. 23, 277–294.</a:t>
             </a:r>
           </a:p>
           <a:p>
-            <a:pPr marL="439035" indent="-439035">
+            <a:pPr marL="457200" indent="-457200">
+              <a:buFont typeface="+mj-lt"/>
+              <a:buAutoNum type="arabicPeriod"/>
               <a:defRPr/>
             </a:pPr>
             <a:r>
-              <a:rPr lang="en-US" sz="2300" dirty="0" err="1">
+              <a:rPr lang="en-US" sz="2200" dirty="0" err="1">
                 <a:latin typeface="+mn-lt"/>
               </a:rPr>
               <a:t>Chevin</a:t>
             </a:r>
             <a:r>
-              <a:rPr lang="en-US" sz="2300" dirty="0">
+              <a:rPr lang="en-US" sz="2200" dirty="0">
                 <a:latin typeface="+mn-lt"/>
               </a:rPr>
               <a:t>, L.-M., 2011. </a:t>
             </a:r>
             <a:r>
-              <a:rPr lang="en-US" sz="2300" i="1" dirty="0">
+              <a:rPr lang="en-US" sz="2200" i="1" dirty="0">
                 <a:latin typeface="+mn-lt"/>
               </a:rPr>
               <a:t>On measuring selection </a:t>
             </a:r>
             <a:r>
-              <a:rPr lang="en-US" sz="2300" i="1" dirty="0" smtClean="0">
+              <a:rPr lang="en-US" sz="2200" i="1" dirty="0" smtClean="0">
                 <a:latin typeface="+mn-lt"/>
               </a:rPr>
               <a:t>in experimental </a:t>
             </a:r>
             <a:r>
-              <a:rPr lang="en-US" sz="2300" i="1" dirty="0">
+              <a:rPr lang="en-US" sz="2200" i="1" dirty="0">
                 <a:latin typeface="+mn-lt"/>
               </a:rPr>
               <a:t>evolution</a:t>
             </a:r>
             <a:r>
-              <a:rPr lang="en-US" sz="2300" dirty="0">
+              <a:rPr lang="en-US" sz="2200" dirty="0">
                 <a:latin typeface="+mn-lt"/>
               </a:rPr>
-              <a:t>. </a:t>
-            </a:r>
-            <a:r>
-              <a:rPr lang="en-US" sz="2300" dirty="0">
-                <a:latin typeface="+mn-lt"/>
-              </a:rPr>
-              <a:t>Biol. Lett. 7, 210–3.</a:t>
-            </a:r>
-          </a:p>
-          <a:p>
-            <a:pPr marL="439035" indent="-439035">
+              <a:t>. Biol. Lett. 7, 210–3.</a:t>
+            </a:r>
+          </a:p>
+          <a:p>
+            <a:pPr marL="457200" indent="-457200">
+              <a:buFont typeface="+mj-lt"/>
+              <a:buAutoNum type="arabicPeriod"/>
               <a:defRPr/>
             </a:pPr>
             <a:r>
-              <a:rPr lang="en-US" sz="2300" dirty="0">
+              <a:rPr lang="en-US" sz="2200" dirty="0">
                 <a:latin typeface="+mn-lt"/>
               </a:rPr>
               <a:t>Crow, J.F., Kimura, M., 1970. </a:t>
             </a:r>
             <a:r>
-              <a:rPr lang="en-US" sz="2300" i="1" dirty="0">
+              <a:rPr lang="en-US" sz="2200" i="1" dirty="0">
                 <a:latin typeface="+mn-lt"/>
               </a:rPr>
               <a:t>An introduction to population genetics theory</a:t>
             </a:r>
             <a:r>
-              <a:rPr lang="en-US" sz="2300" dirty="0">
+              <a:rPr lang="en-US" sz="2200" dirty="0">
                 <a:latin typeface="+mn-lt"/>
               </a:rPr>
               <a:t>. Burgess Pub. Co., Minneapolis.</a:t>
             </a:r>
           </a:p>
           <a:p>
-            <a:pPr marL="439035" indent="-439035">
+            <a:pPr marL="457200" indent="-457200">
+              <a:buFont typeface="+mj-lt"/>
+              <a:buAutoNum type="arabicPeriod"/>
               <a:defRPr/>
             </a:pPr>
             <a:r>
-              <a:rPr lang="en-US" sz="2300" dirty="0" err="1">
+              <a:rPr lang="en-US" sz="2200" dirty="0" err="1">
                 <a:latin typeface="+mn-lt"/>
               </a:rPr>
               <a:t>Masel</a:t>
             </a:r>
             <a:r>
-              <a:rPr lang="en-US" sz="2300" dirty="0">
+              <a:rPr lang="en-US" sz="2200" dirty="0">
                 <a:latin typeface="+mn-lt"/>
               </a:rPr>
               <a:t>, J., 2014. </a:t>
             </a:r>
             <a:r>
-              <a:rPr lang="en-US" sz="2300" i="1" dirty="0">
+              <a:rPr lang="en-US" sz="2200" i="1" dirty="0">
                 <a:latin typeface="+mn-lt"/>
               </a:rPr>
               <a:t>Eco-evolutionary “fitness” in 3 dimensions: absolute growth, absolute efficiency, and relative competitiveness</a:t>
             </a:r>
             <a:r>
-              <a:rPr lang="en-US" sz="2300" dirty="0">
+              <a:rPr lang="en-US" sz="2200" dirty="0">
                 <a:latin typeface="+mn-lt"/>
               </a:rPr>
-              <a:t>. </a:t>
-            </a:r>
-            <a:r>
-              <a:rPr lang="en-US" sz="2300" dirty="0">
+              <a:t>. ArXiv:1407.1024</a:t>
+            </a:r>
+          </a:p>
+          <a:p>
+            <a:pPr marL="457200" indent="-457200">
+              <a:buFont typeface="+mj-lt"/>
+              <a:buAutoNum type="arabicPeriod"/>
+              <a:defRPr/>
+            </a:pPr>
+            <a:r>
+              <a:rPr lang="en-US" sz="2200" dirty="0">
                 <a:latin typeface="+mn-lt"/>
               </a:rPr>
-              <a:t>ArXiv:1407.1024</a:t>
-            </a:r>
-          </a:p>
-          <a:p>
-            <a:pPr marL="439035" indent="-439035">
-              <a:defRPr/>
-            </a:pPr>
-            <a:r>
-              <a:rPr lang="en-US" sz="2300" dirty="0">
-                <a:latin typeface="+mn-lt"/>
-              </a:rPr>
-              <a:t>Wiser</a:t>
-            </a:r>
-            <a:r>
-              <a:rPr lang="en-US" sz="2300" dirty="0">
-                <a:latin typeface="+mn-lt"/>
-              </a:rPr>
-              <a:t>, M.J., </a:t>
-            </a:r>
-            <a:r>
-              <a:rPr lang="en-US" sz="2300" dirty="0" err="1">
+              <a:t>Wiser, M.J., </a:t>
+            </a:r>
+            <a:r>
+              <a:rPr lang="en-US" sz="2200" dirty="0" err="1">
                 <a:latin typeface="+mn-lt"/>
               </a:rPr>
               <a:t>Lenski</a:t>
             </a:r>
             <a:r>
-              <a:rPr lang="en-US" sz="2300" dirty="0">
+              <a:rPr lang="en-US" sz="2200" dirty="0">
                 <a:latin typeface="+mn-lt"/>
               </a:rPr>
               <a:t>, R.E., 2015. </a:t>
             </a:r>
             <a:r>
-              <a:rPr lang="en-US" sz="2300" i="1" dirty="0">
+              <a:rPr lang="en-US" sz="2200" i="1" dirty="0">
                 <a:latin typeface="+mn-lt"/>
               </a:rPr>
               <a:t>A Comparison of Methods to Measure Fitness in </a:t>
             </a:r>
             <a:r>
-              <a:rPr lang="en-US" sz="2300" dirty="0">
+              <a:rPr lang="en-US" sz="2200" dirty="0">
                 <a:latin typeface="+mn-lt"/>
               </a:rPr>
               <a:t>Escherichia coli. </a:t>
             </a:r>
             <a:r>
-              <a:rPr lang="en-US" sz="2300" dirty="0" err="1">
+              <a:rPr lang="en-US" sz="2200" dirty="0" err="1">
                 <a:latin typeface="+mn-lt"/>
               </a:rPr>
               <a:t>PLoS</a:t>
             </a:r>
             <a:r>
-              <a:rPr lang="en-US" sz="2300" dirty="0">
+              <a:rPr lang="en-US" sz="2200" dirty="0">
                 <a:latin typeface="+mn-lt"/>
               </a:rPr>
               <a:t> One 10, e0126210</a:t>
             </a:r>
             <a:r>
-              <a:rPr lang="en-US" sz="2300" dirty="0" smtClean="0">
+              <a:rPr lang="en-US" sz="2200" dirty="0" smtClean="0">
                 <a:latin typeface="+mn-lt"/>
                 <a:ea typeface="ＭＳ Ｐゴシック" pitchFamily="-111" charset="-128"/>
                 <a:cs typeface="ＭＳ Ｐゴシック" pitchFamily="-111" charset="-128"/>
               </a:rPr>
               <a:t>.</a:t>
             </a:r>
-            <a:endParaRPr lang="en-US" sz="2300" dirty="0">
+            <a:endParaRPr lang="en-US" sz="2200" dirty="0">
               <a:latin typeface="+mn-lt"/>
               <a:ea typeface="ＭＳ Ｐゴシック" pitchFamily="-111" charset="-128"/>
               <a:cs typeface="ＭＳ Ｐゴシック" pitchFamily="-111" charset="-128"/>
@@ -11060,90 +10851,8 @@
         </p:blipFill>
         <p:spPr bwMode="auto">
           <a:xfrm>
-            <a:off x="1630800" y="17483200"/>
+            <a:off x="1630800" y="16206154"/>
             <a:ext cx="7748588" cy="5157788"/>
-          </a:xfrm>
-          <a:prstGeom prst="rect">
-            <a:avLst/>
-          </a:prstGeom>
-          <a:noFill/>
-          <a:extLst>
-            <a:ext uri="{909E8E84-426E-40DD-AFC4-6F175D3DCCD1}">
-              <a14:hiddenFill xmlns:a14="http://schemas.microsoft.com/office/drawing/2010/main">
-                <a:solidFill>
-                  <a:srgbClr val="FFFFFF"/>
-                </a:solidFill>
-              </a14:hiddenFill>
-            </a:ext>
-          </a:extLst>
-        </p:spPr>
-      </p:pic>
-      <p:pic>
-        <p:nvPicPr>
-          <p:cNvPr id="1033" name="Picture 9" descr="D:\university\presentations\GRC 2015\model_fits.png"/>
-          <p:cNvPicPr>
-            <a:picLocks noChangeAspect="1" noChangeArrowheads="1"/>
-          </p:cNvPicPr>
-          <p:nvPr/>
-        </p:nvPicPr>
-        <p:blipFill>
-          <a:blip r:embed="rId22">
-            <a:extLst>
-              <a:ext uri="{28A0092B-C50C-407E-A947-70E740481C1C}">
-                <a14:useLocalDpi xmlns:a14="http://schemas.microsoft.com/office/drawing/2010/main" val="0"/>
-              </a:ext>
-            </a:extLst>
-          </a:blip>
-          <a:srcRect/>
-          <a:stretch>
-            <a:fillRect/>
-          </a:stretch>
-        </p:blipFill>
-        <p:spPr bwMode="auto">
-          <a:xfrm>
-            <a:off x="1630800" y="28610984"/>
-            <a:ext cx="7748587" cy="5297488"/>
-          </a:xfrm>
-          <a:prstGeom prst="rect">
-            <a:avLst/>
-          </a:prstGeom>
-          <a:noFill/>
-          <a:extLst>
-            <a:ext uri="{909E8E84-426E-40DD-AFC4-6F175D3DCCD1}">
-              <a14:hiddenFill xmlns:a14="http://schemas.microsoft.com/office/drawing/2010/main">
-                <a:solidFill>
-                  <a:srgbClr val="FFFFFF"/>
-                </a:solidFill>
-              </a14:hiddenFill>
-            </a:ext>
-          </a:extLst>
-        </p:spPr>
-      </p:pic>
-      <p:pic>
-        <p:nvPicPr>
-          <p:cNvPr id="1037" name="Picture 13" descr="D:\university\presentations\GRC 2015\total_OD_comparison.png"/>
-          <p:cNvPicPr>
-            <a:picLocks noChangeAspect="1" noChangeArrowheads="1"/>
-          </p:cNvPicPr>
-          <p:nvPr/>
-        </p:nvPicPr>
-        <p:blipFill>
-          <a:blip r:embed="rId23">
-            <a:extLst>
-              <a:ext uri="{28A0092B-C50C-407E-A947-70E740481C1C}">
-                <a14:useLocalDpi xmlns:a14="http://schemas.microsoft.com/office/drawing/2010/main" val="0"/>
-              </a:ext>
-            </a:extLst>
-          </a:blip>
-          <a:srcRect/>
-          <a:stretch>
-            <a:fillRect/>
-          </a:stretch>
-        </p:blipFill>
-        <p:spPr bwMode="auto">
-          <a:xfrm>
-            <a:off x="20970000" y="22263150"/>
-            <a:ext cx="7748588" cy="5310188"/>
           </a:xfrm>
           <a:prstGeom prst="rect">
             <a:avLst/>
@@ -11169,7 +10878,7 @@
           <p:nvPr/>
         </p:nvPicPr>
         <p:blipFill>
-          <a:blip r:embed="rId24">
+          <a:blip r:embed="rId22">
             <a:extLst>
               <a:ext uri="{28A0092B-C50C-407E-A947-70E740481C1C}">
                 <a14:useLocalDpi xmlns:a14="http://schemas.microsoft.com/office/drawing/2010/main" val="0"/>
@@ -11183,7 +10892,7 @@
         </p:blipFill>
         <p:spPr bwMode="auto">
           <a:xfrm>
-            <a:off x="22817123" y="9926537"/>
+            <a:off x="22622555" y="9894290"/>
             <a:ext cx="4274600" cy="3112168"/>
           </a:xfrm>
           <a:prstGeom prst="rect">
@@ -11201,39 +10910,6 @@
           </a:extLst>
         </p:spPr>
       </p:pic>
-      <p:cxnSp>
-        <p:nvCxnSpPr>
-          <p:cNvPr id="9" name="Straight Arrow Connector 8"/>
-          <p:cNvCxnSpPr/>
-          <p:nvPr/>
-        </p:nvCxnSpPr>
-        <p:spPr>
-          <a:xfrm>
-            <a:off x="24933411" y="18270724"/>
-            <a:ext cx="0" cy="843328"/>
-          </a:xfrm>
-          <a:prstGeom prst="straightConnector1">
-            <a:avLst/>
-          </a:prstGeom>
-          <a:ln>
-            <a:tailEnd type="arrow"/>
-          </a:ln>
-        </p:spPr>
-        <p:style>
-          <a:lnRef idx="3">
-            <a:schemeClr val="dk1"/>
-          </a:lnRef>
-          <a:fillRef idx="0">
-            <a:schemeClr val="dk1"/>
-          </a:fillRef>
-          <a:effectRef idx="2">
-            <a:schemeClr val="dk1"/>
-          </a:effectRef>
-          <a:fontRef idx="minor">
-            <a:schemeClr val="tx1"/>
-          </a:fontRef>
-        </p:style>
-      </p:cxnSp>
       <p:sp>
         <p:nvSpPr>
           <p:cNvPr id="56" name="TextBox 55"/>
@@ -11375,39 +11051,6 @@
           </a:fontRef>
         </p:style>
       </p:cxnSp>
-      <p:cxnSp>
-        <p:nvCxnSpPr>
-          <p:cNvPr id="59" name="Straight Arrow Connector 58"/>
-          <p:cNvCxnSpPr/>
-          <p:nvPr/>
-        </p:nvCxnSpPr>
-        <p:spPr>
-          <a:xfrm>
-            <a:off x="24954423" y="21618362"/>
-            <a:ext cx="0" cy="843328"/>
-          </a:xfrm>
-          <a:prstGeom prst="straightConnector1">
-            <a:avLst/>
-          </a:prstGeom>
-          <a:ln>
-            <a:tailEnd type="arrow"/>
-          </a:ln>
-        </p:spPr>
-        <p:style>
-          <a:lnRef idx="3">
-            <a:schemeClr val="dk1"/>
-          </a:lnRef>
-          <a:fillRef idx="0">
-            <a:schemeClr val="dk1"/>
-          </a:fillRef>
-          <a:effectRef idx="2">
-            <a:schemeClr val="dk1"/>
-          </a:effectRef>
-          <a:fontRef idx="minor">
-            <a:schemeClr val="tx1"/>
-          </a:fontRef>
-        </p:style>
-      </p:cxnSp>
       <p:pic>
         <p:nvPicPr>
           <p:cNvPr id="29" name="Picture 2" descr="D:\university\presentations\GRC 2015\plot_strains2.png"/>
@@ -11417,7 +11060,7 @@
           <p:nvPr/>
         </p:nvPicPr>
         <p:blipFill>
-          <a:blip r:embed="rId25">
+          <a:blip r:embed="rId23">
             <a:extLst>
               <a:ext uri="{28A0092B-C50C-407E-A947-70E740481C1C}">
                 <a14:useLocalDpi xmlns:a14="http://schemas.microsoft.com/office/drawing/2010/main" val="0"/>
@@ -11458,7 +11101,7 @@
           <p:nvPr/>
         </p:nvPicPr>
         <p:blipFill>
-          <a:blip r:embed="rId26">
+          <a:blip r:embed="rId24">
             <a:extLst>
               <a:ext uri="{28A0092B-C50C-407E-A947-70E740481C1C}">
                 <a14:useLocalDpi xmlns:a14="http://schemas.microsoft.com/office/drawing/2010/main" val="0"/>
@@ -11490,6 +11133,1292 @@
           </a:extLst>
         </p:spPr>
       </p:pic>
+      <mc:AlternateContent xmlns:mc="http://schemas.openxmlformats.org/markup-compatibility/2006">
+        <mc:Choice xmlns:a14="http://schemas.microsoft.com/office/drawing/2010/main" Requires="a14">
+          <p:graphicFrame>
+            <p:nvGraphicFramePr>
+              <p:cNvPr id="6" name="Table 5"/>
+              <p:cNvGraphicFramePr>
+                <a:graphicFrameLocks noGrp="1"/>
+              </p:cNvGraphicFramePr>
+              <p:nvPr>
+                <p:extLst>
+                  <p:ext uri="{D42A27DB-BD31-4B8C-83A1-F6EECF244321}">
+                    <p14:modId xmlns:p14="http://schemas.microsoft.com/office/powerpoint/2010/main" val="1531113529"/>
+                  </p:ext>
+                </p:extLst>
+              </p:nvPr>
+            </p:nvGraphicFramePr>
+            <p:xfrm>
+              <a:off x="6227077" y="25565586"/>
+              <a:ext cx="3211047" cy="2560320"/>
+            </p:xfrm>
+            <a:graphic>
+              <a:graphicData uri="http://schemas.openxmlformats.org/drawingml/2006/table">
+                <a:tbl>
+                  <a:tblPr rtl="1" firstRow="1" bandRow="1">
+                    <a:tableStyleId>{D27102A9-8310-4765-A935-A1911B00CA55}</a:tableStyleId>
+                  </a:tblPr>
+                  <a:tblGrid>
+                    <a:gridCol w="945930"/>
+                    <a:gridCol w="748399"/>
+                    <a:gridCol w="1516718"/>
+                  </a:tblGrid>
+                  <a:tr h="0">
+                    <a:tc>
+                      <a:txBody>
+                        <a:bodyPr/>
+                        <a:lstStyle/>
+                        <a:p>
+                          <a:pPr algn="ctr" rtl="0"/>
+                          <a:r>
+                            <a:rPr lang="en-US" dirty="0" smtClean="0">
+                              <a:latin typeface="Cambria Math" panose="02040503050406030204" pitchFamily="18" charset="0"/>
+                              <a:ea typeface="Cambria Math" panose="02040503050406030204" pitchFamily="18" charset="0"/>
+                            </a:rPr>
+                            <a:t>Red</a:t>
+                          </a:r>
+                          <a:endParaRPr lang="he-IL" dirty="0">
+                            <a:solidFill>
+                              <a:srgbClr val="FF0000"/>
+                            </a:solidFill>
+                            <a:latin typeface="Cambria Math" panose="02040503050406030204" pitchFamily="18" charset="0"/>
+                            <a:ea typeface="Cambria Math" panose="02040503050406030204" pitchFamily="18" charset="0"/>
+                          </a:endParaRPr>
+                        </a:p>
+                      </a:txBody>
+                      <a:tcPr/>
+                    </a:tc>
+                    <a:tc>
+                      <a:txBody>
+                        <a:bodyPr/>
+                        <a:lstStyle/>
+                        <a:p>
+                          <a:pPr algn="ctr" rtl="0"/>
+                          <a:r>
+                            <a:rPr lang="en-US" dirty="0" smtClean="0">
+                              <a:latin typeface="Cambria Math" panose="02040503050406030204" pitchFamily="18" charset="0"/>
+                              <a:ea typeface="Cambria Math" panose="02040503050406030204" pitchFamily="18" charset="0"/>
+                            </a:rPr>
+                            <a:t>Green</a:t>
+                          </a:r>
+                          <a:endParaRPr lang="he-IL" dirty="0">
+                            <a:solidFill>
+                              <a:srgbClr val="00B050"/>
+                            </a:solidFill>
+                            <a:latin typeface="Cambria Math" panose="02040503050406030204" pitchFamily="18" charset="0"/>
+                            <a:ea typeface="Cambria Math" panose="02040503050406030204" pitchFamily="18" charset="0"/>
+                          </a:endParaRPr>
+                        </a:p>
+                      </a:txBody>
+                      <a:tcPr/>
+                    </a:tc>
+                    <a:tc>
+                      <a:txBody>
+                        <a:bodyPr/>
+                        <a:lstStyle/>
+                        <a:p>
+                          <a:pPr algn="ctr" rtl="0"/>
+                          <a:r>
+                            <a:rPr lang="en-US" dirty="0" smtClean="0">
+                              <a:latin typeface="Cambria Math" panose="02040503050406030204" pitchFamily="18" charset="0"/>
+                              <a:ea typeface="Cambria Math" panose="02040503050406030204" pitchFamily="18" charset="0"/>
+                            </a:rPr>
+                            <a:t>Parameter</a:t>
+                          </a:r>
+                          <a:endParaRPr lang="he-IL" dirty="0">
+                            <a:latin typeface="Cambria Math" panose="02040503050406030204" pitchFamily="18" charset="0"/>
+                            <a:ea typeface="Cambria Math" panose="02040503050406030204" pitchFamily="18" charset="0"/>
+                          </a:endParaRPr>
+                        </a:p>
+                      </a:txBody>
+                      <a:tcPr/>
+                    </a:tc>
+                  </a:tr>
+                  <a:tr h="370840">
+                    <a:tc>
+                      <a:txBody>
+                        <a:bodyPr/>
+                        <a:lstStyle/>
+                        <a:p>
+                          <a:pPr algn="ctr" rtl="0"/>
+                          <a:r>
+                            <a:rPr lang="en-US" dirty="0" smtClean="0">
+                              <a:latin typeface="Cambria Math" panose="02040503050406030204" pitchFamily="18" charset="0"/>
+                              <a:ea typeface="Cambria Math" panose="02040503050406030204" pitchFamily="18" charset="0"/>
+                            </a:rPr>
+                            <a:t>0.979</a:t>
+                          </a:r>
+                          <a:endParaRPr lang="he-IL" dirty="0">
+                            <a:latin typeface="Cambria Math" panose="02040503050406030204" pitchFamily="18" charset="0"/>
+                            <a:ea typeface="Cambria Math" panose="02040503050406030204" pitchFamily="18" charset="0"/>
+                          </a:endParaRPr>
+                        </a:p>
+                      </a:txBody>
+                      <a:tcPr/>
+                    </a:tc>
+                    <a:tc>
+                      <a:txBody>
+                        <a:bodyPr/>
+                        <a:lstStyle/>
+                        <a:p>
+                          <a:pPr algn="ctr" rtl="0"/>
+                          <a:r>
+                            <a:rPr lang="en-US" dirty="0" smtClean="0">
+                              <a:latin typeface="Cambria Math" panose="02040503050406030204" pitchFamily="18" charset="0"/>
+                              <a:ea typeface="Cambria Math" panose="02040503050406030204" pitchFamily="18" charset="0"/>
+                            </a:rPr>
+                            <a:t>0.983</a:t>
+                          </a:r>
+                          <a:endParaRPr lang="he-IL" dirty="0">
+                            <a:latin typeface="Cambria Math" panose="02040503050406030204" pitchFamily="18" charset="0"/>
+                            <a:ea typeface="Cambria Math" panose="02040503050406030204" pitchFamily="18" charset="0"/>
+                          </a:endParaRPr>
+                        </a:p>
+                      </a:txBody>
+                      <a:tcPr/>
+                    </a:tc>
+                    <a:tc>
+                      <a:txBody>
+                        <a:bodyPr/>
+                        <a:lstStyle/>
+                        <a:p>
+                          <a:pPr algn="ctr" rtl="0"/>
+                          <a14:m>
+                            <m:oMathPara xmlns:m="http://schemas.openxmlformats.org/officeDocument/2006/math">
+                              <m:oMathParaPr>
+                                <m:jc m:val="centerGroup"/>
+                              </m:oMathParaPr>
+                              <m:oMath xmlns:m="http://schemas.openxmlformats.org/officeDocument/2006/math">
+                                <m:sSub>
+                                  <m:sSubPr>
+                                    <m:ctrlPr>
+                                      <a:rPr lang="en-US" altLang="he-IL" sz="1600" smtClean="0">
+                                        <a:latin typeface="Cambria Math" panose="02040503050406030204" pitchFamily="18" charset="0"/>
+                                        <a:ea typeface="Cambria Math" panose="02040503050406030204" pitchFamily="18" charset="0"/>
+                                      </a:rPr>
+                                    </m:ctrlPr>
+                                  </m:sSubPr>
+                                  <m:e>
+                                    <m:r>
+                                      <a:rPr lang="en-US" altLang="he-IL" sz="1600" smtClean="0">
+                                        <a:latin typeface="Cambria Math" panose="02040503050406030204" pitchFamily="18" charset="0"/>
+                                        <a:ea typeface="Cambria Math" panose="02040503050406030204" pitchFamily="18" charset="0"/>
+                                      </a:rPr>
+                                      <m:t>𝑁</m:t>
+                                    </m:r>
+                                  </m:e>
+                                  <m:sub>
+                                    <m:r>
+                                      <a:rPr lang="en-US" altLang="he-IL" sz="1600" smtClean="0">
+                                        <a:latin typeface="Cambria Math" panose="02040503050406030204" pitchFamily="18" charset="0"/>
+                                        <a:ea typeface="Cambria Math" panose="02040503050406030204" pitchFamily="18" charset="0"/>
+                                      </a:rPr>
+                                      <m:t>0</m:t>
+                                    </m:r>
+                                  </m:sub>
+                                </m:sSub>
+                              </m:oMath>
+                            </m:oMathPara>
+                          </a14:m>
+                          <a:endParaRPr lang="he-IL" dirty="0">
+                            <a:latin typeface="Cambria Math" panose="02040503050406030204" pitchFamily="18" charset="0"/>
+                            <a:ea typeface="Cambria Math" panose="02040503050406030204" pitchFamily="18" charset="0"/>
+                          </a:endParaRPr>
+                        </a:p>
+                      </a:txBody>
+                      <a:tcPr/>
+                    </a:tc>
+                  </a:tr>
+                  <a:tr h="370840">
+                    <a:tc>
+                      <a:txBody>
+                        <a:bodyPr/>
+                        <a:lstStyle/>
+                        <a:p>
+                          <a:pPr algn="ctr" rtl="0"/>
+                          <a:r>
+                            <a:rPr lang="en-US" dirty="0" smtClean="0">
+                              <a:latin typeface="Cambria Math" panose="02040503050406030204" pitchFamily="18" charset="0"/>
+                              <a:ea typeface="Cambria Math" panose="02040503050406030204" pitchFamily="18" charset="0"/>
+                            </a:rPr>
+                            <a:t>1.332</a:t>
+                          </a:r>
+                          <a:endParaRPr lang="he-IL" dirty="0">
+                            <a:latin typeface="Cambria Math" panose="02040503050406030204" pitchFamily="18" charset="0"/>
+                            <a:ea typeface="Cambria Math" panose="02040503050406030204" pitchFamily="18" charset="0"/>
+                          </a:endParaRPr>
+                        </a:p>
+                      </a:txBody>
+                      <a:tcPr/>
+                    </a:tc>
+                    <a:tc>
+                      <a:txBody>
+                        <a:bodyPr/>
+                        <a:lstStyle/>
+                        <a:p>
+                          <a:pPr algn="ctr" rtl="0"/>
+                          <a:r>
+                            <a:rPr lang="en-US" dirty="0" smtClean="0">
+                              <a:latin typeface="Cambria Math" panose="02040503050406030204" pitchFamily="18" charset="0"/>
+                              <a:ea typeface="Cambria Math" panose="02040503050406030204" pitchFamily="18" charset="0"/>
+                            </a:rPr>
+                            <a:t>1.136</a:t>
+                          </a:r>
+                          <a:endParaRPr lang="he-IL" dirty="0">
+                            <a:latin typeface="Cambria Math" panose="02040503050406030204" pitchFamily="18" charset="0"/>
+                            <a:ea typeface="Cambria Math" panose="02040503050406030204" pitchFamily="18" charset="0"/>
+                          </a:endParaRPr>
+                        </a:p>
+                      </a:txBody>
+                      <a:tcPr/>
+                    </a:tc>
+                    <a:tc>
+                      <a:txBody>
+                        <a:bodyPr/>
+                        <a:lstStyle/>
+                        <a:p>
+                          <a:pPr algn="ctr" rtl="0"/>
+                          <a14:m>
+                            <m:oMathPara xmlns:m="http://schemas.openxmlformats.org/officeDocument/2006/math">
+                              <m:oMathParaPr>
+                                <m:jc m:val="centerGroup"/>
+                              </m:oMathParaPr>
+                              <m:oMath xmlns:m="http://schemas.openxmlformats.org/officeDocument/2006/math">
+                                <m:r>
+                                  <a:rPr lang="en-US" altLang="he-IL" sz="1600" smtClean="0">
+                                    <a:latin typeface="Cambria Math" panose="02040503050406030204" pitchFamily="18" charset="0"/>
+                                    <a:ea typeface="Cambria Math" panose="02040503050406030204" pitchFamily="18" charset="0"/>
+                                  </a:rPr>
+                                  <m:t>𝐾</m:t>
+                                </m:r>
+                              </m:oMath>
+                            </m:oMathPara>
+                          </a14:m>
+                          <a:endParaRPr lang="he-IL" dirty="0">
+                            <a:latin typeface="Cambria Math" panose="02040503050406030204" pitchFamily="18" charset="0"/>
+                            <a:ea typeface="Cambria Math" panose="02040503050406030204" pitchFamily="18" charset="0"/>
+                          </a:endParaRPr>
+                        </a:p>
+                      </a:txBody>
+                      <a:tcPr/>
+                    </a:tc>
+                  </a:tr>
+                  <a:tr h="370840">
+                    <a:tc>
+                      <a:txBody>
+                        <a:bodyPr/>
+                        <a:lstStyle/>
+                        <a:p>
+                          <a:pPr algn="ctr" rtl="0"/>
+                          <a:r>
+                            <a:rPr lang="en-US" dirty="0" smtClean="0">
+                              <a:latin typeface="Cambria Math" panose="02040503050406030204" pitchFamily="18" charset="0"/>
+                              <a:ea typeface="Cambria Math" panose="02040503050406030204" pitchFamily="18" charset="0"/>
+                            </a:rPr>
+                            <a:t>171.67</a:t>
+                          </a:r>
+                          <a:endParaRPr lang="he-IL" dirty="0">
+                            <a:latin typeface="Cambria Math" panose="02040503050406030204" pitchFamily="18" charset="0"/>
+                            <a:ea typeface="Cambria Math" panose="02040503050406030204" pitchFamily="18" charset="0"/>
+                          </a:endParaRPr>
+                        </a:p>
+                      </a:txBody>
+                      <a:tcPr/>
+                    </a:tc>
+                    <a:tc>
+                      <a:txBody>
+                        <a:bodyPr/>
+                        <a:lstStyle/>
+                        <a:p>
+                          <a:pPr algn="ctr" rtl="0"/>
+                          <a:r>
+                            <a:rPr lang="en-US" dirty="0" smtClean="0">
+                              <a:latin typeface="Cambria Math" panose="02040503050406030204" pitchFamily="18" charset="0"/>
+                              <a:ea typeface="Cambria Math" panose="02040503050406030204" pitchFamily="18" charset="0"/>
+                            </a:rPr>
+                            <a:t>0.174</a:t>
+                          </a:r>
+                          <a:endParaRPr lang="he-IL" dirty="0">
+                            <a:latin typeface="Cambria Math" panose="02040503050406030204" pitchFamily="18" charset="0"/>
+                            <a:ea typeface="Cambria Math" panose="02040503050406030204" pitchFamily="18" charset="0"/>
+                          </a:endParaRPr>
+                        </a:p>
+                      </a:txBody>
+                      <a:tcPr/>
+                    </a:tc>
+                    <a:tc>
+                      <a:txBody>
+                        <a:bodyPr/>
+                        <a:lstStyle/>
+                        <a:p>
+                          <a:pPr algn="ctr" rtl="0"/>
+                          <a14:m>
+                            <m:oMathPara xmlns:m="http://schemas.openxmlformats.org/officeDocument/2006/math">
+                              <m:oMathParaPr>
+                                <m:jc m:val="centerGroup"/>
+                              </m:oMathParaPr>
+                              <m:oMath xmlns:m="http://schemas.openxmlformats.org/officeDocument/2006/math">
+                                <m:r>
+                                  <a:rPr lang="en-US" altLang="he-IL" sz="1600" smtClean="0">
+                                    <a:latin typeface="Cambria Math" panose="02040503050406030204" pitchFamily="18" charset="0"/>
+                                    <a:ea typeface="Cambria Math" panose="02040503050406030204" pitchFamily="18" charset="0"/>
+                                  </a:rPr>
+                                  <m:t>𝑟</m:t>
+                                </m:r>
+                              </m:oMath>
+                            </m:oMathPara>
+                          </a14:m>
+                          <a:endParaRPr lang="he-IL" dirty="0">
+                            <a:latin typeface="Cambria Math" panose="02040503050406030204" pitchFamily="18" charset="0"/>
+                            <a:ea typeface="Cambria Math" panose="02040503050406030204" pitchFamily="18" charset="0"/>
+                          </a:endParaRPr>
+                        </a:p>
+                      </a:txBody>
+                      <a:tcPr/>
+                    </a:tc>
+                  </a:tr>
+                  <a:tr h="370840">
+                    <a:tc>
+                      <a:txBody>
+                        <a:bodyPr/>
+                        <a:lstStyle/>
+                        <a:p>
+                          <a:pPr algn="ctr" rtl="0"/>
+                          <a:r>
+                            <a:rPr lang="en-US" dirty="0" smtClean="0">
+                              <a:latin typeface="Cambria Math" panose="02040503050406030204" pitchFamily="18" charset="0"/>
+                              <a:ea typeface="Cambria Math" panose="02040503050406030204" pitchFamily="18" charset="0"/>
+                            </a:rPr>
+                            <a:t>0.00088</a:t>
+                          </a:r>
+                          <a:endParaRPr lang="he-IL" dirty="0">
+                            <a:latin typeface="Cambria Math" panose="02040503050406030204" pitchFamily="18" charset="0"/>
+                            <a:ea typeface="Cambria Math" panose="02040503050406030204" pitchFamily="18" charset="0"/>
+                          </a:endParaRPr>
+                        </a:p>
+                      </a:txBody>
+                      <a:tcPr/>
+                    </a:tc>
+                    <a:tc>
+                      <a:txBody>
+                        <a:bodyPr/>
+                        <a:lstStyle/>
+                        <a:p>
+                          <a:pPr algn="ctr" rtl="0"/>
+                          <a:r>
+                            <a:rPr lang="en-US" dirty="0" smtClean="0">
+                              <a:latin typeface="Cambria Math" panose="02040503050406030204" pitchFamily="18" charset="0"/>
+                              <a:ea typeface="Cambria Math" panose="02040503050406030204" pitchFamily="18" charset="0"/>
+                            </a:rPr>
+                            <a:t>1</a:t>
+                          </a:r>
+                          <a:endParaRPr lang="he-IL" dirty="0">
+                            <a:latin typeface="Cambria Math" panose="02040503050406030204" pitchFamily="18" charset="0"/>
+                            <a:ea typeface="Cambria Math" panose="02040503050406030204" pitchFamily="18" charset="0"/>
+                          </a:endParaRPr>
+                        </a:p>
+                      </a:txBody>
+                      <a:tcPr/>
+                    </a:tc>
+                    <a:tc>
+                      <a:txBody>
+                        <a:bodyPr/>
+                        <a:lstStyle/>
+                        <a:p>
+                          <a:pPr algn="ctr" rtl="0"/>
+                          <a14:m>
+                            <m:oMathPara xmlns:m="http://schemas.openxmlformats.org/officeDocument/2006/math">
+                              <m:oMathParaPr>
+                                <m:jc m:val="centerGroup"/>
+                              </m:oMathParaPr>
+                              <m:oMath xmlns:m="http://schemas.openxmlformats.org/officeDocument/2006/math">
+                                <m:r>
+                                  <a:rPr lang="en-US" altLang="he-IL" sz="1600" smtClean="0">
+                                    <a:latin typeface="Cambria Math" panose="02040503050406030204" pitchFamily="18" charset="0"/>
+                                    <a:ea typeface="Cambria Math" panose="02040503050406030204" pitchFamily="18" charset="0"/>
+                                  </a:rPr>
+                                  <m:t>𝜈</m:t>
+                                </m:r>
+                              </m:oMath>
+                            </m:oMathPara>
+                          </a14:m>
+                          <a:endParaRPr lang="he-IL" dirty="0">
+                            <a:latin typeface="Cambria Math" panose="02040503050406030204" pitchFamily="18" charset="0"/>
+                            <a:ea typeface="Cambria Math" panose="02040503050406030204" pitchFamily="18" charset="0"/>
+                          </a:endParaRPr>
+                        </a:p>
+                      </a:txBody>
+                      <a:tcPr/>
+                    </a:tc>
+                  </a:tr>
+                  <a:tr h="370840">
+                    <a:tc>
+                      <a:txBody>
+                        <a:bodyPr/>
+                        <a:lstStyle/>
+                        <a:p>
+                          <a:pPr algn="ctr" rtl="0"/>
+                          <a:r>
+                            <a:rPr lang="en-US" dirty="0" smtClean="0">
+                              <a:latin typeface="Cambria Math" panose="02040503050406030204" pitchFamily="18" charset="0"/>
+                              <a:ea typeface="Cambria Math" panose="02040503050406030204" pitchFamily="18" charset="0"/>
+                            </a:rPr>
+                            <a:t>6.5</a:t>
+                          </a:r>
+                          <a:endParaRPr lang="he-IL" dirty="0">
+                            <a:latin typeface="Cambria Math" panose="02040503050406030204" pitchFamily="18" charset="0"/>
+                            <a:ea typeface="Cambria Math" panose="02040503050406030204" pitchFamily="18" charset="0"/>
+                          </a:endParaRPr>
+                        </a:p>
+                      </a:txBody>
+                      <a:tcPr/>
+                    </a:tc>
+                    <a:tc>
+                      <a:txBody>
+                        <a:bodyPr/>
+                        <a:lstStyle/>
+                        <a:p>
+                          <a:pPr algn="ctr" rtl="0"/>
+                          <a:r>
+                            <a:rPr lang="en-US" dirty="0" smtClean="0">
+                              <a:latin typeface="Cambria Math" panose="02040503050406030204" pitchFamily="18" charset="0"/>
+                              <a:ea typeface="Cambria Math" panose="02040503050406030204" pitchFamily="18" charset="0"/>
+                            </a:rPr>
+                            <a:t>6.6</a:t>
+                          </a:r>
+                          <a:endParaRPr lang="he-IL" dirty="0">
+                            <a:latin typeface="Cambria Math" panose="02040503050406030204" pitchFamily="18" charset="0"/>
+                            <a:ea typeface="Cambria Math" panose="02040503050406030204" pitchFamily="18" charset="0"/>
+                          </a:endParaRPr>
+                        </a:p>
+                      </a:txBody>
+                      <a:tcPr/>
+                    </a:tc>
+                    <a:tc>
+                      <a:txBody>
+                        <a:bodyPr/>
+                        <a:lstStyle/>
+                        <a:p>
+                          <a:pPr algn="ctr" rtl="0"/>
+                          <a:r>
+                            <a:rPr lang="en-US" dirty="0" smtClean="0">
+                              <a:latin typeface="Cambria Math" panose="02040503050406030204" pitchFamily="18" charset="0"/>
+                              <a:ea typeface="Cambria Math" panose="02040503050406030204" pitchFamily="18" charset="0"/>
+                            </a:rPr>
+                            <a:t>Lag duration</a:t>
+                          </a:r>
+                          <a:endParaRPr lang="he-IL" dirty="0">
+                            <a:latin typeface="Cambria Math" panose="02040503050406030204" pitchFamily="18" charset="0"/>
+                            <a:ea typeface="Cambria Math" panose="02040503050406030204" pitchFamily="18" charset="0"/>
+                          </a:endParaRPr>
+                        </a:p>
+                      </a:txBody>
+                      <a:tcPr/>
+                    </a:tc>
+                  </a:tr>
+                  <a:tr h="370840">
+                    <a:tc>
+                      <a:txBody>
+                        <a:bodyPr/>
+                        <a:lstStyle/>
+                        <a:p>
+                          <a:pPr algn="ctr" rtl="0"/>
+                          <a:r>
+                            <a:rPr lang="en-US" dirty="0" smtClean="0">
+                              <a:latin typeface="Cambria Math" panose="02040503050406030204" pitchFamily="18" charset="0"/>
+                              <a:ea typeface="Cambria Math" panose="02040503050406030204" pitchFamily="18" charset="0"/>
+                            </a:rPr>
+                            <a:t>0.165</a:t>
+                          </a:r>
+                          <a:endParaRPr lang="he-IL" dirty="0">
+                            <a:latin typeface="Cambria Math" panose="02040503050406030204" pitchFamily="18" charset="0"/>
+                            <a:ea typeface="Cambria Math" panose="02040503050406030204" pitchFamily="18" charset="0"/>
+                          </a:endParaRPr>
+                        </a:p>
+                      </a:txBody>
+                      <a:tcPr/>
+                    </a:tc>
+                    <a:tc>
+                      <a:txBody>
+                        <a:bodyPr/>
+                        <a:lstStyle/>
+                        <a:p>
+                          <a:pPr algn="ctr" rtl="0"/>
+                          <a:r>
+                            <a:rPr lang="en-US" dirty="0" smtClean="0">
+                              <a:latin typeface="Cambria Math" panose="02040503050406030204" pitchFamily="18" charset="0"/>
+                              <a:ea typeface="Cambria Math" panose="02040503050406030204" pitchFamily="18" charset="0"/>
+                            </a:rPr>
+                            <a:t>0.141</a:t>
+                          </a:r>
+                          <a:endParaRPr lang="he-IL" dirty="0">
+                            <a:latin typeface="Cambria Math" panose="02040503050406030204" pitchFamily="18" charset="0"/>
+                            <a:ea typeface="Cambria Math" panose="02040503050406030204" pitchFamily="18" charset="0"/>
+                          </a:endParaRPr>
+                        </a:p>
+                      </a:txBody>
+                      <a:tcPr/>
+                    </a:tc>
+                    <a:tc>
+                      <a:txBody>
+                        <a:bodyPr/>
+                        <a:lstStyle/>
+                        <a:p>
+                          <a:pPr algn="ctr" rtl="0"/>
+                          <a:r>
+                            <a:rPr lang="en-US" dirty="0" smtClean="0">
+                              <a:latin typeface="Cambria Math" panose="02040503050406030204" pitchFamily="18" charset="0"/>
+                              <a:ea typeface="Cambria Math" panose="02040503050406030204" pitchFamily="18" charset="0"/>
+                            </a:rPr>
+                            <a:t>Max. growth</a:t>
+                          </a:r>
+                          <a:endParaRPr lang="he-IL" dirty="0">
+                            <a:latin typeface="Cambria Math" panose="02040503050406030204" pitchFamily="18" charset="0"/>
+                            <a:ea typeface="Cambria Math" panose="02040503050406030204" pitchFamily="18" charset="0"/>
+                          </a:endParaRPr>
+                        </a:p>
+                      </a:txBody>
+                      <a:tcPr/>
+                    </a:tc>
+                  </a:tr>
+                </a:tbl>
+              </a:graphicData>
+            </a:graphic>
+          </p:graphicFrame>
+        </mc:Choice>
+        <mc:Fallback>
+          <p:graphicFrame>
+            <p:nvGraphicFramePr>
+              <p:cNvPr id="6" name="Table 5"/>
+              <p:cNvGraphicFramePr>
+                <a:graphicFrameLocks noGrp="1"/>
+              </p:cNvGraphicFramePr>
+              <p:nvPr>
+                <p:extLst>
+                  <p:ext uri="{D42A27DB-BD31-4B8C-83A1-F6EECF244321}">
+                    <p14:modId xmlns:p14="http://schemas.microsoft.com/office/powerpoint/2010/main" val="1531113529"/>
+                  </p:ext>
+                </p:extLst>
+              </p:nvPr>
+            </p:nvGraphicFramePr>
+            <p:xfrm>
+              <a:off x="6227077" y="25565586"/>
+              <a:ext cx="3211047" cy="2560320"/>
+            </p:xfrm>
+            <a:graphic>
+              <a:graphicData uri="http://schemas.openxmlformats.org/drawingml/2006/table">
+                <a:tbl>
+                  <a:tblPr rtl="1" firstRow="1" bandRow="1">
+                    <a:tableStyleId>{D27102A9-8310-4765-A935-A1911B00CA55}</a:tableStyleId>
+                  </a:tblPr>
+                  <a:tblGrid>
+                    <a:gridCol w="945930"/>
+                    <a:gridCol w="748399"/>
+                    <a:gridCol w="1516718"/>
+                  </a:tblGrid>
+                  <a:tr h="335280">
+                    <a:tc>
+                      <a:txBody>
+                        <a:bodyPr/>
+                        <a:lstStyle/>
+                        <a:p>
+                          <a:pPr algn="ctr" rtl="0"/>
+                          <a:r>
+                            <a:rPr lang="en-US" dirty="0" smtClean="0">
+                              <a:latin typeface="Cambria Math" panose="02040503050406030204" pitchFamily="18" charset="0"/>
+                              <a:ea typeface="Cambria Math" panose="02040503050406030204" pitchFamily="18" charset="0"/>
+                            </a:rPr>
+                            <a:t>Red</a:t>
+                          </a:r>
+                          <a:endParaRPr lang="he-IL" dirty="0">
+                            <a:solidFill>
+                              <a:srgbClr val="FF0000"/>
+                            </a:solidFill>
+                            <a:latin typeface="Cambria Math" panose="02040503050406030204" pitchFamily="18" charset="0"/>
+                            <a:ea typeface="Cambria Math" panose="02040503050406030204" pitchFamily="18" charset="0"/>
+                          </a:endParaRPr>
+                        </a:p>
+                      </a:txBody>
+                      <a:tcPr/>
+                    </a:tc>
+                    <a:tc>
+                      <a:txBody>
+                        <a:bodyPr/>
+                        <a:lstStyle/>
+                        <a:p>
+                          <a:pPr algn="ctr" rtl="0"/>
+                          <a:r>
+                            <a:rPr lang="en-US" dirty="0" smtClean="0">
+                              <a:latin typeface="Cambria Math" panose="02040503050406030204" pitchFamily="18" charset="0"/>
+                              <a:ea typeface="Cambria Math" panose="02040503050406030204" pitchFamily="18" charset="0"/>
+                            </a:rPr>
+                            <a:t>Green</a:t>
+                          </a:r>
+                          <a:endParaRPr lang="he-IL" dirty="0">
+                            <a:solidFill>
+                              <a:srgbClr val="00B050"/>
+                            </a:solidFill>
+                            <a:latin typeface="Cambria Math" panose="02040503050406030204" pitchFamily="18" charset="0"/>
+                            <a:ea typeface="Cambria Math" panose="02040503050406030204" pitchFamily="18" charset="0"/>
+                          </a:endParaRPr>
+                        </a:p>
+                      </a:txBody>
+                      <a:tcPr/>
+                    </a:tc>
+                    <a:tc>
+                      <a:txBody>
+                        <a:bodyPr/>
+                        <a:lstStyle/>
+                        <a:p>
+                          <a:pPr algn="ctr" rtl="0"/>
+                          <a:r>
+                            <a:rPr lang="en-US" dirty="0" smtClean="0">
+                              <a:latin typeface="Cambria Math" panose="02040503050406030204" pitchFamily="18" charset="0"/>
+                              <a:ea typeface="Cambria Math" panose="02040503050406030204" pitchFamily="18" charset="0"/>
+                            </a:rPr>
+                            <a:t>Parameter</a:t>
+                          </a:r>
+                          <a:endParaRPr lang="he-IL" dirty="0">
+                            <a:latin typeface="Cambria Math" panose="02040503050406030204" pitchFamily="18" charset="0"/>
+                            <a:ea typeface="Cambria Math" panose="02040503050406030204" pitchFamily="18" charset="0"/>
+                          </a:endParaRPr>
+                        </a:p>
+                      </a:txBody>
+                      <a:tcPr/>
+                    </a:tc>
+                  </a:tr>
+                  <a:tr h="370840">
+                    <a:tc>
+                      <a:txBody>
+                        <a:bodyPr/>
+                        <a:lstStyle/>
+                        <a:p>
+                          <a:pPr algn="ctr" rtl="0"/>
+                          <a:r>
+                            <a:rPr lang="en-US" dirty="0" smtClean="0">
+                              <a:latin typeface="Cambria Math" panose="02040503050406030204" pitchFamily="18" charset="0"/>
+                              <a:ea typeface="Cambria Math" panose="02040503050406030204" pitchFamily="18" charset="0"/>
+                            </a:rPr>
+                            <a:t>0.979</a:t>
+                          </a:r>
+                          <a:endParaRPr lang="he-IL" dirty="0">
+                            <a:latin typeface="Cambria Math" panose="02040503050406030204" pitchFamily="18" charset="0"/>
+                            <a:ea typeface="Cambria Math" panose="02040503050406030204" pitchFamily="18" charset="0"/>
+                          </a:endParaRPr>
+                        </a:p>
+                      </a:txBody>
+                      <a:tcPr/>
+                    </a:tc>
+                    <a:tc>
+                      <a:txBody>
+                        <a:bodyPr/>
+                        <a:lstStyle/>
+                        <a:p>
+                          <a:pPr algn="ctr" rtl="0"/>
+                          <a:r>
+                            <a:rPr lang="en-US" dirty="0" smtClean="0">
+                              <a:latin typeface="Cambria Math" panose="02040503050406030204" pitchFamily="18" charset="0"/>
+                              <a:ea typeface="Cambria Math" panose="02040503050406030204" pitchFamily="18" charset="0"/>
+                            </a:rPr>
+                            <a:t>0.983</a:t>
+                          </a:r>
+                          <a:endParaRPr lang="he-IL" dirty="0">
+                            <a:latin typeface="Cambria Math" panose="02040503050406030204" pitchFamily="18" charset="0"/>
+                            <a:ea typeface="Cambria Math" panose="02040503050406030204" pitchFamily="18" charset="0"/>
+                          </a:endParaRPr>
+                        </a:p>
+                      </a:txBody>
+                      <a:tcPr/>
+                    </a:tc>
+                    <a:tc>
+                      <a:txBody>
+                        <a:bodyPr/>
+                        <a:lstStyle/>
+                        <a:p>
+                          <a:endParaRPr lang="he-IL"/>
+                        </a:p>
+                      </a:txBody>
+                      <a:tcPr>
+                        <a:blipFill rotWithShape="1">
+                          <a:blip r:embed="rId25"/>
+                          <a:stretch>
+                            <a:fillRect l="-112500" t="-96721" r="-403" b="-508197"/>
+                          </a:stretch>
+                        </a:blipFill>
+                      </a:tcPr>
+                    </a:tc>
+                  </a:tr>
+                  <a:tr h="370840">
+                    <a:tc>
+                      <a:txBody>
+                        <a:bodyPr/>
+                        <a:lstStyle/>
+                        <a:p>
+                          <a:pPr algn="ctr" rtl="0"/>
+                          <a:r>
+                            <a:rPr lang="en-US" dirty="0" smtClean="0">
+                              <a:latin typeface="Cambria Math" panose="02040503050406030204" pitchFamily="18" charset="0"/>
+                              <a:ea typeface="Cambria Math" panose="02040503050406030204" pitchFamily="18" charset="0"/>
+                            </a:rPr>
+                            <a:t>1.332</a:t>
+                          </a:r>
+                          <a:endParaRPr lang="he-IL" dirty="0">
+                            <a:latin typeface="Cambria Math" panose="02040503050406030204" pitchFamily="18" charset="0"/>
+                            <a:ea typeface="Cambria Math" panose="02040503050406030204" pitchFamily="18" charset="0"/>
+                          </a:endParaRPr>
+                        </a:p>
+                      </a:txBody>
+                      <a:tcPr/>
+                    </a:tc>
+                    <a:tc>
+                      <a:txBody>
+                        <a:bodyPr/>
+                        <a:lstStyle/>
+                        <a:p>
+                          <a:pPr algn="ctr" rtl="0"/>
+                          <a:r>
+                            <a:rPr lang="en-US" dirty="0" smtClean="0">
+                              <a:latin typeface="Cambria Math" panose="02040503050406030204" pitchFamily="18" charset="0"/>
+                              <a:ea typeface="Cambria Math" panose="02040503050406030204" pitchFamily="18" charset="0"/>
+                            </a:rPr>
+                            <a:t>1.136</a:t>
+                          </a:r>
+                          <a:endParaRPr lang="he-IL" dirty="0">
+                            <a:latin typeface="Cambria Math" panose="02040503050406030204" pitchFamily="18" charset="0"/>
+                            <a:ea typeface="Cambria Math" panose="02040503050406030204" pitchFamily="18" charset="0"/>
+                          </a:endParaRPr>
+                        </a:p>
+                      </a:txBody>
+                      <a:tcPr/>
+                    </a:tc>
+                    <a:tc>
+                      <a:txBody>
+                        <a:bodyPr/>
+                        <a:lstStyle/>
+                        <a:p>
+                          <a:endParaRPr lang="he-IL"/>
+                        </a:p>
+                      </a:txBody>
+                      <a:tcPr>
+                        <a:blipFill rotWithShape="1">
+                          <a:blip r:embed="rId25"/>
+                          <a:stretch>
+                            <a:fillRect l="-112500" t="-196721" r="-403" b="-408197"/>
+                          </a:stretch>
+                        </a:blipFill>
+                      </a:tcPr>
+                    </a:tc>
+                  </a:tr>
+                  <a:tr h="370840">
+                    <a:tc>
+                      <a:txBody>
+                        <a:bodyPr/>
+                        <a:lstStyle/>
+                        <a:p>
+                          <a:pPr algn="ctr" rtl="0"/>
+                          <a:r>
+                            <a:rPr lang="en-US" dirty="0" smtClean="0">
+                              <a:latin typeface="Cambria Math" panose="02040503050406030204" pitchFamily="18" charset="0"/>
+                              <a:ea typeface="Cambria Math" panose="02040503050406030204" pitchFamily="18" charset="0"/>
+                            </a:rPr>
+                            <a:t>171.67</a:t>
+                          </a:r>
+                          <a:endParaRPr lang="he-IL" dirty="0">
+                            <a:latin typeface="Cambria Math" panose="02040503050406030204" pitchFamily="18" charset="0"/>
+                            <a:ea typeface="Cambria Math" panose="02040503050406030204" pitchFamily="18" charset="0"/>
+                          </a:endParaRPr>
+                        </a:p>
+                      </a:txBody>
+                      <a:tcPr/>
+                    </a:tc>
+                    <a:tc>
+                      <a:txBody>
+                        <a:bodyPr/>
+                        <a:lstStyle/>
+                        <a:p>
+                          <a:pPr algn="ctr" rtl="0"/>
+                          <a:r>
+                            <a:rPr lang="en-US" dirty="0" smtClean="0">
+                              <a:latin typeface="Cambria Math" panose="02040503050406030204" pitchFamily="18" charset="0"/>
+                              <a:ea typeface="Cambria Math" panose="02040503050406030204" pitchFamily="18" charset="0"/>
+                            </a:rPr>
+                            <a:t>0.174</a:t>
+                          </a:r>
+                          <a:endParaRPr lang="he-IL" dirty="0">
+                            <a:latin typeface="Cambria Math" panose="02040503050406030204" pitchFamily="18" charset="0"/>
+                            <a:ea typeface="Cambria Math" panose="02040503050406030204" pitchFamily="18" charset="0"/>
+                          </a:endParaRPr>
+                        </a:p>
+                      </a:txBody>
+                      <a:tcPr/>
+                    </a:tc>
+                    <a:tc>
+                      <a:txBody>
+                        <a:bodyPr/>
+                        <a:lstStyle/>
+                        <a:p>
+                          <a:endParaRPr lang="he-IL"/>
+                        </a:p>
+                      </a:txBody>
+                      <a:tcPr>
+                        <a:blipFill rotWithShape="1">
+                          <a:blip r:embed="rId25"/>
+                          <a:stretch>
+                            <a:fillRect l="-112500" t="-296721" r="-403" b="-308197"/>
+                          </a:stretch>
+                        </a:blipFill>
+                      </a:tcPr>
+                    </a:tc>
+                  </a:tr>
+                  <a:tr h="370840">
+                    <a:tc>
+                      <a:txBody>
+                        <a:bodyPr/>
+                        <a:lstStyle/>
+                        <a:p>
+                          <a:pPr algn="ctr" rtl="0"/>
+                          <a:r>
+                            <a:rPr lang="en-US" dirty="0" smtClean="0">
+                              <a:latin typeface="Cambria Math" panose="02040503050406030204" pitchFamily="18" charset="0"/>
+                              <a:ea typeface="Cambria Math" panose="02040503050406030204" pitchFamily="18" charset="0"/>
+                            </a:rPr>
+                            <a:t>0.00088</a:t>
+                          </a:r>
+                          <a:endParaRPr lang="he-IL" dirty="0">
+                            <a:latin typeface="Cambria Math" panose="02040503050406030204" pitchFamily="18" charset="0"/>
+                            <a:ea typeface="Cambria Math" panose="02040503050406030204" pitchFamily="18" charset="0"/>
+                          </a:endParaRPr>
+                        </a:p>
+                      </a:txBody>
+                      <a:tcPr/>
+                    </a:tc>
+                    <a:tc>
+                      <a:txBody>
+                        <a:bodyPr/>
+                        <a:lstStyle/>
+                        <a:p>
+                          <a:pPr algn="ctr" rtl="0"/>
+                          <a:r>
+                            <a:rPr lang="en-US" dirty="0" smtClean="0">
+                              <a:latin typeface="Cambria Math" panose="02040503050406030204" pitchFamily="18" charset="0"/>
+                              <a:ea typeface="Cambria Math" panose="02040503050406030204" pitchFamily="18" charset="0"/>
+                            </a:rPr>
+                            <a:t>1</a:t>
+                          </a:r>
+                          <a:endParaRPr lang="he-IL" dirty="0">
+                            <a:latin typeface="Cambria Math" panose="02040503050406030204" pitchFamily="18" charset="0"/>
+                            <a:ea typeface="Cambria Math" panose="02040503050406030204" pitchFamily="18" charset="0"/>
+                          </a:endParaRPr>
+                        </a:p>
+                      </a:txBody>
+                      <a:tcPr/>
+                    </a:tc>
+                    <a:tc>
+                      <a:txBody>
+                        <a:bodyPr/>
+                        <a:lstStyle/>
+                        <a:p>
+                          <a:endParaRPr lang="he-IL"/>
+                        </a:p>
+                      </a:txBody>
+                      <a:tcPr>
+                        <a:blipFill rotWithShape="1">
+                          <a:blip r:embed="rId25"/>
+                          <a:stretch>
+                            <a:fillRect l="-112500" t="-403333" r="-403" b="-213333"/>
+                          </a:stretch>
+                        </a:blipFill>
+                      </a:tcPr>
+                    </a:tc>
+                  </a:tr>
+                  <a:tr h="370840">
+                    <a:tc>
+                      <a:txBody>
+                        <a:bodyPr/>
+                        <a:lstStyle/>
+                        <a:p>
+                          <a:pPr algn="ctr" rtl="0"/>
+                          <a:r>
+                            <a:rPr lang="en-US" dirty="0" smtClean="0">
+                              <a:latin typeface="Cambria Math" panose="02040503050406030204" pitchFamily="18" charset="0"/>
+                              <a:ea typeface="Cambria Math" panose="02040503050406030204" pitchFamily="18" charset="0"/>
+                            </a:rPr>
+                            <a:t>6.5</a:t>
+                          </a:r>
+                          <a:endParaRPr lang="he-IL" dirty="0">
+                            <a:latin typeface="Cambria Math" panose="02040503050406030204" pitchFamily="18" charset="0"/>
+                            <a:ea typeface="Cambria Math" panose="02040503050406030204" pitchFamily="18" charset="0"/>
+                          </a:endParaRPr>
+                        </a:p>
+                      </a:txBody>
+                      <a:tcPr/>
+                    </a:tc>
+                    <a:tc>
+                      <a:txBody>
+                        <a:bodyPr/>
+                        <a:lstStyle/>
+                        <a:p>
+                          <a:pPr algn="ctr" rtl="0"/>
+                          <a:r>
+                            <a:rPr lang="en-US" dirty="0" smtClean="0">
+                              <a:latin typeface="Cambria Math" panose="02040503050406030204" pitchFamily="18" charset="0"/>
+                              <a:ea typeface="Cambria Math" panose="02040503050406030204" pitchFamily="18" charset="0"/>
+                            </a:rPr>
+                            <a:t>6.6</a:t>
+                          </a:r>
+                          <a:endParaRPr lang="he-IL" dirty="0">
+                            <a:latin typeface="Cambria Math" panose="02040503050406030204" pitchFamily="18" charset="0"/>
+                            <a:ea typeface="Cambria Math" panose="02040503050406030204" pitchFamily="18" charset="0"/>
+                          </a:endParaRPr>
+                        </a:p>
+                      </a:txBody>
+                      <a:tcPr/>
+                    </a:tc>
+                    <a:tc>
+                      <a:txBody>
+                        <a:bodyPr/>
+                        <a:lstStyle/>
+                        <a:p>
+                          <a:pPr algn="ctr" rtl="0"/>
+                          <a:r>
+                            <a:rPr lang="en-US" dirty="0" smtClean="0">
+                              <a:latin typeface="Cambria Math" panose="02040503050406030204" pitchFamily="18" charset="0"/>
+                              <a:ea typeface="Cambria Math" panose="02040503050406030204" pitchFamily="18" charset="0"/>
+                            </a:rPr>
+                            <a:t>Lag duration</a:t>
+                          </a:r>
+                          <a:endParaRPr lang="he-IL" dirty="0">
+                            <a:latin typeface="Cambria Math" panose="02040503050406030204" pitchFamily="18" charset="0"/>
+                            <a:ea typeface="Cambria Math" panose="02040503050406030204" pitchFamily="18" charset="0"/>
+                          </a:endParaRPr>
+                        </a:p>
+                      </a:txBody>
+                      <a:tcPr/>
+                    </a:tc>
+                  </a:tr>
+                  <a:tr h="370840">
+                    <a:tc>
+                      <a:txBody>
+                        <a:bodyPr/>
+                        <a:lstStyle/>
+                        <a:p>
+                          <a:pPr algn="ctr" rtl="0"/>
+                          <a:r>
+                            <a:rPr lang="en-US" dirty="0" smtClean="0">
+                              <a:latin typeface="Cambria Math" panose="02040503050406030204" pitchFamily="18" charset="0"/>
+                              <a:ea typeface="Cambria Math" panose="02040503050406030204" pitchFamily="18" charset="0"/>
+                            </a:rPr>
+                            <a:t>0.165</a:t>
+                          </a:r>
+                          <a:endParaRPr lang="he-IL" dirty="0">
+                            <a:latin typeface="Cambria Math" panose="02040503050406030204" pitchFamily="18" charset="0"/>
+                            <a:ea typeface="Cambria Math" panose="02040503050406030204" pitchFamily="18" charset="0"/>
+                          </a:endParaRPr>
+                        </a:p>
+                      </a:txBody>
+                      <a:tcPr/>
+                    </a:tc>
+                    <a:tc>
+                      <a:txBody>
+                        <a:bodyPr/>
+                        <a:lstStyle/>
+                        <a:p>
+                          <a:pPr algn="ctr" rtl="0"/>
+                          <a:r>
+                            <a:rPr lang="en-US" dirty="0" smtClean="0">
+                              <a:latin typeface="Cambria Math" panose="02040503050406030204" pitchFamily="18" charset="0"/>
+                              <a:ea typeface="Cambria Math" panose="02040503050406030204" pitchFamily="18" charset="0"/>
+                            </a:rPr>
+                            <a:t>0.141</a:t>
+                          </a:r>
+                          <a:endParaRPr lang="he-IL" dirty="0">
+                            <a:latin typeface="Cambria Math" panose="02040503050406030204" pitchFamily="18" charset="0"/>
+                            <a:ea typeface="Cambria Math" panose="02040503050406030204" pitchFamily="18" charset="0"/>
+                          </a:endParaRPr>
+                        </a:p>
+                      </a:txBody>
+                      <a:tcPr/>
+                    </a:tc>
+                    <a:tc>
+                      <a:txBody>
+                        <a:bodyPr/>
+                        <a:lstStyle/>
+                        <a:p>
+                          <a:pPr algn="ctr" rtl="0"/>
+                          <a:r>
+                            <a:rPr lang="en-US" dirty="0" smtClean="0">
+                              <a:latin typeface="Cambria Math" panose="02040503050406030204" pitchFamily="18" charset="0"/>
+                              <a:ea typeface="Cambria Math" panose="02040503050406030204" pitchFamily="18" charset="0"/>
+                            </a:rPr>
+                            <a:t>Max. growth</a:t>
+                          </a:r>
+                          <a:endParaRPr lang="he-IL" dirty="0">
+                            <a:latin typeface="Cambria Math" panose="02040503050406030204" pitchFamily="18" charset="0"/>
+                            <a:ea typeface="Cambria Math" panose="02040503050406030204" pitchFamily="18" charset="0"/>
+                          </a:endParaRPr>
+                        </a:p>
+                      </a:txBody>
+                      <a:tcPr/>
+                    </a:tc>
+                  </a:tr>
+                </a:tbl>
+              </a:graphicData>
+            </a:graphic>
+          </p:graphicFrame>
+        </mc:Fallback>
+      </mc:AlternateContent>
+      <p:sp>
+        <p:nvSpPr>
+          <p:cNvPr id="8" name="TextBox 7"/>
+          <p:cNvSpPr txBox="1"/>
+          <p:nvPr/>
+        </p:nvSpPr>
+        <p:spPr>
+          <a:xfrm>
+            <a:off x="2017986" y="25738834"/>
+            <a:ext cx="4051738" cy="2015936"/>
+          </a:xfrm>
+          <a:prstGeom prst="rect">
+            <a:avLst/>
+          </a:prstGeom>
+          <a:noFill/>
+        </p:spPr>
+        <p:txBody>
+          <a:bodyPr wrap="square" rtlCol="1">
+            <a:spAutoFit/>
+          </a:bodyPr>
+          <a:lstStyle/>
+          <a:p>
+            <a:r>
+              <a:rPr lang="en-US" altLang="he-IL" sz="2500" dirty="0">
+                <a:latin typeface="Times New Roman" pitchFamily="18" charset="0"/>
+              </a:rPr>
+              <a:t>We fit four versions of the model to the data </a:t>
+            </a:r>
+            <a:r>
+              <a:rPr lang="en-US" altLang="he-IL" sz="2500" dirty="0" smtClean="0">
+                <a:latin typeface="Times New Roman" pitchFamily="18" charset="0"/>
+              </a:rPr>
+              <a:t>(</a:t>
+            </a:r>
+            <a:r>
+              <a:rPr lang="en-US" altLang="he-IL" sz="2500" dirty="0">
+                <a:latin typeface="Times New Roman" pitchFamily="18" charset="0"/>
+              </a:rPr>
+              <a:t>using </a:t>
+            </a:r>
+            <a:r>
+              <a:rPr lang="en-US" altLang="he-IL" sz="2500" i="1" dirty="0" smtClean="0">
+                <a:latin typeface="Times New Roman" pitchFamily="18" charset="0"/>
+              </a:rPr>
+              <a:t>least </a:t>
+            </a:r>
+            <a:r>
+              <a:rPr lang="en-US" altLang="he-IL" sz="2500" i="1" dirty="0">
+                <a:latin typeface="Times New Roman" pitchFamily="18" charset="0"/>
+              </a:rPr>
+              <a:t>squares</a:t>
+            </a:r>
+            <a:r>
+              <a:rPr lang="en-US" altLang="he-IL" sz="2500" dirty="0">
+                <a:latin typeface="Times New Roman" pitchFamily="18" charset="0"/>
+              </a:rPr>
+              <a:t>) and choose the best model with a model selection </a:t>
+            </a:r>
+            <a:r>
+              <a:rPr lang="en-US" altLang="he-IL" sz="2500" dirty="0" smtClean="0">
+                <a:latin typeface="Times New Roman" pitchFamily="18" charset="0"/>
+              </a:rPr>
+              <a:t>procedure.</a:t>
+            </a:r>
+            <a:endParaRPr lang="en-US" altLang="he-IL" sz="2500" dirty="0">
+              <a:latin typeface="Times New Roman" pitchFamily="18" charset="0"/>
+            </a:endParaRPr>
+          </a:p>
+        </p:txBody>
+      </p:sp>
+      <p:pic>
+        <p:nvPicPr>
+          <p:cNvPr id="12" name="Picture 2" descr="D:\university\presentations\GRC 2015\model_fits.png"/>
+          <p:cNvPicPr>
+            <a:picLocks noChangeAspect="1" noChangeArrowheads="1"/>
+          </p:cNvPicPr>
+          <p:nvPr/>
+        </p:nvPicPr>
+        <p:blipFill>
+          <a:blip r:embed="rId26">
+            <a:extLst>
+              <a:ext uri="{28A0092B-C50C-407E-A947-70E740481C1C}">
+                <a14:useLocalDpi xmlns:a14="http://schemas.microsoft.com/office/drawing/2010/main" val="0"/>
+              </a:ext>
+            </a:extLst>
+          </a:blip>
+          <a:srcRect/>
+          <a:stretch>
+            <a:fillRect/>
+          </a:stretch>
+        </p:blipFill>
+        <p:spPr bwMode="auto">
+          <a:xfrm>
+            <a:off x="1630800" y="28544918"/>
+            <a:ext cx="7748588" cy="5297488"/>
+          </a:xfrm>
+          <a:prstGeom prst="rect">
+            <a:avLst/>
+          </a:prstGeom>
+          <a:noFill/>
+          <a:extLst>
+            <a:ext uri="{909E8E84-426E-40DD-AFC4-6F175D3DCCD1}">
+              <a14:hiddenFill xmlns:a14="http://schemas.microsoft.com/office/drawing/2010/main">
+                <a:solidFill>
+                  <a:srgbClr val="FFFFFF"/>
+                </a:solidFill>
+              </a14:hiddenFill>
+            </a:ext>
+          </a:extLst>
+        </p:spPr>
+      </p:pic>
+      <p:pic>
+        <p:nvPicPr>
+          <p:cNvPr id="13" name="Picture 3" descr="D:\university\presentations\GRC 2015\total_OD_comparison.png"/>
+          <p:cNvPicPr>
+            <a:picLocks noChangeAspect="1" noChangeArrowheads="1"/>
+          </p:cNvPicPr>
+          <p:nvPr/>
+        </p:nvPicPr>
+        <p:blipFill>
+          <a:blip r:embed="rId27">
+            <a:extLst>
+              <a:ext uri="{28A0092B-C50C-407E-A947-70E740481C1C}">
+                <a14:useLocalDpi xmlns:a14="http://schemas.microsoft.com/office/drawing/2010/main" val="0"/>
+              </a:ext>
+            </a:extLst>
+          </a:blip>
+          <a:srcRect/>
+          <a:stretch>
+            <a:fillRect/>
+          </a:stretch>
+        </p:blipFill>
+        <p:spPr bwMode="auto">
+          <a:xfrm>
+            <a:off x="20970000" y="22262400"/>
+            <a:ext cx="7748588" cy="5310187"/>
+          </a:xfrm>
+          <a:prstGeom prst="rect">
+            <a:avLst/>
+          </a:prstGeom>
+          <a:noFill/>
+          <a:extLst>
+            <a:ext uri="{909E8E84-426E-40DD-AFC4-6F175D3DCCD1}">
+              <a14:hiddenFill xmlns:a14="http://schemas.microsoft.com/office/drawing/2010/main">
+                <a:solidFill>
+                  <a:srgbClr val="FFFFFF"/>
+                </a:solidFill>
+              </a14:hiddenFill>
+            </a:ext>
+          </a:extLst>
+        </p:spPr>
+      </p:pic>
+      <p:cxnSp>
+        <p:nvCxnSpPr>
+          <p:cNvPr id="59" name="Straight Arrow Connector 58"/>
+          <p:cNvCxnSpPr/>
+          <p:nvPr/>
+        </p:nvCxnSpPr>
+        <p:spPr>
+          <a:xfrm>
+            <a:off x="24954423" y="21618362"/>
+            <a:ext cx="0" cy="843328"/>
+          </a:xfrm>
+          <a:prstGeom prst="straightConnector1">
+            <a:avLst/>
+          </a:prstGeom>
+          <a:ln>
+            <a:tailEnd type="arrow"/>
+          </a:ln>
+        </p:spPr>
+        <p:style>
+          <a:lnRef idx="3">
+            <a:schemeClr val="dk1"/>
+          </a:lnRef>
+          <a:fillRef idx="0">
+            <a:schemeClr val="dk1"/>
+          </a:fillRef>
+          <a:effectRef idx="2">
+            <a:schemeClr val="dk1"/>
+          </a:effectRef>
+          <a:fontRef idx="minor">
+            <a:schemeClr val="tx1"/>
+          </a:fontRef>
+        </p:style>
+      </p:cxnSp>
+      <p:cxnSp>
+        <p:nvCxnSpPr>
+          <p:cNvPr id="60" name="Straight Arrow Connector 59"/>
+          <p:cNvCxnSpPr/>
+          <p:nvPr/>
+        </p:nvCxnSpPr>
+        <p:spPr>
+          <a:xfrm>
+            <a:off x="24954423" y="18221966"/>
+            <a:ext cx="0" cy="843328"/>
+          </a:xfrm>
+          <a:prstGeom prst="straightConnector1">
+            <a:avLst/>
+          </a:prstGeom>
+          <a:ln>
+            <a:tailEnd type="arrow"/>
+          </a:ln>
+        </p:spPr>
+        <p:style>
+          <a:lnRef idx="3">
+            <a:schemeClr val="dk1"/>
+          </a:lnRef>
+          <a:fillRef idx="0">
+            <a:schemeClr val="dk1"/>
+          </a:fillRef>
+          <a:effectRef idx="2">
+            <a:schemeClr val="dk1"/>
+          </a:effectRef>
+          <a:fontRef idx="minor">
+            <a:schemeClr val="tx1"/>
+          </a:fontRef>
+        </p:style>
+      </p:cxnSp>
+      <p:cxnSp>
+        <p:nvCxnSpPr>
+          <p:cNvPr id="9" name="Straight Arrow Connector 8"/>
+          <p:cNvCxnSpPr/>
+          <p:nvPr/>
+        </p:nvCxnSpPr>
+        <p:spPr>
+          <a:xfrm>
+            <a:off x="24937778" y="12998948"/>
+            <a:ext cx="0" cy="843328"/>
+          </a:xfrm>
+          <a:prstGeom prst="straightConnector1">
+            <a:avLst/>
+          </a:prstGeom>
+          <a:ln>
+            <a:tailEnd type="arrow"/>
+          </a:ln>
+        </p:spPr>
+        <p:style>
+          <a:lnRef idx="3">
+            <a:schemeClr val="dk1"/>
+          </a:lnRef>
+          <a:fillRef idx="0">
+            <a:schemeClr val="dk1"/>
+          </a:fillRef>
+          <a:effectRef idx="2">
+            <a:schemeClr val="dk1"/>
+          </a:effectRef>
+          <a:fontRef idx="minor">
+            <a:schemeClr val="tx1"/>
+          </a:fontRef>
+        </p:style>
+      </p:cxnSp>
     </p:spTree>
   </p:cSld>
   <p:clrMapOvr>

</xml_diff>

<commit_message>
worked in the selection inference box
</commit_message>
<xml_diff>
--- a/poster.pptx
+++ b/poster.pptx
@@ -4184,6 +4184,846 @@
           <a:chExt cx="0" cy="0"/>
         </a:xfrm>
       </p:grpSpPr>
+      <mc:AlternateContent xmlns:mc="http://schemas.openxmlformats.org/markup-compatibility/2006">
+        <mc:Choice xmlns:a14="http://schemas.microsoft.com/office/drawing/2010/main" Requires="a14">
+          <p:sp>
+            <p:nvSpPr>
+              <p:cNvPr id="51" name="Text Box 11"/>
+              <p:cNvSpPr txBox="1">
+                <a:spLocks noChangeArrowheads="1"/>
+              </p:cNvSpPr>
+              <p:nvPr/>
+            </p:nvSpPr>
+            <p:spPr bwMode="auto">
+              <a:xfrm>
+                <a:off x="10944000" y="19716750"/>
+                <a:ext cx="8458200" cy="14363700"/>
+              </a:xfrm>
+              <a:prstGeom prst="rect">
+                <a:avLst/>
+              </a:prstGeom>
+              <a:solidFill>
+                <a:schemeClr val="bg1"/>
+              </a:solidFill>
+              <a:ln w="38100">
+                <a:solidFill>
+                  <a:srgbClr val="000000"/>
+                </a:solidFill>
+                <a:round/>
+                <a:headEnd/>
+                <a:tailEnd/>
+              </a:ln>
+            </p:spPr>
+            <p:txBody>
+              <a:bodyPr lIns="802806" tIns="401404" rIns="802806" bIns="802806"/>
+              <a:lstStyle>
+                <a:lvl1pPr eaLnBrk="0" hangingPunct="0">
+                  <a:tabLst>
+                    <a:tab pos="508000" algn="l"/>
+                  </a:tabLst>
+                  <a:defRPr sz="2800">
+                    <a:solidFill>
+                      <a:schemeClr val="tx1"/>
+                    </a:solidFill>
+                    <a:latin typeface="Helvetica" pitchFamily="124" charset="0"/>
+                    <a:ea typeface="MS PGothic" pitchFamily="34" charset="-128"/>
+                  </a:defRPr>
+                </a:lvl1pPr>
+                <a:lvl2pPr marL="742950" indent="-285750" eaLnBrk="0" hangingPunct="0">
+                  <a:tabLst>
+                    <a:tab pos="508000" algn="l"/>
+                  </a:tabLst>
+                  <a:defRPr sz="2800">
+                    <a:solidFill>
+                      <a:schemeClr val="tx1"/>
+                    </a:solidFill>
+                    <a:latin typeface="Helvetica" pitchFamily="124" charset="0"/>
+                    <a:ea typeface="MS PGothic" pitchFamily="34" charset="-128"/>
+                  </a:defRPr>
+                </a:lvl2pPr>
+                <a:lvl3pPr marL="1143000" indent="-228600" eaLnBrk="0" hangingPunct="0">
+                  <a:tabLst>
+                    <a:tab pos="508000" algn="l"/>
+                  </a:tabLst>
+                  <a:defRPr sz="2800">
+                    <a:solidFill>
+                      <a:schemeClr val="tx1"/>
+                    </a:solidFill>
+                    <a:latin typeface="Helvetica" pitchFamily="124" charset="0"/>
+                    <a:ea typeface="MS PGothic" pitchFamily="34" charset="-128"/>
+                  </a:defRPr>
+                </a:lvl3pPr>
+                <a:lvl4pPr marL="1600200" indent="-228600" eaLnBrk="0" hangingPunct="0">
+                  <a:tabLst>
+                    <a:tab pos="508000" algn="l"/>
+                  </a:tabLst>
+                  <a:defRPr sz="2800">
+                    <a:solidFill>
+                      <a:schemeClr val="tx1"/>
+                    </a:solidFill>
+                    <a:latin typeface="Helvetica" pitchFamily="124" charset="0"/>
+                    <a:ea typeface="MS PGothic" pitchFamily="34" charset="-128"/>
+                  </a:defRPr>
+                </a:lvl4pPr>
+                <a:lvl5pPr marL="2057400" indent="-228600" eaLnBrk="0" hangingPunct="0">
+                  <a:tabLst>
+                    <a:tab pos="508000" algn="l"/>
+                  </a:tabLst>
+                  <a:defRPr sz="2800">
+                    <a:solidFill>
+                      <a:schemeClr val="tx1"/>
+                    </a:solidFill>
+                    <a:latin typeface="Helvetica" pitchFamily="124" charset="0"/>
+                    <a:ea typeface="MS PGothic" pitchFamily="34" charset="-128"/>
+                  </a:defRPr>
+                </a:lvl5pPr>
+                <a:lvl6pPr marL="2514600" indent="-228600" algn="l" rtl="0" eaLnBrk="0" fontAlgn="base" hangingPunct="0">
+                  <a:spcBef>
+                    <a:spcPct val="0"/>
+                  </a:spcBef>
+                  <a:spcAft>
+                    <a:spcPct val="0"/>
+                  </a:spcAft>
+                  <a:tabLst>
+                    <a:tab pos="508000" algn="l"/>
+                  </a:tabLst>
+                  <a:defRPr sz="2800">
+                    <a:solidFill>
+                      <a:schemeClr val="tx1"/>
+                    </a:solidFill>
+                    <a:latin typeface="Helvetica" pitchFamily="124" charset="0"/>
+                    <a:ea typeface="MS PGothic" pitchFamily="34" charset="-128"/>
+                  </a:defRPr>
+                </a:lvl6pPr>
+                <a:lvl7pPr marL="2971800" indent="-228600" algn="l" rtl="0" eaLnBrk="0" fontAlgn="base" hangingPunct="0">
+                  <a:spcBef>
+                    <a:spcPct val="0"/>
+                  </a:spcBef>
+                  <a:spcAft>
+                    <a:spcPct val="0"/>
+                  </a:spcAft>
+                  <a:tabLst>
+                    <a:tab pos="508000" algn="l"/>
+                  </a:tabLst>
+                  <a:defRPr sz="2800">
+                    <a:solidFill>
+                      <a:schemeClr val="tx1"/>
+                    </a:solidFill>
+                    <a:latin typeface="Helvetica" pitchFamily="124" charset="0"/>
+                    <a:ea typeface="MS PGothic" pitchFamily="34" charset="-128"/>
+                  </a:defRPr>
+                </a:lvl7pPr>
+                <a:lvl8pPr marL="3429000" indent="-228600" algn="l" rtl="0" eaLnBrk="0" fontAlgn="base" hangingPunct="0">
+                  <a:spcBef>
+                    <a:spcPct val="0"/>
+                  </a:spcBef>
+                  <a:spcAft>
+                    <a:spcPct val="0"/>
+                  </a:spcAft>
+                  <a:tabLst>
+                    <a:tab pos="508000" algn="l"/>
+                  </a:tabLst>
+                  <a:defRPr sz="2800">
+                    <a:solidFill>
+                      <a:schemeClr val="tx1"/>
+                    </a:solidFill>
+                    <a:latin typeface="Helvetica" pitchFamily="124" charset="0"/>
+                    <a:ea typeface="MS PGothic" pitchFamily="34" charset="-128"/>
+                  </a:defRPr>
+                </a:lvl8pPr>
+                <a:lvl9pPr marL="3886200" indent="-228600" algn="l" rtl="0" eaLnBrk="0" fontAlgn="base" hangingPunct="0">
+                  <a:spcBef>
+                    <a:spcPct val="0"/>
+                  </a:spcBef>
+                  <a:spcAft>
+                    <a:spcPct val="0"/>
+                  </a:spcAft>
+                  <a:tabLst>
+                    <a:tab pos="508000" algn="l"/>
+                  </a:tabLst>
+                  <a:defRPr sz="2800">
+                    <a:solidFill>
+                      <a:schemeClr val="tx1"/>
+                    </a:solidFill>
+                    <a:latin typeface="Helvetica" pitchFamily="124" charset="0"/>
+                    <a:ea typeface="MS PGothic" pitchFamily="34" charset="-128"/>
+                  </a:defRPr>
+                </a:lvl9pPr>
+              </a:lstStyle>
+              <a:p>
+                <a:pPr indent="180000" eaLnBrk="1" hangingPunct="1">
+                  <a:spcBef>
+                    <a:spcPct val="50000"/>
+                  </a:spcBef>
+                  <a:tabLst>
+                    <a:tab pos="635000" algn="l"/>
+                  </a:tabLst>
+                </a:pPr>
+                <a:r>
+                  <a:rPr lang="en-US" altLang="he-IL" sz="4200" b="1" dirty="0" smtClean="0">
+                    <a:solidFill>
+                      <a:srgbClr val="000000"/>
+                    </a:solidFill>
+                    <a:latin typeface="Calibri" pitchFamily="34" charset="0"/>
+                  </a:rPr>
+                  <a:t>Fitness inference</a:t>
+                </a:r>
+                <a:endParaRPr lang="en-US" altLang="he-IL" sz="4200" b="1" dirty="0">
+                  <a:solidFill>
+                    <a:srgbClr val="000000"/>
+                  </a:solidFill>
+                  <a:latin typeface="Calibri" pitchFamily="34" charset="0"/>
+                </a:endParaRPr>
+              </a:p>
+              <a:p>
+                <a:pPr eaLnBrk="1" hangingPunct="1">
+                  <a:spcBef>
+                    <a:spcPct val="10000"/>
+                  </a:spcBef>
+                </a:pPr>
+                <a:r>
+                  <a:rPr lang="en-US" altLang="he-IL" sz="2500" dirty="0" smtClean="0">
+                    <a:latin typeface="Times New Roman" pitchFamily="18" charset="0"/>
+                  </a:rPr>
+                  <a:t>Fitness can be inferred from competitions in several ways</a:t>
+                </a:r>
+                <a:r>
+                  <a:rPr lang="en-US" altLang="he-IL" sz="2500" baseline="30000" dirty="0" smtClean="0">
+                    <a:latin typeface="Times New Roman" pitchFamily="18" charset="0"/>
+                  </a:rPr>
+                  <a:t>2,3,5</a:t>
+                </a:r>
+                <a:r>
+                  <a:rPr lang="en-US" altLang="he-IL" sz="2500" dirty="0" smtClean="0">
+                    <a:latin typeface="Times New Roman" pitchFamily="18" charset="0"/>
+                  </a:rPr>
+                  <a:t>.</a:t>
+                </a:r>
+              </a:p>
+              <a:p>
+                <a:pPr eaLnBrk="1" hangingPunct="1">
+                  <a:spcBef>
+                    <a:spcPct val="10000"/>
+                  </a:spcBef>
+                </a:pPr>
+                <a:r>
+                  <a:rPr lang="en-US" altLang="he-IL" sz="2500" dirty="0" smtClean="0">
+                    <a:latin typeface="Times New Roman" pitchFamily="18" charset="0"/>
+                  </a:rPr>
+                  <a:t>For example, according to Crow &amp; Kimura</a:t>
+                </a:r>
+                <a:r>
+                  <a:rPr lang="en-US" altLang="he-IL" sz="2500" baseline="30000" dirty="0" smtClean="0">
+                    <a:latin typeface="Times New Roman" pitchFamily="18" charset="0"/>
+                  </a:rPr>
+                  <a:t>3</a:t>
+                </a:r>
+                <a:r>
+                  <a:rPr lang="en-US" altLang="he-IL" sz="2500" dirty="0" smtClean="0">
+                    <a:latin typeface="Times New Roman" pitchFamily="18" charset="0"/>
+                  </a:rPr>
+                  <a:t> the frequency of the red strain </a:t>
+                </a:r>
+                <a14:m>
+                  <m:oMath xmlns:m="http://schemas.openxmlformats.org/officeDocument/2006/math">
+                    <m:r>
+                      <a:rPr lang="en-US" altLang="he-IL" sz="2500" i="1">
+                        <a:latin typeface="Cambria Math"/>
+                      </a:rPr>
+                      <m:t>𝑝</m:t>
+                    </m:r>
+                  </m:oMath>
+                </a14:m>
+                <a:r>
+                  <a:rPr lang="en-US" altLang="he-IL" sz="2500" dirty="0" smtClean="0">
+                    <a:latin typeface="Times New Roman" pitchFamily="18" charset="0"/>
+                  </a:rPr>
+                  <a:t> changes according to:</a:t>
+                </a:r>
+              </a:p>
+              <a:p>
+                <a:pPr eaLnBrk="1" hangingPunct="1">
+                  <a:spcBef>
+                    <a:spcPct val="10000"/>
+                  </a:spcBef>
+                </a:pPr>
+                <a:endParaRPr lang="en-US" altLang="he-IL" sz="2500" dirty="0" smtClean="0">
+                  <a:latin typeface="Times New Roman" pitchFamily="18" charset="0"/>
+                </a:endParaRPr>
+              </a:p>
+              <a:p>
+                <a:pPr eaLnBrk="1" hangingPunct="1">
+                  <a:spcBef>
+                    <a:spcPct val="10000"/>
+                  </a:spcBef>
+                </a:pPr>
+                <a14:m>
+                  <m:oMathPara xmlns:m="http://schemas.openxmlformats.org/officeDocument/2006/math">
+                    <m:oMathParaPr>
+                      <m:jc m:val="centerGroup"/>
+                    </m:oMathParaPr>
+                    <m:oMath xmlns:m="http://schemas.openxmlformats.org/officeDocument/2006/math">
+                      <m:r>
+                        <a:rPr lang="en-US" altLang="he-IL" sz="3200" b="0" i="1" smtClean="0">
+                          <a:latin typeface="Cambria Math"/>
+                        </a:rPr>
+                        <m:t>𝑝</m:t>
+                      </m:r>
+                      <m:d>
+                        <m:dPr>
+                          <m:ctrlPr>
+                            <a:rPr lang="en-US" altLang="he-IL" sz="3200" b="0" i="1" smtClean="0">
+                              <a:latin typeface="Cambria Math"/>
+                            </a:rPr>
+                          </m:ctrlPr>
+                        </m:dPr>
+                        <m:e>
+                          <m:r>
+                            <a:rPr lang="en-US" altLang="he-IL" sz="3200" b="0" i="1" smtClean="0">
+                              <a:latin typeface="Cambria Math"/>
+                            </a:rPr>
+                            <m:t>𝑡</m:t>
+                          </m:r>
+                        </m:e>
+                      </m:d>
+                      <m:r>
+                        <a:rPr lang="en-US" altLang="he-IL" sz="3200" b="0" i="1" smtClean="0">
+                          <a:latin typeface="Cambria Math"/>
+                        </a:rPr>
+                        <m:t>=</m:t>
+                      </m:r>
+                      <m:f>
+                        <m:fPr>
+                          <m:ctrlPr>
+                            <a:rPr lang="en-US" altLang="he-IL" sz="3200" b="0" i="1" smtClean="0">
+                              <a:latin typeface="Cambria Math"/>
+                            </a:rPr>
+                          </m:ctrlPr>
+                        </m:fPr>
+                        <m:num>
+                          <m:sSub>
+                            <m:sSubPr>
+                              <m:ctrlPr>
+                                <a:rPr lang="en-US" altLang="he-IL" sz="3200" b="0" i="1" smtClean="0">
+                                  <a:latin typeface="Cambria Math"/>
+                                </a:rPr>
+                              </m:ctrlPr>
+                            </m:sSubPr>
+                            <m:e>
+                              <m:r>
+                                <a:rPr lang="en-US" altLang="he-IL" sz="3200" b="0" i="1" smtClean="0">
+                                  <a:latin typeface="Cambria Math"/>
+                                </a:rPr>
+                                <m:t>𝑝</m:t>
+                              </m:r>
+                            </m:e>
+                            <m:sub>
+                              <m:r>
+                                <a:rPr lang="en-US" altLang="he-IL" sz="3200" b="0" i="1" smtClean="0">
+                                  <a:latin typeface="Cambria Math"/>
+                                </a:rPr>
+                                <m:t>0</m:t>
+                              </m:r>
+                            </m:sub>
+                          </m:sSub>
+                        </m:num>
+                        <m:den>
+                          <m:sSub>
+                            <m:sSubPr>
+                              <m:ctrlPr>
+                                <a:rPr lang="en-US" altLang="he-IL" sz="3200" b="0" i="1" smtClean="0">
+                                  <a:latin typeface="Cambria Math"/>
+                                </a:rPr>
+                              </m:ctrlPr>
+                            </m:sSubPr>
+                            <m:e>
+                              <m:r>
+                                <a:rPr lang="en-US" altLang="he-IL" sz="3200" b="0" i="1" smtClean="0">
+                                  <a:latin typeface="Cambria Math"/>
+                                </a:rPr>
+                                <m:t>𝑝</m:t>
+                              </m:r>
+                            </m:e>
+                            <m:sub>
+                              <m:r>
+                                <a:rPr lang="en-US" altLang="he-IL" sz="3200" b="0" i="1" smtClean="0">
+                                  <a:latin typeface="Cambria Math"/>
+                                </a:rPr>
+                                <m:t>0</m:t>
+                              </m:r>
+                            </m:sub>
+                          </m:sSub>
+                          <m:r>
+                            <a:rPr lang="en-US" altLang="he-IL" sz="3200" b="0" i="1" smtClean="0">
+                              <a:latin typeface="Cambria Math"/>
+                            </a:rPr>
+                            <m:t>+</m:t>
+                          </m:r>
+                          <m:d>
+                            <m:dPr>
+                              <m:ctrlPr>
+                                <a:rPr lang="en-US" altLang="he-IL" sz="3200" b="0" i="1" smtClean="0">
+                                  <a:latin typeface="Cambria Math"/>
+                                </a:rPr>
+                              </m:ctrlPr>
+                            </m:dPr>
+                            <m:e>
+                              <m:r>
+                                <a:rPr lang="en-US" altLang="he-IL" sz="3200" b="0" i="1" smtClean="0">
+                                  <a:latin typeface="Cambria Math"/>
+                                </a:rPr>
+                                <m:t>1</m:t>
+                              </m:r>
+                              <m:r>
+                                <a:rPr lang="en-US" altLang="he-IL" sz="3200" b="0" i="1" smtClean="0">
+                                  <a:latin typeface="Cambria Math"/>
+                                </a:rPr>
+                                <m:t>−</m:t>
+                              </m:r>
+                              <m:sSub>
+                                <m:sSubPr>
+                                  <m:ctrlPr>
+                                    <a:rPr lang="en-US" altLang="he-IL" sz="3200" b="0" i="1" smtClean="0">
+                                      <a:latin typeface="Cambria Math"/>
+                                    </a:rPr>
+                                  </m:ctrlPr>
+                                </m:sSubPr>
+                                <m:e>
+                                  <m:r>
+                                    <a:rPr lang="en-US" altLang="he-IL" sz="3200" b="0" i="1" smtClean="0">
+                                      <a:latin typeface="Cambria Math"/>
+                                    </a:rPr>
+                                    <m:t>𝑝</m:t>
+                                  </m:r>
+                                </m:e>
+                                <m:sub>
+                                  <m:r>
+                                    <a:rPr lang="en-US" altLang="he-IL" sz="3200" b="0" i="1" smtClean="0">
+                                      <a:latin typeface="Cambria Math"/>
+                                    </a:rPr>
+                                    <m:t>0</m:t>
+                                  </m:r>
+                                </m:sub>
+                              </m:sSub>
+                            </m:e>
+                          </m:d>
+                          <m:sSup>
+                            <m:sSupPr>
+                              <m:ctrlPr>
+                                <a:rPr lang="en-US" altLang="he-IL" sz="3200" b="0" i="1" smtClean="0">
+                                  <a:latin typeface="Cambria Math"/>
+                                </a:rPr>
+                              </m:ctrlPr>
+                            </m:sSupPr>
+                            <m:e>
+                              <m:r>
+                                <a:rPr lang="en-US" altLang="he-IL" sz="3200" b="0" i="1" smtClean="0">
+                                  <a:latin typeface="Cambria Math"/>
+                                </a:rPr>
+                                <m:t>𝑒</m:t>
+                              </m:r>
+                            </m:e>
+                            <m:sup>
+                              <m:r>
+                                <a:rPr lang="en-US" altLang="he-IL" sz="3200" b="0" i="1" smtClean="0">
+                                  <a:latin typeface="Cambria Math"/>
+                                </a:rPr>
+                                <m:t>−</m:t>
+                              </m:r>
+                              <m:r>
+                                <a:rPr lang="en-US" altLang="he-IL" sz="3200" b="0" i="1" smtClean="0">
+                                  <a:latin typeface="Cambria Math"/>
+                                </a:rPr>
+                                <m:t>𝑠𝑡</m:t>
+                              </m:r>
+                            </m:sup>
+                          </m:sSup>
+                        </m:den>
+                      </m:f>
+                    </m:oMath>
+                  </m:oMathPara>
+                </a14:m>
+                <a:endParaRPr lang="en-US" altLang="he-IL" sz="3200" dirty="0" smtClean="0">
+                  <a:latin typeface="Times New Roman" pitchFamily="18" charset="0"/>
+                </a:endParaRPr>
+              </a:p>
+              <a:p>
+                <a:pPr eaLnBrk="1" hangingPunct="1">
+                  <a:spcBef>
+                    <a:spcPct val="10000"/>
+                  </a:spcBef>
+                </a:pPr>
+                <a:endParaRPr lang="en-US" altLang="he-IL" sz="2500" b="0" i="1" dirty="0" smtClean="0">
+                  <a:latin typeface="Cambria Math"/>
+                </a:endParaRPr>
+              </a:p>
+              <a:p>
+                <a:pPr eaLnBrk="1" hangingPunct="1">
+                  <a:spcBef>
+                    <a:spcPct val="10000"/>
+                  </a:spcBef>
+                </a:pPr>
+                <a:r>
+                  <a:rPr lang="en-US" altLang="he-IL" sz="2500" dirty="0">
+                    <a:latin typeface="Times New Roman" pitchFamily="18" charset="0"/>
+                  </a:rPr>
+                  <a:t>Where</a:t>
+                </a:r>
+                <a:r>
+                  <a:rPr lang="en-US" altLang="he-IL" sz="2500" i="1" dirty="0" smtClean="0">
+                    <a:latin typeface="Cambria Math"/>
+                  </a:rPr>
+                  <a:t> </a:t>
+                </a:r>
+                <a14:m>
+                  <m:oMath xmlns:m="http://schemas.openxmlformats.org/officeDocument/2006/math">
+                    <m:sSub>
+                      <m:sSubPr>
+                        <m:ctrlPr>
+                          <a:rPr lang="en-US" altLang="he-IL" sz="2500" b="0" i="1" smtClean="0">
+                            <a:latin typeface="Cambria Math"/>
+                          </a:rPr>
+                        </m:ctrlPr>
+                      </m:sSubPr>
+                      <m:e>
+                        <m:r>
+                          <a:rPr lang="en-US" altLang="he-IL" sz="2500" b="0" i="1" smtClean="0">
+                            <a:latin typeface="Cambria Math"/>
+                          </a:rPr>
+                          <m:t>𝑝</m:t>
+                        </m:r>
+                      </m:e>
+                      <m:sub>
+                        <m:r>
+                          <a:rPr lang="en-US" altLang="he-IL" sz="2500" b="0" i="1" smtClean="0">
+                            <a:latin typeface="Cambria Math"/>
+                          </a:rPr>
+                          <m:t>0</m:t>
+                        </m:r>
+                      </m:sub>
+                    </m:sSub>
+                  </m:oMath>
+                </a14:m>
+                <a:r>
+                  <a:rPr lang="en-US" altLang="he-IL" sz="2500" dirty="0" smtClean="0">
+                    <a:latin typeface="Times New Roman" pitchFamily="18" charset="0"/>
+                  </a:rPr>
+                  <a:t> </a:t>
+                </a:r>
+                <a:r>
+                  <a:rPr lang="en-US" altLang="he-IL" sz="2500" dirty="0" smtClean="0">
+                    <a:latin typeface="Times New Roman" pitchFamily="18" charset="0"/>
+                  </a:rPr>
+                  <a:t>is the </a:t>
+                </a:r>
+                <a:r>
+                  <a:rPr lang="en-US" altLang="he-IL" sz="2500" dirty="0" smtClean="0">
+                    <a:latin typeface="Times New Roman" pitchFamily="18" charset="0"/>
+                  </a:rPr>
+                  <a:t>initial </a:t>
+                </a:r>
+                <a:r>
+                  <a:rPr lang="en-US" altLang="he-IL" sz="2500" dirty="0" smtClean="0">
+                    <a:latin typeface="Times New Roman" pitchFamily="18" charset="0"/>
+                  </a:rPr>
+                  <a:t>frequency and </a:t>
+                </a:r>
+                <a14:m>
+                  <m:oMath xmlns:m="http://schemas.openxmlformats.org/officeDocument/2006/math">
+                    <m:r>
+                      <a:rPr lang="en-US" altLang="he-IL" sz="2500" b="0" i="1" smtClean="0">
+                        <a:latin typeface="Cambria Math"/>
+                      </a:rPr>
+                      <m:t>𝑠</m:t>
+                    </m:r>
+                  </m:oMath>
+                </a14:m>
+                <a:r>
+                  <a:rPr lang="en-US" altLang="he-IL" sz="2500" dirty="0" smtClean="0">
+                    <a:latin typeface="Times New Roman" pitchFamily="18" charset="0"/>
+                  </a:rPr>
+                  <a:t> </a:t>
+                </a:r>
+                <a:r>
+                  <a:rPr lang="en-US" altLang="he-IL" sz="2500" dirty="0" smtClean="0">
+                    <a:latin typeface="Times New Roman" pitchFamily="18" charset="0"/>
+                  </a:rPr>
+                  <a:t>is the </a:t>
+                </a:r>
+                <a:r>
+                  <a:rPr lang="en-US" altLang="he-IL" sz="2500" dirty="0" smtClean="0">
+                    <a:latin typeface="Times New Roman" pitchFamily="18" charset="0"/>
+                  </a:rPr>
+                  <a:t>selection </a:t>
+                </a:r>
+                <a:r>
+                  <a:rPr lang="en-US" altLang="he-IL" sz="2500" dirty="0" smtClean="0">
+                    <a:latin typeface="Times New Roman" pitchFamily="18" charset="0"/>
+                  </a:rPr>
+                  <a:t>coefficient for the red strain.</a:t>
+                </a:r>
+              </a:p>
+              <a:p>
+                <a:pPr eaLnBrk="1" hangingPunct="1">
+                  <a:spcBef>
+                    <a:spcPct val="10000"/>
+                  </a:spcBef>
+                </a:pPr>
+                <a:endParaRPr lang="en-US" altLang="he-IL" sz="2500" dirty="0">
+                  <a:latin typeface="Times New Roman" pitchFamily="18" charset="0"/>
+                </a:endParaRPr>
+              </a:p>
+              <a:p>
+                <a:pPr eaLnBrk="1" hangingPunct="1">
+                  <a:spcBef>
+                    <a:spcPct val="10000"/>
+                  </a:spcBef>
+                </a:pPr>
+                <a:endParaRPr lang="en-US" altLang="he-IL" sz="2500" dirty="0" smtClean="0">
+                  <a:latin typeface="Times New Roman" pitchFamily="18" charset="0"/>
+                </a:endParaRPr>
+              </a:p>
+              <a:p>
+                <a:pPr eaLnBrk="1" hangingPunct="1">
+                  <a:spcBef>
+                    <a:spcPct val="10000"/>
+                  </a:spcBef>
+                </a:pPr>
+                <a:endParaRPr lang="en-US" altLang="he-IL" sz="2500" dirty="0">
+                  <a:latin typeface="Times New Roman" pitchFamily="18" charset="0"/>
+                </a:endParaRPr>
+              </a:p>
+              <a:p>
+                <a:pPr eaLnBrk="1" hangingPunct="1">
+                  <a:spcBef>
+                    <a:spcPct val="10000"/>
+                  </a:spcBef>
+                </a:pPr>
+                <a:endParaRPr lang="en-US" altLang="he-IL" sz="2500" dirty="0" smtClean="0">
+                  <a:latin typeface="Times New Roman" pitchFamily="18" charset="0"/>
+                </a:endParaRPr>
+              </a:p>
+              <a:p>
+                <a:pPr eaLnBrk="1" hangingPunct="1">
+                  <a:spcBef>
+                    <a:spcPct val="10000"/>
+                  </a:spcBef>
+                </a:pPr>
+                <a:endParaRPr lang="en-US" altLang="he-IL" sz="2500" dirty="0">
+                  <a:latin typeface="Times New Roman" pitchFamily="18" charset="0"/>
+                </a:endParaRPr>
+              </a:p>
+              <a:p>
+                <a:pPr eaLnBrk="1" hangingPunct="1">
+                  <a:spcBef>
+                    <a:spcPct val="10000"/>
+                  </a:spcBef>
+                </a:pPr>
+                <a:endParaRPr lang="en-US" altLang="he-IL" sz="2500" dirty="0" smtClean="0">
+                  <a:latin typeface="Times New Roman" pitchFamily="18" charset="0"/>
+                </a:endParaRPr>
+              </a:p>
+              <a:p>
+                <a:pPr eaLnBrk="1" hangingPunct="1">
+                  <a:spcBef>
+                    <a:spcPct val="10000"/>
+                  </a:spcBef>
+                </a:pPr>
+                <a:endParaRPr lang="en-US" altLang="he-IL" sz="2500" dirty="0">
+                  <a:latin typeface="Times New Roman" pitchFamily="18" charset="0"/>
+                </a:endParaRPr>
+              </a:p>
+              <a:p>
+                <a:pPr eaLnBrk="1" hangingPunct="1">
+                  <a:spcBef>
+                    <a:spcPct val="10000"/>
+                  </a:spcBef>
+                </a:pPr>
+                <a:endParaRPr lang="en-US" altLang="he-IL" sz="2500" dirty="0" smtClean="0">
+                  <a:latin typeface="Times New Roman" pitchFamily="18" charset="0"/>
+                </a:endParaRPr>
+              </a:p>
+              <a:p>
+                <a:pPr eaLnBrk="1" hangingPunct="1">
+                  <a:spcBef>
+                    <a:spcPct val="10000"/>
+                  </a:spcBef>
+                </a:pPr>
+                <a:endParaRPr lang="en-US" altLang="he-IL" sz="2500" dirty="0">
+                  <a:latin typeface="Times New Roman" pitchFamily="18" charset="0"/>
+                </a:endParaRPr>
+              </a:p>
+              <a:p>
+                <a:pPr eaLnBrk="1" hangingPunct="1">
+                  <a:spcBef>
+                    <a:spcPct val="10000"/>
+                  </a:spcBef>
+                </a:pPr>
+                <a:endParaRPr lang="en-US" altLang="he-IL" sz="2500" dirty="0" smtClean="0">
+                  <a:latin typeface="Times New Roman" pitchFamily="18" charset="0"/>
+                </a:endParaRPr>
+              </a:p>
+              <a:p>
+                <a:pPr eaLnBrk="1" hangingPunct="1">
+                  <a:spcBef>
+                    <a:spcPct val="10000"/>
+                  </a:spcBef>
+                </a:pPr>
+                <a:endParaRPr lang="en-US" altLang="he-IL" sz="2500" dirty="0">
+                  <a:latin typeface="Times New Roman" pitchFamily="18" charset="0"/>
+                </a:endParaRPr>
+              </a:p>
+              <a:p>
+                <a:pPr eaLnBrk="1" hangingPunct="1">
+                  <a:spcBef>
+                    <a:spcPct val="10000"/>
+                  </a:spcBef>
+                </a:pPr>
+                <a:endParaRPr lang="en-US" altLang="he-IL" sz="2500" dirty="0" smtClean="0">
+                  <a:latin typeface="Times New Roman" pitchFamily="18" charset="0"/>
+                </a:endParaRPr>
+              </a:p>
+              <a:p>
+                <a:pPr eaLnBrk="1" hangingPunct="1">
+                  <a:spcBef>
+                    <a:spcPct val="10000"/>
+                  </a:spcBef>
+                </a:pPr>
+                <a:endParaRPr lang="en-US" altLang="he-IL" sz="2500" dirty="0">
+                  <a:latin typeface="Times New Roman" pitchFamily="18" charset="0"/>
+                </a:endParaRPr>
+              </a:p>
+              <a:p>
+                <a:pPr eaLnBrk="1" hangingPunct="1">
+                  <a:spcBef>
+                    <a:spcPct val="10000"/>
+                  </a:spcBef>
+                </a:pPr>
+                <a:endParaRPr lang="en-US" altLang="he-IL" sz="2500" dirty="0" smtClean="0">
+                  <a:latin typeface="Times New Roman" pitchFamily="18" charset="0"/>
+                </a:endParaRPr>
+              </a:p>
+              <a:p>
+                <a:pPr eaLnBrk="1" hangingPunct="1">
+                  <a:spcBef>
+                    <a:spcPct val="10000"/>
+                  </a:spcBef>
+                </a:pPr>
+                <a:endParaRPr lang="en-US" altLang="he-IL" sz="2500" dirty="0">
+                  <a:latin typeface="Times New Roman" pitchFamily="18" charset="0"/>
+                </a:endParaRPr>
+              </a:p>
+              <a:p>
+                <a:pPr eaLnBrk="1" hangingPunct="1">
+                  <a:spcBef>
+                    <a:spcPct val="10000"/>
+                  </a:spcBef>
+                </a:pPr>
+                <a:endParaRPr lang="en-US" altLang="he-IL" sz="2500" dirty="0" smtClean="0">
+                  <a:latin typeface="Times New Roman" pitchFamily="18" charset="0"/>
+                </a:endParaRPr>
+              </a:p>
+              <a:p>
+                <a:pPr eaLnBrk="1" hangingPunct="1">
+                  <a:spcBef>
+                    <a:spcPct val="10000"/>
+                  </a:spcBef>
+                </a:pPr>
+                <a:endParaRPr lang="en-US" altLang="he-IL" sz="2500" dirty="0">
+                  <a:latin typeface="Times New Roman" pitchFamily="18" charset="0"/>
+                </a:endParaRPr>
+              </a:p>
+            </p:txBody>
+          </p:sp>
+        </mc:Choice>
+        <mc:Fallback>
+          <p:sp>
+            <p:nvSpPr>
+              <p:cNvPr id="51" name="Text Box 11"/>
+              <p:cNvSpPr txBox="1">
+                <a:spLocks noRot="1" noChangeAspect="1" noMove="1" noResize="1" noEditPoints="1" noAdjustHandles="1" noChangeArrowheads="1" noChangeShapeType="1" noTextEdit="1"/>
+              </p:cNvSpPr>
+              <p:nvPr/>
+            </p:nvSpPr>
+            <p:spPr bwMode="auto">
+              <a:xfrm>
+                <a:off x="10944000" y="19716750"/>
+                <a:ext cx="8458200" cy="14363700"/>
+              </a:xfrm>
+              <a:prstGeom prst="rect">
+                <a:avLst/>
+              </a:prstGeom>
+              <a:blipFill rotWithShape="1">
+                <a:blip r:embed="rId4"/>
+                <a:stretch>
+                  <a:fillRect/>
+                </a:stretch>
+              </a:blipFill>
+              <a:ln w="38100">
+                <a:solidFill>
+                  <a:srgbClr val="000000"/>
+                </a:solidFill>
+                <a:round/>
+                <a:headEnd/>
+                <a:tailEnd/>
+              </a:ln>
+            </p:spPr>
+            <p:txBody>
+              <a:bodyPr/>
+              <a:lstStyle/>
+              <a:p>
+                <a:r>
+                  <a:rPr lang="he-IL">
+                    <a:noFill/>
+                  </a:rPr>
+                  <a:t> </a:t>
+                </a:r>
+              </a:p>
+            </p:txBody>
+          </p:sp>
+        </mc:Fallback>
+      </mc:AlternateContent>
+      <p:pic>
+        <p:nvPicPr>
+          <p:cNvPr id="15" name="Picture 2" descr="D:\university\presentations\GRC 2015\frequency_fit.png"/>
+          <p:cNvPicPr>
+            <a:picLocks noChangeAspect="1" noChangeArrowheads="1"/>
+          </p:cNvPicPr>
+          <p:nvPr/>
+        </p:nvPicPr>
+        <p:blipFill>
+          <a:blip r:embed="rId5">
+            <a:extLst>
+              <a:ext uri="{28A0092B-C50C-407E-A947-70E740481C1C}">
+                <a14:useLocalDpi xmlns:a14="http://schemas.microsoft.com/office/drawing/2010/main" val="0"/>
+              </a:ext>
+            </a:extLst>
+          </a:blip>
+          <a:srcRect/>
+          <a:stretch>
+            <a:fillRect/>
+          </a:stretch>
+        </p:blipFill>
+        <p:spPr bwMode="auto">
+          <a:xfrm>
+            <a:off x="11304000" y="28544400"/>
+            <a:ext cx="7748587" cy="5310188"/>
+          </a:xfrm>
+          <a:prstGeom prst="rect">
+            <a:avLst/>
+          </a:prstGeom>
+          <a:noFill/>
+          <a:extLst>
+            <a:ext uri="{909E8E84-426E-40DD-AFC4-6F175D3DCCD1}">
+              <a14:hiddenFill xmlns:a14="http://schemas.microsoft.com/office/drawing/2010/main">
+                <a:solidFill>
+                  <a:srgbClr val="FFFFFF"/>
+                </a:solidFill>
+              </a14:hiddenFill>
+            </a:ext>
+          </a:extLst>
+        </p:spPr>
+      </p:pic>
       <p:pic>
         <p:nvPicPr>
           <p:cNvPr id="1052" name="Picture 28" descr="D:\workspace\curveball_project\gh-pages\img\logo_200px.png"/>
@@ -4193,7 +5033,7 @@
           <p:nvPr/>
         </p:nvPicPr>
         <p:blipFill>
-          <a:blip r:embed="rId4">
+          <a:blip r:embed="rId6">
             <a:extLst>
               <a:ext uri="{28A0092B-C50C-407E-A947-70E740481C1C}">
                 <a14:useLocalDpi xmlns:a14="http://schemas.microsoft.com/office/drawing/2010/main" val="0"/>
@@ -4390,13 +5230,13 @@
             </a:lvl9pPr>
           </a:lstStyle>
           <a:p>
-            <a:pPr eaLnBrk="1" hangingPunct="1">
+            <a:pPr indent="180000" eaLnBrk="1" hangingPunct="1">
               <a:spcBef>
                 <a:spcPct val="50000"/>
               </a:spcBef>
             </a:pPr>
             <a:r>
-              <a:rPr lang="en-US" altLang="he-IL" sz="3900" b="1" dirty="0" smtClean="0">
+              <a:rPr lang="en-US" altLang="he-IL" sz="4200" b="1" dirty="0" smtClean="0">
                 <a:solidFill>
                   <a:srgbClr val="000000"/>
                 </a:solidFill>
@@ -4404,7 +5244,7 @@
               </a:rPr>
               <a:t>Experimental test</a:t>
             </a:r>
-            <a:endParaRPr lang="en-US" altLang="he-IL" sz="3900" b="1" dirty="0">
+            <a:endParaRPr lang="en-US" altLang="he-IL" sz="4200" b="1" dirty="0">
               <a:solidFill>
                 <a:srgbClr val="000000"/>
               </a:solidFill>
@@ -4412,7 +5252,7 @@
             </a:endParaRPr>
           </a:p>
           <a:p>
-            <a:pPr eaLnBrk="1" hangingPunct="1">
+            <a:pPr indent="180000" eaLnBrk="1" hangingPunct="1">
               <a:spcBef>
                 <a:spcPct val="10000"/>
               </a:spcBef>
@@ -4476,7 +5316,7 @@
             </a:r>
           </a:p>
           <a:p>
-            <a:pPr eaLnBrk="1" hangingPunct="1">
+            <a:pPr indent="180000" eaLnBrk="1" hangingPunct="1">
               <a:spcBef>
                 <a:spcPct val="10000"/>
               </a:spcBef>
@@ -4486,7 +5326,7 @@
             </a:endParaRPr>
           </a:p>
           <a:p>
-            <a:pPr eaLnBrk="1" hangingPunct="1">
+            <a:pPr indent="180000" eaLnBrk="1" hangingPunct="1">
               <a:spcBef>
                 <a:spcPct val="10000"/>
               </a:spcBef>
@@ -4496,7 +5336,7 @@
             </a:endParaRPr>
           </a:p>
           <a:p>
-            <a:pPr eaLnBrk="1" hangingPunct="1">
+            <a:pPr indent="180000" eaLnBrk="1" hangingPunct="1">
               <a:spcBef>
                 <a:spcPct val="10000"/>
               </a:spcBef>
@@ -4506,7 +5346,7 @@
             </a:endParaRPr>
           </a:p>
           <a:p>
-            <a:pPr eaLnBrk="1" hangingPunct="1">
+            <a:pPr indent="180000" eaLnBrk="1" hangingPunct="1">
               <a:spcBef>
                 <a:spcPct val="10000"/>
               </a:spcBef>
@@ -4516,7 +5356,7 @@
             </a:endParaRPr>
           </a:p>
           <a:p>
-            <a:pPr eaLnBrk="1" hangingPunct="1">
+            <a:pPr indent="180000" eaLnBrk="1" hangingPunct="1">
               <a:spcBef>
                 <a:spcPct val="10000"/>
               </a:spcBef>
@@ -4526,7 +5366,7 @@
             </a:endParaRPr>
           </a:p>
           <a:p>
-            <a:pPr eaLnBrk="1" hangingPunct="1">
+            <a:pPr indent="180000" eaLnBrk="1" hangingPunct="1">
               <a:spcBef>
                 <a:spcPct val="10000"/>
               </a:spcBef>
@@ -4536,7 +5376,7 @@
             </a:endParaRPr>
           </a:p>
           <a:p>
-            <a:pPr eaLnBrk="1" hangingPunct="1">
+            <a:pPr indent="180000" eaLnBrk="1" hangingPunct="1">
               <a:spcBef>
                 <a:spcPct val="10000"/>
               </a:spcBef>
@@ -4546,7 +5386,7 @@
             </a:endParaRPr>
           </a:p>
           <a:p>
-            <a:pPr eaLnBrk="1" hangingPunct="1">
+            <a:pPr indent="180000" eaLnBrk="1" hangingPunct="1">
               <a:spcBef>
                 <a:spcPct val="10000"/>
               </a:spcBef>
@@ -4556,7 +5396,7 @@
             </a:endParaRPr>
           </a:p>
           <a:p>
-            <a:pPr eaLnBrk="1" hangingPunct="1">
+            <a:pPr indent="180000" eaLnBrk="1" hangingPunct="1">
               <a:spcBef>
                 <a:spcPct val="10000"/>
               </a:spcBef>
@@ -4566,7 +5406,7 @@
             </a:endParaRPr>
           </a:p>
           <a:p>
-            <a:pPr eaLnBrk="1" hangingPunct="1">
+            <a:pPr indent="180000" eaLnBrk="1" hangingPunct="1">
               <a:spcBef>
                 <a:spcPct val="10000"/>
               </a:spcBef>
@@ -4576,7 +5416,7 @@
             </a:endParaRPr>
           </a:p>
           <a:p>
-            <a:pPr eaLnBrk="1" hangingPunct="1">
+            <a:pPr indent="180000" eaLnBrk="1" hangingPunct="1">
               <a:spcBef>
                 <a:spcPct val="10000"/>
               </a:spcBef>
@@ -4586,7 +5426,7 @@
             </a:endParaRPr>
           </a:p>
           <a:p>
-            <a:pPr eaLnBrk="1" hangingPunct="1">
+            <a:pPr indent="180000" eaLnBrk="1" hangingPunct="1">
               <a:spcBef>
                 <a:spcPct val="10000"/>
               </a:spcBef>
@@ -4596,7 +5436,7 @@
             </a:endParaRPr>
           </a:p>
           <a:p>
-            <a:pPr eaLnBrk="1" hangingPunct="1">
+            <a:pPr indent="180000" eaLnBrk="1" hangingPunct="1">
               <a:spcBef>
                 <a:spcPct val="10000"/>
               </a:spcBef>
@@ -4606,7 +5446,7 @@
             </a:endParaRPr>
           </a:p>
           <a:p>
-            <a:pPr eaLnBrk="1" hangingPunct="1">
+            <a:pPr indent="180000" eaLnBrk="1" hangingPunct="1">
               <a:spcBef>
                 <a:spcPct val="10000"/>
               </a:spcBef>
@@ -4616,7 +5456,7 @@
             </a:endParaRPr>
           </a:p>
           <a:p>
-            <a:pPr eaLnBrk="1" hangingPunct="1">
+            <a:pPr indent="180000" eaLnBrk="1" hangingPunct="1">
               <a:spcBef>
                 <a:spcPct val="10000"/>
               </a:spcBef>
@@ -4626,7 +5466,7 @@
             </a:endParaRPr>
           </a:p>
           <a:p>
-            <a:pPr eaLnBrk="1" hangingPunct="1">
+            <a:pPr indent="180000" eaLnBrk="1" hangingPunct="1">
               <a:spcBef>
                 <a:spcPct val="10000"/>
               </a:spcBef>
@@ -4636,7 +5476,7 @@
             </a:endParaRPr>
           </a:p>
           <a:p>
-            <a:pPr eaLnBrk="1" hangingPunct="1">
+            <a:pPr indent="180000" eaLnBrk="1" hangingPunct="1">
               <a:spcBef>
                 <a:spcPct val="10000"/>
               </a:spcBef>
@@ -4646,7 +5486,7 @@
             </a:endParaRPr>
           </a:p>
           <a:p>
-            <a:pPr eaLnBrk="1" hangingPunct="1">
+            <a:pPr indent="180000" eaLnBrk="1" hangingPunct="1">
               <a:spcBef>
                 <a:spcPct val="10000"/>
               </a:spcBef>
@@ -4656,7 +5496,7 @@
             </a:endParaRPr>
           </a:p>
           <a:p>
-            <a:pPr eaLnBrk="1" hangingPunct="1">
+            <a:pPr indent="180000" eaLnBrk="1" hangingPunct="1">
               <a:spcBef>
                 <a:spcPct val="10000"/>
               </a:spcBef>
@@ -4666,7 +5506,7 @@
             </a:endParaRPr>
           </a:p>
           <a:p>
-            <a:pPr eaLnBrk="1" hangingPunct="1">
+            <a:pPr indent="180000" eaLnBrk="1" hangingPunct="1">
               <a:spcBef>
                 <a:spcPct val="10000"/>
               </a:spcBef>
@@ -4676,7 +5516,7 @@
             </a:endParaRPr>
           </a:p>
           <a:p>
-            <a:pPr eaLnBrk="1" hangingPunct="1">
+            <a:pPr indent="180000" eaLnBrk="1" hangingPunct="1">
               <a:spcBef>
                 <a:spcPct val="10000"/>
               </a:spcBef>
@@ -4686,7 +5526,7 @@
             </a:endParaRPr>
           </a:p>
           <a:p>
-            <a:pPr eaLnBrk="1" hangingPunct="1">
+            <a:pPr indent="180000" eaLnBrk="1" hangingPunct="1">
               <a:spcBef>
                 <a:spcPct val="10000"/>
               </a:spcBef>
@@ -4696,7 +5536,7 @@
             </a:endParaRPr>
           </a:p>
           <a:p>
-            <a:pPr eaLnBrk="1" hangingPunct="1">
+            <a:pPr indent="180000" eaLnBrk="1" hangingPunct="1">
               <a:spcBef>
                 <a:spcPct val="10000"/>
               </a:spcBef>
@@ -4706,7 +5546,7 @@
             </a:endParaRPr>
           </a:p>
           <a:p>
-            <a:pPr eaLnBrk="1" hangingPunct="1">
+            <a:pPr indent="180000" eaLnBrk="1" hangingPunct="1">
               <a:spcBef>
                 <a:spcPct val="10000"/>
               </a:spcBef>
@@ -4716,7 +5556,7 @@
             </a:endParaRPr>
           </a:p>
           <a:p>
-            <a:pPr eaLnBrk="1" hangingPunct="1">
+            <a:pPr indent="180000" eaLnBrk="1" hangingPunct="1">
               <a:spcBef>
                 <a:spcPct val="10000"/>
               </a:spcBef>
@@ -4726,7 +5566,7 @@
             </a:endParaRPr>
           </a:p>
           <a:p>
-            <a:pPr eaLnBrk="1" hangingPunct="1">
+            <a:pPr indent="180000" eaLnBrk="1" hangingPunct="1">
               <a:spcBef>
                 <a:spcPct val="10000"/>
               </a:spcBef>
@@ -4736,7 +5576,7 @@
             </a:endParaRPr>
           </a:p>
           <a:p>
-            <a:pPr eaLnBrk="1" hangingPunct="1">
+            <a:pPr indent="180000" eaLnBrk="1" hangingPunct="1">
               <a:spcBef>
                 <a:spcPct val="10000"/>
               </a:spcBef>
@@ -4746,7 +5586,7 @@
             </a:endParaRPr>
           </a:p>
           <a:p>
-            <a:pPr eaLnBrk="1" hangingPunct="1">
+            <a:pPr indent="180000" eaLnBrk="1" hangingPunct="1">
               <a:spcBef>
                 <a:spcPct val="10000"/>
               </a:spcBef>
@@ -4756,7 +5596,7 @@
             </a:endParaRPr>
           </a:p>
           <a:p>
-            <a:pPr eaLnBrk="1" hangingPunct="1">
+            <a:pPr indent="180000" eaLnBrk="1" hangingPunct="1">
               <a:spcBef>
                 <a:spcPct val="10000"/>
               </a:spcBef>
@@ -4766,7 +5606,7 @@
             </a:endParaRPr>
           </a:p>
           <a:p>
-            <a:pPr eaLnBrk="1" hangingPunct="1">
+            <a:pPr indent="180000" eaLnBrk="1" hangingPunct="1">
               <a:spcBef>
                 <a:spcPct val="10000"/>
               </a:spcBef>
@@ -4776,7 +5616,7 @@
             </a:endParaRPr>
           </a:p>
           <a:p>
-            <a:pPr eaLnBrk="1" hangingPunct="1">
+            <a:pPr indent="180000" eaLnBrk="1" hangingPunct="1">
               <a:spcBef>
                 <a:spcPct val="10000"/>
               </a:spcBef>
@@ -4786,7 +5626,7 @@
             </a:endParaRPr>
           </a:p>
           <a:p>
-            <a:pPr eaLnBrk="1" hangingPunct="1">
+            <a:pPr indent="180000" eaLnBrk="1" hangingPunct="1">
               <a:spcBef>
                 <a:spcPct val="10000"/>
               </a:spcBef>
@@ -4796,7 +5636,7 @@
             </a:endParaRPr>
           </a:p>
           <a:p>
-            <a:pPr eaLnBrk="1" hangingPunct="1">
+            <a:pPr indent="180000" eaLnBrk="1" hangingPunct="1">
               <a:spcBef>
                 <a:spcPct val="10000"/>
               </a:spcBef>
@@ -4806,7 +5646,7 @@
             </a:endParaRPr>
           </a:p>
           <a:p>
-            <a:pPr eaLnBrk="1" hangingPunct="1">
+            <a:pPr indent="180000" eaLnBrk="1" hangingPunct="1">
               <a:spcBef>
                 <a:spcPct val="10000"/>
               </a:spcBef>
@@ -4816,7 +5656,7 @@
             </a:endParaRPr>
           </a:p>
           <a:p>
-            <a:pPr eaLnBrk="1" hangingPunct="1">
+            <a:pPr indent="180000" eaLnBrk="1" hangingPunct="1">
               <a:spcBef>
                 <a:spcPct val="10000"/>
               </a:spcBef>
@@ -4826,7 +5666,7 @@
             </a:endParaRPr>
           </a:p>
           <a:p>
-            <a:pPr eaLnBrk="1" hangingPunct="1">
+            <a:pPr indent="180000" eaLnBrk="1" hangingPunct="1">
               <a:spcBef>
                 <a:spcPct val="10000"/>
               </a:spcBef>
@@ -4836,7 +5676,7 @@
             </a:endParaRPr>
           </a:p>
           <a:p>
-            <a:pPr eaLnBrk="1" hangingPunct="1">
+            <a:pPr indent="180000" eaLnBrk="1" hangingPunct="1">
               <a:spcBef>
                 <a:spcPct val="10000"/>
               </a:spcBef>
@@ -4846,7 +5686,7 @@
             </a:endParaRPr>
           </a:p>
           <a:p>
-            <a:pPr eaLnBrk="1" hangingPunct="1">
+            <a:pPr indent="180000" eaLnBrk="1" hangingPunct="1">
               <a:spcBef>
                 <a:spcPct val="10000"/>
               </a:spcBef>
@@ -4856,7 +5696,7 @@
             </a:endParaRPr>
           </a:p>
           <a:p>
-            <a:pPr eaLnBrk="1" hangingPunct="1">
+            <a:pPr indent="180000" eaLnBrk="1" hangingPunct="1">
               <a:spcBef>
                 <a:spcPct val="10000"/>
               </a:spcBef>
@@ -4866,7 +5706,7 @@
             </a:endParaRPr>
           </a:p>
           <a:p>
-            <a:pPr eaLnBrk="1" hangingPunct="1">
+            <a:pPr indent="180000" eaLnBrk="1" hangingPunct="1">
               <a:spcBef>
                 <a:spcPct val="10000"/>
               </a:spcBef>
@@ -4876,7 +5716,7 @@
             </a:endParaRPr>
           </a:p>
           <a:p>
-            <a:pPr eaLnBrk="1" hangingPunct="1">
+            <a:pPr indent="180000" eaLnBrk="1" hangingPunct="1">
               <a:spcBef>
                 <a:spcPct val="10000"/>
               </a:spcBef>
@@ -4886,7 +5726,7 @@
             </a:endParaRPr>
           </a:p>
           <a:p>
-            <a:pPr eaLnBrk="1" hangingPunct="1">
+            <a:pPr indent="180000" eaLnBrk="1" hangingPunct="1">
               <a:spcBef>
                 <a:spcPct val="10000"/>
               </a:spcBef>
@@ -4896,7 +5736,7 @@
             </a:endParaRPr>
           </a:p>
           <a:p>
-            <a:pPr eaLnBrk="1" hangingPunct="1">
+            <a:pPr indent="180000" eaLnBrk="1" hangingPunct="1">
               <a:spcBef>
                 <a:spcPct val="10000"/>
               </a:spcBef>
@@ -4906,7 +5746,7 @@
             </a:endParaRPr>
           </a:p>
           <a:p>
-            <a:pPr eaLnBrk="1" hangingPunct="1">
+            <a:pPr indent="180000" eaLnBrk="1" hangingPunct="1">
               <a:spcBef>
                 <a:spcPct val="10000"/>
               </a:spcBef>
@@ -4915,19 +5755,7 @@
               <a:rPr lang="en-US" altLang="he-IL" sz="2500" dirty="0" smtClean="0">
                 <a:latin typeface="Times New Roman" pitchFamily="18" charset="0"/>
               </a:rPr>
-              <a:t>The total OD in the </a:t>
-            </a:r>
-            <a:r>
-              <a:rPr lang="en-US" altLang="he-IL" sz="2500" dirty="0" smtClean="0">
-                <a:latin typeface="Times New Roman" pitchFamily="18" charset="0"/>
-              </a:rPr>
-              <a:t>model predictions </a:t>
-            </a:r>
-            <a:r>
-              <a:rPr lang="en-US" altLang="he-IL" sz="2500" dirty="0" smtClean="0">
-                <a:latin typeface="Times New Roman" pitchFamily="18" charset="0"/>
-              </a:rPr>
-              <a:t>(solid blue line) has a </a:t>
+              <a:t>The total OD in the model predictions (solid blue line) has a </a:t>
             </a:r>
             <a:r>
               <a:rPr lang="en-US" altLang="he-IL" sz="2500" b="1" dirty="0" smtClean="0">
@@ -4939,35 +5767,11 @@
               <a:rPr lang="en-US" altLang="he-IL" sz="2500" dirty="0" smtClean="0">
                 <a:latin typeface="Times New Roman" pitchFamily="18" charset="0"/>
               </a:rPr>
-              <a:t>with the </a:t>
-            </a:r>
-            <a:r>
-              <a:rPr lang="en-US" altLang="he-IL" sz="2500" dirty="0" smtClean="0">
-                <a:latin typeface="Times New Roman" pitchFamily="18" charset="0"/>
-              </a:rPr>
-              <a:t>total </a:t>
-            </a:r>
-            <a:r>
-              <a:rPr lang="en-US" altLang="he-IL" sz="2500" dirty="0" smtClean="0">
-                <a:latin typeface="Times New Roman" pitchFamily="18" charset="0"/>
-              </a:rPr>
-              <a:t>OD in </a:t>
-            </a:r>
-            <a:r>
-              <a:rPr lang="en-US" altLang="he-IL" sz="2500" smtClean="0">
-                <a:latin typeface="Times New Roman" pitchFamily="18" charset="0"/>
-              </a:rPr>
-              <a:t>competition experiments </a:t>
-            </a:r>
-            <a:r>
-              <a:rPr lang="en-US" altLang="he-IL" sz="2500" dirty="0" smtClean="0">
-                <a:latin typeface="Times New Roman" pitchFamily="18" charset="0"/>
-              </a:rPr>
-              <a:t>(black markers).</a:t>
-            </a:r>
-          </a:p>
-          <a:p>
-            <a:pPr eaLnBrk="1" hangingPunct="1">
+              <a:t>with the total OD in competition experiments (black markers).</a:t>
+            </a:r>
+          </a:p>
+          <a:p>
+            <a:pPr indent="180000" eaLnBrk="1" hangingPunct="1">
               <a:spcBef>
                 <a:spcPct val="10000"/>
               </a:spcBef>
@@ -4977,7 +5781,7 @@
             </a:endParaRPr>
           </a:p>
           <a:p>
-            <a:pPr eaLnBrk="1" hangingPunct="1">
+            <a:pPr indent="180000" eaLnBrk="1" hangingPunct="1">
               <a:spcBef>
                 <a:spcPct val="10000"/>
               </a:spcBef>
@@ -4986,1287 +5790,20 @@
               <a:rPr lang="en-US" altLang="he-IL" sz="2500" dirty="0" smtClean="0">
                 <a:latin typeface="Times New Roman" pitchFamily="18" charset="0"/>
               </a:rPr>
-              <a:t>Further validation will require measuring the frequency of the strains in experimental competitions. This will be achieved using fluorescent markers and flow cytometry or fluorescent microscopy.</a:t>
-            </a:r>
-          </a:p>
-          <a:p>
-            <a:pPr eaLnBrk="1" hangingPunct="1">
-              <a:spcBef>
-                <a:spcPct val="10000"/>
-              </a:spcBef>
-            </a:pPr>
+              <a:t>Further validation will require measuring the frequency of the strains in experimental competitions. This will be achieved using fluorescent markers and flow cytometry or fluorescent microscopy</a:t>
+            </a:r>
+            <a:r>
+              <a:rPr lang="en-US" altLang="he-IL" sz="2500" dirty="0" smtClean="0">
+                <a:latin typeface="Times New Roman" pitchFamily="18" charset="0"/>
+              </a:rPr>
+              <a:t>.</a:t>
+            </a:r>
             <a:endParaRPr lang="en-US" altLang="he-IL" sz="2500" dirty="0">
               <a:latin typeface="Times New Roman" pitchFamily="18" charset="0"/>
             </a:endParaRPr>
           </a:p>
-          <a:p>
-            <a:pPr eaLnBrk="1" hangingPunct="1">
-              <a:spcBef>
-                <a:spcPct val="10000"/>
-              </a:spcBef>
-            </a:pPr>
-            <a:endParaRPr lang="en-US" altLang="he-IL" sz="2500" dirty="0" smtClean="0">
-              <a:latin typeface="Times New Roman" pitchFamily="18" charset="0"/>
-            </a:endParaRPr>
-          </a:p>
-          <a:p>
-            <a:pPr eaLnBrk="1" hangingPunct="1">
-              <a:spcBef>
-                <a:spcPct val="10000"/>
-              </a:spcBef>
-            </a:pPr>
-            <a:endParaRPr lang="en-US" altLang="he-IL" sz="2500" dirty="0">
-              <a:latin typeface="Times New Roman" pitchFamily="18" charset="0"/>
-            </a:endParaRPr>
-          </a:p>
-          <a:p>
-            <a:pPr eaLnBrk="1" hangingPunct="1">
-              <a:spcBef>
-                <a:spcPct val="10000"/>
-              </a:spcBef>
-            </a:pPr>
-            <a:endParaRPr lang="en-US" altLang="he-IL" sz="2500" dirty="0" smtClean="0">
-              <a:latin typeface="Times New Roman" pitchFamily="18" charset="0"/>
-            </a:endParaRPr>
-          </a:p>
-          <a:p>
-            <a:pPr eaLnBrk="1" hangingPunct="1">
-              <a:spcBef>
-                <a:spcPct val="10000"/>
-              </a:spcBef>
-            </a:pPr>
-            <a:endParaRPr lang="en-US" altLang="he-IL" sz="2500" dirty="0">
-              <a:latin typeface="Times New Roman" pitchFamily="18" charset="0"/>
-            </a:endParaRPr>
-          </a:p>
-          <a:p>
-            <a:pPr eaLnBrk="1" hangingPunct="1">
-              <a:spcBef>
-                <a:spcPct val="10000"/>
-              </a:spcBef>
-            </a:pPr>
-            <a:endParaRPr lang="en-US" altLang="he-IL" sz="2500" dirty="0" smtClean="0">
-              <a:latin typeface="Times New Roman" pitchFamily="18" charset="0"/>
-            </a:endParaRPr>
-          </a:p>
-          <a:p>
-            <a:pPr eaLnBrk="1" hangingPunct="1">
-              <a:spcBef>
-                <a:spcPct val="10000"/>
-              </a:spcBef>
-            </a:pPr>
-            <a:endParaRPr lang="en-US" altLang="he-IL" sz="2500" dirty="0">
-              <a:latin typeface="Times New Roman" pitchFamily="18" charset="0"/>
-            </a:endParaRPr>
-          </a:p>
         </p:txBody>
       </p:sp>
-      <mc:AlternateContent xmlns:mc="http://schemas.openxmlformats.org/markup-compatibility/2006" xmlns:a14="http://schemas.microsoft.com/office/drawing/2010/main">
-        <mc:Choice Requires="a14">
-          <p:sp>
-            <p:nvSpPr>
-              <p:cNvPr id="51" name="Text Box 11"/>
-              <p:cNvSpPr txBox="1">
-                <a:spLocks noChangeArrowheads="1"/>
-              </p:cNvSpPr>
-              <p:nvPr/>
-            </p:nvSpPr>
-            <p:spPr bwMode="auto">
-              <a:xfrm>
-                <a:off x="10944000" y="19716750"/>
-                <a:ext cx="8458200" cy="14363700"/>
-              </a:xfrm>
-              <a:prstGeom prst="rect">
-                <a:avLst/>
-              </a:prstGeom>
-              <a:solidFill>
-                <a:schemeClr val="bg1"/>
-              </a:solidFill>
-              <a:ln w="38100">
-                <a:solidFill>
-                  <a:srgbClr val="000000"/>
-                </a:solidFill>
-                <a:round/>
-                <a:headEnd/>
-                <a:tailEnd/>
-              </a:ln>
-            </p:spPr>
-            <p:txBody>
-              <a:bodyPr lIns="802806" tIns="401404" rIns="802806" bIns="802806"/>
-              <a:lstStyle>
-                <a:lvl1pPr eaLnBrk="0" hangingPunct="0">
-                  <a:tabLst>
-                    <a:tab pos="508000" algn="l"/>
-                  </a:tabLst>
-                  <a:defRPr sz="2800">
-                    <a:solidFill>
-                      <a:schemeClr val="tx1"/>
-                    </a:solidFill>
-                    <a:latin typeface="Helvetica" pitchFamily="124" charset="0"/>
-                    <a:ea typeface="MS PGothic" pitchFamily="34" charset="-128"/>
-                  </a:defRPr>
-                </a:lvl1pPr>
-                <a:lvl2pPr marL="742950" indent="-285750" eaLnBrk="0" hangingPunct="0">
-                  <a:tabLst>
-                    <a:tab pos="508000" algn="l"/>
-                  </a:tabLst>
-                  <a:defRPr sz="2800">
-                    <a:solidFill>
-                      <a:schemeClr val="tx1"/>
-                    </a:solidFill>
-                    <a:latin typeface="Helvetica" pitchFamily="124" charset="0"/>
-                    <a:ea typeface="MS PGothic" pitchFamily="34" charset="-128"/>
-                  </a:defRPr>
-                </a:lvl2pPr>
-                <a:lvl3pPr marL="1143000" indent="-228600" eaLnBrk="0" hangingPunct="0">
-                  <a:tabLst>
-                    <a:tab pos="508000" algn="l"/>
-                  </a:tabLst>
-                  <a:defRPr sz="2800">
-                    <a:solidFill>
-                      <a:schemeClr val="tx1"/>
-                    </a:solidFill>
-                    <a:latin typeface="Helvetica" pitchFamily="124" charset="0"/>
-                    <a:ea typeface="MS PGothic" pitchFamily="34" charset="-128"/>
-                  </a:defRPr>
-                </a:lvl3pPr>
-                <a:lvl4pPr marL="1600200" indent="-228600" eaLnBrk="0" hangingPunct="0">
-                  <a:tabLst>
-                    <a:tab pos="508000" algn="l"/>
-                  </a:tabLst>
-                  <a:defRPr sz="2800">
-                    <a:solidFill>
-                      <a:schemeClr val="tx1"/>
-                    </a:solidFill>
-                    <a:latin typeface="Helvetica" pitchFamily="124" charset="0"/>
-                    <a:ea typeface="MS PGothic" pitchFamily="34" charset="-128"/>
-                  </a:defRPr>
-                </a:lvl4pPr>
-                <a:lvl5pPr marL="2057400" indent="-228600" eaLnBrk="0" hangingPunct="0">
-                  <a:tabLst>
-                    <a:tab pos="508000" algn="l"/>
-                  </a:tabLst>
-                  <a:defRPr sz="2800">
-                    <a:solidFill>
-                      <a:schemeClr val="tx1"/>
-                    </a:solidFill>
-                    <a:latin typeface="Helvetica" pitchFamily="124" charset="0"/>
-                    <a:ea typeface="MS PGothic" pitchFamily="34" charset="-128"/>
-                  </a:defRPr>
-                </a:lvl5pPr>
-                <a:lvl6pPr marL="2514600" indent="-228600" algn="l" rtl="0" eaLnBrk="0" fontAlgn="base" hangingPunct="0">
-                  <a:spcBef>
-                    <a:spcPct val="0"/>
-                  </a:spcBef>
-                  <a:spcAft>
-                    <a:spcPct val="0"/>
-                  </a:spcAft>
-                  <a:tabLst>
-                    <a:tab pos="508000" algn="l"/>
-                  </a:tabLst>
-                  <a:defRPr sz="2800">
-                    <a:solidFill>
-                      <a:schemeClr val="tx1"/>
-                    </a:solidFill>
-                    <a:latin typeface="Helvetica" pitchFamily="124" charset="0"/>
-                    <a:ea typeface="MS PGothic" pitchFamily="34" charset="-128"/>
-                  </a:defRPr>
-                </a:lvl6pPr>
-                <a:lvl7pPr marL="2971800" indent="-228600" algn="l" rtl="0" eaLnBrk="0" fontAlgn="base" hangingPunct="0">
-                  <a:spcBef>
-                    <a:spcPct val="0"/>
-                  </a:spcBef>
-                  <a:spcAft>
-                    <a:spcPct val="0"/>
-                  </a:spcAft>
-                  <a:tabLst>
-                    <a:tab pos="508000" algn="l"/>
-                  </a:tabLst>
-                  <a:defRPr sz="2800">
-                    <a:solidFill>
-                      <a:schemeClr val="tx1"/>
-                    </a:solidFill>
-                    <a:latin typeface="Helvetica" pitchFamily="124" charset="0"/>
-                    <a:ea typeface="MS PGothic" pitchFamily="34" charset="-128"/>
-                  </a:defRPr>
-                </a:lvl7pPr>
-                <a:lvl8pPr marL="3429000" indent="-228600" algn="l" rtl="0" eaLnBrk="0" fontAlgn="base" hangingPunct="0">
-                  <a:spcBef>
-                    <a:spcPct val="0"/>
-                  </a:spcBef>
-                  <a:spcAft>
-                    <a:spcPct val="0"/>
-                  </a:spcAft>
-                  <a:tabLst>
-                    <a:tab pos="508000" algn="l"/>
-                  </a:tabLst>
-                  <a:defRPr sz="2800">
-                    <a:solidFill>
-                      <a:schemeClr val="tx1"/>
-                    </a:solidFill>
-                    <a:latin typeface="Helvetica" pitchFamily="124" charset="0"/>
-                    <a:ea typeface="MS PGothic" pitchFamily="34" charset="-128"/>
-                  </a:defRPr>
-                </a:lvl8pPr>
-                <a:lvl9pPr marL="3886200" indent="-228600" algn="l" rtl="0" eaLnBrk="0" fontAlgn="base" hangingPunct="0">
-                  <a:spcBef>
-                    <a:spcPct val="0"/>
-                  </a:spcBef>
-                  <a:spcAft>
-                    <a:spcPct val="0"/>
-                  </a:spcAft>
-                  <a:tabLst>
-                    <a:tab pos="508000" algn="l"/>
-                  </a:tabLst>
-                  <a:defRPr sz="2800">
-                    <a:solidFill>
-                      <a:schemeClr val="tx1"/>
-                    </a:solidFill>
-                    <a:latin typeface="Helvetica" pitchFamily="124" charset="0"/>
-                    <a:ea typeface="MS PGothic" pitchFamily="34" charset="-128"/>
-                  </a:defRPr>
-                </a:lvl9pPr>
-              </a:lstStyle>
-              <a:p>
-                <a:pPr algn="just" eaLnBrk="1" hangingPunct="1">
-                  <a:spcBef>
-                    <a:spcPct val="50000"/>
-                  </a:spcBef>
-                </a:pPr>
-                <a:r>
-                  <a:rPr lang="en-US" altLang="he-IL" sz="3900" b="1" dirty="0" smtClean="0">
-                    <a:solidFill>
-                      <a:srgbClr val="000000"/>
-                    </a:solidFill>
-                    <a:latin typeface="Calibri" pitchFamily="34" charset="0"/>
-                  </a:rPr>
-                  <a:t>Selection estimation</a:t>
-                </a:r>
-                <a:endParaRPr lang="en-US" altLang="he-IL" sz="2100" dirty="0">
-                  <a:latin typeface="Times New Roman" pitchFamily="18" charset="0"/>
-                </a:endParaRPr>
-              </a:p>
-              <a:p>
-                <a:pPr eaLnBrk="1" hangingPunct="1">
-                  <a:spcBef>
-                    <a:spcPct val="10000"/>
-                  </a:spcBef>
-                </a:pPr>
-                <a:r>
-                  <a:rPr lang="en-US" altLang="he-IL" sz="2500" dirty="0" smtClean="0">
-                    <a:latin typeface="Times New Roman" pitchFamily="18" charset="0"/>
-                  </a:rPr>
-                  <a:t>Kimura and Crow 1970:</a:t>
-                </a:r>
-              </a:p>
-              <a:p>
-                <a:pPr eaLnBrk="1" hangingPunct="1">
-                  <a:spcBef>
-                    <a:spcPct val="10000"/>
-                  </a:spcBef>
-                </a:pPr>
-                <a14:m>
-                  <m:oMathPara xmlns:m="http://schemas.openxmlformats.org/officeDocument/2006/math">
-                    <m:oMathParaPr>
-                      <m:jc m:val="centerGroup"/>
-                    </m:oMathParaPr>
-                    <m:oMath xmlns:m="http://schemas.openxmlformats.org/officeDocument/2006/math">
-                      <m:r>
-                        <a:rPr lang="en-US" altLang="he-IL" sz="2500" b="0" i="1" smtClean="0">
-                          <a:latin typeface="Cambria Math"/>
-                        </a:rPr>
-                        <m:t>𝑝</m:t>
-                      </m:r>
-                      <m:d>
-                        <m:dPr>
-                          <m:ctrlPr>
-                            <a:rPr lang="en-US" altLang="he-IL" sz="2500" b="0" i="1" smtClean="0">
-                              <a:latin typeface="Cambria Math"/>
-                            </a:rPr>
-                          </m:ctrlPr>
-                        </m:dPr>
-                        <m:e>
-                          <m:r>
-                            <a:rPr lang="en-US" altLang="he-IL" sz="2500" b="0" i="1" smtClean="0">
-                              <a:latin typeface="Cambria Math"/>
-                            </a:rPr>
-                            <m:t>𝑡</m:t>
-                          </m:r>
-                        </m:e>
-                      </m:d>
-                      <m:r>
-                        <a:rPr lang="en-US" altLang="he-IL" sz="2500" b="0" i="1" smtClean="0">
-                          <a:latin typeface="Cambria Math"/>
-                        </a:rPr>
-                        <m:t>=</m:t>
-                      </m:r>
-                      <m:f>
-                        <m:fPr>
-                          <m:ctrlPr>
-                            <a:rPr lang="en-US" altLang="he-IL" sz="2500" b="0" i="1" smtClean="0">
-                              <a:latin typeface="Cambria Math"/>
-                            </a:rPr>
-                          </m:ctrlPr>
-                        </m:fPr>
-                        <m:num>
-                          <m:sSub>
-                            <m:sSubPr>
-                              <m:ctrlPr>
-                                <a:rPr lang="en-US" altLang="he-IL" sz="2500" b="0" i="1" smtClean="0">
-                                  <a:latin typeface="Cambria Math"/>
-                                </a:rPr>
-                              </m:ctrlPr>
-                            </m:sSubPr>
-                            <m:e>
-                              <m:r>
-                                <a:rPr lang="en-US" altLang="he-IL" sz="2500" b="0" i="1" smtClean="0">
-                                  <a:latin typeface="Cambria Math"/>
-                                </a:rPr>
-                                <m:t>𝑝</m:t>
-                              </m:r>
-                            </m:e>
-                            <m:sub>
-                              <m:r>
-                                <a:rPr lang="en-US" altLang="he-IL" sz="2500" b="0" i="1" smtClean="0">
-                                  <a:latin typeface="Cambria Math"/>
-                                </a:rPr>
-                                <m:t>0</m:t>
-                              </m:r>
-                            </m:sub>
-                          </m:sSub>
-                        </m:num>
-                        <m:den>
-                          <m:sSub>
-                            <m:sSubPr>
-                              <m:ctrlPr>
-                                <a:rPr lang="en-US" altLang="he-IL" sz="2500" b="0" i="1" smtClean="0">
-                                  <a:latin typeface="Cambria Math"/>
-                                </a:rPr>
-                              </m:ctrlPr>
-                            </m:sSubPr>
-                            <m:e>
-                              <m:r>
-                                <a:rPr lang="en-US" altLang="he-IL" sz="2500" b="0" i="1" smtClean="0">
-                                  <a:latin typeface="Cambria Math"/>
-                                </a:rPr>
-                                <m:t>𝑝</m:t>
-                              </m:r>
-                            </m:e>
-                            <m:sub>
-                              <m:r>
-                                <a:rPr lang="en-US" altLang="he-IL" sz="2500" b="0" i="1" smtClean="0">
-                                  <a:latin typeface="Cambria Math"/>
-                                </a:rPr>
-                                <m:t>0</m:t>
-                              </m:r>
-                            </m:sub>
-                          </m:sSub>
-                          <m:r>
-                            <a:rPr lang="en-US" altLang="he-IL" sz="2500" b="0" i="1" smtClean="0">
-                              <a:latin typeface="Cambria Math"/>
-                            </a:rPr>
-                            <m:t>+</m:t>
-                          </m:r>
-                          <m:d>
-                            <m:dPr>
-                              <m:ctrlPr>
-                                <a:rPr lang="en-US" altLang="he-IL" sz="2500" b="0" i="1" smtClean="0">
-                                  <a:latin typeface="Cambria Math"/>
-                                </a:rPr>
-                              </m:ctrlPr>
-                            </m:dPr>
-                            <m:e>
-                              <m:r>
-                                <a:rPr lang="en-US" altLang="he-IL" sz="2500" b="0" i="1" smtClean="0">
-                                  <a:latin typeface="Cambria Math"/>
-                                </a:rPr>
-                                <m:t>1</m:t>
-                              </m:r>
-                              <m:r>
-                                <a:rPr lang="en-US" altLang="he-IL" sz="2500" b="0" i="1" smtClean="0">
-                                  <a:latin typeface="Cambria Math"/>
-                                </a:rPr>
-                                <m:t>−</m:t>
-                              </m:r>
-                              <m:sSub>
-                                <m:sSubPr>
-                                  <m:ctrlPr>
-                                    <a:rPr lang="en-US" altLang="he-IL" sz="2500" b="0" i="1" smtClean="0">
-                                      <a:latin typeface="Cambria Math"/>
-                                    </a:rPr>
-                                  </m:ctrlPr>
-                                </m:sSubPr>
-                                <m:e>
-                                  <m:r>
-                                    <a:rPr lang="en-US" altLang="he-IL" sz="2500" b="0" i="1" smtClean="0">
-                                      <a:latin typeface="Cambria Math"/>
-                                    </a:rPr>
-                                    <m:t>𝑝</m:t>
-                                  </m:r>
-                                </m:e>
-                                <m:sub>
-                                  <m:r>
-                                    <a:rPr lang="en-US" altLang="he-IL" sz="2500" b="0" i="1" smtClean="0">
-                                      <a:latin typeface="Cambria Math"/>
-                                    </a:rPr>
-                                    <m:t>0</m:t>
-                                  </m:r>
-                                </m:sub>
-                              </m:sSub>
-                            </m:e>
-                          </m:d>
-                          <m:sSup>
-                            <m:sSupPr>
-                              <m:ctrlPr>
-                                <a:rPr lang="en-US" altLang="he-IL" sz="2500" b="0" i="1" smtClean="0">
-                                  <a:latin typeface="Cambria Math"/>
-                                </a:rPr>
-                              </m:ctrlPr>
-                            </m:sSupPr>
-                            <m:e>
-                              <m:r>
-                                <a:rPr lang="en-US" altLang="he-IL" sz="2500" b="0" i="1" smtClean="0">
-                                  <a:latin typeface="Cambria Math"/>
-                                </a:rPr>
-                                <m:t>𝑒</m:t>
-                              </m:r>
-                            </m:e>
-                            <m:sup>
-                              <m:r>
-                                <a:rPr lang="en-US" altLang="he-IL" sz="2500" b="0" i="1" smtClean="0">
-                                  <a:latin typeface="Cambria Math"/>
-                                </a:rPr>
-                                <m:t>−</m:t>
-                              </m:r>
-                              <m:r>
-                                <a:rPr lang="en-US" altLang="he-IL" sz="2500" b="0" i="1" smtClean="0">
-                                  <a:latin typeface="Cambria Math"/>
-                                </a:rPr>
-                                <m:t>𝑠𝑡</m:t>
-                              </m:r>
-                            </m:sup>
-                          </m:sSup>
-                        </m:den>
-                      </m:f>
-                    </m:oMath>
-                  </m:oMathPara>
-                </a14:m>
-                <a:endParaRPr lang="en-US" altLang="he-IL" sz="2500" dirty="0" smtClean="0">
-                  <a:latin typeface="Times New Roman" pitchFamily="18" charset="0"/>
-                </a:endParaRPr>
-              </a:p>
-              <a:p>
-                <a:pPr eaLnBrk="1" hangingPunct="1">
-                  <a:spcBef>
-                    <a:spcPct val="10000"/>
-                  </a:spcBef>
-                </a:pPr>
-                <a14:m>
-                  <m:oMath xmlns:m="http://schemas.openxmlformats.org/officeDocument/2006/math">
-                    <m:sSub>
-                      <m:sSubPr>
-                        <m:ctrlPr>
-                          <a:rPr lang="en-US" altLang="he-IL" sz="2500" b="0" i="1" smtClean="0">
-                            <a:latin typeface="Cambria Math"/>
-                          </a:rPr>
-                        </m:ctrlPr>
-                      </m:sSubPr>
-                      <m:e>
-                        <m:r>
-                          <a:rPr lang="en-US" altLang="he-IL" sz="2500" b="0" i="1" smtClean="0">
-                            <a:latin typeface="Cambria Math"/>
-                          </a:rPr>
-                          <m:t>𝑝</m:t>
-                        </m:r>
-                      </m:e>
-                      <m:sub>
-                        <m:r>
-                          <a:rPr lang="en-US" altLang="he-IL" sz="2500" b="0" i="1" smtClean="0">
-                            <a:latin typeface="Cambria Math"/>
-                          </a:rPr>
-                          <m:t>0</m:t>
-                        </m:r>
-                      </m:sub>
-                    </m:sSub>
-                  </m:oMath>
-                </a14:m>
-                <a:r>
-                  <a:rPr lang="en-US" altLang="he-IL" sz="2500" dirty="0" smtClean="0">
-                    <a:latin typeface="Times New Roman" pitchFamily="18" charset="0"/>
-                  </a:rPr>
-                  <a:t> - initial frequency 	</a:t>
-                </a:r>
-                <a14:m>
-                  <m:oMath xmlns:m="http://schemas.openxmlformats.org/officeDocument/2006/math">
-                    <m:r>
-                      <a:rPr lang="en-US" altLang="he-IL" sz="2500" b="0" i="1" smtClean="0">
-                        <a:latin typeface="Cambria Math"/>
-                      </a:rPr>
-                      <m:t>𝑠</m:t>
-                    </m:r>
-                  </m:oMath>
-                </a14:m>
-                <a:r>
-                  <a:rPr lang="en-US" altLang="he-IL" sz="2500" dirty="0" smtClean="0">
-                    <a:latin typeface="Times New Roman" pitchFamily="18" charset="0"/>
-                  </a:rPr>
-                  <a:t> – selection coefficient</a:t>
-                </a:r>
-              </a:p>
-              <a:p>
-                <a:pPr eaLnBrk="1" hangingPunct="1">
-                  <a:spcBef>
-                    <a:spcPct val="10000"/>
-                  </a:spcBef>
-                </a:pPr>
-                <a:endParaRPr lang="en-US" altLang="he-IL" sz="2500" dirty="0">
-                  <a:latin typeface="Times New Roman" pitchFamily="18" charset="0"/>
-                </a:endParaRPr>
-              </a:p>
-              <a:p>
-                <a:pPr eaLnBrk="1" hangingPunct="1">
-                  <a:spcBef>
-                    <a:spcPct val="10000"/>
-                  </a:spcBef>
-                </a:pPr>
-                <a:endParaRPr lang="en-US" altLang="he-IL" sz="2500" dirty="0" smtClean="0">
-                  <a:latin typeface="Times New Roman" pitchFamily="18" charset="0"/>
-                </a:endParaRPr>
-              </a:p>
-              <a:p>
-                <a:pPr eaLnBrk="1" hangingPunct="1">
-                  <a:spcBef>
-                    <a:spcPct val="10000"/>
-                  </a:spcBef>
-                </a:pPr>
-                <a:endParaRPr lang="en-US" altLang="he-IL" sz="2500" dirty="0">
-                  <a:latin typeface="Times New Roman" pitchFamily="18" charset="0"/>
-                </a:endParaRPr>
-              </a:p>
-              <a:p>
-                <a:pPr eaLnBrk="1" hangingPunct="1">
-                  <a:spcBef>
-                    <a:spcPct val="10000"/>
-                  </a:spcBef>
-                </a:pPr>
-                <a:endParaRPr lang="en-US" altLang="he-IL" sz="2500" dirty="0" smtClean="0">
-                  <a:latin typeface="Times New Roman" pitchFamily="18" charset="0"/>
-                </a:endParaRPr>
-              </a:p>
-              <a:p>
-                <a:pPr eaLnBrk="1" hangingPunct="1">
-                  <a:spcBef>
-                    <a:spcPct val="10000"/>
-                  </a:spcBef>
-                </a:pPr>
-                <a:endParaRPr lang="en-US" altLang="he-IL" sz="2500" dirty="0">
-                  <a:latin typeface="Times New Roman" pitchFamily="18" charset="0"/>
-                </a:endParaRPr>
-              </a:p>
-              <a:p>
-                <a:pPr eaLnBrk="1" hangingPunct="1">
-                  <a:spcBef>
-                    <a:spcPct val="10000"/>
-                  </a:spcBef>
-                </a:pPr>
-                <a:endParaRPr lang="en-US" altLang="he-IL" sz="2500" dirty="0" smtClean="0">
-                  <a:latin typeface="Times New Roman" pitchFamily="18" charset="0"/>
-                </a:endParaRPr>
-              </a:p>
-              <a:p>
-                <a:pPr eaLnBrk="1" hangingPunct="1">
-                  <a:spcBef>
-                    <a:spcPct val="10000"/>
-                  </a:spcBef>
-                </a:pPr>
-                <a:endParaRPr lang="en-US" altLang="he-IL" sz="2500" dirty="0">
-                  <a:latin typeface="Times New Roman" pitchFamily="18" charset="0"/>
-                </a:endParaRPr>
-              </a:p>
-              <a:p>
-                <a:pPr eaLnBrk="1" hangingPunct="1">
-                  <a:spcBef>
-                    <a:spcPct val="10000"/>
-                  </a:spcBef>
-                </a:pPr>
-                <a:endParaRPr lang="en-US" altLang="he-IL" sz="2500" dirty="0" smtClean="0">
-                  <a:latin typeface="Times New Roman" pitchFamily="18" charset="0"/>
-                </a:endParaRPr>
-              </a:p>
-              <a:p>
-                <a:pPr eaLnBrk="1" hangingPunct="1">
-                  <a:spcBef>
-                    <a:spcPct val="10000"/>
-                  </a:spcBef>
-                </a:pPr>
-                <a:endParaRPr lang="en-US" altLang="he-IL" sz="2500" dirty="0">
-                  <a:latin typeface="Times New Roman" pitchFamily="18" charset="0"/>
-                </a:endParaRPr>
-              </a:p>
-              <a:p>
-                <a:pPr eaLnBrk="1" hangingPunct="1">
-                  <a:spcBef>
-                    <a:spcPct val="10000"/>
-                  </a:spcBef>
-                </a:pPr>
-                <a:endParaRPr lang="en-US" altLang="he-IL" sz="2500" dirty="0" smtClean="0">
-                  <a:latin typeface="Times New Roman" pitchFamily="18" charset="0"/>
-                </a:endParaRPr>
-              </a:p>
-              <a:p>
-                <a:pPr eaLnBrk="1" hangingPunct="1">
-                  <a:spcBef>
-                    <a:spcPct val="10000"/>
-                  </a:spcBef>
-                </a:pPr>
-                <a:endParaRPr lang="en-US" altLang="he-IL" sz="2500" dirty="0">
-                  <a:latin typeface="Times New Roman" pitchFamily="18" charset="0"/>
-                </a:endParaRPr>
-              </a:p>
-              <a:p>
-                <a:pPr eaLnBrk="1" hangingPunct="1">
-                  <a:spcBef>
-                    <a:spcPct val="10000"/>
-                  </a:spcBef>
-                </a:pPr>
-                <a:endParaRPr lang="en-US" altLang="he-IL" sz="2500" dirty="0" smtClean="0">
-                  <a:latin typeface="Times New Roman" pitchFamily="18" charset="0"/>
-                </a:endParaRPr>
-              </a:p>
-              <a:p>
-                <a:pPr eaLnBrk="1" hangingPunct="1">
-                  <a:spcBef>
-                    <a:spcPct val="10000"/>
-                  </a:spcBef>
-                </a:pPr>
-                <a:endParaRPr lang="en-US" altLang="he-IL" sz="2500" dirty="0">
-                  <a:latin typeface="Times New Roman" pitchFamily="18" charset="0"/>
-                </a:endParaRPr>
-              </a:p>
-              <a:p>
-                <a:pPr eaLnBrk="1" hangingPunct="1">
-                  <a:spcBef>
-                    <a:spcPct val="10000"/>
-                  </a:spcBef>
-                </a:pPr>
-                <a:endParaRPr lang="en-US" altLang="he-IL" sz="2500" dirty="0" smtClean="0">
-                  <a:latin typeface="Times New Roman" pitchFamily="18" charset="0"/>
-                </a:endParaRPr>
-              </a:p>
-              <a:p>
-                <a:pPr eaLnBrk="1" hangingPunct="1">
-                  <a:spcBef>
-                    <a:spcPct val="10000"/>
-                  </a:spcBef>
-                </a:pPr>
-                <a:endParaRPr lang="en-US" altLang="he-IL" sz="2500" dirty="0">
-                  <a:latin typeface="Times New Roman" pitchFamily="18" charset="0"/>
-                </a:endParaRPr>
-              </a:p>
-              <a:p>
-                <a:pPr eaLnBrk="1" hangingPunct="1">
-                  <a:spcBef>
-                    <a:spcPct val="10000"/>
-                  </a:spcBef>
-                </a:pPr>
-                <a14:m>
-                  <m:oMathPara xmlns:m="http://schemas.openxmlformats.org/officeDocument/2006/math">
-                    <m:oMathParaPr>
-                      <m:jc m:val="centerGroup"/>
-                    </m:oMathParaPr>
-                    <m:oMath xmlns:m="http://schemas.openxmlformats.org/officeDocument/2006/math">
-                      <m:sSub>
-                        <m:sSubPr>
-                          <m:ctrlPr>
-                            <a:rPr lang="en-US" altLang="he-IL" sz="2500" i="1">
-                              <a:latin typeface="Cambria Math"/>
-                            </a:rPr>
-                          </m:ctrlPr>
-                        </m:sSubPr>
-                        <m:e>
-                          <m:r>
-                            <a:rPr lang="en-US" altLang="he-IL" sz="2500" i="1">
-                              <a:latin typeface="Cambria Math"/>
-                            </a:rPr>
-                            <m:t>𝑝</m:t>
-                          </m:r>
-                        </m:e>
-                        <m:sub>
-                          <m:r>
-                            <a:rPr lang="en-US" altLang="he-IL" sz="2500" i="1">
-                              <a:latin typeface="Cambria Math"/>
-                            </a:rPr>
-                            <m:t>0</m:t>
-                          </m:r>
-                        </m:sub>
-                      </m:sSub>
-                      <m:r>
-                        <a:rPr lang="en-US" altLang="he-IL" sz="2500" b="0" i="1" smtClean="0">
-                          <a:latin typeface="Cambria Math"/>
-                        </a:rPr>
-                        <m:t>=</m:t>
-                      </m:r>
-                      <m:r>
-                        <a:rPr lang="en-US" altLang="he-IL" sz="2500" b="0" i="1" smtClean="0">
-                          <a:latin typeface="Cambria Math"/>
-                        </a:rPr>
-                        <m:t>0</m:t>
-                      </m:r>
-                      <m:r>
-                        <a:rPr lang="en-US" altLang="he-IL" sz="2500" b="0" i="1" smtClean="0">
-                          <a:latin typeface="Cambria Math"/>
-                        </a:rPr>
-                        <m:t>.</m:t>
-                      </m:r>
-                      <m:r>
-                        <a:rPr lang="en-US" altLang="he-IL" sz="2500" b="0" i="1" smtClean="0">
-                          <a:latin typeface="Cambria Math"/>
-                        </a:rPr>
-                        <m:t>495</m:t>
-                      </m:r>
-                      <m:r>
-                        <a:rPr lang="en-US" altLang="he-IL" sz="2500" b="0" i="1" smtClean="0">
-                          <a:latin typeface="Cambria Math"/>
-                        </a:rPr>
-                        <m:t>±</m:t>
-                      </m:r>
-                      <m:r>
-                        <a:rPr lang="en-US" altLang="he-IL" sz="2500" b="0" i="1" smtClean="0">
-                          <a:latin typeface="Cambria Math"/>
-                        </a:rPr>
-                        <m:t>0</m:t>
-                      </m:r>
-                      <m:r>
-                        <a:rPr lang="en-US" altLang="he-IL" sz="2500" b="0" i="1" smtClean="0">
-                          <a:latin typeface="Cambria Math"/>
-                        </a:rPr>
-                        <m:t>.</m:t>
-                      </m:r>
-                      <m:r>
-                        <a:rPr lang="en-US" altLang="he-IL" sz="2500" b="0" i="1" smtClean="0">
-                          <a:latin typeface="Cambria Math"/>
-                        </a:rPr>
-                        <m:t>001</m:t>
-                      </m:r>
-                      <m:r>
-                        <a:rPr lang="en-US" altLang="he-IL" sz="2500" b="0" i="1" smtClean="0">
-                          <a:latin typeface="Cambria Math"/>
-                        </a:rPr>
-                        <m:t>,   </m:t>
-                      </m:r>
-                      <m:r>
-                        <a:rPr lang="en-US" altLang="he-IL" sz="2500" b="0" i="1" smtClean="0">
-                          <a:latin typeface="Cambria Math"/>
-                        </a:rPr>
-                        <m:t>𝑠</m:t>
-                      </m:r>
-                      <m:r>
-                        <a:rPr lang="en-US" altLang="he-IL" sz="2500" b="0" i="1" smtClean="0">
-                          <a:latin typeface="Cambria Math"/>
-                        </a:rPr>
-                        <m:t>=</m:t>
-                      </m:r>
-                      <m:r>
-                        <a:rPr lang="en-US" altLang="he-IL" sz="2500" b="0" i="1" smtClean="0">
-                          <a:latin typeface="Cambria Math"/>
-                        </a:rPr>
-                        <m:t>0</m:t>
-                      </m:r>
-                      <m:r>
-                        <a:rPr lang="en-US" altLang="he-IL" sz="2500" b="0" i="1" smtClean="0">
-                          <a:latin typeface="Cambria Math"/>
-                        </a:rPr>
-                        <m:t>.</m:t>
-                      </m:r>
-                      <m:r>
-                        <a:rPr lang="en-US" altLang="he-IL" sz="2500" b="0" i="1" smtClean="0">
-                          <a:latin typeface="Cambria Math"/>
-                        </a:rPr>
-                        <m:t>0261</m:t>
-                      </m:r>
-                      <m:r>
-                        <a:rPr lang="en-US" altLang="he-IL" sz="2500" b="0" i="1" smtClean="0">
-                          <a:latin typeface="Cambria Math"/>
-                        </a:rPr>
-                        <m:t>±</m:t>
-                      </m:r>
-                      <m:r>
-                        <a:rPr lang="en-US" altLang="he-IL" sz="2500" b="0" i="1" smtClean="0">
-                          <a:latin typeface="Cambria Math"/>
-                        </a:rPr>
-                        <m:t>0</m:t>
-                      </m:r>
-                      <m:r>
-                        <a:rPr lang="en-US" altLang="he-IL" sz="2500" b="0" i="1" smtClean="0">
-                          <a:latin typeface="Cambria Math"/>
-                        </a:rPr>
-                        <m:t>.</m:t>
-                      </m:r>
-                      <m:r>
-                        <a:rPr lang="en-US" altLang="he-IL" sz="2500" b="0" i="1" smtClean="0">
-                          <a:latin typeface="Cambria Math"/>
-                        </a:rPr>
-                        <m:t>00018</m:t>
-                      </m:r>
-                    </m:oMath>
-                  </m:oMathPara>
-                </a14:m>
-                <a:endParaRPr lang="en-US" altLang="he-IL" sz="2500" dirty="0">
-                  <a:latin typeface="Times New Roman" pitchFamily="18" charset="0"/>
-                </a:endParaRPr>
-              </a:p>
-              <a:p>
-                <a:pPr eaLnBrk="1" hangingPunct="1">
-                  <a:spcBef>
-                    <a:spcPct val="10000"/>
-                  </a:spcBef>
-                </a:pPr>
-                <a:endParaRPr lang="en-US" altLang="he-IL" sz="2500" dirty="0" smtClean="0">
-                  <a:latin typeface="Times New Roman" pitchFamily="18" charset="0"/>
-                </a:endParaRPr>
-              </a:p>
-              <a:p>
-                <a:pPr eaLnBrk="1" hangingPunct="1">
-                  <a:spcBef>
-                    <a:spcPct val="10000"/>
-                  </a:spcBef>
-                </a:pPr>
-                <a:endParaRPr lang="en-US" altLang="he-IL" sz="2500" dirty="0">
-                  <a:latin typeface="Times New Roman" pitchFamily="18" charset="0"/>
-                </a:endParaRPr>
-              </a:p>
-              <a:p>
-                <a:pPr eaLnBrk="1" hangingPunct="1">
-                  <a:spcBef>
-                    <a:spcPct val="10000"/>
-                  </a:spcBef>
-                </a:pPr>
-                <a:r>
-                  <a:rPr lang="en-GB" sz="2400" dirty="0"/>
-                  <a:t>Lorem ipsum </a:t>
-                </a:r>
-                <a:r>
-                  <a:rPr lang="en-GB" sz="2400" dirty="0" err="1"/>
-                  <a:t>dolor</a:t>
-                </a:r>
-                <a:r>
-                  <a:rPr lang="en-GB" sz="2400" dirty="0"/>
-                  <a:t> sit </a:t>
-                </a:r>
-                <a:r>
-                  <a:rPr lang="en-GB" sz="2400" dirty="0" err="1"/>
-                  <a:t>amet</a:t>
-                </a:r>
-                <a:r>
-                  <a:rPr lang="en-GB" sz="2400" dirty="0"/>
-                  <a:t>, </a:t>
-                </a:r>
-                <a:r>
-                  <a:rPr lang="en-GB" sz="2400" dirty="0" err="1"/>
-                  <a:t>consectetur</a:t>
-                </a:r>
-                <a:r>
-                  <a:rPr lang="en-GB" sz="2400" dirty="0"/>
-                  <a:t> </a:t>
-                </a:r>
-                <a:r>
-                  <a:rPr lang="en-GB" sz="2400" dirty="0" err="1"/>
-                  <a:t>adipiscing</a:t>
-                </a:r>
-                <a:r>
-                  <a:rPr lang="en-GB" sz="2400" dirty="0"/>
-                  <a:t> </a:t>
-                </a:r>
-                <a:r>
-                  <a:rPr lang="en-GB" sz="2400" dirty="0" err="1"/>
-                  <a:t>elit</a:t>
-                </a:r>
-                <a:r>
-                  <a:rPr lang="en-GB" sz="2400" dirty="0"/>
-                  <a:t>. </a:t>
-                </a:r>
-                <a:r>
-                  <a:rPr lang="en-GB" sz="2400" dirty="0" err="1"/>
-                  <a:t>Donec</a:t>
-                </a:r>
-                <a:r>
-                  <a:rPr lang="en-GB" sz="2400" dirty="0"/>
-                  <a:t> a </a:t>
-                </a:r>
-                <a:r>
-                  <a:rPr lang="en-GB" sz="2400" dirty="0" err="1"/>
-                  <a:t>diam</a:t>
-                </a:r>
-                <a:r>
-                  <a:rPr lang="en-GB" sz="2400" dirty="0"/>
-                  <a:t> </a:t>
-                </a:r>
-                <a:r>
-                  <a:rPr lang="en-GB" sz="2400" dirty="0" err="1"/>
-                  <a:t>lectus</a:t>
-                </a:r>
-                <a:r>
-                  <a:rPr lang="en-GB" sz="2400" dirty="0"/>
-                  <a:t>. </a:t>
-                </a:r>
-                <a:r>
-                  <a:rPr lang="en-GB" sz="2400" dirty="0" err="1"/>
-                  <a:t>Sed</a:t>
-                </a:r>
-                <a:r>
-                  <a:rPr lang="en-GB" sz="2400" dirty="0"/>
-                  <a:t> sit </a:t>
-                </a:r>
-                <a:r>
-                  <a:rPr lang="en-GB" sz="2400" dirty="0" err="1"/>
-                  <a:t>amet</a:t>
-                </a:r>
-                <a:r>
-                  <a:rPr lang="en-GB" sz="2400" dirty="0"/>
-                  <a:t> ipsum </a:t>
-                </a:r>
-                <a:r>
-                  <a:rPr lang="en-GB" sz="2400" dirty="0" err="1"/>
-                  <a:t>mauris</a:t>
-                </a:r>
-                <a:r>
-                  <a:rPr lang="en-GB" sz="2400" dirty="0"/>
-                  <a:t>. Maecenas </a:t>
-                </a:r>
-                <a:r>
-                  <a:rPr lang="en-GB" sz="2400" dirty="0" err="1"/>
-                  <a:t>congue</a:t>
-                </a:r>
-                <a:r>
-                  <a:rPr lang="en-GB" sz="2400" dirty="0"/>
-                  <a:t> ligula ac quam </a:t>
-                </a:r>
-                <a:r>
-                  <a:rPr lang="en-GB" sz="2400" dirty="0" err="1"/>
-                  <a:t>viverra</a:t>
-                </a:r>
-                <a:r>
-                  <a:rPr lang="en-GB" sz="2400" dirty="0"/>
-                  <a:t> </a:t>
-                </a:r>
-                <a:r>
-                  <a:rPr lang="en-GB" sz="2400" dirty="0" err="1"/>
-                  <a:t>nec</a:t>
-                </a:r>
-                <a:r>
-                  <a:rPr lang="en-GB" sz="2400" dirty="0"/>
-                  <a:t> </a:t>
-                </a:r>
-                <a:r>
-                  <a:rPr lang="en-GB" sz="2400" dirty="0" err="1"/>
-                  <a:t>consectetur</a:t>
-                </a:r>
-                <a:r>
-                  <a:rPr lang="en-GB" sz="2400" dirty="0"/>
-                  <a:t> ante </a:t>
-                </a:r>
-                <a:r>
-                  <a:rPr lang="en-GB" sz="2400" dirty="0" err="1"/>
-                  <a:t>hendrerit</a:t>
-                </a:r>
-                <a:r>
-                  <a:rPr lang="en-GB" sz="2400" dirty="0"/>
-                  <a:t>. </a:t>
-                </a:r>
-                <a:r>
-                  <a:rPr lang="en-GB" sz="2400" dirty="0" err="1"/>
-                  <a:t>Donec</a:t>
-                </a:r>
-                <a:r>
-                  <a:rPr lang="en-GB" sz="2400" dirty="0"/>
-                  <a:t> et </a:t>
-                </a:r>
-                <a:r>
-                  <a:rPr lang="en-GB" sz="2400" dirty="0" err="1"/>
-                  <a:t>mollis</a:t>
-                </a:r>
-                <a:r>
-                  <a:rPr lang="en-GB" sz="2400" dirty="0"/>
-                  <a:t> </a:t>
-                </a:r>
-                <a:r>
-                  <a:rPr lang="en-GB" sz="2400" dirty="0" err="1"/>
-                  <a:t>dolor</a:t>
-                </a:r>
-                <a:r>
-                  <a:rPr lang="en-GB" sz="2400" dirty="0"/>
-                  <a:t>. </a:t>
-                </a:r>
-                <a:r>
-                  <a:rPr lang="en-GB" sz="2400" dirty="0" err="1"/>
-                  <a:t>Praesent</a:t>
-                </a:r>
-                <a:r>
-                  <a:rPr lang="en-GB" sz="2400" dirty="0"/>
-                  <a:t> et </a:t>
-                </a:r>
-                <a:r>
-                  <a:rPr lang="en-GB" sz="2400" dirty="0" err="1"/>
-                  <a:t>diam</a:t>
-                </a:r>
-                <a:r>
-                  <a:rPr lang="en-GB" sz="2400" dirty="0"/>
-                  <a:t> </a:t>
-                </a:r>
-                <a:r>
-                  <a:rPr lang="en-GB" sz="2400" dirty="0" err="1"/>
-                  <a:t>eget</a:t>
-                </a:r>
-                <a:r>
-                  <a:rPr lang="en-GB" sz="2400" dirty="0"/>
-                  <a:t> libero </a:t>
-                </a:r>
-                <a:r>
-                  <a:rPr lang="en-GB" sz="2400" dirty="0" err="1"/>
-                  <a:t>egestas</a:t>
-                </a:r>
-                <a:r>
-                  <a:rPr lang="en-GB" sz="2400" dirty="0"/>
-                  <a:t> </a:t>
-                </a:r>
-                <a:r>
-                  <a:rPr lang="en-GB" sz="2400" dirty="0" err="1"/>
-                  <a:t>mattis</a:t>
-                </a:r>
-                <a:r>
-                  <a:rPr lang="en-GB" sz="2400" dirty="0"/>
-                  <a:t> sit </a:t>
-                </a:r>
-                <a:r>
-                  <a:rPr lang="en-GB" sz="2400" dirty="0" err="1"/>
-                  <a:t>amet</a:t>
-                </a:r>
-                <a:r>
-                  <a:rPr lang="en-GB" sz="2400" dirty="0"/>
-                  <a:t> vitae </a:t>
-                </a:r>
-                <a:r>
-                  <a:rPr lang="en-GB" sz="2400" dirty="0" err="1"/>
-                  <a:t>augue</a:t>
-                </a:r>
-                <a:r>
-                  <a:rPr lang="en-GB" sz="2400" dirty="0"/>
-                  <a:t>. Nam </a:t>
-                </a:r>
-                <a:r>
-                  <a:rPr lang="en-GB" sz="2400" dirty="0" err="1"/>
-                  <a:t>tincidunt</a:t>
-                </a:r>
-                <a:r>
-                  <a:rPr lang="en-GB" sz="2400" dirty="0"/>
-                  <a:t> </a:t>
-                </a:r>
-                <a:r>
-                  <a:rPr lang="en-GB" sz="2400" dirty="0" err="1"/>
-                  <a:t>congue</a:t>
-                </a:r>
-                <a:r>
-                  <a:rPr lang="en-GB" sz="2400" dirty="0"/>
-                  <a:t> </a:t>
-                </a:r>
-                <a:r>
-                  <a:rPr lang="en-GB" sz="2400" dirty="0" err="1"/>
-                  <a:t>enim</a:t>
-                </a:r>
-                <a:r>
-                  <a:rPr lang="en-GB" sz="2400" dirty="0"/>
-                  <a:t>, </a:t>
-                </a:r>
-                <a:r>
-                  <a:rPr lang="en-GB" sz="2400" dirty="0" err="1"/>
-                  <a:t>ut</a:t>
-                </a:r>
-                <a:r>
-                  <a:rPr lang="en-GB" sz="2400" dirty="0"/>
-                  <a:t> porta lorem </a:t>
-                </a:r>
-                <a:r>
-                  <a:rPr lang="en-GB" sz="2400" dirty="0" err="1"/>
-                  <a:t>lacinia</a:t>
-                </a:r>
-                <a:r>
-                  <a:rPr lang="en-GB" sz="2400" dirty="0"/>
-                  <a:t> </a:t>
-                </a:r>
-                <a:r>
-                  <a:rPr lang="en-GB" sz="2400" dirty="0" err="1"/>
-                  <a:t>consectetur</a:t>
-                </a:r>
-                <a:r>
-                  <a:rPr lang="en-GB" sz="2400" dirty="0"/>
-                  <a:t>. </a:t>
-                </a:r>
-                <a:r>
-                  <a:rPr lang="en-GB" sz="2400" dirty="0" err="1"/>
-                  <a:t>Donec</a:t>
-                </a:r>
-                <a:r>
-                  <a:rPr lang="en-GB" sz="2400" dirty="0"/>
-                  <a:t> </a:t>
-                </a:r>
-                <a:r>
-                  <a:rPr lang="en-GB" sz="2400" dirty="0" err="1"/>
-                  <a:t>ut</a:t>
-                </a:r>
-                <a:r>
-                  <a:rPr lang="en-GB" sz="2400" dirty="0"/>
-                  <a:t> libero </a:t>
-                </a:r>
-                <a:r>
-                  <a:rPr lang="en-GB" sz="2400" dirty="0" err="1"/>
-                  <a:t>sed</a:t>
-                </a:r>
-                <a:r>
-                  <a:rPr lang="en-GB" sz="2400" dirty="0"/>
-                  <a:t> </a:t>
-                </a:r>
-                <a:r>
-                  <a:rPr lang="en-GB" sz="2400" dirty="0" err="1"/>
-                  <a:t>arcu</a:t>
-                </a:r>
-                <a:r>
-                  <a:rPr lang="en-GB" sz="2400" dirty="0"/>
-                  <a:t> </a:t>
-                </a:r>
-                <a:r>
-                  <a:rPr lang="en-GB" sz="2400" dirty="0" err="1"/>
-                  <a:t>vehicula</a:t>
-                </a:r>
-                <a:r>
-                  <a:rPr lang="en-GB" sz="2400" dirty="0"/>
-                  <a:t> </a:t>
-                </a:r>
-                <a:r>
-                  <a:rPr lang="en-GB" sz="2400" dirty="0" err="1"/>
-                  <a:t>ultricies</a:t>
-                </a:r>
-                <a:r>
-                  <a:rPr lang="en-GB" sz="2400" dirty="0"/>
-                  <a:t> a non </a:t>
-                </a:r>
-                <a:r>
-                  <a:rPr lang="en-GB" sz="2400" dirty="0" err="1"/>
-                  <a:t>tortor</a:t>
-                </a:r>
-                <a:r>
-                  <a:rPr lang="en-GB" sz="2400" dirty="0"/>
-                  <a:t>. Lorem ipsum </a:t>
-                </a:r>
-                <a:r>
-                  <a:rPr lang="en-GB" sz="2400" dirty="0" err="1"/>
-                  <a:t>dolor</a:t>
-                </a:r>
-                <a:r>
-                  <a:rPr lang="en-GB" sz="2400" dirty="0"/>
-                  <a:t> sit </a:t>
-                </a:r>
-                <a:r>
-                  <a:rPr lang="en-GB" sz="2400" dirty="0" err="1"/>
-                  <a:t>amet</a:t>
-                </a:r>
-                <a:r>
-                  <a:rPr lang="en-GB" sz="2400" dirty="0"/>
-                  <a:t>, </a:t>
-                </a:r>
-                <a:r>
-                  <a:rPr lang="en-GB" sz="2400" dirty="0" err="1"/>
-                  <a:t>consectetur</a:t>
-                </a:r>
-                <a:r>
-                  <a:rPr lang="en-GB" sz="2400" dirty="0"/>
-                  <a:t> </a:t>
-                </a:r>
-                <a:r>
-                  <a:rPr lang="en-GB" sz="2400" dirty="0" err="1"/>
-                  <a:t>adipiscing</a:t>
-                </a:r>
-                <a:r>
-                  <a:rPr lang="en-GB" sz="2400" dirty="0"/>
-                  <a:t> </a:t>
-                </a:r>
-                <a:r>
-                  <a:rPr lang="en-GB" sz="2400" dirty="0" err="1"/>
-                  <a:t>elit</a:t>
-                </a:r>
-                <a:r>
-                  <a:rPr lang="en-GB" sz="2400" dirty="0"/>
-                  <a:t>. </a:t>
-                </a:r>
-                <a:r>
-                  <a:rPr lang="en-GB" sz="2400" dirty="0" err="1"/>
-                  <a:t>Aenean</a:t>
-                </a:r>
-                <a:r>
-                  <a:rPr lang="en-GB" sz="2400" dirty="0"/>
-                  <a:t> </a:t>
-                </a:r>
-                <a:r>
-                  <a:rPr lang="en-GB" sz="2400" dirty="0" err="1"/>
-                  <a:t>ut</a:t>
-                </a:r>
-                <a:r>
-                  <a:rPr lang="en-GB" sz="2400" dirty="0"/>
-                  <a:t> gravida lorem. </a:t>
-                </a:r>
-                <a:endParaRPr lang="en-US" altLang="he-IL" sz="2500" dirty="0">
-                  <a:latin typeface="Times New Roman" pitchFamily="18" charset="0"/>
-                </a:endParaRPr>
-              </a:p>
-            </p:txBody>
-          </p:sp>
-        </mc:Choice>
-        <mc:Fallback xmlns="">
-          <p:sp>
-            <p:nvSpPr>
-              <p:cNvPr id="51" name="Text Box 11"/>
-              <p:cNvSpPr txBox="1">
-                <a:spLocks noRot="1" noChangeAspect="1" noMove="1" noResize="1" noEditPoints="1" noAdjustHandles="1" noChangeArrowheads="1" noChangeShapeType="1" noTextEdit="1"/>
-              </p:cNvSpPr>
-              <p:nvPr/>
-            </p:nvSpPr>
-            <p:spPr bwMode="auto">
-              <a:xfrm>
-                <a:off x="10944000" y="19716750"/>
-                <a:ext cx="8458200" cy="14363700"/>
-              </a:xfrm>
-              <a:prstGeom prst="rect">
-                <a:avLst/>
-              </a:prstGeom>
-              <a:blipFill rotWithShape="1">
-                <a:blip r:embed="rId5"/>
-                <a:stretch>
-                  <a:fillRect/>
-                </a:stretch>
-              </a:blipFill>
-              <a:ln w="38100">
-                <a:solidFill>
-                  <a:srgbClr val="000000"/>
-                </a:solidFill>
-                <a:round/>
-                <a:headEnd/>
-                <a:tailEnd/>
-              </a:ln>
-            </p:spPr>
-            <p:txBody>
-              <a:bodyPr/>
-              <a:lstStyle/>
-              <a:p>
-                <a:r>
-                  <a:rPr lang="he-IL">
-                    <a:noFill/>
-                  </a:rPr>
-                  <a:t> </a:t>
-                </a:r>
-              </a:p>
-            </p:txBody>
-          </p:sp>
-        </mc:Fallback>
-      </mc:AlternateContent>
       <p:sp>
         <p:nvSpPr>
           <p:cNvPr id="14339" name="Text Box 7"/>
@@ -6278,7 +5815,7 @@
         <p:spPr bwMode="auto">
           <a:xfrm>
             <a:off x="1270000" y="7550151"/>
-            <a:ext cx="8458200" cy="4867073"/>
+            <a:ext cx="8458200" cy="5086349"/>
           </a:xfrm>
           <a:prstGeom prst="rect">
             <a:avLst/>
@@ -6432,23 +5969,32 @@
             </a:lvl9pPr>
           </a:lstStyle>
           <a:p>
-            <a:pPr algn="just" eaLnBrk="1" hangingPunct="1">
+            <a:pPr indent="180000" eaLnBrk="1" hangingPunct="1">
               <a:spcBef>
                 <a:spcPct val="50000"/>
               </a:spcBef>
+              <a:tabLst>
+                <a:tab pos="635000" algn="l"/>
+              </a:tabLst>
             </a:pPr>
             <a:r>
-              <a:rPr lang="en-US" altLang="he-IL" sz="4200" b="1" dirty="0" smtClean="0">
+              <a:rPr lang="en-US" altLang="he-IL" sz="4200" b="1" dirty="0">
+                <a:solidFill>
+                  <a:srgbClr val="000000"/>
+                </a:solidFill>
                 <a:latin typeface="Calibri" pitchFamily="34" charset="0"/>
               </a:rPr>
               <a:t>Introduction</a:t>
             </a:r>
             <a:endParaRPr lang="en-US" altLang="he-IL" sz="4200" b="1" dirty="0">
+              <a:solidFill>
+                <a:srgbClr val="000000"/>
+              </a:solidFill>
               <a:latin typeface="Calibri" pitchFamily="34" charset="0"/>
             </a:endParaRPr>
           </a:p>
           <a:p>
-            <a:pPr eaLnBrk="1" hangingPunct="1">
+            <a:pPr indent="180000" eaLnBrk="1" hangingPunct="1">
               <a:spcBef>
                 <a:spcPct val="10000"/>
               </a:spcBef>
@@ -6523,7 +6069,29 @@
               <a:rPr lang="en-US" sz="2400" dirty="0">
                 <a:latin typeface="+mn-lt"/>
               </a:rPr>
-              <a:t>. The only </a:t>
+              <a:t>. </a:t>
+            </a:r>
+            <a:endParaRPr lang="en-US" sz="2400" dirty="0" smtClean="0">
+              <a:latin typeface="+mn-lt"/>
+            </a:endParaRPr>
+          </a:p>
+          <a:p>
+            <a:pPr indent="180000" eaLnBrk="1" hangingPunct="1">
+              <a:spcBef>
+                <a:spcPct val="10000"/>
+              </a:spcBef>
+            </a:pPr>
+            <a:r>
+              <a:rPr lang="en-US" sz="2400" dirty="0" smtClean="0">
+                <a:latin typeface="+mn-lt"/>
+              </a:rPr>
+              <a:t>The </a:t>
+            </a:r>
+            <a:r>
+              <a:rPr lang="en-US" sz="2400" dirty="0">
+                <a:latin typeface="+mn-lt"/>
+              </a:rPr>
+              <a:t>only </a:t>
             </a:r>
             <a:r>
               <a:rPr lang="en-US" sz="2400" dirty="0" smtClean="0">
@@ -6788,23 +6356,26 @@
                 </a:lvl9pPr>
               </a:lstStyle>
               <a:p>
-                <a:pPr algn="just" eaLnBrk="1" hangingPunct="1">
+                <a:pPr indent="180000" eaLnBrk="1" hangingPunct="1">
                   <a:spcBef>
                     <a:spcPct val="50000"/>
                   </a:spcBef>
+                  <a:tabLst>
+                    <a:tab pos="635000" algn="l"/>
+                  </a:tabLst>
                 </a:pPr>
                 <a:r>
-                  <a:rPr lang="en-US" altLang="he-IL" sz="3900" b="1" dirty="0" smtClean="0">
+                  <a:rPr lang="en-US" altLang="he-IL" sz="4200" b="1" dirty="0">
                     <a:solidFill>
                       <a:srgbClr val="000000"/>
                     </a:solidFill>
                     <a:latin typeface="Calibri" pitchFamily="34" charset="0"/>
                   </a:rPr>
-                  <a:t>Fitting growth models</a:t>
+                  <a:t>Growth models</a:t>
                 </a:r>
               </a:p>
               <a:p>
-                <a:pPr algn="just" eaLnBrk="1" hangingPunct="1">
+                <a:pPr indent="180000" algn="just" eaLnBrk="1" hangingPunct="1">
                   <a:spcBef>
                     <a:spcPct val="50000"/>
                   </a:spcBef>
@@ -6856,7 +6427,7 @@
                 </a:r>
               </a:p>
               <a:p>
-                <a:pPr algn="just" eaLnBrk="1" hangingPunct="1">
+                <a:pPr indent="180000" algn="just" eaLnBrk="1" hangingPunct="1">
                   <a:spcBef>
                     <a:spcPct val="50000"/>
                   </a:spcBef>
@@ -6869,7 +6440,7 @@
                 </a:endParaRPr>
               </a:p>
               <a:p>
-                <a:pPr algn="just" eaLnBrk="1" hangingPunct="1">
+                <a:pPr indent="180000" algn="just" eaLnBrk="1" hangingPunct="1">
                   <a:spcBef>
                     <a:spcPct val="50000"/>
                   </a:spcBef>
@@ -6882,7 +6453,7 @@
                 </a:endParaRPr>
               </a:p>
               <a:p>
-                <a:pPr algn="just" eaLnBrk="1" hangingPunct="1">
+                <a:pPr indent="180000" algn="just" eaLnBrk="1" hangingPunct="1">
                   <a:spcBef>
                     <a:spcPct val="50000"/>
                   </a:spcBef>
@@ -6895,7 +6466,7 @@
                 </a:endParaRPr>
               </a:p>
               <a:p>
-                <a:pPr algn="just" eaLnBrk="1" hangingPunct="1">
+                <a:pPr indent="180000" algn="just" eaLnBrk="1" hangingPunct="1">
                   <a:spcBef>
                     <a:spcPct val="50000"/>
                   </a:spcBef>
@@ -6908,7 +6479,7 @@
                 </a:endParaRPr>
               </a:p>
               <a:p>
-                <a:pPr algn="just" eaLnBrk="1" hangingPunct="1">
+                <a:pPr indent="180000" algn="just" eaLnBrk="1" hangingPunct="1">
                   <a:spcBef>
                     <a:spcPct val="50000"/>
                   </a:spcBef>
@@ -6921,7 +6492,7 @@
                 </a:endParaRPr>
               </a:p>
               <a:p>
-                <a:pPr algn="just" eaLnBrk="1" hangingPunct="1">
+                <a:pPr indent="180000" algn="just" eaLnBrk="1" hangingPunct="1">
                   <a:spcBef>
                     <a:spcPct val="50000"/>
                   </a:spcBef>
@@ -6934,7 +6505,7 @@
                 </a:endParaRPr>
               </a:p>
               <a:p>
-                <a:pPr algn="just" eaLnBrk="1" hangingPunct="1">
+                <a:pPr indent="180000" algn="just" eaLnBrk="1" hangingPunct="1">
                   <a:spcBef>
                     <a:spcPct val="50000"/>
                   </a:spcBef>
@@ -6947,7 +6518,7 @@
                 </a:endParaRPr>
               </a:p>
               <a:p>
-                <a:pPr algn="just" eaLnBrk="1" hangingPunct="1">
+                <a:pPr indent="180000" algn="just" eaLnBrk="1" hangingPunct="1">
                   <a:spcBef>
                     <a:spcPct val="50000"/>
                   </a:spcBef>
@@ -6960,7 +6531,7 @@
                 </a:endParaRPr>
               </a:p>
               <a:p>
-                <a:pPr algn="just" eaLnBrk="1" hangingPunct="1">
+                <a:pPr indent="180000" algn="just" eaLnBrk="1" hangingPunct="1">
                   <a:spcBef>
                     <a:spcPct val="50000"/>
                   </a:spcBef>
@@ -6973,11 +6544,13 @@
                 </a:endParaRPr>
               </a:p>
               <a:p>
+                <a:pPr indent="180000"/>
                 <a:endParaRPr lang="en-US" sz="2500" dirty="0" smtClean="0">
                   <a:latin typeface="Times New Roman" pitchFamily="18" charset="0"/>
                 </a:endParaRPr>
               </a:p>
               <a:p>
+                <a:pPr indent="180000"/>
                 <a:r>
                   <a:rPr lang="en-US" sz="2500" dirty="0" smtClean="0">
                     <a:latin typeface="Times New Roman" pitchFamily="18" charset="0"/>
@@ -7025,12 +6598,17 @@
                 </a:endParaRPr>
               </a:p>
               <a:p>
-                <a:endParaRPr lang="en-US" sz="2400" i="1" dirty="0">
+                <a:pPr indent="180000" eaLnBrk="1" hangingPunct="1">
+                  <a:spcBef>
+                    <a:spcPct val="10000"/>
+                  </a:spcBef>
+                </a:pPr>
+                <a:endParaRPr lang="en-US" altLang="he-IL" sz="2400" i="1" dirty="0">
                   <a:latin typeface="Cambria Math"/>
                 </a:endParaRPr>
               </a:p>
               <a:p>
-                <a:pPr eaLnBrk="1" hangingPunct="1">
+                <a:pPr indent="180000" eaLnBrk="1" hangingPunct="1">
                   <a:spcBef>
                     <a:spcPct val="10000"/>
                   </a:spcBef>
@@ -7196,7 +6774,13 @@
                         <a:rPr lang="en-US" altLang="he-IL" sz="2500" b="0" i="1" smtClean="0">
                           <a:latin typeface="Cambria Math"/>
                         </a:rPr>
-                        <m:t>,   </m:t>
+                        <m:t>,</m:t>
+                      </m:r>
+                      <m:r>
+                        <a:rPr lang="en-US" altLang="he-IL" sz="2500" b="0" i="1" smtClean="0">
+                          <a:latin typeface="Cambria Math"/>
+                        </a:rPr>
+                        <m:t>  </m:t>
                       </m:r>
                       <m:r>
                         <a:rPr lang="en-US" sz="2500" b="0" i="1" smtClean="0">
@@ -7352,7 +6936,7 @@
                 </a:endParaRPr>
               </a:p>
               <a:p>
-                <a:pPr eaLnBrk="1" hangingPunct="1">
+                <a:pPr indent="180000" eaLnBrk="1" hangingPunct="1">
                   <a:spcBef>
                     <a:spcPct val="10000"/>
                   </a:spcBef>
@@ -7362,7 +6946,7 @@
                 </a:endParaRPr>
               </a:p>
               <a:p>
-                <a:pPr eaLnBrk="1" hangingPunct="1">
+                <a:pPr indent="180000" eaLnBrk="1" hangingPunct="1">
                   <a:spcBef>
                     <a:spcPct val="10000"/>
                   </a:spcBef>
@@ -7405,7 +6989,7 @@
                 </a:r>
               </a:p>
               <a:p>
-                <a:pPr eaLnBrk="1" hangingPunct="1">
+                <a:pPr indent="180000" eaLnBrk="1" hangingPunct="1">
                   <a:spcBef>
                     <a:spcPct val="10000"/>
                   </a:spcBef>
@@ -7462,7 +7046,7 @@
                 </a:r>
               </a:p>
               <a:p>
-                <a:pPr eaLnBrk="1" hangingPunct="1">
+                <a:pPr indent="180000" eaLnBrk="1" hangingPunct="1">
                   <a:spcBef>
                     <a:spcPct val="10000"/>
                   </a:spcBef>
@@ -7480,7 +7064,7 @@
                       <m:dPr>
                         <m:ctrlPr>
                           <a:rPr lang="en-US" sz="2000" i="1">
-                            <a:latin typeface="Cambria Math" panose="02040503050406030204" pitchFamily="18" charset="0"/>
+                            <a:latin typeface="Cambria Math"/>
                             <a:ea typeface="Cambria Math" panose="02040503050406030204" pitchFamily="18" charset="0"/>
                           </a:rPr>
                         </m:ctrlPr>
@@ -7506,7 +7090,7 @@
                 </a:r>
               </a:p>
               <a:p>
-                <a:pPr eaLnBrk="1" hangingPunct="1">
+                <a:pPr indent="180000" eaLnBrk="1" hangingPunct="1">
                   <a:spcBef>
                     <a:spcPct val="10000"/>
                   </a:spcBef>
@@ -7517,7 +7101,7 @@
                       <m:sSubPr>
                         <m:ctrlPr>
                           <a:rPr lang="en-US" sz="2000" i="1">
-                            <a:latin typeface="Cambria Math" panose="02040503050406030204" pitchFamily="18" charset="0"/>
+                            <a:latin typeface="Cambria Math"/>
                             <a:ea typeface="Cambria Math" panose="02040503050406030204" pitchFamily="18" charset="0"/>
                           </a:rPr>
                         </m:ctrlPr>
@@ -7584,7 +7168,7 @@
                 </a:r>
               </a:p>
               <a:p>
-                <a:pPr eaLnBrk="1" hangingPunct="1">
+                <a:pPr indent="180000" eaLnBrk="1" hangingPunct="1">
                   <a:spcBef>
                     <a:spcPct val="10000"/>
                   </a:spcBef>
@@ -7594,7 +7178,7 @@
                 </a:endParaRPr>
               </a:p>
               <a:p>
-                <a:pPr eaLnBrk="1" hangingPunct="1">
+                <a:pPr indent="180000" eaLnBrk="1" hangingPunct="1">
                   <a:spcBef>
                     <a:spcPct val="10000"/>
                   </a:spcBef>
@@ -7624,7 +7208,7 @@
                 <a:avLst/>
               </a:prstGeom>
               <a:blipFill rotWithShape="1">
-                <a:blip r:embed="rId6"/>
+                <a:blip r:embed="rId7"/>
                 <a:stretch>
                   <a:fillRect/>
                 </a:stretch>
@@ -8193,9 +7777,16 @@
                 </a:lvl9pPr>
               </a:lstStyle>
               <a:p>
-                <a:pPr algn="just" eaLnBrk="1" hangingPunct="1"/>
+                <a:pPr indent="180000" eaLnBrk="1" hangingPunct="1">
+                  <a:spcBef>
+                    <a:spcPct val="50000"/>
+                  </a:spcBef>
+                  <a:tabLst>
+                    <a:tab pos="635000" algn="l"/>
+                  </a:tabLst>
+                </a:pPr>
                 <a:r>
-                  <a:rPr lang="en-US" altLang="he-IL" sz="4200" b="1" dirty="0" smtClean="0">
+                  <a:rPr lang="en-US" altLang="he-IL" sz="4200" b="1" dirty="0">
                     <a:solidFill>
                       <a:srgbClr val="000000"/>
                     </a:solidFill>
@@ -8205,7 +7796,38 @@
                 </a:r>
               </a:p>
               <a:p>
-                <a:pPr eaLnBrk="1" hangingPunct="1">
+                <a:pPr indent="180000" eaLnBrk="1" hangingPunct="1">
+                  <a:spcBef>
+                    <a:spcPct val="10000"/>
+                  </a:spcBef>
+                </a:pPr>
+                <a:r>
+                  <a:rPr lang="en-US" sz="2400" dirty="0">
+                    <a:latin typeface="+mn-lt"/>
+                  </a:rPr>
+                  <a:t>Competitions will be simulated by integrating a two-species ordinary differential equation (ODE). We assume that the only interaction between strains in </a:t>
+                </a:r>
+                <a:r>
+                  <a:rPr lang="en-US" sz="2400" b="1" dirty="0">
+                    <a:latin typeface="+mn-lt"/>
+                  </a:rPr>
+                  <a:t>resource competition</a:t>
+                </a:r>
+                <a:r>
+                  <a:rPr lang="en-US" sz="2400" baseline="30000" dirty="0">
+                    <a:latin typeface="+mn-lt"/>
+                  </a:rPr>
+                  <a:t>2,4</a:t>
+                </a:r>
+                <a:r>
+                  <a:rPr lang="en-US" sz="2400" dirty="0">
+                    <a:latin typeface="+mn-lt"/>
+                  </a:rPr>
+                  <a:t>.</a:t>
+                </a:r>
+              </a:p>
+              <a:p>
+                <a:pPr indent="180000" eaLnBrk="1" hangingPunct="1">
                   <a:spcBef>
                     <a:spcPct val="10000"/>
                   </a:spcBef>
@@ -8214,49 +7836,13 @@
                   <a:rPr lang="en-US" sz="2400" dirty="0" smtClean="0">
                     <a:latin typeface="+mn-lt"/>
                   </a:rPr>
-                  <a:t>Competitions </a:t>
-                </a:r>
-                <a:r>
-                  <a:rPr lang="en-US" sz="2400" dirty="0">
-                    <a:latin typeface="+mn-lt"/>
-                  </a:rPr>
-                  <a:t>will </a:t>
-                </a:r>
-                <a:r>
-                  <a:rPr lang="en-US" sz="2400" dirty="0" smtClean="0">
-                    <a:latin typeface="+mn-lt"/>
-                  </a:rPr>
-                  <a:t>be </a:t>
-                </a:r>
-                <a:r>
-                  <a:rPr lang="en-US" sz="2400" dirty="0">
-                    <a:latin typeface="+mn-lt"/>
-                  </a:rPr>
-                  <a:t>simulated by integrating a two-species ordinary differential equation (ODE</a:t>
-                </a:r>
-                <a:r>
-                  <a:rPr lang="en-US" sz="2400" dirty="0" smtClean="0">
-                    <a:latin typeface="+mn-lt"/>
-                  </a:rPr>
-                  <a:t>). For example, the </a:t>
+                  <a:t>For example, the </a:t>
                 </a:r>
                 <a:r>
                   <a:rPr lang="en-US" altLang="he-IL" sz="2500" b="1" dirty="0" smtClean="0">
                     <a:latin typeface="Times New Roman" pitchFamily="18" charset="0"/>
                   </a:rPr>
-                  <a:t>two-strain </a:t>
-                </a:r>
-                <a:r>
-                  <a:rPr lang="en-US" altLang="he-IL" sz="2500" b="1" dirty="0">
-                    <a:latin typeface="Times New Roman" pitchFamily="18" charset="0"/>
-                  </a:rPr>
-                  <a:t>ordinary differential </a:t>
-                </a:r>
-                <a:r>
-                  <a:rPr lang="en-US" altLang="he-IL" sz="2500" b="1" dirty="0" smtClean="0">
-                    <a:latin typeface="Times New Roman" pitchFamily="18" charset="0"/>
-                  </a:rPr>
-                  <a:t>equation </a:t>
+                  <a:t>two-strain ordinary differential equation </a:t>
                 </a:r>
                 <a:r>
                   <a:rPr lang="en-US" altLang="he-IL" sz="2500" dirty="0" smtClean="0">
@@ -8314,14 +7900,14 @@
                       <m:f>
                         <m:fPr>
                           <m:ctrlPr>
-                            <a:rPr lang="en-US" altLang="he-IL" sz="2500" i="1">
+                            <a:rPr lang="en-US" altLang="he-IL" sz="3200" i="1">
                               <a:latin typeface="Cambria Math"/>
                             </a:rPr>
                           </m:ctrlPr>
                         </m:fPr>
                         <m:num>
                           <m:r>
-                            <a:rPr lang="en-US" altLang="he-IL" sz="2500" i="1">
+                            <a:rPr lang="en-US" altLang="he-IL" sz="3200" i="1">
                               <a:latin typeface="Cambria Math"/>
                             </a:rPr>
                             <m:t>𝑑</m:t>
@@ -8329,14 +7915,14 @@
                           <m:sSub>
                             <m:sSubPr>
                               <m:ctrlPr>
-                                <a:rPr lang="en-US" altLang="he-IL" sz="2500" i="1">
+                                <a:rPr lang="en-US" altLang="he-IL" sz="3200" i="1">
                                   <a:latin typeface="Cambria Math"/>
                                 </a:rPr>
                               </m:ctrlPr>
                             </m:sSubPr>
                             <m:e>
                               <m:r>
-                                <a:rPr lang="en-US" altLang="he-IL" sz="2500" i="1">
+                                <a:rPr lang="en-US" altLang="he-IL" sz="3200" i="1">
                                   <a:latin typeface="Cambria Math"/>
                                 </a:rPr>
                                 <m:t>𝑁</m:t>
@@ -8344,7 +7930,7 @@
                             </m:e>
                             <m:sub>
                               <m:r>
-                                <a:rPr lang="en-US" altLang="he-IL" sz="2500" i="1">
+                                <a:rPr lang="en-US" altLang="he-IL" sz="3200" i="1">
                                   <a:latin typeface="Cambria Math"/>
                                 </a:rPr>
                                 <m:t>𝑖</m:t>
@@ -8354,7 +7940,7 @@
                         </m:num>
                         <m:den>
                           <m:r>
-                            <a:rPr lang="en-US" altLang="he-IL" sz="2500" i="1">
+                            <a:rPr lang="en-US" altLang="he-IL" sz="3200" i="1">
                               <a:latin typeface="Cambria Math"/>
                             </a:rPr>
                             <m:t>𝑑𝑡</m:t>
@@ -8362,7 +7948,7 @@
                         </m:den>
                       </m:f>
                       <m:r>
-                        <a:rPr lang="en-US" altLang="he-IL" sz="2500" i="1">
+                        <a:rPr lang="en-US" altLang="he-IL" sz="3200" i="1">
                           <a:latin typeface="Cambria Math"/>
                         </a:rPr>
                         <m:t>=</m:t>
@@ -8370,14 +7956,14 @@
                       <m:sSub>
                         <m:sSubPr>
                           <m:ctrlPr>
-                            <a:rPr lang="en-US" altLang="he-IL" sz="2500" i="1">
+                            <a:rPr lang="en-US" altLang="he-IL" sz="3200" i="1">
                               <a:latin typeface="Cambria Math"/>
                             </a:rPr>
                           </m:ctrlPr>
                         </m:sSubPr>
                         <m:e>
                           <m:r>
-                            <a:rPr lang="en-US" altLang="he-IL" sz="2500" i="1">
+                            <a:rPr lang="en-US" altLang="he-IL" sz="3200" i="1">
                               <a:latin typeface="Cambria Math"/>
                             </a:rPr>
                             <m:t>𝑟</m:t>
@@ -8385,7 +7971,7 @@
                         </m:e>
                         <m:sub>
                           <m:r>
-                            <a:rPr lang="en-US" altLang="he-IL" sz="2500" i="1">
+                            <a:rPr lang="en-US" altLang="he-IL" sz="3200" i="1">
                               <a:latin typeface="Cambria Math"/>
                             </a:rPr>
                             <m:t>𝑖</m:t>
@@ -8395,14 +7981,14 @@
                       <m:sSub>
                         <m:sSubPr>
                           <m:ctrlPr>
-                            <a:rPr lang="en-US" altLang="he-IL" sz="2500" i="1">
+                            <a:rPr lang="en-US" altLang="he-IL" sz="3200" i="1">
                               <a:latin typeface="Cambria Math"/>
                             </a:rPr>
                           </m:ctrlPr>
                         </m:sSubPr>
                         <m:e>
                           <m:r>
-                            <a:rPr lang="en-US" altLang="he-IL" sz="2500" i="1">
+                            <a:rPr lang="en-US" altLang="he-IL" sz="3200" i="1">
                               <a:latin typeface="Cambria Math"/>
                             </a:rPr>
                             <m:t>𝛼</m:t>
@@ -8410,7 +7996,7 @@
                         </m:e>
                         <m:sub>
                           <m:r>
-                            <a:rPr lang="en-US" altLang="he-IL" sz="2500" i="1">
+                            <a:rPr lang="en-US" altLang="he-IL" sz="3200" i="1">
                               <a:latin typeface="Cambria Math"/>
                             </a:rPr>
                             <m:t>𝑖</m:t>
@@ -8420,14 +8006,14 @@
                       <m:d>
                         <m:dPr>
                           <m:ctrlPr>
-                            <a:rPr lang="en-US" altLang="he-IL" sz="2500" i="1">
+                            <a:rPr lang="en-US" altLang="he-IL" sz="3200" i="1">
                               <a:latin typeface="Cambria Math"/>
                             </a:rPr>
                           </m:ctrlPr>
                         </m:dPr>
                         <m:e>
                           <m:r>
-                            <a:rPr lang="en-US" altLang="he-IL" sz="2500" i="1">
+                            <a:rPr lang="en-US" altLang="he-IL" sz="3200" i="1">
                               <a:latin typeface="Cambria Math"/>
                             </a:rPr>
                             <m:t>𝑡</m:t>
@@ -8437,14 +8023,14 @@
                       <m:sSub>
                         <m:sSubPr>
                           <m:ctrlPr>
-                            <a:rPr lang="en-US" altLang="he-IL" sz="2500" i="1">
+                            <a:rPr lang="en-US" altLang="he-IL" sz="3200" i="1">
                               <a:latin typeface="Cambria Math"/>
                             </a:rPr>
                           </m:ctrlPr>
                         </m:sSubPr>
                         <m:e>
                           <m:r>
-                            <a:rPr lang="en-US" altLang="he-IL" sz="2500" i="1">
+                            <a:rPr lang="en-US" altLang="he-IL" sz="3200" i="1">
                               <a:latin typeface="Cambria Math"/>
                             </a:rPr>
                             <m:t>𝑁</m:t>
@@ -8452,7 +8038,7 @@
                         </m:e>
                         <m:sub>
                           <m:r>
-                            <a:rPr lang="en-US" altLang="he-IL" sz="2500" i="1">
+                            <a:rPr lang="en-US" altLang="he-IL" sz="3200" i="1">
                               <a:latin typeface="Cambria Math"/>
                             </a:rPr>
                             <m:t>𝑖</m:t>
@@ -8462,20 +8048,20 @@
                       <m:d>
                         <m:dPr>
                           <m:ctrlPr>
-                            <a:rPr lang="en-US" altLang="he-IL" sz="2500" i="1">
+                            <a:rPr lang="en-US" altLang="he-IL" sz="3200" i="1">
                               <a:latin typeface="Cambria Math"/>
                             </a:rPr>
                           </m:ctrlPr>
                         </m:dPr>
                         <m:e>
                           <m:r>
-                            <a:rPr lang="en-US" altLang="he-IL" sz="2500" i="1">
+                            <a:rPr lang="en-US" altLang="he-IL" sz="3200" i="1">
                               <a:latin typeface="Cambria Math"/>
                             </a:rPr>
                             <m:t>1</m:t>
                           </m:r>
                           <m:r>
-                            <a:rPr lang="en-US" altLang="he-IL" sz="2500" i="1">
+                            <a:rPr lang="en-US" altLang="he-IL" sz="3200" i="1">
                               <a:latin typeface="Cambria Math"/>
                             </a:rPr>
                             <m:t>−</m:t>
@@ -8483,7 +8069,7 @@
                           <m:sSup>
                             <m:sSupPr>
                               <m:ctrlPr>
-                                <a:rPr lang="en-US" altLang="he-IL" sz="2500" i="1">
+                                <a:rPr lang="en-US" altLang="he-IL" sz="3200" i="1">
                                   <a:latin typeface="Cambria Math"/>
                                 </a:rPr>
                               </m:ctrlPr>
@@ -8492,7 +8078,7 @@
                               <m:d>
                                 <m:dPr>
                                   <m:ctrlPr>
-                                    <a:rPr lang="en-US" altLang="he-IL" sz="2500" i="1">
+                                    <a:rPr lang="en-US" altLang="he-IL" sz="3200" i="1">
                                       <a:latin typeface="Cambria Math"/>
                                     </a:rPr>
                                   </m:ctrlPr>
@@ -8501,7 +8087,7 @@
                                   <m:f>
                                     <m:fPr>
                                       <m:ctrlPr>
-                                        <a:rPr lang="en-US" altLang="he-IL" sz="2500" i="1">
+                                        <a:rPr lang="en-US" altLang="he-IL" sz="3200" i="1">
                                           <a:latin typeface="Cambria Math"/>
                                         </a:rPr>
                                       </m:ctrlPr>
@@ -8510,14 +8096,14 @@
                                       <m:sSub>
                                         <m:sSubPr>
                                           <m:ctrlPr>
-                                            <a:rPr lang="en-US" altLang="he-IL" sz="2500" i="1">
+                                            <a:rPr lang="en-US" altLang="he-IL" sz="3200" i="1">
                                               <a:latin typeface="Cambria Math"/>
                                             </a:rPr>
                                           </m:ctrlPr>
                                         </m:sSubPr>
                                         <m:e>
                                           <m:r>
-                                            <a:rPr lang="en-US" altLang="he-IL" sz="2500" i="1">
+                                            <a:rPr lang="en-US" altLang="he-IL" sz="3200" i="1">
                                               <a:latin typeface="Cambria Math"/>
                                             </a:rPr>
                                             <m:t>𝑁</m:t>
@@ -8525,7 +8111,7 @@
                                         </m:e>
                                         <m:sub>
                                           <m:r>
-                                            <a:rPr lang="en-US" altLang="he-IL" sz="2500" i="1">
+                                            <a:rPr lang="en-US" altLang="he-IL" sz="3200" i="1">
                                               <a:latin typeface="Cambria Math"/>
                                             </a:rPr>
                                             <m:t>𝐺</m:t>
@@ -8533,7 +8119,7 @@
                                         </m:sub>
                                       </m:sSub>
                                       <m:r>
-                                        <a:rPr lang="en-US" altLang="he-IL" sz="2500" i="1">
+                                        <a:rPr lang="en-US" altLang="he-IL" sz="3200" i="1">
                                           <a:latin typeface="Cambria Math"/>
                                         </a:rPr>
                                         <m:t>+</m:t>
@@ -8541,14 +8127,14 @@
                                       <m:sSub>
                                         <m:sSubPr>
                                           <m:ctrlPr>
-                                            <a:rPr lang="en-US" altLang="he-IL" sz="2500" i="1">
+                                            <a:rPr lang="en-US" altLang="he-IL" sz="3200" i="1">
                                               <a:latin typeface="Cambria Math"/>
                                             </a:rPr>
                                           </m:ctrlPr>
                                         </m:sSubPr>
                                         <m:e>
                                           <m:r>
-                                            <a:rPr lang="en-US" altLang="he-IL" sz="2500" i="1">
+                                            <a:rPr lang="en-US" altLang="he-IL" sz="3200" i="1">
                                               <a:latin typeface="Cambria Math"/>
                                             </a:rPr>
                                             <m:t>𝑁</m:t>
@@ -8556,7 +8142,7 @@
                                         </m:e>
                                         <m:sub>
                                           <m:r>
-                                            <a:rPr lang="en-US" altLang="he-IL" sz="2500" i="1">
+                                            <a:rPr lang="en-US" altLang="he-IL" sz="3200" i="1">
                                               <a:latin typeface="Cambria Math"/>
                                             </a:rPr>
                                             <m:t>𝑅</m:t>
@@ -8568,14 +8154,14 @@
                                       <m:sSub>
                                         <m:sSubPr>
                                           <m:ctrlPr>
-                                            <a:rPr lang="en-US" altLang="he-IL" sz="2500" i="1">
+                                            <a:rPr lang="en-US" altLang="he-IL" sz="3200" i="1">
                                               <a:latin typeface="Cambria Math"/>
                                             </a:rPr>
                                           </m:ctrlPr>
                                         </m:sSubPr>
                                         <m:e>
                                           <m:r>
-                                            <a:rPr lang="en-US" altLang="he-IL" sz="2500" i="1">
+                                            <a:rPr lang="en-US" altLang="he-IL" sz="3200" i="1">
                                               <a:latin typeface="Cambria Math"/>
                                             </a:rPr>
                                             <m:t>𝐾</m:t>
@@ -8583,7 +8169,7 @@
                                         </m:e>
                                         <m:sub>
                                           <m:r>
-                                            <a:rPr lang="en-US" altLang="he-IL" sz="2500" i="1">
+                                            <a:rPr lang="en-US" altLang="he-IL" sz="3200" i="1">
                                               <a:latin typeface="Cambria Math"/>
                                             </a:rPr>
                                             <m:t>𝑖</m:t>
@@ -8599,14 +8185,14 @@
                               <m:sSub>
                                 <m:sSubPr>
                                   <m:ctrlPr>
-                                    <a:rPr lang="en-US" altLang="he-IL" sz="2500" i="1">
+                                    <a:rPr lang="en-US" altLang="he-IL" sz="3200" i="1">
                                       <a:latin typeface="Cambria Math"/>
                                     </a:rPr>
                                   </m:ctrlPr>
                                 </m:sSubPr>
                                 <m:e>
                                   <m:r>
-                                    <a:rPr lang="en-US" altLang="he-IL" sz="2500" i="1">
+                                    <a:rPr lang="en-US" altLang="he-IL" sz="3200" i="1">
                                       <a:latin typeface="Cambria Math"/>
                                     </a:rPr>
                                     <m:t>𝜈</m:t>
@@ -8614,7 +8200,7 @@
                                 </m:e>
                                 <m:sub>
                                   <m:r>
-                                    <a:rPr lang="en-US" altLang="he-IL" sz="2500" i="1">
+                                    <a:rPr lang="en-US" altLang="he-IL" sz="3200" i="1">
                                       <a:latin typeface="Cambria Math"/>
                                     </a:rPr>
                                     <m:t>𝑖</m:t>
@@ -8642,40 +8228,6 @@
                   <a:latin typeface="+mn-lt"/>
                 </a:endParaRPr>
               </a:p>
-              <a:p>
-                <a:pPr eaLnBrk="1" hangingPunct="1">
-                  <a:spcBef>
-                    <a:spcPct val="10000"/>
-                  </a:spcBef>
-                </a:pPr>
-                <a:r>
-                  <a:rPr lang="en-US" altLang="he-IL" sz="2500" dirty="0" smtClean="0">
-                    <a:latin typeface="+mn-lt"/>
-                  </a:rPr>
-                  <a:t>We assume that the only interaction between strains in </a:t>
-                </a:r>
-                <a:r>
-                  <a:rPr lang="en-US" altLang="he-IL" sz="2500" b="1" dirty="0" smtClean="0">
-                    <a:latin typeface="+mn-lt"/>
-                  </a:rPr>
-                  <a:t>resource competition</a:t>
-                </a:r>
-                <a:r>
-                  <a:rPr lang="en-US" altLang="he-IL" sz="2500" baseline="30000" dirty="0" smtClean="0">
-                    <a:latin typeface="+mn-lt"/>
-                  </a:rPr>
-                  <a:t>2,4</a:t>
-                </a:r>
-                <a:r>
-                  <a:rPr lang="en-US" altLang="he-IL" sz="2500" dirty="0" smtClean="0">
-                    <a:latin typeface="+mn-lt"/>
-                  </a:rPr>
-                  <a:t>.</a:t>
-                </a:r>
-                <a:endParaRPr lang="en-US" altLang="he-IL" sz="2500" dirty="0">
-                  <a:latin typeface="+mn-lt"/>
-                </a:endParaRPr>
-              </a:p>
             </p:txBody>
           </p:sp>
         </mc:Choice>
@@ -8697,7 +8249,7 @@
                 <a:avLst/>
               </a:prstGeom>
               <a:blipFill rotWithShape="1">
-                <a:blip r:embed="rId7"/>
+                <a:blip r:embed="rId8"/>
                 <a:stretch>
                   <a:fillRect/>
                 </a:stretch>
@@ -9878,7 +9430,7 @@
           <p:nvPr/>
         </p:nvPicPr>
         <p:blipFill>
-          <a:blip r:embed="rId8">
+          <a:blip r:embed="rId9">
             <a:extLst>
               <a:ext uri="{28A0092B-C50C-407E-A947-70E740481C1C}">
                 <a14:useLocalDpi xmlns:a14="http://schemas.microsoft.com/office/drawing/2010/main" val="0"/>
@@ -9919,7 +9471,7 @@
           <p:nvPr/>
         </p:nvPicPr>
         <p:blipFill>
-          <a:blip r:embed="rId9">
+          <a:blip r:embed="rId10">
             <a:extLst>
               <a:ext uri="{28A0092B-C50C-407E-A947-70E740481C1C}">
                 <a14:useLocalDpi xmlns:a14="http://schemas.microsoft.com/office/drawing/2010/main" val="0"/>
@@ -9960,7 +9512,7 @@
           <p:nvPr/>
         </p:nvPicPr>
         <p:blipFill rotWithShape="1">
-          <a:blip r:embed="rId10">
+          <a:blip r:embed="rId11">
             <a:extLst>
               <a:ext uri="{28A0092B-C50C-407E-A947-70E740481C1C}">
                 <a14:useLocalDpi xmlns:a14="http://schemas.microsoft.com/office/drawing/2010/main" val="0"/>
@@ -10022,7 +9574,7 @@
           <p:nvPr/>
         </p:nvPicPr>
         <p:blipFill>
-          <a:blip r:embed="rId11">
+          <a:blip r:embed="rId12">
             <a:extLst>
               <a:ext uri="{28A0092B-C50C-407E-A947-70E740481C1C}">
                 <a14:useLocalDpi xmlns:a14="http://schemas.microsoft.com/office/drawing/2010/main" val="0"/>
@@ -10076,7 +9628,7 @@
           <p:nvPr/>
         </p:nvPicPr>
         <p:blipFill>
-          <a:blip r:embed="rId12">
+          <a:blip r:embed="rId13">
             <a:extLst>
               <a:ext uri="{28A0092B-C50C-407E-A947-70E740481C1C}">
                 <a14:useLocalDpi xmlns:a14="http://schemas.microsoft.com/office/drawing/2010/main" val="0"/>
@@ -10130,7 +9682,7 @@
           <p:nvPr/>
         </p:nvPicPr>
         <p:blipFill>
-          <a:blip r:embed="rId13">
+          <a:blip r:embed="rId14">
             <a:extLst>
               <a:ext uri="{28A0092B-C50C-407E-A947-70E740481C1C}">
                 <a14:useLocalDpi xmlns:a14="http://schemas.microsoft.com/office/drawing/2010/main" val="0"/>
@@ -10171,7 +9723,7 @@
           <p:nvPr/>
         </p:nvPicPr>
         <p:blipFill>
-          <a:blip r:embed="rId14">
+          <a:blip r:embed="rId15">
             <a:extLst>
               <a:ext uri="{28A0092B-C50C-407E-A947-70E740481C1C}">
                 <a14:useLocalDpi xmlns:a14="http://schemas.microsoft.com/office/drawing/2010/main" val="0"/>
@@ -10323,7 +9875,7 @@
                 <p:nvPr/>
               </p:nvPicPr>
               <p:blipFill>
-                <a:blip r:embed="rId15">
+                <a:blip r:embed="rId16">
                   <a:extLst>
                     <a:ext uri="{28A0092B-C50C-407E-A947-70E740481C1C}">
                       <a14:useLocalDpi xmlns:a14="http://schemas.microsoft.com/office/drawing/2010/main" val="0"/>
@@ -10387,7 +9939,7 @@
                 <p:nvPr/>
               </p:nvPicPr>
               <p:blipFill>
-                <a:blip r:embed="rId16">
+                <a:blip r:embed="rId17">
                   <a:extLst>
                     <a:ext uri="{28A0092B-C50C-407E-A947-70E740481C1C}">
                       <a14:useLocalDpi xmlns:a14="http://schemas.microsoft.com/office/drawing/2010/main" val="0"/>
@@ -10451,7 +10003,7 @@
                 <p:nvPr/>
               </p:nvPicPr>
               <p:blipFill>
-                <a:blip r:embed="rId17">
+                <a:blip r:embed="rId18">
                   <a:extLst>
                     <a:ext uri="{28A0092B-C50C-407E-A947-70E740481C1C}">
                       <a14:useLocalDpi xmlns:a14="http://schemas.microsoft.com/office/drawing/2010/main" val="0"/>
@@ -10611,7 +10163,7 @@
             <p:nvPr/>
           </p:nvPicPr>
           <p:blipFill>
-            <a:blip r:embed="rId18">
+            <a:blip r:embed="rId19">
               <a:extLst>
                 <a:ext uri="{28A0092B-C50C-407E-A947-70E740481C1C}">
                   <a14:useLocalDpi xmlns:a14="http://schemas.microsoft.com/office/drawing/2010/main" val="0"/>
@@ -10653,7 +10205,7 @@
           <p:nvPr/>
         </p:nvPicPr>
         <p:blipFill>
-          <a:blip r:embed="rId19">
+          <a:blip r:embed="rId20">
             <a:extLst>
               <a:ext uri="{28A0092B-C50C-407E-A947-70E740481C1C}">
                 <a14:useLocalDpi xmlns:a14="http://schemas.microsoft.com/office/drawing/2010/main" val="0"/>
@@ -10787,47 +10339,6 @@
           </a:p>
         </p:txBody>
       </p:sp>
-      <p:pic>
-        <p:nvPicPr>
-          <p:cNvPr id="10" name="Picture 7" descr="D:\university\presentations\GRC 2015\frequency_fit.png"/>
-          <p:cNvPicPr>
-            <a:picLocks noChangeAspect="1" noChangeArrowheads="1"/>
-          </p:cNvPicPr>
-          <p:nvPr/>
-        </p:nvPicPr>
-        <p:blipFill>
-          <a:blip r:embed="rId20">
-            <a:extLst>
-              <a:ext uri="{28A0092B-C50C-407E-A947-70E740481C1C}">
-                <a14:useLocalDpi xmlns:a14="http://schemas.microsoft.com/office/drawing/2010/main" val="0"/>
-              </a:ext>
-            </a:extLst>
-          </a:blip>
-          <a:srcRect/>
-          <a:stretch>
-            <a:fillRect/>
-          </a:stretch>
-        </p:blipFill>
-        <p:spPr bwMode="auto">
-          <a:xfrm>
-            <a:off x="11304000" y="22957613"/>
-            <a:ext cx="7748587" cy="5310187"/>
-          </a:xfrm>
-          <a:prstGeom prst="rect">
-            <a:avLst/>
-          </a:prstGeom>
-          <a:noFill/>
-          <a:extLst>
-            <a:ext uri="{909E8E84-426E-40DD-AFC4-6F175D3DCCD1}">
-              <a14:hiddenFill xmlns:a14="http://schemas.microsoft.com/office/drawing/2010/main">
-                <a:solidFill>
-                  <a:srgbClr val="FFFFFF"/>
-                </a:solidFill>
-              </a14:hiddenFill>
-            </a:ext>
-          </a:extLst>
-        </p:spPr>
-      </p:pic>
       <p:pic>
         <p:nvPicPr>
           <p:cNvPr id="1032" name="Picture 8" descr="D:\university\presentations\GRC 2015\all_curves.png"/>
@@ -11133,8 +10644,8 @@
           </a:extLst>
         </p:spPr>
       </p:pic>
-      <mc:AlternateContent xmlns:mc="http://schemas.openxmlformats.org/markup-compatibility/2006">
-        <mc:Choice xmlns:a14="http://schemas.microsoft.com/office/drawing/2010/main" Requires="a14">
+      <mc:AlternateContent xmlns:mc="http://schemas.openxmlformats.org/markup-compatibility/2006" xmlns:a14="http://schemas.microsoft.com/office/drawing/2010/main">
+        <mc:Choice Requires="a14">
           <p:graphicFrame>
             <p:nvGraphicFramePr>
               <p:cNvPr id="6" name="Table 5"/>
@@ -11293,8 +10804,8 @@
                                 <m:sSub>
                                   <m:sSubPr>
                                     <m:ctrlPr>
-                                      <a:rPr lang="en-US" altLang="he-IL" sz="1600" smtClean="0">
-                                        <a:latin typeface="Cambria Math" panose="02040503050406030204" pitchFamily="18" charset="0"/>
+                                      <a:rPr lang="en-US" altLang="he-IL" sz="1600" i="1" smtClean="0">
+                                        <a:latin typeface="Cambria Math"/>
                                         <a:ea typeface="Cambria Math" panose="02040503050406030204" pitchFamily="18" charset="0"/>
                                       </a:rPr>
                                     </m:ctrlPr>
@@ -11687,7 +11198,7 @@
             </a:graphic>
           </p:graphicFrame>
         </mc:Choice>
-        <mc:Fallback>
+        <mc:Fallback xmlns="">
           <p:graphicFrame>
             <p:nvGraphicFramePr>
               <p:cNvPr id="6" name="Table 5"/>
@@ -12190,6 +11701,7 @@
           </a:bodyPr>
           <a:lstStyle/>
           <a:p>
+            <a:pPr indent="180000"/>
             <a:r>
               <a:rPr lang="en-US" altLang="he-IL" sz="2500" dirty="0">
                 <a:latin typeface="Times New Roman" pitchFamily="18" charset="0"/>
@@ -12419,6 +11931,241 @@
           </a:fontRef>
         </p:style>
       </p:cxnSp>
+      <mc:AlternateContent xmlns:mc="http://schemas.openxmlformats.org/markup-compatibility/2006">
+        <mc:Choice xmlns:a14="http://schemas.microsoft.com/office/drawing/2010/main" Requires="a14">
+          <p:sp>
+            <p:nvSpPr>
+              <p:cNvPr id="14" name="Rectangle 13"/>
+              <p:cNvSpPr/>
+              <p:nvPr/>
+            </p:nvSpPr>
+            <p:spPr>
+              <a:xfrm>
+                <a:off x="12613101" y="28885909"/>
+                <a:ext cx="3753913" cy="954107"/>
+              </a:xfrm>
+              <a:prstGeom prst="rect">
+                <a:avLst/>
+              </a:prstGeom>
+            </p:spPr>
+            <p:txBody>
+              <a:bodyPr wrap="none">
+                <a:spAutoFit/>
+              </a:bodyPr>
+              <a:lstStyle/>
+              <a:p>
+                <a:pPr eaLnBrk="1" hangingPunct="1">
+                  <a:spcBef>
+                    <a:spcPct val="10000"/>
+                  </a:spcBef>
+                </a:pPr>
+                <a14:m>
+                  <m:oMathPara xmlns:m="http://schemas.openxmlformats.org/officeDocument/2006/math">
+                    <m:oMathParaPr>
+                      <m:jc m:val="left"/>
+                    </m:oMathParaPr>
+                    <m:oMath xmlns:m="http://schemas.openxmlformats.org/officeDocument/2006/math">
+                      <m:sSub>
+                        <m:sSubPr>
+                          <m:ctrlPr>
+                            <a:rPr lang="en-US" altLang="he-IL" i="1" smtClean="0">
+                              <a:latin typeface="Cambria Math"/>
+                            </a:rPr>
+                          </m:ctrlPr>
+                        </m:sSubPr>
+                        <m:e>
+                          <m:r>
+                            <a:rPr lang="en-US" altLang="he-IL" i="1">
+                              <a:latin typeface="Cambria Math"/>
+                            </a:rPr>
+                            <m:t>𝑝</m:t>
+                          </m:r>
+                        </m:e>
+                        <m:sub>
+                          <m:r>
+                            <a:rPr lang="en-US" altLang="he-IL" i="1">
+                              <a:latin typeface="Cambria Math"/>
+                            </a:rPr>
+                            <m:t>0</m:t>
+                          </m:r>
+                        </m:sub>
+                      </m:sSub>
+                      <m:r>
+                        <a:rPr lang="en-US" altLang="he-IL" i="1">
+                          <a:latin typeface="Cambria Math"/>
+                        </a:rPr>
+                        <m:t>=</m:t>
+                      </m:r>
+                      <m:r>
+                        <a:rPr lang="en-US" altLang="he-IL" i="1">
+                          <a:latin typeface="Cambria Math"/>
+                        </a:rPr>
+                        <m:t>0</m:t>
+                      </m:r>
+                      <m:r>
+                        <a:rPr lang="en-US" altLang="he-IL" i="1">
+                          <a:latin typeface="Cambria Math"/>
+                        </a:rPr>
+                        <m:t>.</m:t>
+                      </m:r>
+                      <m:r>
+                        <a:rPr lang="en-US" altLang="he-IL" i="1">
+                          <a:latin typeface="Cambria Math"/>
+                        </a:rPr>
+                        <m:t>495</m:t>
+                      </m:r>
+                      <m:r>
+                        <a:rPr lang="en-US" altLang="he-IL" i="1">
+                          <a:latin typeface="Cambria Math"/>
+                        </a:rPr>
+                        <m:t>±</m:t>
+                      </m:r>
+                      <m:r>
+                        <a:rPr lang="en-US" altLang="he-IL" i="1">
+                          <a:latin typeface="Cambria Math"/>
+                        </a:rPr>
+                        <m:t>0</m:t>
+                      </m:r>
+                      <m:r>
+                        <a:rPr lang="en-US" altLang="he-IL" i="1">
+                          <a:latin typeface="Cambria Math"/>
+                        </a:rPr>
+                        <m:t>.</m:t>
+                      </m:r>
+                      <m:r>
+                        <a:rPr lang="en-US" altLang="he-IL" i="1">
+                          <a:latin typeface="Cambria Math"/>
+                        </a:rPr>
+                        <m:t>001</m:t>
+                      </m:r>
+                    </m:oMath>
+                  </m:oMathPara>
+                </a14:m>
+                <a:endParaRPr lang="en-US" altLang="he-IL" i="1" dirty="0" smtClean="0">
+                  <a:latin typeface="Cambria Math"/>
+                </a:endParaRPr>
+              </a:p>
+              <a:p>
+                <a:pPr eaLnBrk="1" hangingPunct="1">
+                  <a:spcBef>
+                    <a:spcPct val="10000"/>
+                  </a:spcBef>
+                </a:pPr>
+                <a14:m>
+                  <m:oMathPara xmlns:m="http://schemas.openxmlformats.org/officeDocument/2006/math">
+                    <m:oMathParaPr>
+                      <m:jc m:val="left"/>
+                    </m:oMathParaPr>
+                    <m:oMath xmlns:m="http://schemas.openxmlformats.org/officeDocument/2006/math">
+                      <m:r>
+                        <a:rPr lang="en-US" altLang="he-IL" i="1">
+                          <a:latin typeface="Cambria Math"/>
+                        </a:rPr>
+                        <m:t> </m:t>
+                      </m:r>
+                      <m:r>
+                        <a:rPr lang="en-US" altLang="he-IL" i="1">
+                          <a:latin typeface="Cambria Math"/>
+                        </a:rPr>
+                        <m:t>𝑠</m:t>
+                      </m:r>
+                      <m:r>
+                        <a:rPr lang="en-US" altLang="he-IL" i="1">
+                          <a:latin typeface="Cambria Math"/>
+                        </a:rPr>
+                        <m:t>=</m:t>
+                      </m:r>
+                      <m:r>
+                        <a:rPr lang="en-US" altLang="he-IL" i="1">
+                          <a:latin typeface="Cambria Math"/>
+                        </a:rPr>
+                        <m:t>0</m:t>
+                      </m:r>
+                      <m:r>
+                        <a:rPr lang="en-US" altLang="he-IL" i="1">
+                          <a:latin typeface="Cambria Math"/>
+                        </a:rPr>
+                        <m:t>.</m:t>
+                      </m:r>
+                      <m:r>
+                        <a:rPr lang="en-US" altLang="he-IL" i="1">
+                          <a:latin typeface="Cambria Math"/>
+                        </a:rPr>
+                        <m:t>0261</m:t>
+                      </m:r>
+                      <m:r>
+                        <a:rPr lang="en-US" altLang="he-IL" i="1">
+                          <a:latin typeface="Cambria Math"/>
+                        </a:rPr>
+                        <m:t>±</m:t>
+                      </m:r>
+                      <m:r>
+                        <a:rPr lang="en-US" altLang="he-IL" i="1">
+                          <a:latin typeface="Cambria Math"/>
+                        </a:rPr>
+                        <m:t>0</m:t>
+                      </m:r>
+                      <m:r>
+                        <a:rPr lang="en-US" altLang="he-IL" i="1">
+                          <a:latin typeface="Cambria Math"/>
+                        </a:rPr>
+                        <m:t>.</m:t>
+                      </m:r>
+                      <m:r>
+                        <a:rPr lang="en-US" altLang="he-IL" i="1">
+                          <a:latin typeface="Cambria Math"/>
+                        </a:rPr>
+                        <m:t>00018</m:t>
+                      </m:r>
+                    </m:oMath>
+                  </m:oMathPara>
+                </a14:m>
+                <a:endParaRPr lang="en-US" altLang="he-IL" dirty="0">
+                  <a:latin typeface="Times New Roman" pitchFamily="18" charset="0"/>
+                </a:endParaRPr>
+              </a:p>
+            </p:txBody>
+          </p:sp>
+        </mc:Choice>
+        <mc:Fallback>
+          <p:sp>
+            <p:nvSpPr>
+              <p:cNvPr id="14" name="Rectangle 13"/>
+              <p:cNvSpPr>
+                <a:spLocks noRot="1" noChangeAspect="1" noMove="1" noResize="1" noEditPoints="1" noAdjustHandles="1" noChangeArrowheads="1" noChangeShapeType="1" noTextEdit="1"/>
+              </p:cNvSpPr>
+              <p:nvPr/>
+            </p:nvSpPr>
+            <p:spPr>
+              <a:xfrm>
+                <a:off x="12613101" y="28885909"/>
+                <a:ext cx="3753913" cy="954107"/>
+              </a:xfrm>
+              <a:prstGeom prst="rect">
+                <a:avLst/>
+              </a:prstGeom>
+              <a:blipFill rotWithShape="1">
+                <a:blip r:embed="rId28"/>
+                <a:stretch>
+                  <a:fillRect/>
+                </a:stretch>
+              </a:blipFill>
+            </p:spPr>
+            <p:txBody>
+              <a:bodyPr/>
+              <a:lstStyle/>
+              <a:p>
+                <a:r>
+                  <a:rPr lang="he-IL">
+                    <a:noFill/>
+                  </a:rPr>
+                  <a:t> </a:t>
+                </a:r>
+              </a:p>
+            </p:txBody>
+          </p:sp>
+        </mc:Fallback>
+      </mc:AlternateContent>
     </p:spTree>
   </p:cSld>
   <p:clrMapOvr>

</xml_diff>

<commit_message>
bg color, reorganize bottom and colors
</commit_message>
<xml_diff>
--- a/poster.pptx
+++ b/poster.pptx
@@ -4170,6 +4170,16 @@
 <file path=ppt/slides/slide1.xml><?xml version="1.0" encoding="utf-8"?>
 <p:sld xmlns:a="http://schemas.openxmlformats.org/drawingml/2006/main" xmlns:r="http://schemas.openxmlformats.org/officeDocument/2006/relationships" xmlns:p="http://schemas.openxmlformats.org/presentationml/2006/main">
   <p:cSld>
+    <p:bg>
+      <p:bgPr>
+        <a:solidFill>
+          <a:srgbClr val="A3C1BA">
+            <a:alpha val="64000"/>
+          </a:srgbClr>
+        </a:solidFill>
+        <a:effectLst/>
+      </p:bgPr>
+    </p:bg>
     <p:spTree>
       <p:nvGrpSpPr>
         <p:cNvPr id="1" name=""/>
@@ -4184,6 +4194,304 @@
           <a:chExt cx="0" cy="0"/>
         </a:xfrm>
       </p:grpSpPr>
+      <p:sp>
+        <p:nvSpPr>
+          <p:cNvPr id="67" name="Text Box 16"/>
+          <p:cNvSpPr txBox="1">
+            <a:spLocks noChangeArrowheads="1"/>
+          </p:cNvSpPr>
+          <p:nvPr/>
+        </p:nvSpPr>
+        <p:spPr bwMode="auto">
+          <a:xfrm>
+            <a:off x="20530755" y="35783432"/>
+            <a:ext cx="8410239" cy="6113056"/>
+          </a:xfrm>
+          <a:prstGeom prst="rect">
+            <a:avLst/>
+          </a:prstGeom>
+          <a:solidFill>
+            <a:schemeClr val="bg1"/>
+          </a:solidFill>
+          <a:ln w="38100">
+            <a:solidFill>
+              <a:srgbClr val="000000"/>
+            </a:solidFill>
+            <a:round/>
+            <a:headEnd/>
+            <a:tailEnd/>
+          </a:ln>
+        </p:spPr>
+        <p:txBody>
+          <a:bodyPr lIns="802806" tIns="401404" rIns="802806" bIns="802806"/>
+          <a:lstStyle>
+            <a:lvl1pPr eaLnBrk="0" hangingPunct="0">
+              <a:defRPr sz="2800">
+                <a:solidFill>
+                  <a:schemeClr val="tx1"/>
+                </a:solidFill>
+                <a:latin typeface="Helvetica" pitchFamily="124" charset="0"/>
+                <a:ea typeface="MS PGothic" pitchFamily="34" charset="-128"/>
+              </a:defRPr>
+            </a:lvl1pPr>
+            <a:lvl2pPr marL="742950" indent="-285750" eaLnBrk="0" hangingPunct="0">
+              <a:defRPr sz="2800">
+                <a:solidFill>
+                  <a:schemeClr val="tx1"/>
+                </a:solidFill>
+                <a:latin typeface="Helvetica" pitchFamily="124" charset="0"/>
+                <a:ea typeface="MS PGothic" pitchFamily="34" charset="-128"/>
+              </a:defRPr>
+            </a:lvl2pPr>
+            <a:lvl3pPr marL="1143000" indent="-228600" eaLnBrk="0" hangingPunct="0">
+              <a:defRPr sz="2800">
+                <a:solidFill>
+                  <a:schemeClr val="tx1"/>
+                </a:solidFill>
+                <a:latin typeface="Helvetica" pitchFamily="124" charset="0"/>
+                <a:ea typeface="MS PGothic" pitchFamily="34" charset="-128"/>
+              </a:defRPr>
+            </a:lvl3pPr>
+            <a:lvl4pPr marL="1600200" indent="-228600" eaLnBrk="0" hangingPunct="0">
+              <a:defRPr sz="2800">
+                <a:solidFill>
+                  <a:schemeClr val="tx1"/>
+                </a:solidFill>
+                <a:latin typeface="Helvetica" pitchFamily="124" charset="0"/>
+                <a:ea typeface="MS PGothic" pitchFamily="34" charset="-128"/>
+              </a:defRPr>
+            </a:lvl4pPr>
+            <a:lvl5pPr marL="2057400" indent="-228600" eaLnBrk="0" hangingPunct="0">
+              <a:defRPr sz="2800">
+                <a:solidFill>
+                  <a:schemeClr val="tx1"/>
+                </a:solidFill>
+                <a:latin typeface="Helvetica" pitchFamily="124" charset="0"/>
+                <a:ea typeface="MS PGothic" pitchFamily="34" charset="-128"/>
+              </a:defRPr>
+            </a:lvl5pPr>
+            <a:lvl6pPr marL="2514600" indent="-228600" algn="l" rtl="0" eaLnBrk="0" fontAlgn="base" hangingPunct="0">
+              <a:spcBef>
+                <a:spcPct val="0"/>
+              </a:spcBef>
+              <a:spcAft>
+                <a:spcPct val="0"/>
+              </a:spcAft>
+              <a:defRPr sz="2800">
+                <a:solidFill>
+                  <a:schemeClr val="tx1"/>
+                </a:solidFill>
+                <a:latin typeface="Helvetica" pitchFamily="124" charset="0"/>
+                <a:ea typeface="MS PGothic" pitchFamily="34" charset="-128"/>
+              </a:defRPr>
+            </a:lvl6pPr>
+            <a:lvl7pPr marL="2971800" indent="-228600" algn="l" rtl="0" eaLnBrk="0" fontAlgn="base" hangingPunct="0">
+              <a:spcBef>
+                <a:spcPct val="0"/>
+              </a:spcBef>
+              <a:spcAft>
+                <a:spcPct val="0"/>
+              </a:spcAft>
+              <a:defRPr sz="2800">
+                <a:solidFill>
+                  <a:schemeClr val="tx1"/>
+                </a:solidFill>
+                <a:latin typeface="Helvetica" pitchFamily="124" charset="0"/>
+                <a:ea typeface="MS PGothic" pitchFamily="34" charset="-128"/>
+              </a:defRPr>
+            </a:lvl7pPr>
+            <a:lvl8pPr marL="3429000" indent="-228600" algn="l" rtl="0" eaLnBrk="0" fontAlgn="base" hangingPunct="0">
+              <a:spcBef>
+                <a:spcPct val="0"/>
+              </a:spcBef>
+              <a:spcAft>
+                <a:spcPct val="0"/>
+              </a:spcAft>
+              <a:defRPr sz="2800">
+                <a:solidFill>
+                  <a:schemeClr val="tx1"/>
+                </a:solidFill>
+                <a:latin typeface="Helvetica" pitchFamily="124" charset="0"/>
+                <a:ea typeface="MS PGothic" pitchFamily="34" charset="-128"/>
+              </a:defRPr>
+            </a:lvl8pPr>
+            <a:lvl9pPr marL="3886200" indent="-228600" algn="l" rtl="0" eaLnBrk="0" fontAlgn="base" hangingPunct="0">
+              <a:spcBef>
+                <a:spcPct val="0"/>
+              </a:spcBef>
+              <a:spcAft>
+                <a:spcPct val="0"/>
+              </a:spcAft>
+              <a:defRPr sz="2800">
+                <a:solidFill>
+                  <a:schemeClr val="tx1"/>
+                </a:solidFill>
+                <a:latin typeface="Helvetica" pitchFamily="124" charset="0"/>
+                <a:ea typeface="MS PGothic" pitchFamily="34" charset="-128"/>
+              </a:defRPr>
+            </a:lvl9pPr>
+          </a:lstStyle>
+          <a:p>
+            <a:pPr eaLnBrk="1" hangingPunct="1">
+              <a:spcBef>
+                <a:spcPct val="50000"/>
+              </a:spcBef>
+            </a:pPr>
+            <a:endParaRPr lang="en-GB" sz="2500" dirty="0">
+              <a:latin typeface="Times New Roman" pitchFamily="18" charset="0"/>
+            </a:endParaRPr>
+          </a:p>
+        </p:txBody>
+      </p:sp>
+      <p:sp>
+        <p:nvSpPr>
+          <p:cNvPr id="62" name="Text Box 16"/>
+          <p:cNvSpPr txBox="1">
+            <a:spLocks noChangeArrowheads="1"/>
+          </p:cNvSpPr>
+          <p:nvPr/>
+        </p:nvSpPr>
+        <p:spPr bwMode="auto">
+          <a:xfrm>
+            <a:off x="10955768" y="35783839"/>
+            <a:ext cx="8458924" cy="6113056"/>
+          </a:xfrm>
+          <a:prstGeom prst="rect">
+            <a:avLst/>
+          </a:prstGeom>
+          <a:solidFill>
+            <a:schemeClr val="bg1"/>
+          </a:solidFill>
+          <a:ln w="38100">
+            <a:solidFill>
+              <a:srgbClr val="000000"/>
+            </a:solidFill>
+            <a:round/>
+            <a:headEnd/>
+            <a:tailEnd/>
+          </a:ln>
+        </p:spPr>
+        <p:txBody>
+          <a:bodyPr lIns="802806" tIns="401404" rIns="802806" bIns="802806"/>
+          <a:lstStyle>
+            <a:lvl1pPr eaLnBrk="0" hangingPunct="0">
+              <a:defRPr sz="2800">
+                <a:solidFill>
+                  <a:schemeClr val="tx1"/>
+                </a:solidFill>
+                <a:latin typeface="Helvetica" pitchFamily="124" charset="0"/>
+                <a:ea typeface="MS PGothic" pitchFamily="34" charset="-128"/>
+              </a:defRPr>
+            </a:lvl1pPr>
+            <a:lvl2pPr marL="742950" indent="-285750" eaLnBrk="0" hangingPunct="0">
+              <a:defRPr sz="2800">
+                <a:solidFill>
+                  <a:schemeClr val="tx1"/>
+                </a:solidFill>
+                <a:latin typeface="Helvetica" pitchFamily="124" charset="0"/>
+                <a:ea typeface="MS PGothic" pitchFamily="34" charset="-128"/>
+              </a:defRPr>
+            </a:lvl2pPr>
+            <a:lvl3pPr marL="1143000" indent="-228600" eaLnBrk="0" hangingPunct="0">
+              <a:defRPr sz="2800">
+                <a:solidFill>
+                  <a:schemeClr val="tx1"/>
+                </a:solidFill>
+                <a:latin typeface="Helvetica" pitchFamily="124" charset="0"/>
+                <a:ea typeface="MS PGothic" pitchFamily="34" charset="-128"/>
+              </a:defRPr>
+            </a:lvl3pPr>
+            <a:lvl4pPr marL="1600200" indent="-228600" eaLnBrk="0" hangingPunct="0">
+              <a:defRPr sz="2800">
+                <a:solidFill>
+                  <a:schemeClr val="tx1"/>
+                </a:solidFill>
+                <a:latin typeface="Helvetica" pitchFamily="124" charset="0"/>
+                <a:ea typeface="MS PGothic" pitchFamily="34" charset="-128"/>
+              </a:defRPr>
+            </a:lvl4pPr>
+            <a:lvl5pPr marL="2057400" indent="-228600" eaLnBrk="0" hangingPunct="0">
+              <a:defRPr sz="2800">
+                <a:solidFill>
+                  <a:schemeClr val="tx1"/>
+                </a:solidFill>
+                <a:latin typeface="Helvetica" pitchFamily="124" charset="0"/>
+                <a:ea typeface="MS PGothic" pitchFamily="34" charset="-128"/>
+              </a:defRPr>
+            </a:lvl5pPr>
+            <a:lvl6pPr marL="2514600" indent="-228600" algn="l" rtl="0" eaLnBrk="0" fontAlgn="base" hangingPunct="0">
+              <a:spcBef>
+                <a:spcPct val="0"/>
+              </a:spcBef>
+              <a:spcAft>
+                <a:spcPct val="0"/>
+              </a:spcAft>
+              <a:defRPr sz="2800">
+                <a:solidFill>
+                  <a:schemeClr val="tx1"/>
+                </a:solidFill>
+                <a:latin typeface="Helvetica" pitchFamily="124" charset="0"/>
+                <a:ea typeface="MS PGothic" pitchFamily="34" charset="-128"/>
+              </a:defRPr>
+            </a:lvl6pPr>
+            <a:lvl7pPr marL="2971800" indent="-228600" algn="l" rtl="0" eaLnBrk="0" fontAlgn="base" hangingPunct="0">
+              <a:spcBef>
+                <a:spcPct val="0"/>
+              </a:spcBef>
+              <a:spcAft>
+                <a:spcPct val="0"/>
+              </a:spcAft>
+              <a:defRPr sz="2800">
+                <a:solidFill>
+                  <a:schemeClr val="tx1"/>
+                </a:solidFill>
+                <a:latin typeface="Helvetica" pitchFamily="124" charset="0"/>
+                <a:ea typeface="MS PGothic" pitchFamily="34" charset="-128"/>
+              </a:defRPr>
+            </a:lvl7pPr>
+            <a:lvl8pPr marL="3429000" indent="-228600" algn="l" rtl="0" eaLnBrk="0" fontAlgn="base" hangingPunct="0">
+              <a:spcBef>
+                <a:spcPct val="0"/>
+              </a:spcBef>
+              <a:spcAft>
+                <a:spcPct val="0"/>
+              </a:spcAft>
+              <a:defRPr sz="2800">
+                <a:solidFill>
+                  <a:schemeClr val="tx1"/>
+                </a:solidFill>
+                <a:latin typeface="Helvetica" pitchFamily="124" charset="0"/>
+                <a:ea typeface="MS PGothic" pitchFamily="34" charset="-128"/>
+              </a:defRPr>
+            </a:lvl8pPr>
+            <a:lvl9pPr marL="3886200" indent="-228600" algn="l" rtl="0" eaLnBrk="0" fontAlgn="base" hangingPunct="0">
+              <a:spcBef>
+                <a:spcPct val="0"/>
+              </a:spcBef>
+              <a:spcAft>
+                <a:spcPct val="0"/>
+              </a:spcAft>
+              <a:defRPr sz="2800">
+                <a:solidFill>
+                  <a:schemeClr val="tx1"/>
+                </a:solidFill>
+                <a:latin typeface="Helvetica" pitchFamily="124" charset="0"/>
+                <a:ea typeface="MS PGothic" pitchFamily="34" charset="-128"/>
+              </a:defRPr>
+            </a:lvl9pPr>
+          </a:lstStyle>
+          <a:p>
+            <a:pPr eaLnBrk="1" hangingPunct="1">
+              <a:spcBef>
+                <a:spcPct val="50000"/>
+              </a:spcBef>
+            </a:pPr>
+            <a:endParaRPr lang="en-GB" sz="2500" dirty="0">
+              <a:latin typeface="Times New Roman" pitchFamily="18" charset="0"/>
+            </a:endParaRPr>
+          </a:p>
+        </p:txBody>
+      </p:sp>
       <mc:AlternateContent xmlns:mc="http://schemas.openxmlformats.org/markup-compatibility/2006">
         <mc:Choice xmlns:a14="http://schemas.microsoft.com/office/drawing/2010/main" Requires="a14">
           <p:sp>
@@ -4362,7 +4670,7 @@
                 <a:r>
                   <a:rPr lang="en-US" altLang="he-IL" sz="4200" b="1" dirty="0" smtClean="0">
                     <a:solidFill>
-                      <a:srgbClr val="000000"/>
+                      <a:srgbClr val="3B7EB5"/>
                     </a:solidFill>
                     <a:latin typeface="Calibri" pitchFamily="34" charset="0"/>
                   </a:rPr>
@@ -4370,7 +4678,7 @@
                 </a:r>
                 <a:endParaRPr lang="en-US" altLang="he-IL" sz="4200" b="1" dirty="0">
                   <a:solidFill>
-                    <a:srgbClr val="000000"/>
+                    <a:srgbClr val="3B7EB5"/>
                   </a:solidFill>
                   <a:latin typeface="Calibri" pitchFamily="34" charset="0"/>
                 </a:endParaRPr>
@@ -5086,47 +5394,6 @@
           </a:extLst>
         </p:spPr>
       </p:pic>
-      <p:pic>
-        <p:nvPicPr>
-          <p:cNvPr id="1052" name="Picture 28" descr="D:\workspace\curveball_project\gh-pages\img\logo_200px.png"/>
-          <p:cNvPicPr>
-            <a:picLocks noChangeAspect="1" noChangeArrowheads="1"/>
-          </p:cNvPicPr>
-          <p:nvPr/>
-        </p:nvPicPr>
-        <p:blipFill>
-          <a:blip r:embed="rId6">
-            <a:extLst>
-              <a:ext uri="{28A0092B-C50C-407E-A947-70E740481C1C}">
-                <a14:useLocalDpi xmlns:a14="http://schemas.microsoft.com/office/drawing/2010/main" val="0"/>
-              </a:ext>
-            </a:extLst>
-          </a:blip>
-          <a:srcRect/>
-          <a:stretch>
-            <a:fillRect/>
-          </a:stretch>
-        </p:blipFill>
-        <p:spPr bwMode="auto">
-          <a:xfrm>
-            <a:off x="26797871" y="34638641"/>
-            <a:ext cx="2540000" cy="2540000"/>
-          </a:xfrm>
-          <a:prstGeom prst="rect">
-            <a:avLst/>
-          </a:prstGeom>
-          <a:noFill/>
-          <a:extLst>
-            <a:ext uri="{909E8E84-426E-40DD-AFC4-6F175D3DCCD1}">
-              <a14:hiddenFill xmlns:a14="http://schemas.microsoft.com/office/drawing/2010/main">
-                <a:solidFill>
-                  <a:srgbClr val="FFFFFF"/>
-                </a:solidFill>
-              </a14:hiddenFill>
-            </a:ext>
-          </a:extLst>
-        </p:spPr>
-      </p:pic>
       <p:sp>
         <p:nvSpPr>
           <p:cNvPr id="14343" name="Text Box 13"/>
@@ -5300,7 +5567,7 @@
             <a:r>
               <a:rPr lang="en-US" altLang="he-IL" sz="4200" b="1" dirty="0" smtClean="0">
                 <a:solidFill>
-                  <a:srgbClr val="000000"/>
+                  <a:srgbClr val="E02829"/>
                 </a:solidFill>
                 <a:latin typeface="Calibri" pitchFamily="34" charset="0"/>
               </a:rPr>
@@ -5308,7 +5575,7 @@
             </a:r>
             <a:endParaRPr lang="en-US" altLang="he-IL" sz="4200" b="1" dirty="0">
               <a:solidFill>
-                <a:srgbClr val="000000"/>
+                <a:srgbClr val="E02829"/>
               </a:solidFill>
               <a:latin typeface="Calibri" pitchFamily="34" charset="0"/>
             </a:endParaRPr>
@@ -5340,7 +5607,7 @@
             <a:r>
               <a:rPr lang="en-US" altLang="he-IL" sz="2500" dirty="0" smtClean="0">
                 <a:solidFill>
-                  <a:srgbClr val="00B050"/>
+                  <a:srgbClr val="59A754"/>
                 </a:solidFill>
                 <a:latin typeface="Times New Roman" pitchFamily="18" charset="0"/>
               </a:rPr>
@@ -5349,17 +5616,26 @@
             <a:r>
               <a:rPr lang="en-US" altLang="he-IL" sz="2500" dirty="0" smtClean="0">
                 <a:solidFill>
-                  <a:srgbClr val="FF0000"/>
+                  <a:srgbClr val="E02829"/>
                 </a:solidFill>
                 <a:latin typeface="Times New Roman" pitchFamily="18" charset="0"/>
               </a:rPr>
-              <a:t>ately</a:t>
+              <a:t>ately </a:t>
             </a:r>
             <a:r>
               <a:rPr lang="en-US" altLang="he-IL" sz="2500" dirty="0" smtClean="0">
                 <a:latin typeface="Times New Roman" pitchFamily="18" charset="0"/>
               </a:rPr>
-              <a:t> and in </a:t>
+              <a:t>and in </a:t>
+            </a:r>
+            <a:r>
+              <a:rPr lang="en-US" altLang="he-IL" sz="2500" dirty="0" smtClean="0">
+                <a:solidFill>
+                  <a:srgbClr val="3B7EB5"/>
+                </a:solidFill>
+                <a:latin typeface="Times New Roman" pitchFamily="18" charset="0"/>
+              </a:rPr>
+              <a:t>competitions</a:t>
             </a:r>
             <a:r>
               <a:rPr lang="en-US" altLang="he-IL" sz="2500" dirty="0" smtClean="0">
@@ -5368,7 +5644,7 @@
                 </a:solidFill>
                 <a:latin typeface="Times New Roman" pitchFamily="18" charset="0"/>
               </a:rPr>
-              <a:t>competitions </a:t>
+              <a:t> </a:t>
             </a:r>
             <a:r>
               <a:rPr lang="en-US" altLang="he-IL" sz="2500" dirty="0" smtClean="0">
@@ -6043,7 +6319,7 @@
             <a:r>
               <a:rPr lang="en-US" altLang="he-IL" sz="4200" b="1" dirty="0">
                 <a:solidFill>
-                  <a:srgbClr val="000000"/>
+                  <a:srgbClr val="59A754"/>
                 </a:solidFill>
                 <a:latin typeface="Calibri" pitchFamily="34" charset="0"/>
               </a:rPr>
@@ -6424,7 +6700,7 @@
                 <a:r>
                   <a:rPr lang="en-US" altLang="he-IL" sz="4200" b="1" dirty="0">
                     <a:solidFill>
-                      <a:srgbClr val="000000"/>
+                      <a:srgbClr val="59A754"/>
                     </a:solidFill>
                     <a:latin typeface="Calibri" pitchFamily="34" charset="0"/>
                   </a:rPr>
@@ -6449,11 +6725,11 @@
                 <a:r>
                   <a:rPr lang="en-US" sz="2500" dirty="0" smtClean="0">
                     <a:solidFill>
-                      <a:srgbClr val="FF0000"/>
+                      <a:srgbClr val="E02829"/>
                     </a:solidFill>
                     <a:latin typeface="Times New Roman"/>
                   </a:rPr>
-                  <a:t>red</a:t>
+                  <a:t>red </a:t>
                 </a:r>
                 <a:r>
                   <a:rPr lang="en-US" sz="2500" dirty="0" smtClean="0">
@@ -6462,12 +6738,12 @@
                     </a:solidFill>
                     <a:latin typeface="Times New Roman"/>
                   </a:rPr>
-                  <a:t> and </a:t>
+                  <a:t>and </a:t>
                 </a:r>
                 <a:r>
                   <a:rPr lang="en-US" sz="2500" dirty="0" smtClean="0">
                     <a:solidFill>
-                      <a:srgbClr val="00B050"/>
+                      <a:srgbClr val="59A754"/>
                     </a:solidFill>
                     <a:latin typeface="Times New Roman"/>
                   </a:rPr>
@@ -7259,7 +7535,7 @@
                 <a:avLst/>
               </a:prstGeom>
               <a:blipFill rotWithShape="1">
-                <a:blip r:embed="rId7"/>
+                <a:blip r:embed="rId6"/>
                 <a:stretch>
                   <a:fillRect/>
                 </a:stretch>
@@ -7298,8 +7574,8 @@
         </p:nvSpPr>
         <p:spPr bwMode="auto">
           <a:xfrm>
-            <a:off x="10956493" y="35783839"/>
-            <a:ext cx="8458200" cy="3311668"/>
+            <a:off x="11012977" y="35853029"/>
+            <a:ext cx="7409527" cy="3242478"/>
           </a:xfrm>
           <a:prstGeom prst="rect">
             <a:avLst/>
@@ -7308,9 +7584,7 @@
             <a:schemeClr val="bg1"/>
           </a:solidFill>
           <a:ln w="38100">
-            <a:solidFill>
-              <a:srgbClr val="000000"/>
-            </a:solidFill>
+            <a:noFill/>
             <a:round/>
             <a:headEnd/>
             <a:tailEnd/>
@@ -7442,150 +7716,150 @@
             </a:r>
           </a:p>
           <a:p>
-            <a:pPr algn="just" eaLnBrk="1" hangingPunct="1">
+            <a:pPr eaLnBrk="1" hangingPunct="1">
               <a:spcBef>
                 <a:spcPct val="50000"/>
               </a:spcBef>
             </a:pPr>
             <a:r>
-              <a:rPr lang="en-GB" sz="2500" dirty="0" smtClean="0">
+              <a:rPr lang="en-GB" sz="2200" dirty="0" smtClean="0">
                 <a:latin typeface="Times New Roman" pitchFamily="18" charset="0"/>
               </a:rPr>
               <a:t>We thank I. Ben-Zion, L</a:t>
             </a:r>
             <a:r>
-              <a:rPr lang="en-GB" sz="2500" dirty="0">
+              <a:rPr lang="en-GB" sz="2200" dirty="0">
                 <a:latin typeface="Times New Roman" pitchFamily="18" charset="0"/>
               </a:rPr>
               <a:t>. </a:t>
             </a:r>
             <a:r>
-              <a:rPr lang="en-GB" sz="2500" dirty="0" err="1" smtClean="0">
+              <a:rPr lang="en-GB" sz="2200" dirty="0" err="1" smtClean="0">
                 <a:latin typeface="Times New Roman" pitchFamily="18" charset="0"/>
               </a:rPr>
               <a:t>Zelcbuch</a:t>
             </a:r>
             <a:r>
-              <a:rPr lang="en-GB" sz="2500" dirty="0" smtClean="0">
+              <a:rPr lang="en-GB" sz="2200" dirty="0" smtClean="0">
                 <a:latin typeface="Times New Roman" pitchFamily="18" charset="0"/>
               </a:rPr>
               <a:t>, Y</a:t>
             </a:r>
             <a:r>
-              <a:rPr lang="en-GB" sz="2500" dirty="0">
+              <a:rPr lang="en-GB" sz="2200" dirty="0">
                 <a:latin typeface="Times New Roman" pitchFamily="18" charset="0"/>
               </a:rPr>
               <a:t>. </a:t>
             </a:r>
             <a:r>
-              <a:rPr lang="en-GB" sz="2500" dirty="0" err="1">
+              <a:rPr lang="en-GB" sz="2200" dirty="0" err="1">
                 <a:latin typeface="Times New Roman" pitchFamily="18" charset="0"/>
               </a:rPr>
               <a:t>Pilpel</a:t>
             </a:r>
             <a:r>
-              <a:rPr lang="en-GB" sz="2500" dirty="0">
+              <a:rPr lang="en-GB" sz="2200" dirty="0">
                 <a:latin typeface="Times New Roman" pitchFamily="18" charset="0"/>
               </a:rPr>
               <a:t>, D. </a:t>
             </a:r>
             <a:r>
-              <a:rPr lang="en-GB" sz="2500" dirty="0" err="1">
+              <a:rPr lang="en-GB" sz="2200" dirty="0" err="1">
                 <a:latin typeface="Times New Roman" pitchFamily="18" charset="0"/>
               </a:rPr>
               <a:t>Hizi</a:t>
             </a:r>
             <a:r>
-              <a:rPr lang="en-GB" sz="2500" dirty="0">
+              <a:rPr lang="en-GB" sz="2200" dirty="0">
                 <a:latin typeface="Times New Roman" pitchFamily="18" charset="0"/>
               </a:rPr>
               <a:t>, I. </a:t>
             </a:r>
             <a:r>
-              <a:rPr lang="en-GB" sz="2500" dirty="0" err="1">
+              <a:rPr lang="en-GB" sz="2200" dirty="0" err="1">
                 <a:latin typeface="Times New Roman" pitchFamily="18" charset="0"/>
               </a:rPr>
               <a:t>Frumkin</a:t>
             </a:r>
             <a:r>
-              <a:rPr lang="en-GB" sz="2500" dirty="0">
+              <a:rPr lang="en-GB" sz="2200" dirty="0">
                 <a:latin typeface="Times New Roman" pitchFamily="18" charset="0"/>
               </a:rPr>
               <a:t>, O. </a:t>
             </a:r>
             <a:r>
-              <a:rPr lang="en-GB" sz="2500" dirty="0" err="1">
+              <a:rPr lang="en-GB" sz="2200" dirty="0" err="1">
                 <a:latin typeface="Times New Roman" pitchFamily="18" charset="0"/>
               </a:rPr>
               <a:t>Dahan</a:t>
             </a:r>
             <a:r>
-              <a:rPr lang="en-GB" sz="2500" dirty="0">
+              <a:rPr lang="en-GB" sz="2200" dirty="0">
                 <a:latin typeface="Times New Roman" pitchFamily="18" charset="0"/>
               </a:rPr>
               <a:t>, and A. </a:t>
             </a:r>
             <a:r>
-              <a:rPr lang="en-GB" sz="2500" dirty="0" err="1">
+              <a:rPr lang="en-GB" sz="2200" dirty="0" err="1">
                 <a:latin typeface="Times New Roman" pitchFamily="18" charset="0"/>
               </a:rPr>
               <a:t>Yona</a:t>
             </a:r>
             <a:r>
-              <a:rPr lang="en-GB" sz="2500" dirty="0">
+              <a:rPr lang="en-GB" sz="2200" dirty="0">
                 <a:latin typeface="Times New Roman" pitchFamily="18" charset="0"/>
               </a:rPr>
               <a:t> for sharing </a:t>
             </a:r>
             <a:r>
-              <a:rPr lang="en-GB" sz="2500" dirty="0" smtClean="0">
+              <a:rPr lang="en-GB" sz="2200" dirty="0" smtClean="0">
                 <a:latin typeface="Times New Roman" pitchFamily="18" charset="0"/>
               </a:rPr>
               <a:t>materials, data</a:t>
             </a:r>
             <a:r>
-              <a:rPr lang="en-GB" sz="2500" dirty="0">
+              <a:rPr lang="en-GB" sz="2200" dirty="0">
                 <a:latin typeface="Times New Roman" pitchFamily="18" charset="0"/>
               </a:rPr>
               <a:t>, impressions, and ideas; </a:t>
             </a:r>
             <a:r>
-              <a:rPr lang="en-GB" sz="2500" dirty="0" smtClean="0">
+              <a:rPr lang="en-GB" sz="2200" dirty="0" smtClean="0">
                 <a:latin typeface="Times New Roman" pitchFamily="18" charset="0"/>
               </a:rPr>
               <a:t>N. Wertheimer, A. Rosenberg, A</a:t>
             </a:r>
             <a:r>
-              <a:rPr lang="en-GB" sz="2500" dirty="0">
+              <a:rPr lang="en-GB" sz="2200" dirty="0">
                 <a:latin typeface="Times New Roman" pitchFamily="18" charset="0"/>
               </a:rPr>
               <a:t>. </a:t>
             </a:r>
             <a:r>
-              <a:rPr lang="en-GB" sz="2500" dirty="0" err="1" smtClean="0">
+              <a:rPr lang="en-GB" sz="2200" dirty="0" err="1" smtClean="0">
                 <a:latin typeface="Times New Roman" pitchFamily="18" charset="0"/>
               </a:rPr>
               <a:t>Zisman</a:t>
             </a:r>
             <a:r>
-              <a:rPr lang="en-GB" sz="2500" dirty="0" smtClean="0">
+              <a:rPr lang="en-GB" sz="2200" dirty="0" smtClean="0">
                 <a:latin typeface="Times New Roman" pitchFamily="18" charset="0"/>
               </a:rPr>
               <a:t>, F. Yang, and E. </a:t>
             </a:r>
             <a:r>
-              <a:rPr lang="en-GB" sz="2500" dirty="0" err="1" smtClean="0">
+              <a:rPr lang="en-GB" sz="2200" dirty="0" err="1" smtClean="0">
                 <a:latin typeface="Times New Roman" pitchFamily="18" charset="0"/>
               </a:rPr>
               <a:t>Shtifman</a:t>
             </a:r>
             <a:r>
-              <a:rPr lang="en-GB" sz="2500" dirty="0" smtClean="0">
+              <a:rPr lang="en-GB" sz="2200" dirty="0" smtClean="0">
                 <a:latin typeface="Times New Roman" pitchFamily="18" charset="0"/>
               </a:rPr>
               <a:t> Segal for generous help in the wet lab. </a:t>
             </a:r>
-            <a:endParaRPr lang="en-GB" sz="2500" dirty="0">
+            <a:endParaRPr lang="en-GB" sz="2200" dirty="0">
               <a:latin typeface="Times New Roman" pitchFamily="18" charset="0"/>
             </a:endParaRPr>
           </a:p>
@@ -7779,7 +8053,7 @@
                 <a:r>
                   <a:rPr lang="en-US" altLang="he-IL" sz="4200" b="1" dirty="0">
                     <a:solidFill>
-                      <a:srgbClr val="000000"/>
+                      <a:srgbClr val="3B7EB5"/>
                     </a:solidFill>
                     <a:latin typeface="Calibri" pitchFamily="34" charset="0"/>
                   </a:rPr>
@@ -8104,7 +8378,7 @@
                                           <m:r>
                                             <a:rPr lang="en-US" altLang="he-IL" sz="3200" i="1" smtClean="0">
                                               <a:solidFill>
-                                                <a:srgbClr val="00B050"/>
+                                                <a:srgbClr val="59A754"/>
                                               </a:solidFill>
                                               <a:latin typeface="Cambria Math"/>
                                             </a:rPr>
@@ -8138,7 +8412,7 @@
                                           <m:r>
                                             <a:rPr lang="en-US" altLang="he-IL" sz="3200" i="1" smtClean="0">
                                               <a:solidFill>
-                                                <a:srgbClr val="FF0000"/>
+                                                <a:srgbClr val="E02829"/>
                                               </a:solidFill>
                                               <a:latin typeface="Cambria Math"/>
                                             </a:rPr>
@@ -8246,7 +8520,7 @@
                 <a:avLst/>
               </a:prstGeom>
               <a:blipFill rotWithShape="1">
-                <a:blip r:embed="rId8"/>
+                <a:blip r:embed="rId7"/>
                 <a:stretch>
                   <a:fillRect/>
                 </a:stretch>
@@ -8285,8 +8559,8 @@
         </p:nvSpPr>
         <p:spPr bwMode="auto">
           <a:xfrm>
-            <a:off x="1031875" y="4118665"/>
-            <a:ext cx="28194000" cy="1855994"/>
+            <a:off x="1031875" y="4034466"/>
+            <a:ext cx="28194000" cy="1378940"/>
           </a:xfrm>
           <a:prstGeom prst="rect">
             <a:avLst/>
@@ -8436,161 +8710,138 @@
               </a:spcAft>
             </a:pPr>
             <a:r>
-              <a:rPr lang="en-US" altLang="he-IL" sz="5300" b="1" u="sng" dirty="0" err="1" smtClean="0">
+              <a:rPr lang="en-US" altLang="he-IL" sz="5800" b="1" u="sng" dirty="0" smtClean="0">
                 <a:latin typeface="Calibri" pitchFamily="34" charset="0"/>
               </a:rPr>
-              <a:t>Yoav</a:t>
-            </a:r>
-            <a:r>
-              <a:rPr lang="en-US" altLang="he-IL" sz="5300" b="1" u="sng" dirty="0" smtClean="0">
+              <a:t>Yoav </a:t>
+            </a:r>
+            <a:r>
+              <a:rPr lang="en-US" altLang="he-IL" sz="5800" b="1" u="sng" dirty="0" smtClean="0">
                 <a:latin typeface="Calibri" pitchFamily="34" charset="0"/>
               </a:rPr>
-              <a:t> Ram</a:t>
-            </a:r>
-            <a:r>
-              <a:rPr lang="en-US" altLang="he-IL" sz="5300" b="1" baseline="30000" dirty="0" smtClean="0">
+              <a:t>Ram</a:t>
+            </a:r>
+            <a:r>
+              <a:rPr lang="en-US" altLang="he-IL" sz="5800" b="1" baseline="30000" dirty="0" smtClean="0">
                 <a:latin typeface="Calibri" pitchFamily="34" charset="0"/>
               </a:rPr>
-              <a:t>1</a:t>
-            </a:r>
-            <a:r>
-              <a:rPr lang="en-US" altLang="he-IL" sz="5300" b="1" dirty="0" smtClean="0">
+              <a:t>a</a:t>
+            </a:r>
+            <a:r>
+              <a:rPr lang="en-US" altLang="he-IL" sz="5800" b="1" dirty="0" smtClean="0">
                 <a:latin typeface="Calibri" pitchFamily="34" charset="0"/>
               </a:rPr>
               <a:t>, </a:t>
             </a:r>
             <a:r>
-              <a:rPr lang="en-US" altLang="he-IL" sz="5300" b="1" dirty="0" err="1" smtClean="0">
+              <a:rPr lang="en-US" altLang="he-IL" sz="5800" b="1" dirty="0" smtClean="0">
                 <a:latin typeface="Calibri" pitchFamily="34" charset="0"/>
               </a:rPr>
-              <a:t>Eynat</a:t>
-            </a:r>
-            <a:r>
-              <a:rPr lang="en-US" altLang="he-IL" sz="5300" b="1" dirty="0" smtClean="0">
+              <a:t>Eynat </a:t>
+            </a:r>
+            <a:r>
+              <a:rPr lang="en-US" altLang="he-IL" sz="5800" b="1" dirty="0" err="1" smtClean="0">
                 <a:latin typeface="Calibri" pitchFamily="34" charset="0"/>
               </a:rPr>
-              <a:t> Dellus-Gur</a:t>
-            </a:r>
-            <a:r>
-              <a:rPr lang="en-US" altLang="he-IL" sz="5300" b="1" baseline="30000" dirty="0" smtClean="0">
+              <a:t>Dellus-Gur</a:t>
+            </a:r>
+            <a:r>
+              <a:rPr lang="en-US" altLang="he-IL" sz="5800" b="1" baseline="30000" dirty="0" err="1" smtClean="0">
                 <a:latin typeface="Calibri" pitchFamily="34" charset="0"/>
               </a:rPr>
-              <a:t>1</a:t>
-            </a:r>
-            <a:r>
-              <a:rPr lang="en-US" altLang="he-IL" sz="5300" b="1" dirty="0" smtClean="0">
+              <a:t>a</a:t>
+            </a:r>
+            <a:r>
+              <a:rPr lang="en-US" altLang="he-IL" sz="5800" b="1" dirty="0" smtClean="0">
                 <a:latin typeface="Calibri" pitchFamily="34" charset="0"/>
               </a:rPr>
-              <a:t>, Uri Obolski</a:t>
-            </a:r>
-            <a:r>
-              <a:rPr lang="en-US" altLang="he-IL" sz="5300" b="1" baseline="30000" dirty="0" smtClean="0">
+              <a:t>, </a:t>
+            </a:r>
+            <a:r>
+              <a:rPr lang="en-US" altLang="he-IL" sz="5800" b="1" dirty="0" smtClean="0">
                 <a:latin typeface="Calibri" pitchFamily="34" charset="0"/>
               </a:rPr>
-              <a:t>1</a:t>
-            </a:r>
-            <a:r>
-              <a:rPr lang="en-US" altLang="he-IL" sz="5300" b="1" dirty="0" smtClean="0">
+              <a:t>Uri </a:t>
+            </a:r>
+            <a:r>
+              <a:rPr lang="en-US" altLang="he-IL" sz="5800" b="1" dirty="0" err="1" smtClean="0">
                 <a:latin typeface="Calibri" pitchFamily="34" charset="0"/>
               </a:rPr>
+              <a:t>Obolska</a:t>
+            </a:r>
+            <a:r>
+              <a:rPr lang="en-US" altLang="he-IL" sz="5800" b="1" dirty="0" smtClean="0">
+                <a:latin typeface="Calibri" pitchFamily="34" charset="0"/>
+              </a:rPr>
               <a:t>, </a:t>
             </a:r>
             <a:r>
-              <a:rPr lang="en-US" altLang="he-IL" sz="5300" b="1" dirty="0" err="1" smtClean="0">
+              <a:rPr lang="en-US" altLang="he-IL" sz="5800" b="1" dirty="0" smtClean="0">
                 <a:latin typeface="Calibri" pitchFamily="34" charset="0"/>
               </a:rPr>
-              <a:t>Maayan</a:t>
-            </a:r>
-            <a:r>
-              <a:rPr lang="en-US" altLang="he-IL" sz="5300" b="1" dirty="0" smtClean="0">
+              <a:t>Maayan </a:t>
+            </a:r>
+            <a:r>
+              <a:rPr lang="en-US" altLang="he-IL" sz="5800" b="1" dirty="0" err="1" smtClean="0">
                 <a:latin typeface="Calibri" pitchFamily="34" charset="0"/>
               </a:rPr>
-              <a:t> Bibi</a:t>
-            </a:r>
-            <a:r>
-              <a:rPr lang="en-US" altLang="he-IL" sz="5300" b="1" baseline="30000" dirty="0" smtClean="0">
+              <a:t>Bibi</a:t>
+            </a:r>
+            <a:r>
+              <a:rPr lang="en-US" altLang="he-IL" sz="5800" b="1" baseline="30000" dirty="0" err="1" smtClean="0">
                 <a:latin typeface="Calibri" pitchFamily="34" charset="0"/>
               </a:rPr>
-              <a:t>2</a:t>
-            </a:r>
-            <a:r>
-              <a:rPr lang="en-US" altLang="he-IL" sz="5300" b="1" dirty="0" smtClean="0">
+              <a:t>b</a:t>
+            </a:r>
+            <a:r>
+              <a:rPr lang="en-US" altLang="he-IL" sz="5800" b="1" dirty="0" smtClean="0">
                 <a:latin typeface="Calibri" pitchFamily="34" charset="0"/>
               </a:rPr>
-              <a:t>, Judith Berman</a:t>
-            </a:r>
-            <a:r>
-              <a:rPr lang="en-US" altLang="he-IL" sz="5300" b="1" baseline="30000" dirty="0" smtClean="0">
+              <a:t>, </a:t>
+            </a:r>
+            <a:r>
+              <a:rPr lang="en-US" altLang="he-IL" sz="5800" b="1" dirty="0" smtClean="0">
                 <a:latin typeface="Calibri" pitchFamily="34" charset="0"/>
               </a:rPr>
-              <a:t>2</a:t>
-            </a:r>
-            <a:r>
-              <a:rPr lang="en-US" altLang="he-IL" sz="5300" b="1" dirty="0" smtClean="0">
+              <a:t>Judith </a:t>
+            </a:r>
+            <a:r>
+              <a:rPr lang="en-US" altLang="he-IL" sz="5800" b="1" dirty="0" err="1" smtClean="0">
                 <a:latin typeface="Calibri" pitchFamily="34" charset="0"/>
               </a:rPr>
+              <a:t>Berman</a:t>
+            </a:r>
+            <a:r>
+              <a:rPr lang="en-US" altLang="he-IL" sz="5800" b="1" baseline="30000" dirty="0" err="1" smtClean="0">
+                <a:latin typeface="Calibri" pitchFamily="34" charset="0"/>
+              </a:rPr>
+              <a:t>b</a:t>
+            </a:r>
+            <a:r>
+              <a:rPr lang="en-US" altLang="he-IL" sz="5800" b="1" dirty="0" smtClean="0">
+                <a:latin typeface="Calibri" pitchFamily="34" charset="0"/>
+              </a:rPr>
               <a:t>, </a:t>
             </a:r>
             <a:r>
-              <a:rPr lang="en-US" altLang="he-IL" sz="5300" b="1" dirty="0" err="1" smtClean="0">
+              <a:rPr lang="en-US" altLang="he-IL" sz="5800" b="1" dirty="0" smtClean="0">
                 <a:latin typeface="Calibri" pitchFamily="34" charset="0"/>
               </a:rPr>
-              <a:t>Lilach</a:t>
-            </a:r>
-            <a:r>
-              <a:rPr lang="en-US" altLang="he-IL" sz="5300" b="1" dirty="0" smtClean="0">
+              <a:t>Lilach </a:t>
+            </a:r>
+            <a:r>
+              <a:rPr lang="en-US" altLang="he-IL" sz="5800" b="1" dirty="0" err="1" smtClean="0">
                 <a:latin typeface="Calibri" pitchFamily="34" charset="0"/>
               </a:rPr>
-              <a:t> Hadany</a:t>
-            </a:r>
-            <a:r>
-              <a:rPr lang="en-US" altLang="he-IL" sz="5300" b="1" baseline="30000" dirty="0" smtClean="0">
+              <a:t>Hadany</a:t>
+            </a:r>
+            <a:r>
+              <a:rPr lang="en-US" altLang="he-IL" sz="5800" b="1" baseline="30000" dirty="0" err="1" smtClean="0">
                 <a:latin typeface="Calibri" pitchFamily="34" charset="0"/>
               </a:rPr>
-              <a:t>1</a:t>
-            </a:r>
-            <a:r>
-              <a:rPr lang="en-US" altLang="he-IL" sz="5300" b="1" dirty="0" smtClean="0">
-                <a:latin typeface="Calibri" pitchFamily="34" charset="0"/>
-              </a:rPr>
-              <a:t/>
-            </a:r>
-            <a:br>
-              <a:rPr lang="en-US" altLang="he-IL" sz="5300" b="1" dirty="0" smtClean="0">
-                <a:latin typeface="Calibri" pitchFamily="34" charset="0"/>
-              </a:rPr>
-            </a:br>
-            <a:r>
-              <a:rPr lang="en-US" altLang="he-IL" sz="3600" spc="100" dirty="0" smtClean="0">
-                <a:latin typeface="Calibri" pitchFamily="34" charset="0"/>
-              </a:rPr>
-              <a:t>Dept. of Molecular Biology &amp; Ecology of Plants</a:t>
-            </a:r>
-            <a:r>
-              <a:rPr lang="en-US" altLang="he-IL" sz="3600" spc="100" baseline="30000" dirty="0" smtClean="0">
-                <a:latin typeface="Calibri" pitchFamily="34" charset="0"/>
-              </a:rPr>
-              <a:t>1</a:t>
-            </a:r>
-            <a:r>
-              <a:rPr lang="en-US" altLang="he-IL" sz="3600" spc="100" dirty="0" smtClean="0">
-                <a:latin typeface="Calibri" pitchFamily="34" charset="0"/>
-              </a:rPr>
-              <a:t> and Dept. of Molecular Microbiology &amp; Biotechnology</a:t>
-            </a:r>
-            <a:r>
-              <a:rPr lang="en-US" altLang="he-IL" sz="3600" spc="100" baseline="30000" dirty="0" smtClean="0">
-                <a:latin typeface="Calibri" pitchFamily="34" charset="0"/>
-              </a:rPr>
-              <a:t>2</a:t>
-            </a:r>
-            <a:r>
-              <a:rPr lang="en-US" altLang="he-IL" sz="3600" spc="100" dirty="0" smtClean="0">
-                <a:latin typeface="Calibri" pitchFamily="34" charset="0"/>
-              </a:rPr>
-              <a:t>, Tel-Aviv University, Tel-Aviv, Israel</a:t>
-            </a:r>
-            <a:endParaRPr lang="en-US" altLang="he-IL" sz="5300" spc="100" dirty="0">
+              <a:t>a</a:t>
+            </a:r>
+            <a:endParaRPr lang="en-US" altLang="he-IL" sz="5800" b="1" dirty="0" smtClean="0">
               <a:latin typeface="Calibri" pitchFamily="34" charset="0"/>
             </a:endParaRPr>
           </a:p>
@@ -8904,11 +9155,6 @@
             </a:pPr>
             <a:r>
               <a:rPr lang="en-US" sz="9700" b="1" dirty="0">
-                <a:ln>
-                  <a:solidFill>
-                    <a:schemeClr val="bg1"/>
-                  </a:solidFill>
-                </a:ln>
                 <a:latin typeface="Calibri"/>
                 <a:ea typeface="ＭＳ Ｐゴシック" charset="0"/>
                 <a:cs typeface="ＭＳ Ｐゴシック" charset="0"/>
@@ -8917,11 +9163,6 @@
             </a:r>
             <a:r>
               <a:rPr lang="en-US" sz="9700" b="1" dirty="0" smtClean="0">
-                <a:ln>
-                  <a:solidFill>
-                    <a:schemeClr val="bg1"/>
-                  </a:solidFill>
-                </a:ln>
                 <a:latin typeface="Calibri"/>
                 <a:ea typeface="ＭＳ Ｐゴシック" charset="0"/>
                 <a:cs typeface="ＭＳ Ｐゴシック" charset="0"/>
@@ -8929,11 +9170,6 @@
               <a:t>&amp; estimating selection</a:t>
             </a:r>
             <a:endParaRPr lang="en-US" sz="9700" b="1" dirty="0">
-              <a:ln>
-                <a:solidFill>
-                  <a:schemeClr val="bg1"/>
-                </a:solidFill>
-              </a:ln>
               <a:latin typeface="Calibri"/>
               <a:ea typeface="ＭＳ Ｐゴシック" charset="0"/>
               <a:cs typeface="ＭＳ Ｐゴシック" charset="0"/>
@@ -8956,15 +9192,10 @@
             <a:avLst/>
           </a:prstGeom>
           <a:solidFill>
-            <a:schemeClr val="bg2">
-              <a:lumMod val="50000"/>
-              <a:lumOff val="50000"/>
-            </a:schemeClr>
+            <a:srgbClr val="59A754"/>
           </a:solidFill>
           <a:ln>
-            <a:solidFill>
-              <a:schemeClr val="tx1"/>
-            </a:solidFill>
+            <a:noFill/>
           </a:ln>
         </p:spPr>
         <p:style>
@@ -9009,15 +9240,10 @@
             <a:avLst/>
           </a:prstGeom>
           <a:solidFill>
-            <a:schemeClr val="bg2">
-              <a:lumMod val="50000"/>
-              <a:lumOff val="50000"/>
-            </a:schemeClr>
+            <a:srgbClr val="3B7EB5"/>
           </a:solidFill>
           <a:ln>
-            <a:solidFill>
-              <a:schemeClr val="tx1"/>
-            </a:solidFill>
+            <a:noFill/>
           </a:ln>
         </p:spPr>
         <p:style>
@@ -9062,15 +9288,10 @@
             <a:avLst/>
           </a:prstGeom>
           <a:solidFill>
-            <a:schemeClr val="bg2">
-              <a:lumMod val="50000"/>
-              <a:lumOff val="50000"/>
-            </a:schemeClr>
+            <a:srgbClr val="E02829"/>
           </a:solidFill>
           <a:ln>
-            <a:solidFill>
-              <a:schemeClr val="tx1"/>
-            </a:solidFill>
+            <a:noFill/>
           </a:ln>
         </p:spPr>
         <p:style>
@@ -9115,15 +9336,10 @@
             <a:avLst/>
           </a:prstGeom>
           <a:solidFill>
-            <a:schemeClr val="bg2">
-              <a:lumMod val="50000"/>
-              <a:lumOff val="50000"/>
-            </a:schemeClr>
+            <a:srgbClr val="59A754"/>
           </a:solidFill>
           <a:ln>
-            <a:solidFill>
-              <a:schemeClr val="tx1"/>
-            </a:solidFill>
+            <a:noFill/>
           </a:ln>
         </p:spPr>
         <p:style>
@@ -9168,15 +9384,10 @@
             <a:avLst/>
           </a:prstGeom>
           <a:solidFill>
-            <a:schemeClr val="bg2">
-              <a:lumMod val="50000"/>
-              <a:lumOff val="50000"/>
-            </a:schemeClr>
+            <a:srgbClr val="3B7EB5"/>
           </a:solidFill>
           <a:ln>
-            <a:solidFill>
-              <a:schemeClr val="tx1"/>
-            </a:solidFill>
+            <a:noFill/>
           </a:ln>
         </p:spPr>
         <p:style>
@@ -9221,15 +9432,10 @@
             <a:avLst/>
           </a:prstGeom>
           <a:solidFill>
-            <a:schemeClr val="bg2">
-              <a:lumMod val="50000"/>
-              <a:lumOff val="50000"/>
-            </a:schemeClr>
+            <a:srgbClr val="E02829"/>
           </a:solidFill>
           <a:ln>
-            <a:solidFill>
-              <a:schemeClr val="tx1"/>
-            </a:solidFill>
+            <a:noFill/>
           </a:ln>
         </p:spPr>
         <p:style>
@@ -9274,15 +9480,10 @@
             <a:avLst/>
           </a:prstGeom>
           <a:solidFill>
-            <a:schemeClr val="bg2">
-              <a:lumMod val="50000"/>
-              <a:lumOff val="50000"/>
-            </a:schemeClr>
+            <a:srgbClr val="59A754"/>
           </a:solidFill>
           <a:ln>
-            <a:solidFill>
-              <a:schemeClr val="tx1"/>
-            </a:solidFill>
+            <a:noFill/>
           </a:ln>
         </p:spPr>
         <p:style>
@@ -9327,15 +9528,10 @@
             <a:avLst/>
           </a:prstGeom>
           <a:solidFill>
-            <a:schemeClr val="bg2">
-              <a:lumMod val="50000"/>
-              <a:lumOff val="50000"/>
-            </a:schemeClr>
+            <a:srgbClr val="3B7EB5"/>
           </a:solidFill>
           <a:ln>
-            <a:solidFill>
-              <a:schemeClr val="tx1"/>
-            </a:solidFill>
+            <a:noFill/>
           </a:ln>
         </p:spPr>
         <p:style>
@@ -9380,15 +9576,10 @@
             <a:avLst/>
           </a:prstGeom>
           <a:solidFill>
-            <a:schemeClr val="bg2">
-              <a:lumMod val="50000"/>
-              <a:lumOff val="50000"/>
-            </a:schemeClr>
+            <a:srgbClr val="E02829"/>
           </a:solidFill>
           <a:ln>
-            <a:solidFill>
-              <a:schemeClr val="tx1"/>
-            </a:solidFill>
+            <a:noFill/>
           </a:ln>
         </p:spPr>
         <p:style>
@@ -9420,14 +9611,14 @@
       </p:sp>
       <p:pic>
         <p:nvPicPr>
-          <p:cNvPr id="26" name="Picture 25" descr="C:\Users\yoavram\Downloads\MinervaLogo.png"/>
+          <p:cNvPr id="1030" name="Picture 6"/>
           <p:cNvPicPr>
             <a:picLocks noChangeAspect="1" noChangeArrowheads="1"/>
           </p:cNvPicPr>
           <p:nvPr/>
         </p:nvPicPr>
         <p:blipFill>
-          <a:blip r:embed="rId9">
+          <a:blip r:embed="rId8">
             <a:extLst>
               <a:ext uri="{28A0092B-C50C-407E-A947-70E740481C1C}">
                 <a14:useLocalDpi xmlns:a14="http://schemas.microsoft.com/office/drawing/2010/main" val="0"/>
@@ -9441,152 +9632,8 @@
         </p:blipFill>
         <p:spPr bwMode="auto">
           <a:xfrm>
-            <a:off x="11926368" y="40216347"/>
-            <a:ext cx="4375618" cy="1260000"/>
-          </a:xfrm>
-          <a:prstGeom prst="rect">
-            <a:avLst/>
-          </a:prstGeom>
-          <a:noFill/>
-          <a:extLst>
-            <a:ext uri="{909E8E84-426E-40DD-AFC4-6F175D3DCCD1}">
-              <a14:hiddenFill xmlns:a14="http://schemas.microsoft.com/office/drawing/2010/main">
-                <a:solidFill>
-                  <a:srgbClr val="FFFFFF"/>
-                </a:solidFill>
-              </a14:hiddenFill>
-            </a:ext>
-          </a:extLst>
-        </p:spPr>
-      </p:pic>
-      <p:pic>
-        <p:nvPicPr>
-          <p:cNvPr id="27" name="Picture 3" descr="C:\Users\yoavram\Downloads\minerva_stiftung.png"/>
-          <p:cNvPicPr>
-            <a:picLocks noChangeAspect="1" noChangeArrowheads="1"/>
-          </p:cNvPicPr>
-          <p:nvPr/>
-        </p:nvPicPr>
-        <p:blipFill>
-          <a:blip r:embed="rId10">
-            <a:extLst>
-              <a:ext uri="{28A0092B-C50C-407E-A947-70E740481C1C}">
-                <a14:useLocalDpi xmlns:a14="http://schemas.microsoft.com/office/drawing/2010/main" val="0"/>
-              </a:ext>
-            </a:extLst>
-          </a:blip>
-          <a:srcRect/>
-          <a:stretch>
-            <a:fillRect/>
-          </a:stretch>
-        </p:blipFill>
-        <p:spPr bwMode="auto">
-          <a:xfrm>
-            <a:off x="10023002" y="39950622"/>
-            <a:ext cx="1885714" cy="1800000"/>
-          </a:xfrm>
-          <a:prstGeom prst="rect">
-            <a:avLst/>
-          </a:prstGeom>
-          <a:noFill/>
-          <a:extLst>
-            <a:ext uri="{909E8E84-426E-40DD-AFC4-6F175D3DCCD1}">
-              <a14:hiddenFill xmlns:a14="http://schemas.microsoft.com/office/drawing/2010/main">
-                <a:solidFill>
-                  <a:srgbClr val="FFFFFF"/>
-                </a:solidFill>
-              </a14:hiddenFill>
-            </a:ext>
-          </a:extLst>
-        </p:spPr>
-      </p:pic>
-      <p:pic>
-        <p:nvPicPr>
-          <p:cNvPr id="1027" name="Picture 3"/>
-          <p:cNvPicPr>
-            <a:picLocks noChangeAspect="1" noChangeArrowheads="1"/>
-          </p:cNvPicPr>
-          <p:nvPr/>
-        </p:nvPicPr>
-        <p:blipFill rotWithShape="1">
-          <a:blip r:embed="rId11">
-            <a:extLst>
-              <a:ext uri="{28A0092B-C50C-407E-A947-70E740481C1C}">
-                <a14:useLocalDpi xmlns:a14="http://schemas.microsoft.com/office/drawing/2010/main" val="0"/>
-              </a:ext>
-            </a:extLst>
-          </a:blip>
-          <a:srcRect l="23256" t="8170" r="5722" b="11134"/>
-          <a:stretch/>
-        </p:blipFill>
-        <p:spPr bwMode="auto">
-          <a:xfrm>
-            <a:off x="21711095" y="40188291"/>
-            <a:ext cx="4108809" cy="1332000"/>
-          </a:xfrm>
-          <a:prstGeom prst="rect">
-            <a:avLst/>
-          </a:prstGeom>
-          <a:noFill/>
-          <a:ln>
-            <a:noFill/>
-          </a:ln>
-          <a:effectLst/>
-          <a:extLst>
-            <a:ext uri="{909E8E84-426E-40DD-AFC4-6F175D3DCCD1}">
-              <a14:hiddenFill xmlns:a14="http://schemas.microsoft.com/office/drawing/2010/main">
-                <a:solidFill>
-                  <a:schemeClr val="accent1"/>
-                </a:solidFill>
-              </a14:hiddenFill>
-            </a:ext>
-            <a:ext uri="{91240B29-F687-4F45-9708-019B960494DF}">
-              <a14:hiddenLine xmlns:a14="http://schemas.microsoft.com/office/drawing/2010/main" w="9525">
-                <a:solidFill>
-                  <a:schemeClr val="tx1"/>
-                </a:solidFill>
-                <a:miter lim="800000"/>
-                <a:headEnd/>
-                <a:tailEnd/>
-              </a14:hiddenLine>
-            </a:ext>
-            <a:ext uri="{AF507438-7753-43E0-B8FC-AC1667EBCBE1}">
-              <a14:hiddenEffects xmlns:a14="http://schemas.microsoft.com/office/drawing/2010/main">
-                <a:effectLst>
-                  <a:outerShdw dist="35921" dir="2700000" algn="ctr" rotWithShape="0">
-                    <a:schemeClr val="bg2"/>
-                  </a:outerShdw>
-                </a:effectLst>
-              </a14:hiddenEffects>
-            </a:ext>
-          </a:extLst>
-        </p:spPr>
-      </p:pic>
-      <p:pic>
-        <p:nvPicPr>
-          <p:cNvPr id="1030" name="Picture 6"/>
-          <p:cNvPicPr>
-            <a:picLocks noChangeAspect="1" noChangeArrowheads="1"/>
-          </p:cNvPicPr>
-          <p:nvPr/>
-        </p:nvPicPr>
-        <p:blipFill>
-          <a:blip r:embed="rId12">
-            <a:extLst>
-              <a:ext uri="{28A0092B-C50C-407E-A947-70E740481C1C}">
-                <a14:useLocalDpi xmlns:a14="http://schemas.microsoft.com/office/drawing/2010/main" val="0"/>
-              </a:ext>
-            </a:extLst>
-          </a:blip>
-          <a:srcRect/>
-          <a:stretch>
-            <a:fillRect/>
-          </a:stretch>
-        </p:blipFill>
-        <p:spPr bwMode="auto">
-          <a:xfrm>
-            <a:off x="19895711" y="40138195"/>
-            <a:ext cx="1221696" cy="1512000"/>
+            <a:off x="18004993" y="36304543"/>
+            <a:ext cx="1076256" cy="1332000"/>
           </a:xfrm>
           <a:prstGeom prst="rect">
             <a:avLst/>
@@ -9618,14 +9665,14 @@
       </p:pic>
       <p:pic>
         <p:nvPicPr>
-          <p:cNvPr id="1031" name="Picture 7"/>
+          <p:cNvPr id="1054" name="Picture 30" descr="C:\Users\yoavram\Pictures\yoav_mypictr_Facebook.jpg"/>
           <p:cNvPicPr>
             <a:picLocks noChangeAspect="1" noChangeArrowheads="1"/>
           </p:cNvPicPr>
           <p:nvPr/>
         </p:nvPicPr>
         <p:blipFill>
-          <a:blip r:embed="rId13">
+          <a:blip r:embed="rId9">
             <a:extLst>
               <a:ext uri="{28A0092B-C50C-407E-A947-70E740481C1C}">
                 <a14:useLocalDpi xmlns:a14="http://schemas.microsoft.com/office/drawing/2010/main" val="0"/>
@@ -9639,103 +9686,8 @@
         </p:blipFill>
         <p:spPr bwMode="auto">
           <a:xfrm>
-            <a:off x="26091215" y="39831305"/>
-            <a:ext cx="3559838" cy="1800000"/>
-          </a:xfrm>
-          <a:prstGeom prst="rect">
-            <a:avLst/>
-          </a:prstGeom>
-          <a:noFill/>
-          <a:ln>
-            <a:noFill/>
-          </a:ln>
-          <a:extLst>
-            <a:ext uri="{909E8E84-426E-40DD-AFC4-6F175D3DCCD1}">
-              <a14:hiddenFill xmlns:a14="http://schemas.microsoft.com/office/drawing/2010/main">
-                <a:solidFill>
-                  <a:schemeClr val="accent1"/>
-                </a:solidFill>
-              </a14:hiddenFill>
-            </a:ext>
-            <a:ext uri="{91240B29-F687-4F45-9708-019B960494DF}">
-              <a14:hiddenLine xmlns:a14="http://schemas.microsoft.com/office/drawing/2010/main" w="9525">
-                <a:solidFill>
-                  <a:schemeClr val="tx1"/>
-                </a:solidFill>
-                <a:miter lim="800000"/>
-                <a:headEnd/>
-                <a:tailEnd/>
-              </a14:hiddenLine>
-            </a:ext>
-          </a:extLst>
-        </p:spPr>
-      </p:pic>
-      <p:pic>
-        <p:nvPicPr>
-          <p:cNvPr id="1053" name="Picture 29" descr="D:\workspace\curveball_project\Plato\public\plato.png"/>
-          <p:cNvPicPr>
-            <a:picLocks noChangeAspect="1" noChangeArrowheads="1"/>
-          </p:cNvPicPr>
-          <p:nvPr/>
-        </p:nvPicPr>
-        <p:blipFill>
-          <a:blip r:embed="rId14">
-            <a:extLst>
-              <a:ext uri="{28A0092B-C50C-407E-A947-70E740481C1C}">
-                <a14:useLocalDpi xmlns:a14="http://schemas.microsoft.com/office/drawing/2010/main" val="0"/>
-              </a:ext>
-            </a:extLst>
-          </a:blip>
-          <a:srcRect/>
-          <a:stretch>
-            <a:fillRect/>
-          </a:stretch>
-        </p:blipFill>
-        <p:spPr bwMode="auto">
-          <a:xfrm>
-            <a:off x="20797134" y="35161191"/>
-            <a:ext cx="1290989" cy="1678286"/>
-          </a:xfrm>
-          <a:prstGeom prst="rect">
-            <a:avLst/>
-          </a:prstGeom>
-          <a:noFill/>
-          <a:extLst>
-            <a:ext uri="{909E8E84-426E-40DD-AFC4-6F175D3DCCD1}">
-              <a14:hiddenFill xmlns:a14="http://schemas.microsoft.com/office/drawing/2010/main">
-                <a:solidFill>
-                  <a:srgbClr val="FFFFFF"/>
-                </a:solidFill>
-              </a14:hiddenFill>
-            </a:ext>
-          </a:extLst>
-        </p:spPr>
-      </p:pic>
-      <p:pic>
-        <p:nvPicPr>
-          <p:cNvPr id="1054" name="Picture 30" descr="C:\Users\yoavram\Pictures\yoav_mypictr_Facebook.jpg"/>
-          <p:cNvPicPr>
-            <a:picLocks noChangeAspect="1" noChangeArrowheads="1"/>
-          </p:cNvPicPr>
-          <p:nvPr/>
-        </p:nvPicPr>
-        <p:blipFill>
-          <a:blip r:embed="rId15">
-            <a:extLst>
-              <a:ext uri="{28A0092B-C50C-407E-A947-70E740481C1C}">
-                <a14:useLocalDpi xmlns:a14="http://schemas.microsoft.com/office/drawing/2010/main" val="0"/>
-              </a:ext>
-            </a:extLst>
-          </a:blip>
-          <a:srcRect/>
-          <a:stretch>
-            <a:fillRect/>
-          </a:stretch>
-        </p:blipFill>
-        <p:spPr bwMode="auto">
-          <a:xfrm>
-            <a:off x="20579145" y="37186051"/>
-            <a:ext cx="1905000" cy="2381250"/>
+            <a:off x="20806934" y="36053793"/>
+            <a:ext cx="2211561" cy="2764451"/>
           </a:xfrm>
           <a:prstGeom prst="rect">
             <a:avLst/>
@@ -9761,450 +9713,332 @@
           </a:extLst>
         </p:spPr>
       </p:pic>
-      <p:sp>
-        <p:nvSpPr>
-          <p:cNvPr id="11" name="TextBox 10"/>
-          <p:cNvSpPr txBox="1"/>
-          <p:nvPr/>
-        </p:nvSpPr>
-        <p:spPr>
-          <a:xfrm>
-            <a:off x="22197852" y="35644959"/>
-            <a:ext cx="4801846" cy="954107"/>
-          </a:xfrm>
-          <a:prstGeom prst="rect">
-            <a:avLst/>
-          </a:prstGeom>
-          <a:noFill/>
-        </p:spPr>
-        <p:txBody>
-          <a:bodyPr wrap="square" rtlCol="1">
-            <a:spAutoFit/>
-          </a:bodyPr>
-          <a:lstStyle>
-            <a:defPPr>
-              <a:defRPr lang="en-US"/>
-            </a:defPPr>
-            <a:lvl1pPr algn="ctr">
-              <a:defRPr sz="2500">
-                <a:latin typeface="Consolas" panose="020B0609020204030204" pitchFamily="49" charset="0"/>
-                <a:cs typeface="Consolas" panose="020B0609020204030204" pitchFamily="49" charset="0"/>
-              </a:defRPr>
-            </a:lvl1pPr>
-          </a:lstStyle>
-          <a:p>
-            <a:pPr algn="l"/>
-            <a:r>
-              <a:rPr lang="en-US" sz="2800" dirty="0" smtClean="0">
-                <a:latin typeface="Arial"/>
-                <a:cs typeface="Arial"/>
-              </a:rPr>
-              <a:t>←</a:t>
-            </a:r>
-            <a:r>
-              <a:rPr lang="en-US" sz="2800" dirty="0" smtClean="0"/>
-              <a:t>plato.yoavram.com</a:t>
-            </a:r>
-          </a:p>
-          <a:p>
-            <a:pPr algn="r"/>
-            <a:r>
-              <a:rPr lang="en-US" sz="2800" dirty="0" smtClean="0"/>
-              <a:t>curveball.yoavram.com</a:t>
-            </a:r>
-            <a:r>
-              <a:rPr lang="en-US" sz="2800" dirty="0" smtClean="0">
-                <a:latin typeface="Arial"/>
-                <a:cs typeface="Arial"/>
-              </a:rPr>
-              <a:t>→</a:t>
-            </a:r>
-            <a:endParaRPr lang="he-IL" sz="2800" dirty="0"/>
-          </a:p>
-        </p:txBody>
-      </p:sp>
       <p:grpSp>
         <p:nvGrpSpPr>
-          <p:cNvPr id="5" name="Group 4"/>
+          <p:cNvPr id="48" name="Group 47"/>
           <p:cNvGrpSpPr/>
           <p:nvPr/>
         </p:nvGrpSpPr>
         <p:grpSpPr>
           <a:xfrm>
-            <a:off x="22858395" y="37455163"/>
-            <a:ext cx="6088750" cy="1853094"/>
-            <a:chOff x="23110572" y="35796177"/>
-            <a:chExt cx="6088750" cy="1853094"/>
+            <a:off x="23176993" y="36290323"/>
+            <a:ext cx="5612578" cy="2062103"/>
+            <a:chOff x="323528" y="5287813"/>
+            <a:chExt cx="5002971" cy="1682120"/>
           </a:xfrm>
         </p:grpSpPr>
         <p:grpSp>
           <p:nvGrpSpPr>
-            <p:cNvPr id="48" name="Group 47"/>
+            <p:cNvPr id="49" name="Group 48"/>
             <p:cNvGrpSpPr/>
             <p:nvPr/>
           </p:nvGrpSpPr>
           <p:grpSpPr>
             <a:xfrm>
-              <a:off x="23110572" y="35796177"/>
-              <a:ext cx="5002971" cy="1815882"/>
-              <a:chOff x="323528" y="5287813"/>
-              <a:chExt cx="5002971" cy="1815882"/>
+              <a:off x="413187" y="5287813"/>
+              <a:ext cx="4913312" cy="1682120"/>
+              <a:chOff x="1026840" y="5356373"/>
+              <a:chExt cx="4913312" cy="1682120"/>
             </a:xfrm>
           </p:grpSpPr>
-          <p:grpSp>
-            <p:nvGrpSpPr>
-              <p:cNvPr id="49" name="Group 48"/>
-              <p:cNvGrpSpPr/>
+          <p:pic>
+            <p:nvPicPr>
+              <p:cNvPr id="52" name="Picture 1"/>
+              <p:cNvPicPr>
+                <a:picLocks noChangeAspect="1" noChangeArrowheads="1"/>
+              </p:cNvPicPr>
               <p:nvPr/>
-            </p:nvGrpSpPr>
-            <p:grpSpPr>
-              <a:xfrm>
-                <a:off x="413187" y="5287813"/>
-                <a:ext cx="4913312" cy="1815882"/>
-                <a:chOff x="1026840" y="5356373"/>
-                <a:chExt cx="4913312" cy="1815882"/>
-              </a:xfrm>
-            </p:grpSpPr>
-            <p:pic>
-              <p:nvPicPr>
-                <p:cNvPr id="52" name="Picture 1"/>
-                <p:cNvPicPr>
-                  <a:picLocks noChangeAspect="1" noChangeArrowheads="1"/>
-                </p:cNvPicPr>
-                <p:nvPr/>
-              </p:nvPicPr>
-              <p:blipFill>
-                <a:blip r:embed="rId16">
-                  <a:extLst>
-                    <a:ext uri="{28A0092B-C50C-407E-A947-70E740481C1C}">
-                      <a14:useLocalDpi xmlns:a14="http://schemas.microsoft.com/office/drawing/2010/main" val="0"/>
-                    </a:ext>
-                  </a:extLst>
-                </a:blip>
-                <a:srcRect/>
-                <a:stretch>
-                  <a:fillRect/>
-                </a:stretch>
-              </p:blipFill>
-              <p:spPr bwMode="auto">
-                <a:xfrm>
-                  <a:off x="1026840" y="5932512"/>
-                  <a:ext cx="304800" cy="304800"/>
-                </a:xfrm>
-                <a:prstGeom prst="rect">
-                  <a:avLst/>
-                </a:prstGeom>
-                <a:noFill/>
-                <a:ln>
-                  <a:noFill/>
-                </a:ln>
-                <a:effectLst/>
+            </p:nvPicPr>
+            <p:blipFill>
+              <a:blip r:embed="rId10">
                 <a:extLst>
-                  <a:ext uri="{909E8E84-426E-40DD-AFC4-6F175D3DCCD1}">
-                    <a14:hiddenFill xmlns:a14="http://schemas.microsoft.com/office/drawing/2010/main">
-                      <a:solidFill>
-                        <a:schemeClr val="accent1"/>
-                      </a:solidFill>
-                    </a14:hiddenFill>
-                  </a:ext>
-                  <a:ext uri="{91240B29-F687-4F45-9708-019B960494DF}">
-                    <a14:hiddenLine xmlns:a14="http://schemas.microsoft.com/office/drawing/2010/main" w="9525">
-                      <a:solidFill>
-                        <a:schemeClr val="tx1"/>
-                      </a:solidFill>
-                      <a:miter lim="800000"/>
-                      <a:headEnd/>
-                      <a:tailEnd/>
-                    </a14:hiddenLine>
-                  </a:ext>
-                  <a:ext uri="{AF507438-7753-43E0-B8FC-AC1667EBCBE1}">
-                    <a14:hiddenEffects xmlns:a14="http://schemas.microsoft.com/office/drawing/2010/main">
-                      <a:effectLst>
-                        <a:outerShdw dist="35921" dir="2700000" algn="ctr" rotWithShape="0">
-                          <a:schemeClr val="bg2"/>
-                        </a:outerShdw>
-                      </a:effectLst>
-                    </a14:hiddenEffects>
+                  <a:ext uri="{28A0092B-C50C-407E-A947-70E740481C1C}">
+                    <a14:useLocalDpi xmlns:a14="http://schemas.microsoft.com/office/drawing/2010/main" val="0"/>
                   </a:ext>
                 </a:extLst>
-              </p:spPr>
-            </p:pic>
-            <p:pic>
-              <p:nvPicPr>
-                <p:cNvPr id="53" name="Picture 2"/>
-                <p:cNvPicPr>
-                  <a:picLocks noChangeAspect="1" noChangeArrowheads="1"/>
-                </p:cNvPicPr>
-                <p:nvPr/>
-              </p:nvPicPr>
-              <p:blipFill>
-                <a:blip r:embed="rId17">
-                  <a:extLst>
-                    <a:ext uri="{28A0092B-C50C-407E-A947-70E740481C1C}">
-                      <a14:useLocalDpi xmlns:a14="http://schemas.microsoft.com/office/drawing/2010/main" val="0"/>
-                    </a:ext>
-                  </a:extLst>
-                </a:blip>
-                <a:srcRect/>
-                <a:stretch>
-                  <a:fillRect/>
-                </a:stretch>
-              </p:blipFill>
-              <p:spPr bwMode="auto">
-                <a:xfrm>
-                  <a:off x="1026840" y="5500464"/>
-                  <a:ext cx="304800" cy="304800"/>
-                </a:xfrm>
-                <a:prstGeom prst="rect">
-                  <a:avLst/>
-                </a:prstGeom>
-                <a:noFill/>
-                <a:ln>
-                  <a:noFill/>
-                </a:ln>
-                <a:effectLst/>
-                <a:extLst>
-                  <a:ext uri="{909E8E84-426E-40DD-AFC4-6F175D3DCCD1}">
-                    <a14:hiddenFill xmlns:a14="http://schemas.microsoft.com/office/drawing/2010/main">
-                      <a:solidFill>
-                        <a:schemeClr val="accent1"/>
-                      </a:solidFill>
-                    </a14:hiddenFill>
-                  </a:ext>
-                  <a:ext uri="{91240B29-F687-4F45-9708-019B960494DF}">
-                    <a14:hiddenLine xmlns:a14="http://schemas.microsoft.com/office/drawing/2010/main" w="9525">
-                      <a:solidFill>
-                        <a:schemeClr val="tx1"/>
-                      </a:solidFill>
-                      <a:miter lim="800000"/>
-                      <a:headEnd/>
-                      <a:tailEnd/>
-                    </a14:hiddenLine>
-                  </a:ext>
-                  <a:ext uri="{AF507438-7753-43E0-B8FC-AC1667EBCBE1}">
-                    <a14:hiddenEffects xmlns:a14="http://schemas.microsoft.com/office/drawing/2010/main">
-                      <a:effectLst>
-                        <a:outerShdw dist="35921" dir="2700000" algn="ctr" rotWithShape="0">
-                          <a:schemeClr val="bg2"/>
-                        </a:outerShdw>
-                      </a:effectLst>
-                    </a14:hiddenEffects>
-                  </a:ext>
-                </a:extLst>
-              </p:spPr>
-            </p:pic>
-            <p:pic>
-              <p:nvPicPr>
-                <p:cNvPr id="54" name="Picture 3"/>
-                <p:cNvPicPr>
-                  <a:picLocks noChangeAspect="1" noChangeArrowheads="1"/>
-                </p:cNvPicPr>
-                <p:nvPr/>
-              </p:nvPicPr>
-              <p:blipFill>
-                <a:blip r:embed="rId18">
-                  <a:extLst>
-                    <a:ext uri="{28A0092B-C50C-407E-A947-70E740481C1C}">
-                      <a14:useLocalDpi xmlns:a14="http://schemas.microsoft.com/office/drawing/2010/main" val="0"/>
-                    </a:ext>
-                  </a:extLst>
-                </a:blip>
-                <a:srcRect/>
-                <a:stretch>
-                  <a:fillRect/>
-                </a:stretch>
-              </p:blipFill>
-              <p:spPr bwMode="auto">
-                <a:xfrm>
-                  <a:off x="1026840" y="6721152"/>
-                  <a:ext cx="304800" cy="304800"/>
-                </a:xfrm>
-                <a:prstGeom prst="rect">
-                  <a:avLst/>
-                </a:prstGeom>
-                <a:noFill/>
-                <a:ln>
-                  <a:noFill/>
-                </a:ln>
-                <a:effectLst/>
-                <a:extLst>
-                  <a:ext uri="{909E8E84-426E-40DD-AFC4-6F175D3DCCD1}">
-                    <a14:hiddenFill xmlns:a14="http://schemas.microsoft.com/office/drawing/2010/main">
-                      <a:solidFill>
-                        <a:schemeClr val="accent1"/>
-                      </a:solidFill>
-                    </a14:hiddenFill>
-                  </a:ext>
-                  <a:ext uri="{91240B29-F687-4F45-9708-019B960494DF}">
-                    <a14:hiddenLine xmlns:a14="http://schemas.microsoft.com/office/drawing/2010/main" w="9525">
-                      <a:solidFill>
-                        <a:schemeClr val="tx1"/>
-                      </a:solidFill>
-                      <a:miter lim="800000"/>
-                      <a:headEnd/>
-                      <a:tailEnd/>
-                    </a14:hiddenLine>
-                  </a:ext>
-                  <a:ext uri="{AF507438-7753-43E0-B8FC-AC1667EBCBE1}">
-                    <a14:hiddenEffects xmlns:a14="http://schemas.microsoft.com/office/drawing/2010/main">
-                      <a:effectLst>
-                        <a:outerShdw dist="35921" dir="2700000" algn="ctr" rotWithShape="0">
-                          <a:schemeClr val="bg2"/>
-                        </a:outerShdw>
-                      </a:effectLst>
-                    </a14:hiddenEffects>
-                  </a:ext>
-                </a:extLst>
-              </p:spPr>
-            </p:pic>
-            <p:sp>
-              <p:nvSpPr>
-                <p:cNvPr id="55" name="Rectangle 54"/>
-                <p:cNvSpPr/>
-                <p:nvPr/>
-              </p:nvSpPr>
-              <p:spPr>
-                <a:xfrm>
-                  <a:off x="1368152" y="5356373"/>
-                  <a:ext cx="4572000" cy="1815882"/>
-                </a:xfrm>
-                <a:prstGeom prst="rect">
-                  <a:avLst/>
-                </a:prstGeom>
-              </p:spPr>
-              <p:txBody>
-                <a:bodyPr>
-                  <a:spAutoFit/>
-                </a:bodyPr>
-                <a:lstStyle/>
-                <a:p>
-                  <a:r>
-                    <a:rPr lang="en-US" sz="2800" b="1" dirty="0"/>
-                    <a:t>yoav@yoavram.com</a:t>
-                  </a:r>
-                </a:p>
-                <a:p>
-                  <a:pPr algn="l" rtl="0"/>
-                  <a:r>
-                    <a:rPr lang="en-US" sz="2800" b="1" dirty="0" smtClean="0"/>
-                    <a:t>@</a:t>
-                  </a:r>
-                  <a:r>
-                    <a:rPr lang="en-US" sz="2800" b="1" dirty="0" err="1" smtClean="0"/>
-                    <a:t>yoavram</a:t>
-                  </a:r>
-                  <a:endParaRPr lang="en-US" sz="2800" b="1" dirty="0" smtClean="0"/>
-                </a:p>
-                <a:p>
-                  <a:pPr algn="l" rtl="0"/>
-                  <a:r>
-                    <a:rPr lang="en-US" b="1" dirty="0" smtClean="0"/>
-                    <a:t>@</a:t>
-                  </a:r>
-                  <a:r>
-                    <a:rPr lang="en-US" sz="2800" b="1" dirty="0" err="1" smtClean="0"/>
-                    <a:t>yoavram</a:t>
-                  </a:r>
-                  <a:endParaRPr lang="en-US" sz="2800" b="1" dirty="0"/>
-                </a:p>
-                <a:p>
-                  <a:pPr algn="l" rtl="0"/>
-                  <a:r>
-                    <a:rPr lang="en-US" sz="2800" b="1" dirty="0" smtClean="0"/>
-                    <a:t>www.yoavram.com</a:t>
-                  </a:r>
-                  <a:endParaRPr lang="he-IL" sz="2800" b="1" dirty="0"/>
-                </a:p>
-              </p:txBody>
-            </p:sp>
-          </p:grpSp>
-          <p:sp>
-            <p:nvSpPr>
-              <p:cNvPr id="50" name="TextBox 49"/>
-              <p:cNvSpPr txBox="1"/>
-              <p:nvPr/>
-            </p:nvSpPr>
-            <p:spPr>
+              </a:blip>
+              <a:srcRect/>
+              <a:stretch>
+                <a:fillRect/>
+              </a:stretch>
+            </p:blipFill>
+            <p:spPr bwMode="auto">
               <a:xfrm>
-                <a:off x="323528" y="6165304"/>
-                <a:ext cx="341312" cy="461665"/>
+                <a:off x="1026840" y="5872841"/>
+                <a:ext cx="304800" cy="304800"/>
               </a:xfrm>
               <a:prstGeom prst="rect">
                 <a:avLst/>
               </a:prstGeom>
               <a:noFill/>
+              <a:ln>
+                <a:noFill/>
+              </a:ln>
+              <a:effectLst/>
+              <a:extLst>
+                <a:ext uri="{909E8E84-426E-40DD-AFC4-6F175D3DCCD1}">
+                  <a14:hiddenFill xmlns:a14="http://schemas.microsoft.com/office/drawing/2010/main">
+                    <a:solidFill>
+                      <a:schemeClr val="accent1"/>
+                    </a:solidFill>
+                  </a14:hiddenFill>
+                </a:ext>
+                <a:ext uri="{91240B29-F687-4F45-9708-019B960494DF}">
+                  <a14:hiddenLine xmlns:a14="http://schemas.microsoft.com/office/drawing/2010/main" w="9525">
+                    <a:solidFill>
+                      <a:schemeClr val="tx1"/>
+                    </a:solidFill>
+                    <a:miter lim="800000"/>
+                    <a:headEnd/>
+                    <a:tailEnd/>
+                  </a14:hiddenLine>
+                </a:ext>
+                <a:ext uri="{AF507438-7753-43E0-B8FC-AC1667EBCBE1}">
+                  <a14:hiddenEffects xmlns:a14="http://schemas.microsoft.com/office/drawing/2010/main">
+                    <a:effectLst>
+                      <a:outerShdw dist="35921" dir="2700000" algn="ctr" rotWithShape="0">
+                        <a:schemeClr val="bg2"/>
+                      </a:outerShdw>
+                    </a:effectLst>
+                  </a14:hiddenEffects>
+                </a:ext>
+              </a:extLst>
+            </p:spPr>
+          </p:pic>
+          <p:pic>
+            <p:nvPicPr>
+              <p:cNvPr id="53" name="Picture 2"/>
+              <p:cNvPicPr>
+                <a:picLocks noChangeAspect="1" noChangeArrowheads="1"/>
+              </p:cNvPicPr>
+              <p:nvPr/>
+            </p:nvPicPr>
+            <p:blipFill>
+              <a:blip r:embed="rId11">
+                <a:extLst>
+                  <a:ext uri="{28A0092B-C50C-407E-A947-70E740481C1C}">
+                    <a14:useLocalDpi xmlns:a14="http://schemas.microsoft.com/office/drawing/2010/main" val="0"/>
+                  </a:ext>
+                </a:extLst>
+              </a:blip>
+              <a:srcRect/>
+              <a:stretch>
+                <a:fillRect/>
+              </a:stretch>
+            </p:blipFill>
+            <p:spPr bwMode="auto">
+              <a:xfrm>
+                <a:off x="1026840" y="5460681"/>
+                <a:ext cx="304800" cy="304800"/>
+              </a:xfrm>
+              <a:prstGeom prst="rect">
+                <a:avLst/>
+              </a:prstGeom>
+              <a:noFill/>
+              <a:ln>
+                <a:noFill/>
+              </a:ln>
+              <a:effectLst/>
+              <a:extLst>
+                <a:ext uri="{909E8E84-426E-40DD-AFC4-6F175D3DCCD1}">
+                  <a14:hiddenFill xmlns:a14="http://schemas.microsoft.com/office/drawing/2010/main">
+                    <a:solidFill>
+                      <a:schemeClr val="accent1"/>
+                    </a:solidFill>
+                  </a14:hiddenFill>
+                </a:ext>
+                <a:ext uri="{91240B29-F687-4F45-9708-019B960494DF}">
+                  <a14:hiddenLine xmlns:a14="http://schemas.microsoft.com/office/drawing/2010/main" w="9525">
+                    <a:solidFill>
+                      <a:schemeClr val="tx1"/>
+                    </a:solidFill>
+                    <a:miter lim="800000"/>
+                    <a:headEnd/>
+                    <a:tailEnd/>
+                  </a14:hiddenLine>
+                </a:ext>
+                <a:ext uri="{AF507438-7753-43E0-B8FC-AC1667EBCBE1}">
+                  <a14:hiddenEffects xmlns:a14="http://schemas.microsoft.com/office/drawing/2010/main">
+                    <a:effectLst>
+                      <a:outerShdw dist="35921" dir="2700000" algn="ctr" rotWithShape="0">
+                        <a:schemeClr val="bg2"/>
+                      </a:outerShdw>
+                    </a:effectLst>
+                  </a14:hiddenEffects>
+                </a:ext>
+              </a:extLst>
+            </p:spPr>
+          </p:pic>
+          <p:pic>
+            <p:nvPicPr>
+              <p:cNvPr id="54" name="Picture 3"/>
+              <p:cNvPicPr>
+                <a:picLocks noChangeAspect="1" noChangeArrowheads="1"/>
+              </p:cNvPicPr>
+              <p:nvPr/>
+            </p:nvPicPr>
+            <p:blipFill>
+              <a:blip r:embed="rId12">
+                <a:extLst>
+                  <a:ext uri="{28A0092B-C50C-407E-A947-70E740481C1C}">
+                    <a14:useLocalDpi xmlns:a14="http://schemas.microsoft.com/office/drawing/2010/main" val="0"/>
+                  </a:ext>
+                </a:extLst>
+              </a:blip>
+              <a:srcRect/>
+              <a:stretch>
+                <a:fillRect/>
+              </a:stretch>
+            </p:blipFill>
+            <p:spPr bwMode="auto">
+              <a:xfrm>
+                <a:off x="1026840" y="6631644"/>
+                <a:ext cx="304800" cy="304800"/>
+              </a:xfrm>
+              <a:prstGeom prst="rect">
+                <a:avLst/>
+              </a:prstGeom>
+              <a:noFill/>
+              <a:ln>
+                <a:noFill/>
+              </a:ln>
+              <a:effectLst/>
+              <a:extLst>
+                <a:ext uri="{909E8E84-426E-40DD-AFC4-6F175D3DCCD1}">
+                  <a14:hiddenFill xmlns:a14="http://schemas.microsoft.com/office/drawing/2010/main">
+                    <a:solidFill>
+                      <a:schemeClr val="accent1"/>
+                    </a:solidFill>
+                  </a14:hiddenFill>
+                </a:ext>
+                <a:ext uri="{91240B29-F687-4F45-9708-019B960494DF}">
+                  <a14:hiddenLine xmlns:a14="http://schemas.microsoft.com/office/drawing/2010/main" w="9525">
+                    <a:solidFill>
+                      <a:schemeClr val="tx1"/>
+                    </a:solidFill>
+                    <a:miter lim="800000"/>
+                    <a:headEnd/>
+                    <a:tailEnd/>
+                  </a14:hiddenLine>
+                </a:ext>
+                <a:ext uri="{AF507438-7753-43E0-B8FC-AC1667EBCBE1}">
+                  <a14:hiddenEffects xmlns:a14="http://schemas.microsoft.com/office/drawing/2010/main">
+                    <a:effectLst>
+                      <a:outerShdw dist="35921" dir="2700000" algn="ctr" rotWithShape="0">
+                        <a:schemeClr val="bg2"/>
+                      </a:outerShdw>
+                    </a:effectLst>
+                  </a14:hiddenEffects>
+                </a:ext>
+              </a:extLst>
+            </p:spPr>
+          </p:pic>
+          <p:sp>
+            <p:nvSpPr>
+              <p:cNvPr id="55" name="Rectangle 54"/>
+              <p:cNvSpPr/>
+              <p:nvPr/>
+            </p:nvSpPr>
+            <p:spPr>
+              <a:xfrm>
+                <a:off x="1368152" y="5356373"/>
+                <a:ext cx="4572000" cy="1682120"/>
+              </a:xfrm>
+              <a:prstGeom prst="rect">
+                <a:avLst/>
+              </a:prstGeom>
             </p:spPr>
             <p:txBody>
-              <a:bodyPr wrap="square" rtlCol="1">
+              <a:bodyPr>
                 <a:spAutoFit/>
               </a:bodyPr>
               <a:lstStyle/>
               <a:p>
                 <a:r>
-                  <a:rPr lang="en-US" sz="2400" dirty="0" smtClean="0">
-                    <a:latin typeface="github-octicons" panose="02000503000000000000" pitchFamily="2" charset="0"/>
-                  </a:rPr>
-                  <a:t>a</a:t>
+                  <a:rPr lang="en-US" sz="3200" b="1" dirty="0"/>
+                  <a:t>yoav@yoavram.com</a:t>
                 </a:r>
-                <a:endParaRPr lang="he-IL" sz="2400" dirty="0">
-                  <a:latin typeface="github-octicons" panose="02000503000000000000" pitchFamily="2" charset="0"/>
-                </a:endParaRPr>
+              </a:p>
+              <a:p>
+                <a:pPr algn="l" rtl="0"/>
+                <a:r>
+                  <a:rPr lang="en-US" sz="3200" b="1" dirty="0" smtClean="0"/>
+                  <a:t>@</a:t>
+                </a:r>
+                <a:r>
+                  <a:rPr lang="en-US" sz="3200" b="1" dirty="0" err="1" smtClean="0"/>
+                  <a:t>yoavram</a:t>
+                </a:r>
+                <a:endParaRPr lang="en-US" sz="3200" b="1" dirty="0" smtClean="0"/>
+              </a:p>
+              <a:p>
+                <a:pPr algn="l" rtl="0"/>
+                <a:r>
+                  <a:rPr lang="en-US" sz="3200" b="1" dirty="0" smtClean="0"/>
+                  <a:t>@</a:t>
+                </a:r>
+                <a:r>
+                  <a:rPr lang="en-US" sz="3200" b="1" dirty="0" err="1" smtClean="0"/>
+                  <a:t>yoavram</a:t>
+                </a:r>
+                <a:endParaRPr lang="en-US" sz="3200" b="1" dirty="0"/>
+              </a:p>
+              <a:p>
+                <a:pPr algn="l" rtl="0"/>
+                <a:r>
+                  <a:rPr lang="en-US" sz="3200" b="1" dirty="0" smtClean="0"/>
+                  <a:t>www.yoavram.com</a:t>
+                </a:r>
+                <a:endParaRPr lang="he-IL" sz="3200" b="1" dirty="0"/>
               </a:p>
             </p:txBody>
           </p:sp>
         </p:grpSp>
-        <p:pic>
-          <p:nvPicPr>
-            <p:cNvPr id="1026" name="Picture 2" descr="C:\Users\yoavram\Downloads\qrcode(1).png"/>
-            <p:cNvPicPr>
-              <a:picLocks noChangeAspect="1" noChangeArrowheads="1"/>
-            </p:cNvPicPr>
+        <p:sp>
+          <p:nvSpPr>
+            <p:cNvPr id="50" name="TextBox 49"/>
+            <p:cNvSpPr txBox="1"/>
             <p:nvPr/>
-          </p:nvPicPr>
-          <p:blipFill>
-            <a:blip r:embed="rId19">
-              <a:extLst>
-                <a:ext uri="{28A0092B-C50C-407E-A947-70E740481C1C}">
-                  <a14:useLocalDpi xmlns:a14="http://schemas.microsoft.com/office/drawing/2010/main" val="0"/>
-                </a:ext>
-              </a:extLst>
-            </a:blip>
-            <a:srcRect/>
-            <a:stretch>
-              <a:fillRect/>
-            </a:stretch>
-          </p:blipFill>
-          <p:spPr bwMode="auto">
+          </p:nvSpPr>
+          <p:spPr>
             <a:xfrm>
-              <a:off x="27399322" y="35849271"/>
-              <a:ext cx="1800000" cy="1800000"/>
+              <a:off x="323528" y="6115579"/>
+              <a:ext cx="341312" cy="461665"/>
             </a:xfrm>
             <a:prstGeom prst="rect">
               <a:avLst/>
             </a:prstGeom>
             <a:noFill/>
-            <a:extLst>
-              <a:ext uri="{909E8E84-426E-40DD-AFC4-6F175D3DCCD1}">
-                <a14:hiddenFill xmlns:a14="http://schemas.microsoft.com/office/drawing/2010/main">
-                  <a:solidFill>
-                    <a:srgbClr val="FFFFFF"/>
-                  </a:solidFill>
-                </a14:hiddenFill>
-              </a:ext>
-            </a:extLst>
           </p:spPr>
-        </p:pic>
+          <p:txBody>
+            <a:bodyPr wrap="square" rtlCol="1">
+              <a:spAutoFit/>
+            </a:bodyPr>
+            <a:lstStyle/>
+            <a:p>
+              <a:r>
+                <a:rPr lang="en-US" sz="2400" dirty="0" smtClean="0">
+                  <a:latin typeface="github-octicons" panose="02000503000000000000" pitchFamily="2" charset="0"/>
+                </a:rPr>
+                <a:t>a</a:t>
+              </a:r>
+              <a:endParaRPr lang="he-IL" sz="2400" dirty="0">
+                <a:latin typeface="github-octicons" panose="02000503000000000000" pitchFamily="2" charset="0"/>
+              </a:endParaRPr>
+            </a:p>
+          </p:txBody>
+        </p:sp>
       </p:grpSp>
       <p:pic>
         <p:nvPicPr>
-          <p:cNvPr id="25" name="Picture 3" descr="D:\projects\sim\presentation\isf.png"/>
+          <p:cNvPr id="1026" name="Picture 2" descr="C:\Users\yoavram\Downloads\qrcode(1).png"/>
           <p:cNvPicPr>
             <a:picLocks noChangeAspect="1" noChangeArrowheads="1"/>
           </p:cNvPicPr>
           <p:nvPr/>
         </p:nvPicPr>
         <p:blipFill>
-          <a:blip r:embed="rId20">
+          <a:blip r:embed="rId13">
             <a:extLst>
               <a:ext uri="{28A0092B-C50C-407E-A947-70E740481C1C}">
                 <a14:useLocalDpi xmlns:a14="http://schemas.microsoft.com/office/drawing/2010/main" val="0"/>
@@ -10218,8 +10052,8 @@
         </p:blipFill>
         <p:spPr bwMode="auto">
           <a:xfrm>
-            <a:off x="16367014" y="40156154"/>
-            <a:ext cx="1892763" cy="1620000"/>
+            <a:off x="25972532" y="38918290"/>
+            <a:ext cx="2817038" cy="2817038"/>
           </a:xfrm>
           <a:prstGeom prst="rect">
             <a:avLst/>
@@ -10244,8 +10078,8 @@
         </p:nvSpPr>
         <p:spPr>
           <a:xfrm>
-            <a:off x="17538093" y="40045416"/>
-            <a:ext cx="2847965" cy="1631216"/>
+            <a:off x="17804037" y="37811826"/>
+            <a:ext cx="1478168" cy="830997"/>
           </a:xfrm>
           <a:prstGeom prst="rect">
             <a:avLst/>
@@ -10260,7 +10094,7 @@
           <a:p>
             <a:pPr algn="ctr"/>
             <a:r>
-              <a:rPr lang="en-US" altLang="he-IL" sz="2000" b="1" dirty="0">
+              <a:rPr lang="en-US" altLang="he-IL" sz="1600" b="1" dirty="0">
                 <a:solidFill>
                   <a:srgbClr val="0070C0"/>
                 </a:solidFill>
@@ -10269,7 +10103,17 @@
               </a:rPr>
               <a:t>Israeli </a:t>
             </a:r>
-            <a:endParaRPr lang="en-US" altLang="he-IL" sz="2000" b="1" dirty="0" smtClean="0">
+            <a:r>
+              <a:rPr lang="en-US" altLang="he-IL" sz="1600" b="1" dirty="0" smtClean="0">
+                <a:solidFill>
+                  <a:srgbClr val="0070C0"/>
+                </a:solidFill>
+                <a:latin typeface="Calibri" panose="020F0502020204030204" pitchFamily="34" charset="0"/>
+                <a:cs typeface="Consolas" panose="020B0609020204030204" pitchFamily="49" charset="0"/>
+              </a:rPr>
+              <a:t>Ministry </a:t>
+            </a:r>
+            <a:endParaRPr lang="en-US" altLang="he-IL" sz="1600" b="1" dirty="0" smtClean="0">
               <a:solidFill>
                 <a:srgbClr val="0070C0"/>
               </a:solidFill>
@@ -10280,55 +10124,26 @@
           <a:p>
             <a:pPr algn="ctr"/>
             <a:r>
-              <a:rPr lang="en-US" altLang="he-IL" sz="2000" b="1" dirty="0" smtClean="0">
+              <a:rPr lang="en-US" altLang="he-IL" sz="1600" b="1" dirty="0" smtClean="0">
                 <a:solidFill>
                   <a:srgbClr val="0070C0"/>
                 </a:solidFill>
                 <a:latin typeface="Calibri" panose="020F0502020204030204" pitchFamily="34" charset="0"/>
                 <a:cs typeface="Consolas" panose="020B0609020204030204" pitchFamily="49" charset="0"/>
               </a:rPr>
-              <a:t>Ministry </a:t>
-            </a:r>
-          </a:p>
-          <a:p>
-            <a:pPr algn="ctr"/>
-            <a:r>
-              <a:rPr lang="en-US" altLang="he-IL" sz="2000" b="1" dirty="0" smtClean="0">
+              <a:t>of </a:t>
+            </a:r>
+            <a:r>
+              <a:rPr lang="en-US" altLang="he-IL" sz="1600" b="1" dirty="0" smtClean="0">
                 <a:solidFill>
                   <a:srgbClr val="0070C0"/>
                 </a:solidFill>
                 <a:latin typeface="Calibri" panose="020F0502020204030204" pitchFamily="34" charset="0"/>
                 <a:cs typeface="Consolas" panose="020B0609020204030204" pitchFamily="49" charset="0"/>
               </a:rPr>
-              <a:t>of Science </a:t>
-            </a:r>
-          </a:p>
-          <a:p>
-            <a:pPr algn="ctr"/>
-            <a:r>
-              <a:rPr lang="en-US" altLang="he-IL" sz="2000" b="1" dirty="0" smtClean="0">
-                <a:solidFill>
-                  <a:srgbClr val="0070C0"/>
-                </a:solidFill>
-                <a:latin typeface="Calibri" panose="020F0502020204030204" pitchFamily="34" charset="0"/>
-                <a:cs typeface="Consolas" panose="020B0609020204030204" pitchFamily="49" charset="0"/>
-              </a:rPr>
-              <a:t>and </a:t>
-            </a:r>
-          </a:p>
-          <a:p>
-            <a:pPr algn="ctr"/>
-            <a:r>
-              <a:rPr lang="en-US" altLang="he-IL" sz="2000" b="1" dirty="0" smtClean="0">
-                <a:solidFill>
-                  <a:srgbClr val="0070C0"/>
-                </a:solidFill>
-                <a:latin typeface="Calibri" panose="020F0502020204030204" pitchFamily="34" charset="0"/>
-                <a:cs typeface="Consolas" panose="020B0609020204030204" pitchFamily="49" charset="0"/>
-              </a:rPr>
-              <a:t>Technology</a:t>
-            </a:r>
-            <a:endParaRPr lang="en-US" altLang="he-IL" sz="2000" b="1" dirty="0">
+              <a:t>Science &amp; Technology</a:t>
+            </a:r>
+            <a:endParaRPr lang="en-US" altLang="he-IL" sz="1600" b="1" dirty="0">
               <a:solidFill>
                 <a:srgbClr val="0070C0"/>
               </a:solidFill>
@@ -10347,7 +10162,7 @@
           <p:nvPr/>
         </p:nvPicPr>
         <p:blipFill>
-          <a:blip r:embed="rId21">
+          <a:blip r:embed="rId14">
             <a:extLst>
               <a:ext uri="{28A0092B-C50C-407E-A947-70E740481C1C}">
                 <a14:useLocalDpi xmlns:a14="http://schemas.microsoft.com/office/drawing/2010/main" val="0"/>
@@ -10388,7 +10203,7 @@
           <p:nvPr/>
         </p:nvPicPr>
         <p:blipFill>
-          <a:blip r:embed="rId22">
+          <a:blip r:embed="rId15">
             <a:extLst>
               <a:ext uri="{28A0092B-C50C-407E-A947-70E740481C1C}">
                 <a14:useLocalDpi xmlns:a14="http://schemas.microsoft.com/office/drawing/2010/main" val="0"/>
@@ -10402,7 +10217,7 @@
         </p:blipFill>
         <p:spPr bwMode="auto">
           <a:xfrm>
-            <a:off x="22622555" y="9894290"/>
+            <a:off x="22622555" y="9862759"/>
             <a:ext cx="4274600" cy="3112168"/>
           </a:xfrm>
           <a:prstGeom prst="rect">
@@ -10428,8 +10243,8 @@
         </p:nvSpPr>
         <p:spPr>
           <a:xfrm>
-            <a:off x="23281307" y="20901733"/>
-            <a:ext cx="3568348" cy="523220"/>
+            <a:off x="22745280" y="20870202"/>
+            <a:ext cx="4533036" cy="646331"/>
           </a:xfrm>
           <a:prstGeom prst="rect">
             <a:avLst/>
@@ -10463,12 +10278,12 @@
           <a:lstStyle/>
           <a:p>
             <a:r>
-              <a:rPr lang="en-US" dirty="0" smtClean="0">
+              <a:rPr lang="en-US" sz="3600" dirty="0" smtClean="0">
                 <a:latin typeface="Calibri" panose="020F0502020204030204" pitchFamily="34" charset="0"/>
               </a:rPr>
               <a:t>Competition Prediction</a:t>
             </a:r>
-            <a:endParaRPr lang="he-IL" dirty="0">
+            <a:endParaRPr lang="he-IL" sz="3600" dirty="0">
               <a:latin typeface="Calibri" panose="020F0502020204030204" pitchFamily="34" charset="0"/>
             </a:endParaRPr>
           </a:p>
@@ -10482,8 +10297,8 @@
         </p:nvSpPr>
         <p:spPr>
           <a:xfrm>
-            <a:off x="23722095" y="19256861"/>
-            <a:ext cx="2544286" cy="523220"/>
+            <a:off x="23343723" y="19130737"/>
+            <a:ext cx="3220753" cy="646331"/>
           </a:xfrm>
           <a:prstGeom prst="rect">
             <a:avLst/>
@@ -10517,12 +10332,12 @@
           <a:lstStyle/>
           <a:p>
             <a:r>
-              <a:rPr lang="en-US" dirty="0">
+              <a:rPr lang="en-US" sz="3600" dirty="0">
                 <a:latin typeface="Calibri" panose="020F0502020204030204" pitchFamily="34" charset="0"/>
               </a:rPr>
               <a:t>Model Selection</a:t>
             </a:r>
-            <a:endParaRPr lang="he-IL" dirty="0">
+            <a:endParaRPr lang="he-IL" sz="3600" dirty="0">
               <a:latin typeface="Calibri" panose="020F0502020204030204" pitchFamily="34" charset="0"/>
             </a:endParaRPr>
           </a:p>
@@ -10570,7 +10385,7 @@
           <p:nvPr/>
         </p:nvPicPr>
         <p:blipFill>
-          <a:blip r:embed="rId23">
+          <a:blip r:embed="rId16">
             <a:extLst>
               <a:ext uri="{28A0092B-C50C-407E-A947-70E740481C1C}">
                 <a14:useLocalDpi xmlns:a14="http://schemas.microsoft.com/office/drawing/2010/main" val="0"/>
@@ -10611,7 +10426,7 @@
           <p:nvPr/>
         </p:nvPicPr>
         <p:blipFill>
-          <a:blip r:embed="rId24">
+          <a:blip r:embed="rId17">
             <a:extLst>
               <a:ext uri="{28A0092B-C50C-407E-A947-70E740481C1C}">
                 <a14:useLocalDpi xmlns:a14="http://schemas.microsoft.com/office/drawing/2010/main" val="0"/>
@@ -10643,8 +10458,8 @@
           </a:extLst>
         </p:spPr>
       </p:pic>
-      <mc:AlternateContent xmlns:mc="http://schemas.openxmlformats.org/markup-compatibility/2006" xmlns:a14="http://schemas.microsoft.com/office/drawing/2010/main">
-        <mc:Choice Requires="a14">
+      <mc:AlternateContent xmlns:mc="http://schemas.openxmlformats.org/markup-compatibility/2006">
+        <mc:Choice xmlns:a14="http://schemas.microsoft.com/office/drawing/2010/main" Requires="a14">
           <p:graphicFrame>
             <p:nvGraphicFramePr>
               <p:cNvPr id="6" name="Table 5"/>
@@ -10654,7 +10469,7 @@
               <p:nvPr>
                 <p:extLst>
                   <p:ext uri="{D42A27DB-BD31-4B8C-83A1-F6EECF244321}">
-                    <p14:modId xmlns:p14="http://schemas.microsoft.com/office/powerpoint/2010/main" val="1531113529"/>
+                    <p14:modId xmlns:p14="http://schemas.microsoft.com/office/powerpoint/2010/main" val="3359294587"/>
                   </p:ext>
                 </p:extLst>
               </p:nvPr>
@@ -10683,6 +10498,9 @@
                           <a:pPr algn="ctr" rtl="0"/>
                           <a:r>
                             <a:rPr lang="en-US" dirty="0" smtClean="0">
+                              <a:solidFill>
+                                <a:srgbClr val="E02829"/>
+                              </a:solidFill>
                               <a:latin typeface="Cambria Math" panose="02040503050406030204" pitchFamily="18" charset="0"/>
                               <a:ea typeface="Cambria Math" panose="02040503050406030204" pitchFamily="18" charset="0"/>
                             </a:rPr>
@@ -10690,7 +10508,7 @@
                           </a:r>
                           <a:endParaRPr lang="he-IL" dirty="0">
                             <a:solidFill>
-                              <a:srgbClr val="FF0000"/>
+                              <a:srgbClr val="E02829"/>
                             </a:solidFill>
                             <a:latin typeface="Cambria Math" panose="02040503050406030204" pitchFamily="18" charset="0"/>
                             <a:ea typeface="Cambria Math" panose="02040503050406030204" pitchFamily="18" charset="0"/>
@@ -10707,6 +10525,9 @@
                           <a:pPr algn="ctr" rtl="0"/>
                           <a:r>
                             <a:rPr lang="en-US" dirty="0" smtClean="0">
+                              <a:solidFill>
+                                <a:srgbClr val="59A754"/>
+                              </a:solidFill>
                               <a:latin typeface="Cambria Math" panose="02040503050406030204" pitchFamily="18" charset="0"/>
                               <a:ea typeface="Cambria Math" panose="02040503050406030204" pitchFamily="18" charset="0"/>
                             </a:rPr>
@@ -10714,7 +10535,7 @@
                           </a:r>
                           <a:endParaRPr lang="he-IL" dirty="0">
                             <a:solidFill>
-                              <a:srgbClr val="00B050"/>
+                              <a:srgbClr val="59A754"/>
                             </a:solidFill>
                             <a:latin typeface="Cambria Math" panose="02040503050406030204" pitchFamily="18" charset="0"/>
                             <a:ea typeface="Cambria Math" panose="02040503050406030204" pitchFamily="18" charset="0"/>
@@ -11197,7 +11018,7 @@
             </a:graphic>
           </p:graphicFrame>
         </mc:Choice>
-        <mc:Fallback xmlns="">
+        <mc:Fallback>
           <p:graphicFrame>
             <p:nvGraphicFramePr>
               <p:cNvPr id="6" name="Table 5"/>
@@ -11207,7 +11028,7 @@
               <p:nvPr>
                 <p:extLst>
                   <p:ext uri="{D42A27DB-BD31-4B8C-83A1-F6EECF244321}">
-                    <p14:modId xmlns:p14="http://schemas.microsoft.com/office/powerpoint/2010/main" val="1531113529"/>
+                    <p14:modId xmlns:p14="http://schemas.microsoft.com/office/powerpoint/2010/main" val="3359294587"/>
                   </p:ext>
                 </p:extLst>
               </p:nvPr>
@@ -11236,6 +11057,9 @@
                           <a:pPr algn="ctr" rtl="0"/>
                           <a:r>
                             <a:rPr lang="en-US" dirty="0" smtClean="0">
+                              <a:solidFill>
+                                <a:srgbClr val="E02829"/>
+                              </a:solidFill>
                               <a:latin typeface="Cambria Math" panose="02040503050406030204" pitchFamily="18" charset="0"/>
                               <a:ea typeface="Cambria Math" panose="02040503050406030204" pitchFamily="18" charset="0"/>
                             </a:rPr>
@@ -11243,7 +11067,7 @@
                           </a:r>
                           <a:endParaRPr lang="he-IL" dirty="0">
                             <a:solidFill>
-                              <a:srgbClr val="FF0000"/>
+                              <a:srgbClr val="E02829"/>
                             </a:solidFill>
                             <a:latin typeface="Cambria Math" panose="02040503050406030204" pitchFamily="18" charset="0"/>
                             <a:ea typeface="Cambria Math" panose="02040503050406030204" pitchFamily="18" charset="0"/>
@@ -11260,6 +11084,9 @@
                           <a:pPr algn="ctr" rtl="0"/>
                           <a:r>
                             <a:rPr lang="en-US" dirty="0" smtClean="0">
+                              <a:solidFill>
+                                <a:srgbClr val="59A754"/>
+                              </a:solidFill>
                               <a:latin typeface="Cambria Math" panose="02040503050406030204" pitchFamily="18" charset="0"/>
                               <a:ea typeface="Cambria Math" panose="02040503050406030204" pitchFamily="18" charset="0"/>
                             </a:rPr>
@@ -11267,7 +11094,7 @@
                           </a:r>
                           <a:endParaRPr lang="he-IL" dirty="0">
                             <a:solidFill>
-                              <a:srgbClr val="00B050"/>
+                              <a:srgbClr val="59A754"/>
                             </a:solidFill>
                             <a:latin typeface="Cambria Math" panose="02040503050406030204" pitchFamily="18" charset="0"/>
                             <a:ea typeface="Cambria Math" panose="02040503050406030204" pitchFamily="18" charset="0"/>
@@ -11351,7 +11178,7 @@
                       </a:txBody>
                       <a:tcPr>
                         <a:blipFill rotWithShape="1">
-                          <a:blip r:embed="rId25"/>
+                          <a:blip r:embed="rId18"/>
                           <a:stretch>
                             <a:fillRect l="-112500" t="-96721" r="-403" b="-508197"/>
                           </a:stretch>
@@ -11412,7 +11239,7 @@
                       </a:txBody>
                       <a:tcPr>
                         <a:blipFill rotWithShape="1">
-                          <a:blip r:embed="rId25"/>
+                          <a:blip r:embed="rId18"/>
                           <a:stretch>
                             <a:fillRect l="-112500" t="-196721" r="-403" b="-408197"/>
                           </a:stretch>
@@ -11473,7 +11300,7 @@
                       </a:txBody>
                       <a:tcPr>
                         <a:blipFill rotWithShape="1">
-                          <a:blip r:embed="rId25"/>
+                          <a:blip r:embed="rId18"/>
                           <a:stretch>
                             <a:fillRect l="-112500" t="-296721" r="-403" b="-308197"/>
                           </a:stretch>
@@ -11534,7 +11361,7 @@
                       </a:txBody>
                       <a:tcPr>
                         <a:blipFill rotWithShape="1">
-                          <a:blip r:embed="rId25"/>
+                          <a:blip r:embed="rId18"/>
                           <a:stretch>
                             <a:fillRect l="-112500" t="-403333" r="-403" b="-213333"/>
                           </a:stretch>
@@ -11758,7 +11585,7 @@
           <p:nvPr/>
         </p:nvPicPr>
         <p:blipFill>
-          <a:blip r:embed="rId26">
+          <a:blip r:embed="rId19">
             <a:extLst>
               <a:ext uri="{28A0092B-C50C-407E-A947-70E740481C1C}">
                 <a14:useLocalDpi xmlns:a14="http://schemas.microsoft.com/office/drawing/2010/main" val="0"/>
@@ -11799,7 +11626,7 @@
           <p:nvPr/>
         </p:nvPicPr>
         <p:blipFill>
-          <a:blip r:embed="rId27">
+          <a:blip r:embed="rId20">
             <a:extLst>
               <a:ext uri="{28A0092B-C50C-407E-A947-70E740481C1C}">
                 <a14:useLocalDpi xmlns:a14="http://schemas.microsoft.com/office/drawing/2010/main" val="0"/>
@@ -11839,7 +11666,7 @@
         </p:nvCxnSpPr>
         <p:spPr>
           <a:xfrm>
-            <a:off x="24954423" y="21618362"/>
+            <a:off x="25017485" y="21618362"/>
             <a:ext cx="0" cy="843328"/>
           </a:xfrm>
           <a:prstGeom prst="straightConnector1">
@@ -12311,7 +12138,7 @@
             <a:r>
               <a:rPr lang="en-US" altLang="he-IL" sz="3900" b="1" dirty="0" smtClean="0">
                 <a:solidFill>
-                  <a:srgbClr val="000000"/>
+                  <a:srgbClr val="E02829"/>
                 </a:solidFill>
                 <a:latin typeface="Calibri" pitchFamily="34" charset="0"/>
               </a:rPr>
@@ -12319,7 +12146,7 @@
             </a:r>
             <a:endParaRPr lang="en-US" altLang="he-IL" sz="3900" b="1" dirty="0" smtClean="0">
               <a:solidFill>
-                <a:srgbClr val="000000"/>
+                <a:srgbClr val="E02829"/>
               </a:solidFill>
               <a:latin typeface="Calibri" pitchFamily="34" charset="0"/>
             </a:endParaRPr>
@@ -12338,6 +12165,793 @@
             </a:r>
             <a:endParaRPr lang="en-US" altLang="he-IL" sz="2500" dirty="0">
               <a:latin typeface="Times New Roman" pitchFamily="18" charset="0"/>
+            </a:endParaRPr>
+          </a:p>
+        </p:txBody>
+      </p:sp>
+      <p:sp>
+        <p:nvSpPr>
+          <p:cNvPr id="10" name="Rectangle 9"/>
+          <p:cNvSpPr/>
+          <p:nvPr/>
+        </p:nvSpPr>
+        <p:spPr>
+          <a:xfrm>
+            <a:off x="530168" y="5560932"/>
+            <a:ext cx="29229464" cy="1569660"/>
+          </a:xfrm>
+          <a:prstGeom prst="rect">
+            <a:avLst/>
+          </a:prstGeom>
+        </p:spPr>
+        <p:txBody>
+          <a:bodyPr wrap="square">
+            <a:spAutoFit/>
+          </a:bodyPr>
+          <a:lstStyle/>
+          <a:p>
+            <a:pPr algn="ctr" eaLnBrk="1" hangingPunct="1">
+              <a:spcBef>
+                <a:spcPts val="0"/>
+              </a:spcBef>
+              <a:spcAft>
+                <a:spcPts val="0"/>
+              </a:spcAft>
+            </a:pPr>
+            <a:r>
+              <a:rPr lang="en-US" altLang="he-IL" sz="4800" spc="100" dirty="0" smtClean="0">
+                <a:latin typeface="Calibri" pitchFamily="34" charset="0"/>
+              </a:rPr>
+              <a:t>(a) Dept</a:t>
+            </a:r>
+            <a:r>
+              <a:rPr lang="en-US" altLang="he-IL" sz="4800" spc="100" dirty="0">
+                <a:latin typeface="Calibri" pitchFamily="34" charset="0"/>
+              </a:rPr>
+              <a:t>. of Molecular Biology &amp; Ecology of </a:t>
+            </a:r>
+            <a:r>
+              <a:rPr lang="en-US" altLang="he-IL" sz="4800" spc="100" dirty="0" smtClean="0">
+                <a:latin typeface="Calibri" pitchFamily="34" charset="0"/>
+              </a:rPr>
+              <a:t>Plants, (b) Dept</a:t>
+            </a:r>
+            <a:r>
+              <a:rPr lang="en-US" altLang="he-IL" sz="4800" spc="100" dirty="0">
+                <a:latin typeface="Calibri" pitchFamily="34" charset="0"/>
+              </a:rPr>
+              <a:t>. of </a:t>
+            </a:r>
+            <a:r>
+              <a:rPr lang="en-US" altLang="he-IL" sz="4800" spc="100" dirty="0" smtClean="0">
+                <a:latin typeface="Calibri" pitchFamily="34" charset="0"/>
+              </a:rPr>
+              <a:t>Molecular </a:t>
+            </a:r>
+            <a:r>
+              <a:rPr lang="en-US" altLang="he-IL" sz="4800" spc="100" dirty="0">
+                <a:latin typeface="Calibri" pitchFamily="34" charset="0"/>
+              </a:rPr>
+              <a:t>Microbiology &amp; </a:t>
+            </a:r>
+            <a:r>
+              <a:rPr lang="en-US" altLang="he-IL" sz="4800" spc="100" dirty="0" smtClean="0">
+                <a:latin typeface="Calibri" pitchFamily="34" charset="0"/>
+              </a:rPr>
+              <a:t>Biotechnology</a:t>
+            </a:r>
+            <a:r>
+              <a:rPr lang="en-US" altLang="he-IL" sz="4800" spc="100" dirty="0">
+                <a:latin typeface="Calibri" pitchFamily="34" charset="0"/>
+              </a:rPr>
+              <a:t>,</a:t>
+            </a:r>
+            <a:r>
+              <a:rPr lang="en-US" altLang="he-IL" sz="4800" spc="100" baseline="30000" dirty="0" smtClean="0">
+                <a:latin typeface="Calibri" pitchFamily="34" charset="0"/>
+              </a:rPr>
+              <a:t> </a:t>
+            </a:r>
+            <a:endParaRPr lang="en-US" altLang="he-IL" sz="4800" spc="100" baseline="30000" dirty="0">
+              <a:latin typeface="Calibri" pitchFamily="34" charset="0"/>
+            </a:endParaRPr>
+          </a:p>
+          <a:p>
+            <a:pPr algn="ctr" eaLnBrk="1" hangingPunct="1">
+              <a:spcBef>
+                <a:spcPts val="0"/>
+              </a:spcBef>
+              <a:spcAft>
+                <a:spcPts val="0"/>
+              </a:spcAft>
+            </a:pPr>
+            <a:r>
+              <a:rPr lang="en-US" altLang="he-IL" sz="4800" spc="100" dirty="0">
+                <a:latin typeface="Calibri" pitchFamily="34" charset="0"/>
+              </a:rPr>
+              <a:t>Tel-Aviv University, Tel-Aviv, Israel</a:t>
+            </a:r>
+            <a:endParaRPr lang="en-US" altLang="he-IL" sz="6600" spc="100" dirty="0">
+              <a:latin typeface="Calibri" pitchFamily="34" charset="0"/>
+            </a:endParaRPr>
+          </a:p>
+        </p:txBody>
+      </p:sp>
+      <p:pic>
+        <p:nvPicPr>
+          <p:cNvPr id="26" name="Picture 25" descr="C:\Users\yoavram\Downloads\MinervaLogo.png"/>
+          <p:cNvPicPr>
+            <a:picLocks noChangeAspect="1" noChangeArrowheads="1"/>
+          </p:cNvPicPr>
+          <p:nvPr/>
+        </p:nvPicPr>
+        <p:blipFill>
+          <a:blip r:embed="rId29">
+            <a:extLst>
+              <a:ext uri="{28A0092B-C50C-407E-A947-70E740481C1C}">
+                <a14:useLocalDpi xmlns:a14="http://schemas.microsoft.com/office/drawing/2010/main" val="0"/>
+              </a:ext>
+            </a:extLst>
+          </a:blip>
+          <a:srcRect/>
+          <a:stretch>
+            <a:fillRect/>
+          </a:stretch>
+        </p:blipFill>
+        <p:spPr bwMode="auto">
+          <a:xfrm>
+            <a:off x="15836744" y="40696809"/>
+            <a:ext cx="3125442" cy="900000"/>
+          </a:xfrm>
+          <a:prstGeom prst="rect">
+            <a:avLst/>
+          </a:prstGeom>
+          <a:noFill/>
+          <a:extLst>
+            <a:ext uri="{909E8E84-426E-40DD-AFC4-6F175D3DCCD1}">
+              <a14:hiddenFill xmlns:a14="http://schemas.microsoft.com/office/drawing/2010/main">
+                <a:solidFill>
+                  <a:srgbClr val="FFFFFF"/>
+                </a:solidFill>
+              </a14:hiddenFill>
+            </a:ext>
+          </a:extLst>
+        </p:spPr>
+      </p:pic>
+      <p:pic>
+        <p:nvPicPr>
+          <p:cNvPr id="28" name="Picture 3"/>
+          <p:cNvPicPr>
+            <a:picLocks noChangeAspect="1" noChangeArrowheads="1"/>
+          </p:cNvPicPr>
+          <p:nvPr/>
+        </p:nvPicPr>
+        <p:blipFill>
+          <a:blip r:embed="rId30">
+            <a:extLst>
+              <a:ext uri="{28A0092B-C50C-407E-A947-70E740481C1C}">
+                <a14:useLocalDpi xmlns:a14="http://schemas.microsoft.com/office/drawing/2010/main" val="0"/>
+              </a:ext>
+            </a:extLst>
+          </a:blip>
+          <a:srcRect/>
+          <a:stretch>
+            <a:fillRect/>
+          </a:stretch>
+        </p:blipFill>
+        <p:spPr bwMode="auto">
+          <a:xfrm>
+            <a:off x="17493872" y="39035995"/>
+            <a:ext cx="1400932" cy="1440000"/>
+          </a:xfrm>
+          <a:prstGeom prst="rect">
+            <a:avLst/>
+          </a:prstGeom>
+          <a:noFill/>
+          <a:ln>
+            <a:noFill/>
+          </a:ln>
+          <a:effectLst/>
+          <a:extLst>
+            <a:ext uri="{909E8E84-426E-40DD-AFC4-6F175D3DCCD1}">
+              <a14:hiddenFill xmlns:a14="http://schemas.microsoft.com/office/drawing/2010/main">
+                <a:solidFill>
+                  <a:schemeClr val="accent1"/>
+                </a:solidFill>
+              </a14:hiddenFill>
+            </a:ext>
+            <a:ext uri="{91240B29-F687-4F45-9708-019B960494DF}">
+              <a14:hiddenLine xmlns:a14="http://schemas.microsoft.com/office/drawing/2010/main" w="9525">
+                <a:solidFill>
+                  <a:schemeClr val="tx1"/>
+                </a:solidFill>
+                <a:miter lim="800000"/>
+                <a:headEnd/>
+                <a:tailEnd/>
+              </a14:hiddenLine>
+            </a:ext>
+            <a:ext uri="{AF507438-7753-43E0-B8FC-AC1667EBCBE1}">
+              <a14:hiddenEffects xmlns:a14="http://schemas.microsoft.com/office/drawing/2010/main">
+                <a:effectLst>
+                  <a:outerShdw dist="35921" dir="2700000" algn="ctr" rotWithShape="0">
+                    <a:schemeClr val="bg2"/>
+                  </a:outerShdw>
+                </a:effectLst>
+              </a14:hiddenEffects>
+            </a:ext>
+          </a:extLst>
+        </p:spPr>
+      </p:pic>
+      <p:pic>
+        <p:nvPicPr>
+          <p:cNvPr id="27" name="Picture 3" descr="C:\Users\yoavram\Downloads\minerva_stiftung.png"/>
+          <p:cNvPicPr>
+            <a:picLocks noChangeAspect="1" noChangeArrowheads="1"/>
+          </p:cNvPicPr>
+          <p:nvPr/>
+        </p:nvPicPr>
+        <p:blipFill>
+          <a:blip r:embed="rId31">
+            <a:extLst>
+              <a:ext uri="{BEBA8EAE-BF5A-486C-A8C5-ECC9F3942E4B}">
+                <a14:imgProps xmlns:a14="http://schemas.microsoft.com/office/drawing/2010/main">
+                  <a14:imgLayer r:embed="rId32">
+                    <a14:imgEffect>
+                      <a14:backgroundRemoval t="0" b="100000" l="0" r="100000"/>
+                    </a14:imgEffect>
+                  </a14:imgLayer>
+                </a14:imgProps>
+              </a:ext>
+              <a:ext uri="{28A0092B-C50C-407E-A947-70E740481C1C}">
+                <a14:useLocalDpi xmlns:a14="http://schemas.microsoft.com/office/drawing/2010/main" val="0"/>
+              </a:ext>
+            </a:extLst>
+          </a:blip>
+          <a:srcRect/>
+          <a:stretch>
+            <a:fillRect/>
+          </a:stretch>
+        </p:blipFill>
+        <p:spPr bwMode="auto">
+          <a:xfrm>
+            <a:off x="15406428" y="38898990"/>
+            <a:ext cx="1697143" cy="1620000"/>
+          </a:xfrm>
+          <a:prstGeom prst="rect">
+            <a:avLst/>
+          </a:prstGeom>
+          <a:noFill/>
+          <a:extLst>
+            <a:ext uri="{909E8E84-426E-40DD-AFC4-6F175D3DCCD1}">
+              <a14:hiddenFill xmlns:a14="http://schemas.microsoft.com/office/drawing/2010/main">
+                <a:solidFill>
+                  <a:srgbClr val="FFFFFF"/>
+                </a:solidFill>
+              </a14:hiddenFill>
+            </a:ext>
+          </a:extLst>
+        </p:spPr>
+      </p:pic>
+      <p:pic>
+        <p:nvPicPr>
+          <p:cNvPr id="1028" name="Picture 4"/>
+          <p:cNvPicPr>
+            <a:picLocks noChangeAspect="1" noChangeArrowheads="1"/>
+          </p:cNvPicPr>
+          <p:nvPr/>
+        </p:nvPicPr>
+        <p:blipFill>
+          <a:blip r:embed="rId33">
+            <a:extLst>
+              <a:ext uri="{28A0092B-C50C-407E-A947-70E740481C1C}">
+                <a14:useLocalDpi xmlns:a14="http://schemas.microsoft.com/office/drawing/2010/main" val="0"/>
+              </a:ext>
+            </a:extLst>
+          </a:blip>
+          <a:srcRect/>
+          <a:stretch>
+            <a:fillRect/>
+          </a:stretch>
+        </p:blipFill>
+        <p:spPr bwMode="auto">
+          <a:xfrm>
+            <a:off x="11618173" y="39090172"/>
+            <a:ext cx="3402958" cy="900000"/>
+          </a:xfrm>
+          <a:prstGeom prst="rect">
+            <a:avLst/>
+          </a:prstGeom>
+          <a:noFill/>
+          <a:ln>
+            <a:noFill/>
+          </a:ln>
+          <a:extLst>
+            <a:ext uri="{909E8E84-426E-40DD-AFC4-6F175D3DCCD1}">
+              <a14:hiddenFill xmlns:a14="http://schemas.microsoft.com/office/drawing/2010/main">
+                <a:solidFill>
+                  <a:schemeClr val="accent1"/>
+                </a:solidFill>
+              </a14:hiddenFill>
+            </a:ext>
+            <a:ext uri="{91240B29-F687-4F45-9708-019B960494DF}">
+              <a14:hiddenLine xmlns:a14="http://schemas.microsoft.com/office/drawing/2010/main" w="9525">
+                <a:solidFill>
+                  <a:schemeClr val="tx1"/>
+                </a:solidFill>
+                <a:miter lim="800000"/>
+                <a:headEnd/>
+                <a:tailEnd/>
+              </a14:hiddenLine>
+            </a:ext>
+          </a:extLst>
+        </p:spPr>
+      </p:pic>
+      <p:sp>
+        <p:nvSpPr>
+          <p:cNvPr id="64" name="Title 1"/>
+          <p:cNvSpPr txBox="1">
+            <a:spLocks/>
+          </p:cNvSpPr>
+          <p:nvPr/>
+        </p:nvSpPr>
+        <p:spPr>
+          <a:xfrm>
+            <a:off x="457200" y="274638"/>
+            <a:ext cx="8229600" cy="1143000"/>
+          </a:xfrm>
+          <a:prstGeom prst="rect">
+            <a:avLst/>
+          </a:prstGeom>
+        </p:spPr>
+        <p:txBody>
+          <a:bodyPr/>
+          <a:lstStyle>
+            <a:lvl1pPr algn="ctr" defTabSz="3576638" rtl="0" eaLnBrk="0" fontAlgn="base" hangingPunct="0">
+              <a:spcBef>
+                <a:spcPct val="0"/>
+              </a:spcBef>
+              <a:spcAft>
+                <a:spcPct val="0"/>
+              </a:spcAft>
+              <a:defRPr sz="17200">
+                <a:solidFill>
+                  <a:schemeClr val="tx2"/>
+                </a:solidFill>
+                <a:latin typeface="+mj-lt"/>
+                <a:ea typeface="MS PGothic" pitchFamily="34" charset="-128"/>
+                <a:cs typeface="ＭＳ Ｐゴシック" pitchFamily="-65" charset="-128"/>
+              </a:defRPr>
+            </a:lvl1pPr>
+            <a:lvl2pPr algn="ctr" defTabSz="3576638" rtl="0" eaLnBrk="0" fontAlgn="base" hangingPunct="0">
+              <a:spcBef>
+                <a:spcPct val="0"/>
+              </a:spcBef>
+              <a:spcAft>
+                <a:spcPct val="0"/>
+              </a:spcAft>
+              <a:defRPr sz="17200">
+                <a:solidFill>
+                  <a:schemeClr val="tx2"/>
+                </a:solidFill>
+                <a:latin typeface="Times New Roman" pitchFamily="-65" charset="0"/>
+                <a:ea typeface="MS PGothic" pitchFamily="34" charset="-128"/>
+                <a:cs typeface="ＭＳ Ｐゴシック" pitchFamily="-65" charset="-128"/>
+              </a:defRPr>
+            </a:lvl2pPr>
+            <a:lvl3pPr algn="ctr" defTabSz="3576638" rtl="0" eaLnBrk="0" fontAlgn="base" hangingPunct="0">
+              <a:spcBef>
+                <a:spcPct val="0"/>
+              </a:spcBef>
+              <a:spcAft>
+                <a:spcPct val="0"/>
+              </a:spcAft>
+              <a:defRPr sz="17200">
+                <a:solidFill>
+                  <a:schemeClr val="tx2"/>
+                </a:solidFill>
+                <a:latin typeface="Times New Roman" pitchFamily="-65" charset="0"/>
+                <a:ea typeface="MS PGothic" pitchFamily="34" charset="-128"/>
+                <a:cs typeface="ＭＳ Ｐゴシック" pitchFamily="-65" charset="-128"/>
+              </a:defRPr>
+            </a:lvl3pPr>
+            <a:lvl4pPr algn="ctr" defTabSz="3576638" rtl="0" eaLnBrk="0" fontAlgn="base" hangingPunct="0">
+              <a:spcBef>
+                <a:spcPct val="0"/>
+              </a:spcBef>
+              <a:spcAft>
+                <a:spcPct val="0"/>
+              </a:spcAft>
+              <a:defRPr sz="17200">
+                <a:solidFill>
+                  <a:schemeClr val="tx2"/>
+                </a:solidFill>
+                <a:latin typeface="Times New Roman" pitchFamily="-65" charset="0"/>
+                <a:ea typeface="MS PGothic" pitchFamily="34" charset="-128"/>
+                <a:cs typeface="ＭＳ Ｐゴシック" pitchFamily="-65" charset="-128"/>
+              </a:defRPr>
+            </a:lvl4pPr>
+            <a:lvl5pPr algn="ctr" defTabSz="3576638" rtl="0" eaLnBrk="0" fontAlgn="base" hangingPunct="0">
+              <a:spcBef>
+                <a:spcPct val="0"/>
+              </a:spcBef>
+              <a:spcAft>
+                <a:spcPct val="0"/>
+              </a:spcAft>
+              <a:defRPr sz="17200">
+                <a:solidFill>
+                  <a:schemeClr val="tx2"/>
+                </a:solidFill>
+                <a:latin typeface="Times New Roman" pitchFamily="-65" charset="0"/>
+                <a:ea typeface="MS PGothic" pitchFamily="34" charset="-128"/>
+                <a:cs typeface="ＭＳ Ｐゴシック" pitchFamily="-65" charset="-128"/>
+              </a:defRPr>
+            </a:lvl5pPr>
+            <a:lvl6pPr marL="401404" algn="ctr" defTabSz="3577785" rtl="0" fontAlgn="base">
+              <a:spcBef>
+                <a:spcPct val="0"/>
+              </a:spcBef>
+              <a:spcAft>
+                <a:spcPct val="0"/>
+              </a:spcAft>
+              <a:defRPr sz="17200">
+                <a:solidFill>
+                  <a:schemeClr val="tx2"/>
+                </a:solidFill>
+                <a:latin typeface="Times New Roman" pitchFamily="-65" charset="0"/>
+              </a:defRPr>
+            </a:lvl6pPr>
+            <a:lvl7pPr marL="802806" algn="ctr" defTabSz="3577785" rtl="0" fontAlgn="base">
+              <a:spcBef>
+                <a:spcPct val="0"/>
+              </a:spcBef>
+              <a:spcAft>
+                <a:spcPct val="0"/>
+              </a:spcAft>
+              <a:defRPr sz="17200">
+                <a:solidFill>
+                  <a:schemeClr val="tx2"/>
+                </a:solidFill>
+                <a:latin typeface="Times New Roman" pitchFamily="-65" charset="0"/>
+              </a:defRPr>
+            </a:lvl7pPr>
+            <a:lvl8pPr marL="1204209" algn="ctr" defTabSz="3577785" rtl="0" fontAlgn="base">
+              <a:spcBef>
+                <a:spcPct val="0"/>
+              </a:spcBef>
+              <a:spcAft>
+                <a:spcPct val="0"/>
+              </a:spcAft>
+              <a:defRPr sz="17200">
+                <a:solidFill>
+                  <a:schemeClr val="tx2"/>
+                </a:solidFill>
+                <a:latin typeface="Times New Roman" pitchFamily="-65" charset="0"/>
+              </a:defRPr>
+            </a:lvl8pPr>
+            <a:lvl9pPr marL="1605613" algn="ctr" defTabSz="3577785" rtl="0" fontAlgn="base">
+              <a:spcBef>
+                <a:spcPct val="0"/>
+              </a:spcBef>
+              <a:spcAft>
+                <a:spcPct val="0"/>
+              </a:spcAft>
+              <a:defRPr sz="17200">
+                <a:solidFill>
+                  <a:schemeClr val="tx2"/>
+                </a:solidFill>
+                <a:latin typeface="Times New Roman" pitchFamily="-65" charset="0"/>
+              </a:defRPr>
+            </a:lvl9pPr>
+          </a:lstStyle>
+          <a:p>
+            <a:endParaRPr lang="he-IL" sz="2500" kern="0" dirty="0">
+              <a:latin typeface="Mathematica1" panose="05000502060100000001" pitchFamily="2" charset="2"/>
+            </a:endParaRPr>
+          </a:p>
+        </p:txBody>
+      </p:sp>
+      <p:grpSp>
+        <p:nvGrpSpPr>
+          <p:cNvPr id="14345" name="Group 14344"/>
+          <p:cNvGrpSpPr/>
+          <p:nvPr/>
+        </p:nvGrpSpPr>
+        <p:grpSpPr>
+          <a:xfrm>
+            <a:off x="21198180" y="39035995"/>
+            <a:ext cx="1424375" cy="2415229"/>
+            <a:chOff x="20850282" y="38940933"/>
+            <a:chExt cx="1424375" cy="2415229"/>
+          </a:xfrm>
+        </p:grpSpPr>
+        <p:pic>
+          <p:nvPicPr>
+            <p:cNvPr id="1053" name="Picture 29" descr="D:\workspace\curveball_project\Plato\public\plato.png"/>
+            <p:cNvPicPr>
+              <a:picLocks noChangeAspect="1" noChangeArrowheads="1"/>
+            </p:cNvPicPr>
+            <p:nvPr/>
+          </p:nvPicPr>
+          <p:blipFill>
+            <a:blip r:embed="rId34">
+              <a:extLst>
+                <a:ext uri="{28A0092B-C50C-407E-A947-70E740481C1C}">
+                  <a14:useLocalDpi xmlns:a14="http://schemas.microsoft.com/office/drawing/2010/main" val="0"/>
+                </a:ext>
+              </a:extLst>
+            </a:blip>
+            <a:srcRect/>
+            <a:stretch>
+              <a:fillRect/>
+            </a:stretch>
+          </p:blipFill>
+          <p:spPr bwMode="auto">
+            <a:xfrm>
+              <a:off x="20850282" y="39504474"/>
+              <a:ext cx="1424375" cy="1851688"/>
+            </a:xfrm>
+            <a:prstGeom prst="rect">
+              <a:avLst/>
+            </a:prstGeom>
+            <a:noFill/>
+            <a:extLst>
+              <a:ext uri="{909E8E84-426E-40DD-AFC4-6F175D3DCCD1}">
+                <a14:hiddenFill xmlns:a14="http://schemas.microsoft.com/office/drawing/2010/main">
+                  <a:solidFill>
+                    <a:srgbClr val="FFFFFF"/>
+                  </a:solidFill>
+                </a14:hiddenFill>
+              </a:ext>
+            </a:extLst>
+          </p:spPr>
+        </p:pic>
+        <p:sp>
+          <p:nvSpPr>
+            <p:cNvPr id="14336" name="Rectangle 14335"/>
+            <p:cNvSpPr/>
+            <p:nvPr/>
+          </p:nvSpPr>
+          <p:spPr>
+            <a:xfrm>
+              <a:off x="20970000" y="38940933"/>
+              <a:ext cx="1184940" cy="523220"/>
+            </a:xfrm>
+            <a:prstGeom prst="rect">
+              <a:avLst/>
+            </a:prstGeom>
+          </p:spPr>
+          <p:txBody>
+            <a:bodyPr wrap="none">
+              <a:spAutoFit/>
+            </a:bodyPr>
+            <a:lstStyle/>
+            <a:p>
+              <a:r>
+                <a:rPr lang="en-US" kern="0" dirty="0">
+                  <a:latin typeface="Mathematica1" panose="05000502060100000001" pitchFamily="2" charset="2"/>
+                </a:rPr>
+                <a:t>Plato</a:t>
+              </a:r>
+              <a:endParaRPr lang="he-IL" kern="0" dirty="0">
+                <a:latin typeface="Mathematica1" panose="05000502060100000001" pitchFamily="2" charset="2"/>
+              </a:endParaRPr>
+            </a:p>
+          </p:txBody>
+        </p:sp>
+      </p:grpSp>
+      <p:grpSp>
+        <p:nvGrpSpPr>
+          <p:cNvPr id="14338" name="Group 14337"/>
+          <p:cNvGrpSpPr/>
+          <p:nvPr/>
+        </p:nvGrpSpPr>
+        <p:grpSpPr>
+          <a:xfrm>
+            <a:off x="23150512" y="39056809"/>
+            <a:ext cx="2540000" cy="2540000"/>
+            <a:chOff x="22228092" y="38918290"/>
+            <a:chExt cx="2540000" cy="2540000"/>
+          </a:xfrm>
+        </p:grpSpPr>
+        <p:pic>
+          <p:nvPicPr>
+            <p:cNvPr id="1052" name="Picture 28" descr="D:\workspace\curveball_project\gh-pages\img\logo_200px.png"/>
+            <p:cNvPicPr>
+              <a:picLocks noChangeAspect="1" noChangeArrowheads="1"/>
+            </p:cNvPicPr>
+            <p:nvPr/>
+          </p:nvPicPr>
+          <p:blipFill>
+            <a:blip r:embed="rId35">
+              <a:extLst>
+                <a:ext uri="{28A0092B-C50C-407E-A947-70E740481C1C}">
+                  <a14:useLocalDpi xmlns:a14="http://schemas.microsoft.com/office/drawing/2010/main" val="0"/>
+                </a:ext>
+              </a:extLst>
+            </a:blip>
+            <a:srcRect/>
+            <a:stretch>
+              <a:fillRect/>
+            </a:stretch>
+          </p:blipFill>
+          <p:spPr bwMode="auto">
+            <a:xfrm>
+              <a:off x="22228092" y="38918290"/>
+              <a:ext cx="2540000" cy="2540000"/>
+            </a:xfrm>
+            <a:prstGeom prst="rect">
+              <a:avLst/>
+            </a:prstGeom>
+            <a:noFill/>
+            <a:extLst>
+              <a:ext uri="{909E8E84-426E-40DD-AFC4-6F175D3DCCD1}">
+                <a14:hiddenFill xmlns:a14="http://schemas.microsoft.com/office/drawing/2010/main">
+                  <a:solidFill>
+                    <a:srgbClr val="FFFFFF"/>
+                  </a:solidFill>
+                </a14:hiddenFill>
+              </a:ext>
+            </a:extLst>
+          </p:spPr>
+        </p:pic>
+        <p:sp>
+          <p:nvSpPr>
+            <p:cNvPr id="14337" name="Rectangle 14336"/>
+            <p:cNvSpPr/>
+            <p:nvPr/>
+          </p:nvSpPr>
+          <p:spPr>
+            <a:xfrm>
+              <a:off x="22566215" y="38951653"/>
+              <a:ext cx="1927131" cy="523220"/>
+            </a:xfrm>
+            <a:prstGeom prst="rect">
+              <a:avLst/>
+            </a:prstGeom>
+          </p:spPr>
+          <p:txBody>
+            <a:bodyPr wrap="none">
+              <a:spAutoFit/>
+            </a:bodyPr>
+            <a:lstStyle/>
+            <a:p>
+              <a:r>
+                <a:rPr lang="en-US" dirty="0">
+                  <a:latin typeface="Gloria Hallelujah" panose="02000000000000000000" pitchFamily="2" charset="0"/>
+                </a:rPr>
+                <a:t>Curveball</a:t>
+              </a:r>
+              <a:endParaRPr lang="he-IL" dirty="0"/>
+            </a:p>
+          </p:txBody>
+        </p:sp>
+      </p:grpSp>
+      <p:pic>
+        <p:nvPicPr>
+          <p:cNvPr id="1027" name="Picture 3"/>
+          <p:cNvPicPr>
+            <a:picLocks noChangeAspect="1" noChangeArrowheads="1"/>
+          </p:cNvPicPr>
+          <p:nvPr/>
+        </p:nvPicPr>
+        <p:blipFill rotWithShape="1">
+          <a:blip r:embed="rId36">
+            <a:extLst>
+              <a:ext uri="{28A0092B-C50C-407E-A947-70E740481C1C}">
+                <a14:useLocalDpi xmlns:a14="http://schemas.microsoft.com/office/drawing/2010/main" val="0"/>
+              </a:ext>
+            </a:extLst>
+          </a:blip>
+          <a:srcRect l="23256" t="8170" r="5722" b="11134"/>
+          <a:stretch/>
+        </p:blipFill>
+        <p:spPr bwMode="auto">
+          <a:xfrm>
+            <a:off x="11530860" y="40456309"/>
+            <a:ext cx="3553565" cy="1152000"/>
+          </a:xfrm>
+          <a:prstGeom prst="rect">
+            <a:avLst/>
+          </a:prstGeom>
+          <a:noFill/>
+          <a:ln>
+            <a:noFill/>
+          </a:ln>
+          <a:effectLst/>
+          <a:extLst>
+            <a:ext uri="{909E8E84-426E-40DD-AFC4-6F175D3DCCD1}">
+              <a14:hiddenFill xmlns:a14="http://schemas.microsoft.com/office/drawing/2010/main">
+                <a:solidFill>
+                  <a:schemeClr val="accent1"/>
+                </a:solidFill>
+              </a14:hiddenFill>
+            </a:ext>
+            <a:ext uri="{91240B29-F687-4F45-9708-019B960494DF}">
+              <a14:hiddenLine xmlns:a14="http://schemas.microsoft.com/office/drawing/2010/main" w="9525">
+                <a:solidFill>
+                  <a:schemeClr val="tx1"/>
+                </a:solidFill>
+                <a:miter lim="800000"/>
+                <a:headEnd/>
+                <a:tailEnd/>
+              </a14:hiddenLine>
+            </a:ext>
+            <a:ext uri="{AF507438-7753-43E0-B8FC-AC1667EBCBE1}">
+              <a14:hiddenEffects xmlns:a14="http://schemas.microsoft.com/office/drawing/2010/main">
+                <a:effectLst>
+                  <a:outerShdw dist="35921" dir="2700000" algn="ctr" rotWithShape="0">
+                    <a:schemeClr val="bg2"/>
+                  </a:outerShdw>
+                </a:effectLst>
+              </a14:hiddenEffects>
+            </a:ext>
+          </a:extLst>
+        </p:spPr>
+      </p:pic>
+      <p:sp>
+        <p:nvSpPr>
+          <p:cNvPr id="14346" name="Rectangle 14345"/>
+          <p:cNvSpPr/>
+          <p:nvPr/>
+        </p:nvSpPr>
+        <p:spPr>
+          <a:xfrm>
+            <a:off x="20957185" y="41439600"/>
+            <a:ext cx="2092239" cy="338554"/>
+          </a:xfrm>
+          <a:prstGeom prst="rect">
+            <a:avLst/>
+          </a:prstGeom>
+        </p:spPr>
+        <p:txBody>
+          <a:bodyPr wrap="none">
+            <a:spAutoFit/>
+          </a:bodyPr>
+          <a:lstStyle/>
+          <a:p>
+            <a:r>
+              <a:rPr lang="en-US" sz="1600" b="1" dirty="0" smtClean="0">
+                <a:latin typeface="Consolas" panose="020B0609020204030204" pitchFamily="49" charset="0"/>
+                <a:cs typeface="Consolas" panose="020B0609020204030204" pitchFamily="49" charset="0"/>
+              </a:rPr>
+              <a:t>plato.yoavram.com</a:t>
+            </a:r>
+            <a:endParaRPr lang="he-IL" sz="1600" b="1" dirty="0">
+              <a:latin typeface="Consolas" panose="020B0609020204030204" pitchFamily="49" charset="0"/>
+            </a:endParaRPr>
+          </a:p>
+        </p:txBody>
+      </p:sp>
+      <p:sp>
+        <p:nvSpPr>
+          <p:cNvPr id="71" name="Rectangle 70"/>
+          <p:cNvSpPr/>
+          <p:nvPr/>
+        </p:nvSpPr>
+        <p:spPr>
+          <a:xfrm>
+            <a:off x="23118022" y="41439032"/>
+            <a:ext cx="2541080" cy="338554"/>
+          </a:xfrm>
+          <a:prstGeom prst="rect">
+            <a:avLst/>
+          </a:prstGeom>
+        </p:spPr>
+        <p:txBody>
+          <a:bodyPr wrap="none">
+            <a:spAutoFit/>
+          </a:bodyPr>
+          <a:lstStyle/>
+          <a:p>
+            <a:r>
+              <a:rPr lang="en-US" sz="1600" b="1" dirty="0" smtClean="0">
+                <a:latin typeface="Consolas" panose="020B0609020204030204" pitchFamily="49" charset="0"/>
+                <a:cs typeface="Consolas" panose="020B0609020204030204" pitchFamily="49" charset="0"/>
+              </a:rPr>
+              <a:t>curveball.yoavram.com</a:t>
+            </a:r>
+            <a:endParaRPr lang="he-IL" sz="1600" b="1" dirty="0">
+              <a:latin typeface="Consolas" panose="020B0609020204030204" pitchFamily="49" charset="0"/>
             </a:endParaRPr>
           </a:p>
         </p:txBody>

</xml_diff>

<commit_message>
first print, before changing strains
</commit_message>
<xml_diff>
--- a/poster.pptx
+++ b/poster.pptx
@@ -254,7 +254,7 @@
             <a:fld id="{4DB31F7E-24C3-4F74-B155-4FAB7B65A36F}" type="datetime1">
               <a:rPr lang="en-US" altLang="he-IL"/>
               <a:pPr/>
-              <a:t>6/16/2015</a:t>
+              <a:t>6/21/2015</a:t>
             </a:fld>
             <a:endParaRPr lang="en-US" altLang="he-IL"/>
           </a:p>
@@ -4803,13 +4803,25 @@
                   <a:rPr lang="en-US" altLang="he-IL" sz="2500" i="1" dirty="0" smtClean="0">
                     <a:latin typeface="Times New Roman" pitchFamily="18" charset="0"/>
                   </a:rPr>
-                  <a:t>effective selection coefficient</a:t>
+                  <a:t>effective selection coefficient </a:t>
                 </a:r>
                 <a:r>
                   <a:rPr lang="en-US" altLang="he-IL" sz="2500" dirty="0" smtClean="0">
                     <a:latin typeface="Times New Roman" pitchFamily="18" charset="0"/>
                   </a:rPr>
-                  <a:t>: the selection coefficient in an idealized population that would cause similar change in frequency as the population under consideration.</a:t>
+                  <a:t>of the red strain: the selection coefficient that would cause similar change in frequency </a:t>
+                </a:r>
+                <a:r>
+                  <a:rPr lang="en-US" altLang="he-IL" sz="2500" dirty="0">
+                    <a:latin typeface="Times New Roman" pitchFamily="18" charset="0"/>
+                  </a:rPr>
+                  <a:t>in an idealized </a:t>
+                </a:r>
+                <a:r>
+                  <a:rPr lang="en-US" altLang="he-IL" sz="2500" dirty="0" smtClean="0">
+                    <a:latin typeface="Times New Roman" pitchFamily="18" charset="0"/>
+                  </a:rPr>
+                  <a:t>population.</a:t>
                 </a:r>
               </a:p>
               <a:p>
@@ -5323,52 +5335,7 @@
                     </a:solidFill>
                     <a:latin typeface="Times New Roman"/>
                   </a:rPr>
-                  <a:t>strains (</a:t>
-                </a:r>
-                <a:r>
-                  <a:rPr lang="en-US" sz="2500" dirty="0" smtClean="0">
-                    <a:solidFill>
-                      <a:srgbClr val="E02829"/>
-                    </a:solidFill>
-                    <a:latin typeface="Times New Roman"/>
-                  </a:rPr>
-                  <a:t>TG1 </a:t>
-                </a:r>
-                <a:r>
-                  <a:rPr lang="en-US" sz="2500" dirty="0" smtClean="0">
-                    <a:solidFill>
-                      <a:srgbClr val="000000"/>
-                    </a:solidFill>
-                    <a:latin typeface="Times New Roman"/>
-                  </a:rPr>
-                  <a:t>and </a:t>
-                </a:r>
-                <a:r>
-                  <a:rPr lang="en-US" sz="2500" dirty="0" smtClean="0">
-                    <a:solidFill>
-                      <a:srgbClr val="59A754"/>
-                    </a:solidFill>
-                    <a:latin typeface="Times New Roman"/>
-                  </a:rPr>
-                  <a:t>DH5</a:t>
-                </a:r>
-                <a:r>
-                  <a:rPr lang="el-GR" sz="2500" dirty="0">
-                    <a:solidFill>
-                      <a:srgbClr val="59A754"/>
-                    </a:solidFill>
-                    <a:latin typeface="Times New Roman"/>
-                  </a:rPr>
-                  <a:t>α</a:t>
-                </a:r>
-                <a:r>
-                  <a:rPr lang="en-US" sz="2500" dirty="0" smtClean="0">
-                    <a:solidFill>
-                      <a:srgbClr val="000000"/>
-                    </a:solidFill>
-                    <a:latin typeface="Times New Roman"/>
-                  </a:rPr>
-                  <a:t>):</a:t>
+                  <a:t>strains:</a:t>
                 </a:r>
               </a:p>
               <a:p>
@@ -6447,7 +6414,19 @@
               <a:rPr lang="en-US" altLang="he-IL" sz="2500" dirty="0" smtClean="0">
                 <a:latin typeface="Times New Roman" pitchFamily="18" charset="0"/>
               </a:rPr>
-              <a:t>We grow our strains separately and in competition in a 96-well plate and measure their OD over time.</a:t>
+              <a:t>We grow two </a:t>
+            </a:r>
+            <a:r>
+              <a:rPr lang="en-US" altLang="he-IL" sz="2500" i="1" dirty="0" smtClean="0">
+                <a:latin typeface="Times New Roman" pitchFamily="18" charset="0"/>
+              </a:rPr>
+              <a:t>E. coli </a:t>
+            </a:r>
+            <a:r>
+              <a:rPr lang="en-US" altLang="he-IL" sz="2500" dirty="0" smtClean="0">
+                <a:latin typeface="Times New Roman" pitchFamily="18" charset="0"/>
+              </a:rPr>
+              <a:t>strains separately and in competition in a 96-well plate and measure their OD over time.</a:t>
             </a:r>
           </a:p>
           <a:p>
@@ -10089,8 +10068,8 @@
         </p:nvSpPr>
         <p:spPr>
           <a:xfrm>
-            <a:off x="17804037" y="37811826"/>
-            <a:ext cx="1478168" cy="830997"/>
+            <a:off x="17804037" y="37681199"/>
+            <a:ext cx="1478168" cy="1200329"/>
           </a:xfrm>
           <a:prstGeom prst="rect">
             <a:avLst/>
@@ -10105,7 +10084,7 @@
           <a:p>
             <a:pPr algn="ctr"/>
             <a:r>
-              <a:rPr lang="en-US" altLang="he-IL" sz="1600" b="1" dirty="0">
+              <a:rPr lang="en-US" altLang="he-IL" sz="1800" b="1" dirty="0">
                 <a:solidFill>
                   <a:srgbClr val="0070C0"/>
                 </a:solidFill>
@@ -10115,7 +10094,7 @@
               <a:t>Israeli </a:t>
             </a:r>
             <a:r>
-              <a:rPr lang="en-US" altLang="he-IL" sz="1600" b="1" dirty="0" smtClean="0">
+              <a:rPr lang="en-US" altLang="he-IL" sz="1800" b="1" dirty="0" smtClean="0">
                 <a:solidFill>
                   <a:srgbClr val="0070C0"/>
                 </a:solidFill>
@@ -10128,7 +10107,7 @@
           <a:p>
             <a:pPr algn="ctr"/>
             <a:r>
-              <a:rPr lang="en-US" altLang="he-IL" sz="1600" b="1" dirty="0" smtClean="0">
+              <a:rPr lang="en-US" altLang="he-IL" sz="1800" b="1" dirty="0" smtClean="0">
                 <a:solidFill>
                   <a:srgbClr val="0070C0"/>
                 </a:solidFill>
@@ -10137,7 +10116,7 @@
               </a:rPr>
               <a:t>of Science &amp; Technology</a:t>
             </a:r>
-            <a:endParaRPr lang="en-US" altLang="he-IL" sz="1600" b="1" dirty="0">
+            <a:endParaRPr lang="en-US" altLang="he-IL" sz="1800" b="1" dirty="0">
               <a:solidFill>
                 <a:srgbClr val="0070C0"/>
               </a:solidFill>
@@ -10340,7 +10319,7 @@
               <p:nvPr>
                 <p:extLst>
                   <p:ext uri="{D42A27DB-BD31-4B8C-83A1-F6EECF244321}">
-                    <p14:modId xmlns:p14="http://schemas.microsoft.com/office/powerpoint/2010/main" val="1990556497"/>
+                    <p14:modId xmlns:p14="http://schemas.microsoft.com/office/powerpoint/2010/main" val="194699424"/>
                   </p:ext>
                 </p:extLst>
               </p:nvPr>
@@ -10375,7 +10354,7 @@
                               <a:latin typeface="Cambria Math" panose="02040503050406030204" pitchFamily="18" charset="0"/>
                               <a:ea typeface="Cambria Math" panose="02040503050406030204" pitchFamily="18" charset="0"/>
                             </a:rPr>
-                            <a:t>TG1</a:t>
+                            <a:t>Red</a:t>
                           </a:r>
                           <a:endParaRPr lang="he-IL" sz="1800" dirty="0">
                             <a:solidFill>
@@ -10403,18 +10382,7 @@
                               <a:ea typeface="Cambria Math" panose="02040503050406030204" pitchFamily="18" charset="0"/>
                               <a:cs typeface="+mn-cs"/>
                             </a:rPr>
-                            <a:t>DH5</a:t>
-                          </a:r>
-                          <a:r>
-                            <a:rPr lang="el-GR" sz="1800" b="1" kern="1200" dirty="0" smtClean="0">
-                              <a:solidFill>
-                                <a:srgbClr val="59A754"/>
-                              </a:solidFill>
-                              <a:latin typeface="Cambria Math" panose="02040503050406030204" pitchFamily="18" charset="0"/>
-                              <a:ea typeface="Cambria Math" panose="02040503050406030204" pitchFamily="18" charset="0"/>
-                              <a:cs typeface="+mn-cs"/>
-                            </a:rPr>
-                            <a:t>α</a:t>
+                            <a:t>Green</a:t>
                           </a:r>
                           <a:endParaRPr lang="he-IL" sz="1800" b="1" kern="1200" dirty="0">
                             <a:solidFill>
@@ -10462,7 +10430,7 @@
                               <a:latin typeface="Cambria Math" panose="02040503050406030204" pitchFamily="18" charset="0"/>
                               <a:ea typeface="Cambria Math" panose="02040503050406030204" pitchFamily="18" charset="0"/>
                             </a:rPr>
-                            <a:t>0.979</a:t>
+                            <a:t>0.0979</a:t>
                           </a:r>
                           <a:endParaRPr lang="he-IL" sz="1800" dirty="0">
                             <a:latin typeface="Cambria Math" panose="02040503050406030204" pitchFamily="18" charset="0"/>
@@ -10483,7 +10451,7 @@
                               <a:latin typeface="Cambria Math" panose="02040503050406030204" pitchFamily="18" charset="0"/>
                               <a:ea typeface="Cambria Math" panose="02040503050406030204" pitchFamily="18" charset="0"/>
                             </a:rPr>
-                            <a:t>0.983</a:t>
+                            <a:t>0.0983</a:t>
                           </a:r>
                           <a:endParaRPr lang="he-IL" sz="1800" dirty="0">
                             <a:latin typeface="Cambria Math" panose="02040503050406030204" pitchFamily="18" charset="0"/>
@@ -10912,7 +10880,7 @@
               <p:nvPr>
                 <p:extLst>
                   <p:ext uri="{D42A27DB-BD31-4B8C-83A1-F6EECF244321}">
-                    <p14:modId xmlns:p14="http://schemas.microsoft.com/office/powerpoint/2010/main" val="1990556497"/>
+                    <p14:modId xmlns:p14="http://schemas.microsoft.com/office/powerpoint/2010/main" val="194699424"/>
                   </p:ext>
                 </p:extLst>
               </p:nvPr>
@@ -10947,7 +10915,7 @@
                               <a:latin typeface="Cambria Math" panose="02040503050406030204" pitchFamily="18" charset="0"/>
                               <a:ea typeface="Cambria Math" panose="02040503050406030204" pitchFamily="18" charset="0"/>
                             </a:rPr>
-                            <a:t>TG1</a:t>
+                            <a:t>Red</a:t>
                           </a:r>
                           <a:endParaRPr lang="he-IL" sz="1800" dirty="0">
                             <a:solidFill>
@@ -10975,18 +10943,7 @@
                               <a:ea typeface="Cambria Math" panose="02040503050406030204" pitchFamily="18" charset="0"/>
                               <a:cs typeface="+mn-cs"/>
                             </a:rPr>
-                            <a:t>DH5</a:t>
-                          </a:r>
-                          <a:r>
-                            <a:rPr lang="el-GR" sz="1800" b="1" kern="1200" dirty="0" smtClean="0">
-                              <a:solidFill>
-                                <a:srgbClr val="59A754"/>
-                              </a:solidFill>
-                              <a:latin typeface="Cambria Math" panose="02040503050406030204" pitchFamily="18" charset="0"/>
-                              <a:ea typeface="Cambria Math" panose="02040503050406030204" pitchFamily="18" charset="0"/>
-                              <a:cs typeface="+mn-cs"/>
-                            </a:rPr>
-                            <a:t>α</a:t>
+                            <a:t>Green</a:t>
                           </a:r>
                           <a:endParaRPr lang="he-IL" sz="1800" b="1" kern="1200" dirty="0">
                             <a:solidFill>
@@ -11034,7 +10991,7 @@
                               <a:latin typeface="Cambria Math" panose="02040503050406030204" pitchFamily="18" charset="0"/>
                               <a:ea typeface="Cambria Math" panose="02040503050406030204" pitchFamily="18" charset="0"/>
                             </a:rPr>
-                            <a:t>0.979</a:t>
+                            <a:t>0.0979</a:t>
                           </a:r>
                           <a:endParaRPr lang="he-IL" sz="1800" dirty="0">
                             <a:latin typeface="Cambria Math" panose="02040503050406030204" pitchFamily="18" charset="0"/>
@@ -11055,7 +11012,7 @@
                               <a:latin typeface="Cambria Math" panose="02040503050406030204" pitchFamily="18" charset="0"/>
                               <a:ea typeface="Cambria Math" panose="02040503050406030204" pitchFamily="18" charset="0"/>
                             </a:rPr>
-                            <a:t>0.983</a:t>
+                            <a:t>0.0983</a:t>
                           </a:r>
                           <a:endParaRPr lang="he-IL" sz="1800" dirty="0">
                             <a:latin typeface="Cambria Math" panose="02040503050406030204" pitchFamily="18" charset="0"/>
@@ -12115,7 +12072,7 @@
         </p:blipFill>
         <p:spPr bwMode="auto">
           <a:xfrm>
-            <a:off x="15836744" y="40696809"/>
+            <a:off x="11576972" y="39235580"/>
             <a:ext cx="3125442" cy="900000"/>
           </a:xfrm>
           <a:prstGeom prst="rect">
@@ -12156,7 +12113,7 @@
         </p:blipFill>
         <p:spPr bwMode="auto">
           <a:xfrm>
-            <a:off x="17493872" y="39035995"/>
+            <a:off x="16345279" y="39054713"/>
             <a:ext cx="1400932" cy="1440000"/>
           </a:xfrm>
           <a:prstGeom prst="rect">
@@ -12229,7 +12186,7 @@
         </p:blipFill>
         <p:spPr bwMode="auto">
           <a:xfrm>
-            <a:off x="15406428" y="38898990"/>
+            <a:off x="14492039" y="38898990"/>
             <a:ext cx="1697143" cy="1620000"/>
           </a:xfrm>
           <a:prstGeom prst="rect">
@@ -12270,7 +12227,7 @@
         </p:blipFill>
         <p:spPr bwMode="auto">
           <a:xfrm>
-            <a:off x="11618173" y="39090172"/>
+            <a:off x="15474893" y="40708309"/>
             <a:ext cx="3402958" cy="900000"/>
           </a:xfrm>
           <a:prstGeom prst="rect">
@@ -12606,7 +12563,7 @@
         </p:blipFill>
         <p:spPr bwMode="auto">
           <a:xfrm>
-            <a:off x="11530860" y="40456309"/>
+            <a:off x="11362911" y="40456309"/>
             <a:ext cx="3553565" cy="1152000"/>
           </a:xfrm>
           <a:prstGeom prst="rect">
@@ -12806,7 +12763,7 @@
         <p:spPr>
           <a:xfrm>
             <a:off x="23220000" y="11160000"/>
-            <a:ext cx="1071127" cy="523220"/>
+            <a:ext cx="1016625" cy="523220"/>
           </a:xfrm>
           <a:prstGeom prst="rect">
             <a:avLst/>
@@ -12820,17 +12777,19 @@
           <a:p>
             <a:r>
               <a:rPr lang="en-US" altLang="he-IL" dirty="0" smtClean="0">
-                <a:latin typeface="Times New Roman" pitchFamily="18" charset="0"/>
+                <a:latin typeface="Calibri" panose="020F0502020204030204" pitchFamily="34" charset="0"/>
               </a:rPr>
               <a:t>DH5</a:t>
             </a:r>
             <a:r>
               <a:rPr lang="el-GR" altLang="he-IL" dirty="0">
-                <a:latin typeface="Times New Roman" pitchFamily="18" charset="0"/>
+                <a:latin typeface="Calibri" panose="020F0502020204030204" pitchFamily="34" charset="0"/>
               </a:rPr>
               <a:t>α</a:t>
             </a:r>
-            <a:endParaRPr lang="he-IL" dirty="0"/>
+            <a:endParaRPr lang="he-IL" dirty="0">
+              <a:latin typeface="Calibri" panose="020F0502020204030204" pitchFamily="34" charset="0"/>
+            </a:endParaRPr>
           </a:p>
         </p:txBody>
       </p:sp>
@@ -12843,7 +12802,7 @@
         <p:spPr>
           <a:xfrm>
             <a:off x="25789013" y="11160000"/>
-            <a:ext cx="843501" cy="523220"/>
+            <a:ext cx="757836" cy="523220"/>
           </a:xfrm>
           <a:prstGeom prst="rect">
             <a:avLst/>
@@ -12857,11 +12816,13 @@
           <a:p>
             <a:r>
               <a:rPr lang="en-US" altLang="he-IL" dirty="0" smtClean="0">
-                <a:latin typeface="Times New Roman" pitchFamily="18" charset="0"/>
+                <a:latin typeface="Calibri" panose="020F0502020204030204" pitchFamily="34" charset="0"/>
               </a:rPr>
               <a:t>TG1</a:t>
             </a:r>
-            <a:endParaRPr lang="he-IL" dirty="0"/>
+            <a:endParaRPr lang="he-IL" dirty="0">
+              <a:latin typeface="Calibri" panose="020F0502020204030204" pitchFamily="34" charset="0"/>
+            </a:endParaRPr>
           </a:p>
         </p:txBody>
       </p:sp>
@@ -12873,8 +12834,8 @@
         </p:nvSpPr>
         <p:spPr>
           <a:xfrm>
-            <a:off x="24390323" y="10742850"/>
-            <a:ext cx="1160895" cy="1384995"/>
+            <a:off x="24421581" y="10742850"/>
+            <a:ext cx="1098378" cy="1384995"/>
           </a:xfrm>
           <a:prstGeom prst="rect">
             <a:avLst/>
@@ -12889,19 +12850,19 @@
             <a:pPr algn="ctr"/>
             <a:r>
               <a:rPr lang="en-US" altLang="he-IL" dirty="0">
-                <a:latin typeface="Times New Roman" pitchFamily="18" charset="0"/>
+                <a:latin typeface="Calibri" panose="020F0502020204030204" pitchFamily="34" charset="0"/>
               </a:rPr>
               <a:t>DH5</a:t>
             </a:r>
             <a:r>
               <a:rPr lang="el-GR" altLang="he-IL" dirty="0" smtClean="0">
-                <a:latin typeface="Times New Roman" pitchFamily="18" charset="0"/>
+                <a:latin typeface="Calibri" panose="020F0502020204030204" pitchFamily="34" charset="0"/>
               </a:rPr>
               <a:t>α</a:t>
             </a:r>
             <a:r>
               <a:rPr lang="en-US" altLang="he-IL" dirty="0" smtClean="0">
-                <a:latin typeface="Times New Roman" pitchFamily="18" charset="0"/>
+                <a:latin typeface="Calibri" panose="020F0502020204030204" pitchFamily="34" charset="0"/>
               </a:rPr>
               <a:t> </a:t>
             </a:r>
@@ -12910,7 +12871,7 @@
             <a:pPr algn="ctr"/>
             <a:r>
               <a:rPr lang="en-US" altLang="he-IL" dirty="0" smtClean="0">
-                <a:latin typeface="Times New Roman" pitchFamily="18" charset="0"/>
+                <a:latin typeface="Calibri" panose="020F0502020204030204" pitchFamily="34" charset="0"/>
               </a:rPr>
               <a:t>+</a:t>
             </a:r>
@@ -12919,11 +12880,13 @@
             <a:pPr algn="ctr"/>
             <a:r>
               <a:rPr lang="en-US" altLang="he-IL" dirty="0" smtClean="0">
-                <a:latin typeface="Times New Roman" pitchFamily="18" charset="0"/>
+                <a:latin typeface="Calibri" panose="020F0502020204030204" pitchFamily="34" charset="0"/>
               </a:rPr>
               <a:t>TG1</a:t>
             </a:r>
-            <a:endParaRPr lang="he-IL" dirty="0"/>
+            <a:endParaRPr lang="he-IL" dirty="0">
+              <a:latin typeface="Calibri" panose="020F0502020204030204" pitchFamily="34" charset="0"/>
+            </a:endParaRPr>
           </a:p>
         </p:txBody>
       </p:sp>
@@ -12981,6 +12944,136 @@
           </a:extLst>
         </p:spPr>
       </p:pic>
+      <p:sp>
+        <p:nvSpPr>
+          <p:cNvPr id="12" name="Rectangle 11"/>
+          <p:cNvSpPr/>
+          <p:nvPr/>
+        </p:nvSpPr>
+        <p:spPr>
+          <a:xfrm>
+            <a:off x="7203233" y="19277045"/>
+            <a:ext cx="1922106" cy="1097045"/>
+          </a:xfrm>
+          <a:prstGeom prst="rect">
+            <a:avLst/>
+          </a:prstGeom>
+          <a:solidFill>
+            <a:schemeClr val="bg1"/>
+          </a:solidFill>
+          <a:ln>
+            <a:solidFill>
+              <a:schemeClr val="bg1"/>
+            </a:solidFill>
+          </a:ln>
+          <a:effectLst/>
+        </p:spPr>
+        <p:style>
+          <a:lnRef idx="1">
+            <a:schemeClr val="accent1"/>
+          </a:lnRef>
+          <a:fillRef idx="3">
+            <a:schemeClr val="accent1"/>
+          </a:fillRef>
+          <a:effectRef idx="2">
+            <a:schemeClr val="accent1"/>
+          </a:effectRef>
+          <a:fontRef idx="minor">
+            <a:schemeClr val="lt1"/>
+          </a:fontRef>
+        </p:style>
+        <p:txBody>
+          <a:bodyPr rtlCol="1" anchor="ctr"/>
+          <a:lstStyle/>
+          <a:p>
+            <a:pPr algn="ctr"/>
+            <a:endParaRPr lang="he-IL"/>
+          </a:p>
+        </p:txBody>
+      </p:sp>
+      <p:sp>
+        <p:nvSpPr>
+          <p:cNvPr id="68" name="TextBox 67"/>
+          <p:cNvSpPr txBox="1"/>
+          <p:nvPr/>
+        </p:nvSpPr>
+        <p:spPr>
+          <a:xfrm>
+            <a:off x="17876838" y="39285922"/>
+            <a:ext cx="1478168" cy="923330"/>
+          </a:xfrm>
+          <a:prstGeom prst="rect">
+            <a:avLst/>
+          </a:prstGeom>
+          <a:noFill/>
+        </p:spPr>
+        <p:txBody>
+          <a:bodyPr wrap="square" rtlCol="1">
+            <a:spAutoFit/>
+          </a:bodyPr>
+          <a:lstStyle/>
+          <a:p>
+            <a:pPr algn="ctr"/>
+            <a:r>
+              <a:rPr lang="en-US" altLang="he-IL" sz="1800" b="1" dirty="0" smtClean="0">
+                <a:solidFill>
+                  <a:srgbClr val="0070C0"/>
+                </a:solidFill>
+                <a:latin typeface="Calibri" panose="020F0502020204030204" pitchFamily="34" charset="0"/>
+                <a:cs typeface="Consolas" panose="020B0609020204030204" pitchFamily="49" charset="0"/>
+              </a:rPr>
+              <a:t>The </a:t>
+            </a:r>
+            <a:r>
+              <a:rPr lang="en-US" altLang="he-IL" sz="1800" b="1" dirty="0" err="1" smtClean="0">
+                <a:solidFill>
+                  <a:srgbClr val="0070C0"/>
+                </a:solidFill>
+                <a:latin typeface="Calibri" panose="020F0502020204030204" pitchFamily="34" charset="0"/>
+                <a:cs typeface="Consolas" panose="020B0609020204030204" pitchFamily="49" charset="0"/>
+              </a:rPr>
+              <a:t>Anat</a:t>
+            </a:r>
+            <a:r>
+              <a:rPr lang="en-US" altLang="he-IL" sz="1800" b="1" dirty="0" smtClean="0">
+                <a:solidFill>
+                  <a:srgbClr val="0070C0"/>
+                </a:solidFill>
+                <a:latin typeface="Calibri" panose="020F0502020204030204" pitchFamily="34" charset="0"/>
+                <a:cs typeface="Consolas" panose="020B0609020204030204" pitchFamily="49" charset="0"/>
+              </a:rPr>
+              <a:t> </a:t>
+            </a:r>
+            <a:r>
+              <a:rPr lang="en-US" altLang="he-IL" sz="1800" b="1" dirty="0" err="1" smtClean="0">
+                <a:solidFill>
+                  <a:srgbClr val="0070C0"/>
+                </a:solidFill>
+                <a:latin typeface="Calibri" panose="020F0502020204030204" pitchFamily="34" charset="0"/>
+                <a:cs typeface="Consolas" panose="020B0609020204030204" pitchFamily="49" charset="0"/>
+              </a:rPr>
+              <a:t>Karuskopf</a:t>
+            </a:r>
+            <a:r>
+              <a:rPr lang="en-US" altLang="he-IL" sz="1800" b="1" dirty="0" smtClean="0">
+                <a:solidFill>
+                  <a:srgbClr val="0070C0"/>
+                </a:solidFill>
+                <a:latin typeface="Calibri" panose="020F0502020204030204" pitchFamily="34" charset="0"/>
+                <a:cs typeface="Consolas" panose="020B0609020204030204" pitchFamily="49" charset="0"/>
+              </a:rPr>
+              <a:t> Fund</a:t>
+            </a:r>
+            <a:endParaRPr lang="en-US" altLang="he-IL" sz="1800" b="1" dirty="0">
+              <a:solidFill>
+                <a:srgbClr val="0070C0"/>
+              </a:solidFill>
+              <a:latin typeface="Calibri" panose="020F0502020204030204" pitchFamily="34" charset="0"/>
+              <a:cs typeface="Consolas" panose="020B0609020204030204" pitchFamily="49" charset="0"/>
+            </a:endParaRPr>
+          </a:p>
+        </p:txBody>
+      </p:sp>
     </p:spTree>
   </p:cSld>
   <p:clrMapOvr>

</xml_diff>

<commit_message>
new figures, using MG1655 and DH12S for first columns
</commit_message>
<xml_diff>
--- a/poster.pptx
+++ b/poster.pptx
@@ -4194,8 +4194,8 @@
           <a:chExt cx="0" cy="0"/>
         </a:xfrm>
       </p:grpSpPr>
-      <mc:AlternateContent xmlns:mc="http://schemas.openxmlformats.org/markup-compatibility/2006" xmlns:a14="http://schemas.microsoft.com/office/drawing/2010/main">
-        <mc:Choice Requires="a14">
+      <mc:AlternateContent xmlns:mc="http://schemas.openxmlformats.org/markup-compatibility/2006">
+        <mc:Choice xmlns:a14="http://schemas.microsoft.com/office/drawing/2010/main" Requires="a14">
           <p:sp>
             <p:nvSpPr>
               <p:cNvPr id="51" name="Text Box 11"/>
@@ -4393,6 +4393,9 @@
                 </a:pPr>
                 <a:r>
                   <a:rPr lang="en-US" altLang="he-IL" b="1" dirty="0" smtClean="0">
+                    <a:solidFill>
+                      <a:srgbClr val="3B7EB5"/>
+                    </a:solidFill>
                     <a:latin typeface="Calibri" panose="020F0502020204030204" pitchFamily="34" charset="0"/>
                   </a:rPr>
                   <a:t>Classical population genetics.</a:t>
@@ -4425,7 +4428,13 @@
                   <a:rPr lang="en-US" altLang="he-IL" sz="2500" dirty="0" smtClean="0">
                     <a:latin typeface="Times New Roman" pitchFamily="18" charset="0"/>
                   </a:rPr>
-                  <a:t> the frequency of the red strain </a:t>
+                  <a:t> the frequency of the </a:t>
+                </a:r>
+                <a:r>
+                  <a:rPr lang="en-US" altLang="he-IL" sz="2500" dirty="0" smtClean="0">
+                    <a:latin typeface="Times New Roman" pitchFamily="18" charset="0"/>
+                  </a:rPr>
+                  <a:t>advantageous strain </a:t>
                 </a:r>
                 <a14:m>
                   <m:oMath xmlns:m="http://schemas.openxmlformats.org/officeDocument/2006/math">
@@ -4635,9 +4644,18 @@
                               </m:r>
                               <m:r>
                                 <a:rPr lang="en-US" altLang="he-IL" sz="3600" b="0" i="1" smtClean="0">
+                                  <a:solidFill>
+                                    <a:srgbClr val="3B7EB5"/>
+                                  </a:solidFill>
                                   <a:latin typeface="Cambria Math"/>
                                 </a:rPr>
-                                <m:t>𝑠𝑡</m:t>
+                                <m:t>𝑠</m:t>
+                              </m:r>
+                              <m:r>
+                                <a:rPr lang="en-US" altLang="he-IL" sz="3600" b="0" i="1" smtClean="0">
+                                  <a:latin typeface="Cambria Math"/>
+                                </a:rPr>
+                                <m:t>𝑡</m:t>
                               </m:r>
                             </m:sup>
                           </m:sSup>
@@ -4717,6 +4735,9 @@
                   <m:oMath xmlns:m="http://schemas.openxmlformats.org/officeDocument/2006/math">
                     <m:r>
                       <a:rPr lang="en-US" altLang="he-IL" sz="2500" b="0" i="1" smtClean="0">
+                        <a:solidFill>
+                          <a:srgbClr val="3B7EB5"/>
+                        </a:solidFill>
                         <a:latin typeface="Cambria Math"/>
                       </a:rPr>
                       <m:t>𝑠</m:t>
@@ -4727,8 +4748,35 @@
                   <a:rPr lang="en-US" altLang="he-IL" sz="2500" dirty="0" smtClean="0">
                     <a:latin typeface="Times New Roman" pitchFamily="18" charset="0"/>
                   </a:rPr>
-                  <a:t> is the selection coefficient of the red strain.</a:t>
+                  <a:t> is the </a:t>
                 </a:r>
+                <a:r>
+                  <a:rPr lang="en-US" altLang="he-IL" sz="2500" dirty="0" smtClean="0">
+                    <a:solidFill>
+                      <a:srgbClr val="3B7EB5"/>
+                    </a:solidFill>
+                    <a:latin typeface="Times New Roman" pitchFamily="18" charset="0"/>
+                  </a:rPr>
+                  <a:t>selection </a:t>
+                </a:r>
+                <a:r>
+                  <a:rPr lang="en-US" altLang="he-IL" sz="2500" dirty="0" smtClean="0">
+                    <a:solidFill>
+                      <a:srgbClr val="3B7EB5"/>
+                    </a:solidFill>
+                    <a:latin typeface="Times New Roman" pitchFamily="18" charset="0"/>
+                  </a:rPr>
+                  <a:t>coefficient </a:t>
+                </a:r>
+                <a:r>
+                  <a:rPr lang="en-US" altLang="he-IL" sz="2500" dirty="0" smtClean="0">
+                    <a:latin typeface="Times New Roman" pitchFamily="18" charset="0"/>
+                  </a:rPr>
+                  <a:t>of the advantageous strain.</a:t>
+                </a:r>
+                <a:endParaRPr lang="en-US" altLang="he-IL" sz="2500" dirty="0" smtClean="0">
+                  <a:latin typeface="Times New Roman" pitchFamily="18" charset="0"/>
+                </a:endParaRPr>
               </a:p>
               <a:p>
                 <a:pPr indent="180000" eaLnBrk="1" hangingPunct="1">
@@ -4748,18 +4796,27 @@
                 </a:pPr>
                 <a:r>
                   <a:rPr lang="en-US" altLang="he-IL" b="1" dirty="0" smtClean="0">
+                    <a:solidFill>
+                      <a:srgbClr val="3B7EB5"/>
+                    </a:solidFill>
                     <a:latin typeface="Calibri" panose="020F0502020204030204" pitchFamily="34" charset="0"/>
                   </a:rPr>
                   <a:t>Effective </a:t>
                 </a:r>
                 <a:r>
                   <a:rPr lang="en-US" altLang="he-IL" b="1" dirty="0">
+                    <a:solidFill>
+                      <a:srgbClr val="3B7EB5"/>
+                    </a:solidFill>
                     <a:latin typeface="Calibri" panose="020F0502020204030204" pitchFamily="34" charset="0"/>
                   </a:rPr>
                   <a:t>selection </a:t>
                 </a:r>
                 <a:r>
                   <a:rPr lang="en-US" altLang="he-IL" b="1" dirty="0" smtClean="0">
+                    <a:solidFill>
+                      <a:srgbClr val="3B7EB5"/>
+                    </a:solidFill>
                     <a:latin typeface="Calibri" panose="020F0502020204030204" pitchFamily="34" charset="0"/>
                   </a:rPr>
                   <a:t>coefficient. </a:t>
@@ -4768,7 +4825,19 @@
                   <a:rPr lang="en-US" altLang="he-IL" sz="2500" dirty="0" smtClean="0">
                     <a:latin typeface="Times New Roman" pitchFamily="18" charset="0"/>
                   </a:rPr>
-                  <a:t>We fit the above  equation to the frequency of the red strain in the competition simulation. </a:t>
+                  <a:t>We fit the above  equation to the frequency of the </a:t>
+                </a:r>
+                <a:r>
+                  <a:rPr lang="en-US" altLang="he-IL" sz="2500" dirty="0" smtClean="0">
+                    <a:latin typeface="Times New Roman" pitchFamily="18" charset="0"/>
+                  </a:rPr>
+                  <a:t>advantageous strain </a:t>
+                </a:r>
+                <a:r>
+                  <a:rPr lang="en-US" altLang="he-IL" sz="2500" dirty="0" smtClean="0">
+                    <a:latin typeface="Times New Roman" pitchFamily="18" charset="0"/>
+                  </a:rPr>
+                  <a:t>in the competition simulation. </a:t>
                 </a:r>
               </a:p>
               <a:p>
@@ -4801,6 +4870,9 @@
                 </a:r>
                 <a:r>
                   <a:rPr lang="en-US" altLang="he-IL" sz="2500" i="1" dirty="0" smtClean="0">
+                    <a:solidFill>
+                      <a:srgbClr val="3B7EB5"/>
+                    </a:solidFill>
                     <a:latin typeface="Times New Roman" pitchFamily="18" charset="0"/>
                   </a:rPr>
                   <a:t>effective selection coefficient </a:t>
@@ -4809,7 +4881,19 @@
                   <a:rPr lang="en-US" altLang="he-IL" sz="2500" dirty="0" smtClean="0">
                     <a:latin typeface="Times New Roman" pitchFamily="18" charset="0"/>
                   </a:rPr>
-                  <a:t>of the red strain: the selection coefficient that would cause similar change in frequency </a:t>
+                  <a:t>of the </a:t>
+                </a:r>
+                <a:r>
+                  <a:rPr lang="en-US" altLang="he-IL" sz="2500" dirty="0">
+                    <a:latin typeface="Times New Roman" pitchFamily="18" charset="0"/>
+                  </a:rPr>
+                  <a:t>advantageous strain</a:t>
+                </a:r>
+                <a:r>
+                  <a:rPr lang="en-US" altLang="he-IL" sz="2500" dirty="0" smtClean="0">
+                    <a:latin typeface="Times New Roman" pitchFamily="18" charset="0"/>
+                  </a:rPr>
+                  <a:t>: the selection coefficient that would cause similar change in frequency </a:t>
                 </a:r>
                 <a:r>
                   <a:rPr lang="en-US" altLang="he-IL" sz="2500" dirty="0">
@@ -5007,7 +5091,7 @@
             </p:txBody>
           </p:sp>
         </mc:Choice>
-        <mc:Fallback xmlns="">
+        <mc:Fallback>
           <p:sp>
             <p:nvSpPr>
               <p:cNvPr id="51" name="Text Box 11"/>
@@ -5056,7 +5140,7 @@
       </mc:AlternateContent>
       <p:pic>
         <p:nvPicPr>
-          <p:cNvPr id="25" name="Picture 6" descr="D:\university\presentations\GRC 2015\frequency_fit.png"/>
+          <p:cNvPr id="1034" name="Picture 10" descr="D:\university\presentations\GRC 2015\frequency_fit_poster.png"/>
           <p:cNvPicPr>
             <a:picLocks noChangeAspect="1" noChangeArrowheads="1"/>
           </p:cNvPicPr>
@@ -5078,7 +5162,7 @@
         <p:spPr bwMode="auto">
           <a:xfrm>
             <a:off x="11304000" y="28623600"/>
-            <a:ext cx="7748588" cy="5310188"/>
+            <a:ext cx="7748587" cy="5297487"/>
           </a:xfrm>
           <a:prstGeom prst="rect">
             <a:avLst/>
@@ -5095,8 +5179,8 @@
           </a:extLst>
         </p:spPr>
       </p:pic>
-      <mc:AlternateContent xmlns:mc="http://schemas.openxmlformats.org/markup-compatibility/2006" xmlns:a14="http://schemas.microsoft.com/office/drawing/2010/main">
-        <mc:Choice Requires="a14">
+      <mc:AlternateContent xmlns:mc="http://schemas.openxmlformats.org/markup-compatibility/2006">
+        <mc:Choice xmlns:a14="http://schemas.microsoft.com/office/drawing/2010/main" Requires="a14">
           <p:sp>
             <p:nvSpPr>
               <p:cNvPr id="14340" name="Text Box 11"/>
@@ -5273,7 +5357,7 @@
                 <a:r>
                   <a:rPr lang="en-US" altLang="he-IL" sz="4200" b="1" dirty="0">
                     <a:solidFill>
-                      <a:srgbClr val="59A754"/>
+                      <a:srgbClr val="3B7EB5"/>
                     </a:solidFill>
                     <a:latin typeface="Calibri" pitchFamily="34" charset="0"/>
                   </a:rPr>
@@ -5288,6 +5372,9 @@
                 </a:pPr>
                 <a:r>
                   <a:rPr lang="en-US" b="1" dirty="0">
+                    <a:solidFill>
+                      <a:srgbClr val="3B7EB5"/>
+                    </a:solidFill>
                     <a:latin typeface="Calibri" panose="020F0502020204030204" pitchFamily="34" charset="0"/>
                   </a:rPr>
                   <a:t>Data. </a:t>
@@ -5317,7 +5404,7 @@
                     </a:solidFill>
                     <a:latin typeface="Times New Roman"/>
                   </a:rPr>
-                  <a:t>of two different </a:t>
+                  <a:t>of two </a:t>
                 </a:r>
                 <a:r>
                   <a:rPr lang="en-US" sz="2500" i="1" dirty="0" smtClean="0">
@@ -5326,7 +5413,16 @@
                     </a:solidFill>
                     <a:latin typeface="Times New Roman"/>
                   </a:rPr>
-                  <a:t>E. coli </a:t>
+                  <a:t>E</a:t>
+                </a:r>
+                <a:r>
+                  <a:rPr lang="en-US" sz="2500" i="1" dirty="0" smtClean="0">
+                    <a:solidFill>
+                      <a:srgbClr val="000000"/>
+                    </a:solidFill>
+                    <a:latin typeface="Times New Roman"/>
+                  </a:rPr>
+                  <a:t>. coli </a:t>
                 </a:r>
                 <a:r>
                   <a:rPr lang="en-US" sz="2500" dirty="0" smtClean="0">
@@ -5465,9 +5561,18 @@
                 <a:pPr indent="180000"/>
                 <a:r>
                   <a:rPr lang="en-US" b="1" dirty="0">
+                    <a:solidFill>
+                      <a:srgbClr val="3B7EB5"/>
+                    </a:solidFill>
                     <a:latin typeface="Calibri" panose="020F0502020204030204" pitchFamily="34" charset="0"/>
                   </a:rPr>
-                  <a:t>Model fitting. </a:t>
+                  <a:t>Model fitting.</a:t>
+                </a:r>
+                <a:r>
+                  <a:rPr lang="en-US" b="1" dirty="0">
+                    <a:latin typeface="Calibri" panose="020F0502020204030204" pitchFamily="34" charset="0"/>
+                  </a:rPr>
+                  <a:t> </a:t>
                 </a:r>
                 <a:r>
                   <a:rPr lang="en-US" sz="2500" dirty="0" smtClean="0">
@@ -5476,13 +5581,13 @@
                   <a:t>We fit the </a:t>
                 </a:r>
                 <a:r>
-                  <a:rPr lang="en-US" sz="2500" b="1" dirty="0" err="1" smtClean="0">
+                  <a:rPr lang="en-US" sz="2500" dirty="0" err="1" smtClean="0">
                     <a:latin typeface="Times New Roman" pitchFamily="18" charset="0"/>
                   </a:rPr>
                   <a:t>Baranyi</a:t>
                 </a:r>
                 <a:r>
-                  <a:rPr lang="en-US" sz="2500" b="1" dirty="0" smtClean="0">
+                  <a:rPr lang="en-US" sz="2500" dirty="0" smtClean="0">
                     <a:latin typeface="Times New Roman" pitchFamily="18" charset="0"/>
                   </a:rPr>
                   <a:t>-Roberts growth model</a:t>
@@ -5497,19 +5602,7 @@
                   <a:rPr lang="en-US" sz="2500" dirty="0" smtClean="0">
                     <a:latin typeface="Times New Roman" pitchFamily="18" charset="0"/>
                   </a:rPr>
-                  <a:t>,</a:t>
-                </a:r>
-                <a:r>
-                  <a:rPr lang="en-US" sz="2500" b="1" dirty="0" smtClean="0">
-                    <a:latin typeface="Times New Roman" pitchFamily="18" charset="0"/>
-                  </a:rPr>
-                  <a:t> </a:t>
-                </a:r>
-                <a:r>
-                  <a:rPr lang="en-US" sz="2500" dirty="0" smtClean="0">
-                    <a:latin typeface="Times New Roman" pitchFamily="18" charset="0"/>
-                  </a:rPr>
-                  <a:t>an extension of </a:t>
+                  <a:t>, an extension of </a:t>
                 </a:r>
                 <a:r>
                   <a:rPr lang="en-US" sz="2500" dirty="0">
@@ -6124,7 +6217,7 @@
             </p:txBody>
           </p:sp>
         </mc:Choice>
-        <mc:Fallback xmlns="">
+        <mc:Fallback>
           <p:sp>
             <p:nvSpPr>
               <p:cNvPr id="14340" name="Text Box 11"/>
@@ -6171,47 +6264,6 @@
           </p:sp>
         </mc:Fallback>
       </mc:AlternateContent>
-      <p:pic>
-        <p:nvPicPr>
-          <p:cNvPr id="16" name="Picture 4" descr="D:\university\presentations\GRC 2015\model_fits.png"/>
-          <p:cNvPicPr>
-            <a:picLocks noChangeAspect="1" noChangeArrowheads="1"/>
-          </p:cNvPicPr>
-          <p:nvPr/>
-        </p:nvPicPr>
-        <p:blipFill>
-          <a:blip r:embed="rId7">
-            <a:extLst>
-              <a:ext uri="{28A0092B-C50C-407E-A947-70E740481C1C}">
-                <a14:useLocalDpi xmlns:a14="http://schemas.microsoft.com/office/drawing/2010/main" val="0"/>
-              </a:ext>
-            </a:extLst>
-          </a:blip>
-          <a:srcRect/>
-          <a:stretch>
-            <a:fillRect/>
-          </a:stretch>
-        </p:blipFill>
-        <p:spPr bwMode="auto">
-          <a:xfrm>
-            <a:off x="1630800" y="25887832"/>
-            <a:ext cx="7748588" cy="5297488"/>
-          </a:xfrm>
-          <a:prstGeom prst="rect">
-            <a:avLst/>
-          </a:prstGeom>
-          <a:noFill/>
-          <a:extLst>
-            <a:ext uri="{909E8E84-426E-40DD-AFC4-6F175D3DCCD1}">
-              <a14:hiddenFill xmlns:a14="http://schemas.microsoft.com/office/drawing/2010/main">
-                <a:solidFill>
-                  <a:srgbClr val="FFFFFF"/>
-                </a:solidFill>
-              </a14:hiddenFill>
-            </a:ext>
-          </a:extLst>
-        </p:spPr>
-      </p:pic>
       <p:sp>
         <p:nvSpPr>
           <p:cNvPr id="14343" name="Text Box 13"/>
@@ -6222,7 +6274,7 @@
         </p:nvSpPr>
         <p:spPr bwMode="auto">
           <a:xfrm>
-            <a:off x="20610513" y="7550150"/>
+            <a:off x="20530800" y="7550150"/>
             <a:ext cx="8458200" cy="21812812"/>
           </a:xfrm>
           <a:prstGeom prst="rect">
@@ -6385,7 +6437,7 @@
             <a:r>
               <a:rPr lang="en-US" altLang="he-IL" sz="4200" b="1" dirty="0" smtClean="0">
                 <a:solidFill>
-                  <a:srgbClr val="E02829"/>
+                  <a:srgbClr val="3B7EB5"/>
                 </a:solidFill>
                 <a:latin typeface="Calibri" pitchFamily="34" charset="0"/>
               </a:rPr>
@@ -6393,7 +6445,7 @@
             </a:r>
             <a:endParaRPr lang="en-US" altLang="he-IL" sz="4200" b="1" dirty="0">
               <a:solidFill>
-                <a:srgbClr val="E02829"/>
+                <a:srgbClr val="3B7EB5"/>
               </a:solidFill>
               <a:latin typeface="Calibri" pitchFamily="34" charset="0"/>
             </a:endParaRPr>
@@ -6406,9 +6458,18 @@
             </a:pPr>
             <a:r>
               <a:rPr lang="en-US" altLang="he-IL" b="1" dirty="0">
+                <a:solidFill>
+                  <a:srgbClr val="3B7EB5"/>
+                </a:solidFill>
                 <a:latin typeface="Calibri" panose="020F0502020204030204" pitchFamily="34" charset="0"/>
               </a:rPr>
-              <a:t>Experimental Design. </a:t>
+              <a:t>Experimental Design.</a:t>
+            </a:r>
+            <a:r>
+              <a:rPr lang="en-US" altLang="he-IL" b="1" dirty="0">
+                <a:latin typeface="Calibri" panose="020F0502020204030204" pitchFamily="34" charset="0"/>
+              </a:rPr>
+              <a:t> </a:t>
             </a:r>
             <a:r>
               <a:rPr lang="en-US" altLang="he-IL" sz="2500" dirty="0" smtClean="0">
@@ -6857,12 +6918,18 @@
             </a:pPr>
             <a:r>
               <a:rPr lang="en-US" altLang="he-IL" b="1" dirty="0" smtClean="0">
+                <a:solidFill>
+                  <a:srgbClr val="3B7EB5"/>
+                </a:solidFill>
                 <a:latin typeface="Calibri" panose="020F0502020204030204" pitchFamily="34" charset="0"/>
               </a:rPr>
               <a:t>Results</a:t>
             </a:r>
             <a:r>
               <a:rPr lang="en-US" altLang="he-IL" b="1" dirty="0">
+                <a:solidFill>
+                  <a:srgbClr val="3B7EB5"/>
+                </a:solidFill>
                 <a:latin typeface="Calibri" panose="020F0502020204030204" pitchFamily="34" charset="0"/>
               </a:rPr>
               <a:t>.</a:t>
@@ -6885,7 +6952,7 @@
           <p:nvPr/>
         </p:nvPicPr>
         <p:blipFill>
-          <a:blip r:embed="rId8">
+          <a:blip r:embed="rId7">
             <a:extLst>
               <a:ext uri="{28A0092B-C50C-407E-A947-70E740481C1C}">
                 <a14:useLocalDpi xmlns:a14="http://schemas.microsoft.com/office/drawing/2010/main" val="0"/>
@@ -7076,7 +7143,7 @@
         </p:nvSpPr>
         <p:spPr bwMode="auto">
           <a:xfrm>
-            <a:off x="10955768" y="35783839"/>
+            <a:off x="10944000" y="35783839"/>
             <a:ext cx="8458924" cy="6113056"/>
           </a:xfrm>
           <a:prstGeom prst="rect">
@@ -7391,7 +7458,7 @@
             <a:r>
               <a:rPr lang="en-US" altLang="he-IL" sz="4200" b="1" dirty="0">
                 <a:solidFill>
-                  <a:srgbClr val="59A754"/>
+                  <a:srgbClr val="3B7EB5"/>
                 </a:solidFill>
                 <a:latin typeface="Calibri" pitchFamily="34" charset="0"/>
               </a:rPr>
@@ -7420,6 +7487,9 @@
             </a:r>
             <a:r>
               <a:rPr lang="en-US" sz="2500" b="1" dirty="0">
+                <a:solidFill>
+                  <a:srgbClr val="3B7EB5"/>
+                </a:solidFill>
                 <a:latin typeface="+mn-lt"/>
               </a:rPr>
               <a:t>growth curves </a:t>
@@ -7470,7 +7540,10 @@
               <a:t>use </a:t>
             </a:r>
             <a:r>
-              <a:rPr lang="en-US" sz="2500" b="1" dirty="0" smtClean="0">
+              <a:rPr lang="en-US" sz="2500" b="1" dirty="0">
+                <a:solidFill>
+                  <a:srgbClr val="3B7EB5"/>
+                </a:solidFill>
                 <a:latin typeface="+mn-lt"/>
               </a:rPr>
               <a:t>selection coefficients </a:t>
@@ -7509,40 +7582,49 @@
               <a:t>The </a:t>
             </a:r>
             <a:r>
-              <a:rPr lang="en-US" sz="2500">
-                <a:latin typeface="+mn-lt"/>
-              </a:rPr>
-              <a:t>only </a:t>
-            </a:r>
-            <a:r>
-              <a:rPr lang="en-US" sz="2500" smtClean="0">
-                <a:latin typeface="+mn-lt"/>
-              </a:rPr>
-              <a:t>bridge </a:t>
-            </a:r>
-            <a:r>
               <a:rPr lang="en-US" sz="2500" dirty="0">
                 <a:latin typeface="+mn-lt"/>
               </a:rPr>
-              <a:t>between experiments and </a:t>
+              <a:t>only </a:t>
             </a:r>
             <a:r>
               <a:rPr lang="en-US" sz="2500" dirty="0" smtClean="0">
                 <a:latin typeface="+mn-lt"/>
               </a:rPr>
-              <a:t>theory, </a:t>
-            </a:r>
-            <a:r>
-              <a:rPr lang="en-US" sz="2500" b="1" dirty="0" smtClean="0">
+              <a:t>bridge </a:t>
+            </a:r>
+            <a:r>
+              <a:rPr lang="en-US" sz="2500" dirty="0">
                 <a:latin typeface="+mn-lt"/>
               </a:rPr>
-              <a:t>competition assays</a:t>
+              <a:t>between experiments and </a:t>
             </a:r>
             <a:r>
               <a:rPr lang="en-US" sz="2500" dirty="0" smtClean="0">
                 <a:latin typeface="+mn-lt"/>
               </a:rPr>
-              <a:t>, are </a:t>
+              <a:t>theory, </a:t>
+            </a:r>
+            <a:r>
+              <a:rPr lang="en-US" sz="2500" b="1" dirty="0">
+                <a:solidFill>
+                  <a:srgbClr val="3B7EB5"/>
+                </a:solidFill>
+                <a:latin typeface="+mn-lt"/>
+              </a:rPr>
+              <a:t>competition assays</a:t>
+            </a:r>
+            <a:r>
+              <a:rPr lang="en-US" sz="2500" b="1" dirty="0">
+                <a:latin typeface="+mn-lt"/>
+              </a:rPr>
+              <a:t>,</a:t>
+            </a:r>
+            <a:r>
+              <a:rPr lang="en-US" sz="2500" dirty="0" smtClean="0">
+                <a:latin typeface="+mn-lt"/>
+              </a:rPr>
+              <a:t> are </a:t>
             </a:r>
             <a:r>
               <a:rPr lang="en-US" sz="2500" dirty="0">
@@ -7573,6 +7655,9 @@
             </a:r>
             <a:r>
               <a:rPr lang="en-US" sz="2500" b="1" dirty="0" smtClean="0">
+                <a:solidFill>
+                  <a:srgbClr val="3B7EB5"/>
+                </a:solidFill>
                 <a:latin typeface="+mn-lt"/>
               </a:rPr>
               <a:t>alternative method </a:t>
@@ -7611,7 +7696,7 @@
         </p:nvSpPr>
         <p:spPr bwMode="auto">
           <a:xfrm>
-            <a:off x="11012977" y="35853029"/>
+            <a:off x="11096104" y="35853029"/>
             <a:ext cx="7409527" cy="3242478"/>
           </a:xfrm>
           <a:prstGeom prst="rect">
@@ -7918,8 +8003,8 @@
           </a:p>
         </p:txBody>
       </p:sp>
-      <mc:AlternateContent xmlns:mc="http://schemas.openxmlformats.org/markup-compatibility/2006" xmlns:a14="http://schemas.microsoft.com/office/drawing/2010/main">
-        <mc:Choice Requires="a14">
+      <mc:AlternateContent xmlns:mc="http://schemas.openxmlformats.org/markup-compatibility/2006">
+        <mc:Choice xmlns:a14="http://schemas.microsoft.com/office/drawing/2010/main" Requires="a14">
           <p:sp>
             <p:nvSpPr>
               <p:cNvPr id="14342" name="Text Box 12"/>
@@ -8094,7 +8179,7 @@
                   </a:tabLst>
                 </a:pPr>
                 <a:r>
-                  <a:rPr lang="en-US" altLang="he-IL" sz="4200" b="1" dirty="0">
+                  <a:rPr lang="en-US" altLang="he-IL" sz="4200" b="1" dirty="0" smtClean="0">
                     <a:solidFill>
                       <a:srgbClr val="3B7EB5"/>
                     </a:solidFill>
@@ -8129,15 +8214,27 @@
                 </a:r>
                 <a:r>
                   <a:rPr lang="en-US" sz="2500" b="1" dirty="0" smtClean="0">
+                    <a:solidFill>
+                      <a:srgbClr val="3B7EB5"/>
+                    </a:solidFill>
                     <a:latin typeface="+mn-lt"/>
                   </a:rPr>
                   <a:t>two-species </a:t>
                 </a:r>
                 <a:r>
                   <a:rPr lang="en-US" sz="2500" b="1" dirty="0">
+                    <a:solidFill>
+                      <a:srgbClr val="3B7EB5"/>
+                    </a:solidFill>
                     <a:latin typeface="+mn-lt"/>
                   </a:rPr>
-                  <a:t>ordinary differential equation </a:t>
+                  <a:t>ordinary differential equation</a:t>
+                </a:r>
+                <a:r>
+                  <a:rPr lang="en-US" sz="2500" b="1" dirty="0">
+                    <a:latin typeface="+mn-lt"/>
+                  </a:rPr>
+                  <a:t> </a:t>
                 </a:r>
                 <a:r>
                   <a:rPr lang="en-US" sz="2500" dirty="0">
@@ -8153,6 +8250,9 @@
                 </a:r>
                 <a:r>
                   <a:rPr lang="en-US" sz="2500" b="1" dirty="0">
+                    <a:solidFill>
+                      <a:srgbClr val="3B7EB5"/>
+                    </a:solidFill>
                     <a:latin typeface="+mn-lt"/>
                   </a:rPr>
                   <a:t>resource competition</a:t>
@@ -8434,7 +8534,7 @@
                                       <m:sSub>
                                         <m:sSubPr>
                                           <m:ctrlPr>
-                                            <a:rPr lang="en-US" altLang="he-IL" sz="3200" i="1">
+                                            <a:rPr lang="en-US" altLang="he-IL" sz="3200" i="1" smtClean="0">
                                               <a:latin typeface="Cambria Math"/>
                                             </a:rPr>
                                           </m:ctrlPr>
@@ -8449,13 +8549,10 @@
                                         </m:e>
                                         <m:sub>
                                           <m:r>
-                                            <a:rPr lang="en-US" altLang="he-IL" sz="3200" i="1" smtClean="0">
-                                              <a:solidFill>
-                                                <a:srgbClr val="59A754"/>
-                                              </a:solidFill>
+                                            <a:rPr lang="en-US" altLang="he-IL" sz="3200" b="0" i="1" smtClean="0">
                                               <a:latin typeface="Cambria Math"/>
                                             </a:rPr>
-                                            <m:t>𝐺</m:t>
+                                            <m:t>1</m:t>
                                           </m:r>
                                         </m:sub>
                                       </m:sSub>
@@ -8483,13 +8580,13 @@
                                         </m:e>
                                         <m:sub>
                                           <m:r>
-                                            <a:rPr lang="en-US" altLang="he-IL" sz="3200" i="1" smtClean="0">
+                                            <a:rPr lang="en-US" altLang="he-IL" sz="3200" b="0" i="1" smtClean="0">
                                               <a:solidFill>
-                                                <a:srgbClr val="E02829"/>
+                                                <a:schemeClr val="tx2"/>
                                               </a:solidFill>
                                               <a:latin typeface="Cambria Math"/>
                                             </a:rPr>
-                                            <m:t>𝑅</m:t>
+                                            <m:t>2</m:t>
                                           </m:r>
                                         </m:sub>
                                       </m:sSub>
@@ -8575,7 +8672,7 @@
             </p:txBody>
           </p:sp>
         </mc:Choice>
-        <mc:Fallback xmlns="">
+        <mc:Fallback>
           <p:sp>
             <p:nvSpPr>
               <p:cNvPr id="14342" name="Text Box 12"/>
@@ -8593,7 +8690,7 @@
                 <a:avLst/>
               </a:prstGeom>
               <a:blipFill rotWithShape="1">
-                <a:blip r:embed="rId9"/>
+                <a:blip r:embed="rId8"/>
                 <a:stretch>
                   <a:fillRect/>
                 </a:stretch>
@@ -9182,7 +9279,7 @@
             <a:avLst/>
           </a:prstGeom>
           <a:solidFill>
-            <a:srgbClr val="59A754"/>
+            <a:srgbClr val="3B7EB5"/>
           </a:solidFill>
           <a:ln>
             <a:noFill/>
@@ -9278,7 +9375,7 @@
             <a:avLst/>
           </a:prstGeom>
           <a:solidFill>
-            <a:srgbClr val="E02829"/>
+            <a:srgbClr val="3B7EB5"/>
           </a:solidFill>
           <a:ln>
             <a:noFill/>
@@ -9326,7 +9423,7 @@
             <a:avLst/>
           </a:prstGeom>
           <a:solidFill>
-            <a:srgbClr val="59A754"/>
+            <a:srgbClr val="3B7EB5"/>
           </a:solidFill>
           <a:ln>
             <a:noFill/>
@@ -9422,7 +9519,7 @@
             <a:avLst/>
           </a:prstGeom>
           <a:solidFill>
-            <a:srgbClr val="E02829"/>
+            <a:srgbClr val="3B7EB5"/>
           </a:solidFill>
           <a:ln>
             <a:noFill/>
@@ -9470,7 +9567,7 @@
             <a:avLst/>
           </a:prstGeom>
           <a:solidFill>
-            <a:srgbClr val="59A754"/>
+            <a:srgbClr val="3B7EB5"/>
           </a:solidFill>
           <a:ln>
             <a:noFill/>
@@ -9566,7 +9663,7 @@
             <a:avLst/>
           </a:prstGeom>
           <a:solidFill>
-            <a:srgbClr val="E02829"/>
+            <a:srgbClr val="3B7EB5"/>
           </a:solidFill>
           <a:ln>
             <a:noFill/>
@@ -9608,7 +9705,7 @@
           <p:nvPr/>
         </p:nvPicPr>
         <p:blipFill>
-          <a:blip r:embed="rId10">
+          <a:blip r:embed="rId9">
             <a:extLst>
               <a:ext uri="{28A0092B-C50C-407E-A947-70E740481C1C}">
                 <a14:useLocalDpi xmlns:a14="http://schemas.microsoft.com/office/drawing/2010/main" val="0"/>
@@ -9662,7 +9759,7 @@
           <p:nvPr/>
         </p:nvPicPr>
         <p:blipFill>
-          <a:blip r:embed="rId11">
+          <a:blip r:embed="rId10">
             <a:extLst>
               <a:ext uri="{28A0092B-C50C-407E-A947-70E740481C1C}">
                 <a14:useLocalDpi xmlns:a14="http://schemas.microsoft.com/office/drawing/2010/main" val="0"/>
@@ -9740,7 +9837,7 @@
               <p:nvPr/>
             </p:nvPicPr>
             <p:blipFill>
-              <a:blip r:embed="rId12">
+              <a:blip r:embed="rId11">
                 <a:extLst>
                   <a:ext uri="{28A0092B-C50C-407E-A947-70E740481C1C}">
                     <a14:useLocalDpi xmlns:a14="http://schemas.microsoft.com/office/drawing/2010/main" val="0"/>
@@ -9804,7 +9901,7 @@
               <p:nvPr/>
             </p:nvPicPr>
             <p:blipFill>
-              <a:blip r:embed="rId13">
+              <a:blip r:embed="rId12">
                 <a:extLst>
                   <a:ext uri="{28A0092B-C50C-407E-A947-70E740481C1C}">
                     <a14:useLocalDpi xmlns:a14="http://schemas.microsoft.com/office/drawing/2010/main" val="0"/>
@@ -9868,7 +9965,7 @@
               <p:nvPr/>
             </p:nvPicPr>
             <p:blipFill>
-              <a:blip r:embed="rId14">
+              <a:blip r:embed="rId13">
                 <a:extLst>
                   <a:ext uri="{28A0092B-C50C-407E-A947-70E740481C1C}">
                     <a14:useLocalDpi xmlns:a14="http://schemas.microsoft.com/office/drawing/2010/main" val="0"/>
@@ -9965,7 +10062,7 @@
                 <a:pPr algn="l" rtl="0"/>
                 <a:r>
                   <a:rPr lang="en-US" sz="3200" b="1" dirty="0" smtClean="0"/>
-                  <a:t>@</a:t>
+                  <a:t>github.com/</a:t>
                 </a:r>
                 <a:r>
                   <a:rPr lang="en-US" sz="3200" b="1" dirty="0" err="1" smtClean="0"/>
@@ -10028,7 +10125,7 @@
           <p:nvPr/>
         </p:nvPicPr>
         <p:blipFill>
-          <a:blip r:embed="rId15">
+          <a:blip r:embed="rId14">
             <a:extLst>
               <a:ext uri="{28A0092B-C50C-407E-A947-70E740481C1C}">
                 <a14:useLocalDpi xmlns:a14="http://schemas.microsoft.com/office/drawing/2010/main" val="0"/>
@@ -10135,7 +10232,7 @@
           <p:nvPr/>
         </p:nvPicPr>
         <p:blipFill>
-          <a:blip r:embed="rId16">
+          <a:blip r:embed="rId15">
             <a:extLst>
               <a:ext uri="{28A0092B-C50C-407E-A947-70E740481C1C}">
                 <a14:useLocalDpi xmlns:a14="http://schemas.microsoft.com/office/drawing/2010/main" val="0"/>
@@ -10308,8 +10405,8 @@
           </a:fontRef>
         </p:style>
       </p:cxnSp>
-      <mc:AlternateContent xmlns:mc="http://schemas.openxmlformats.org/markup-compatibility/2006" xmlns:a14="http://schemas.microsoft.com/office/drawing/2010/main">
-        <mc:Choice Requires="a14">
+      <mc:AlternateContent xmlns:mc="http://schemas.openxmlformats.org/markup-compatibility/2006">
+        <mc:Choice xmlns:a14="http://schemas.microsoft.com/office/drawing/2010/main" Requires="a14">
           <p:graphicFrame>
             <p:nvGraphicFramePr>
               <p:cNvPr id="6" name="Table 5"/>
@@ -10319,7 +10416,7 @@
               <p:nvPr>
                 <p:extLst>
                   <p:ext uri="{D42A27DB-BD31-4B8C-83A1-F6EECF244321}">
-                    <p14:modId xmlns:p14="http://schemas.microsoft.com/office/powerpoint/2010/main" val="194699424"/>
+                    <p14:modId xmlns:p14="http://schemas.microsoft.com/office/powerpoint/2010/main" val="1175918882"/>
                   </p:ext>
                 </p:extLst>
               </p:nvPr>
@@ -10349,16 +10446,16 @@
                           <a:r>
                             <a:rPr lang="en-US" sz="1800" dirty="0" smtClean="0">
                               <a:solidFill>
-                                <a:srgbClr val="E02829"/>
+                                <a:schemeClr val="tx2"/>
                               </a:solidFill>
                               <a:latin typeface="Cambria Math" panose="02040503050406030204" pitchFamily="18" charset="0"/>
                               <a:ea typeface="Cambria Math" panose="02040503050406030204" pitchFamily="18" charset="0"/>
                             </a:rPr>
-                            <a:t>Red</a:t>
+                            <a:t>MG1655</a:t>
                           </a:r>
                           <a:endParaRPr lang="he-IL" sz="1800" dirty="0">
                             <a:solidFill>
-                              <a:srgbClr val="E02829"/>
+                              <a:schemeClr val="tx2"/>
                             </a:solidFill>
                             <a:latin typeface="Cambria Math" panose="02040503050406030204" pitchFamily="18" charset="0"/>
                             <a:ea typeface="Cambria Math" panose="02040503050406030204" pitchFamily="18" charset="0"/>
@@ -10376,17 +10473,17 @@
                           <a:r>
                             <a:rPr lang="en-US" sz="1800" b="1" kern="1200" dirty="0" smtClean="0">
                               <a:solidFill>
-                                <a:srgbClr val="59A754"/>
+                                <a:schemeClr val="tx2"/>
                               </a:solidFill>
                               <a:latin typeface="Cambria Math" panose="02040503050406030204" pitchFamily="18" charset="0"/>
                               <a:ea typeface="Cambria Math" panose="02040503050406030204" pitchFamily="18" charset="0"/>
                               <a:cs typeface="+mn-cs"/>
                             </a:rPr>
-                            <a:t>Green</a:t>
+                            <a:t>DH12S</a:t>
                           </a:r>
                           <a:endParaRPr lang="he-IL" sz="1800" b="1" kern="1200" dirty="0">
                             <a:solidFill>
-                              <a:srgbClr val="59A754"/>
+                              <a:schemeClr val="tx2"/>
                             </a:solidFill>
                             <a:latin typeface="Cambria Math" panose="02040503050406030204" pitchFamily="18" charset="0"/>
                             <a:ea typeface="Cambria Math" panose="02040503050406030204" pitchFamily="18" charset="0"/>
@@ -10430,7 +10527,7 @@
                               <a:latin typeface="Cambria Math" panose="02040503050406030204" pitchFamily="18" charset="0"/>
                               <a:ea typeface="Cambria Math" panose="02040503050406030204" pitchFamily="18" charset="0"/>
                             </a:rPr>
-                            <a:t>0.0979</a:t>
+                            <a:t>0.36</a:t>
                           </a:r>
                           <a:endParaRPr lang="he-IL" sz="1800" dirty="0">
                             <a:latin typeface="Cambria Math" panose="02040503050406030204" pitchFamily="18" charset="0"/>
@@ -10451,7 +10548,7 @@
                               <a:latin typeface="Cambria Math" panose="02040503050406030204" pitchFamily="18" charset="0"/>
                               <a:ea typeface="Cambria Math" panose="02040503050406030204" pitchFamily="18" charset="0"/>
                             </a:rPr>
-                            <a:t>0.0983</a:t>
+                            <a:t>0.29</a:t>
                           </a:r>
                           <a:endParaRPr lang="he-IL" sz="1800" dirty="0">
                             <a:latin typeface="Cambria Math" panose="02040503050406030204" pitchFamily="18" charset="0"/>
@@ -10525,7 +10622,7 @@
                               <a:latin typeface="Cambria Math" panose="02040503050406030204" pitchFamily="18" charset="0"/>
                               <a:ea typeface="Cambria Math" panose="02040503050406030204" pitchFamily="18" charset="0"/>
                             </a:rPr>
-                            <a:t>1.332</a:t>
+                            <a:t>0.59</a:t>
                           </a:r>
                           <a:endParaRPr lang="he-IL" sz="1800" dirty="0">
                             <a:latin typeface="Cambria Math" panose="02040503050406030204" pitchFamily="18" charset="0"/>
@@ -10546,7 +10643,7 @@
                               <a:latin typeface="Cambria Math" panose="02040503050406030204" pitchFamily="18" charset="0"/>
                               <a:ea typeface="Cambria Math" panose="02040503050406030204" pitchFamily="18" charset="0"/>
                             </a:rPr>
-                            <a:t>1.136</a:t>
+                            <a:t>0.5</a:t>
                           </a:r>
                           <a:endParaRPr lang="he-IL" sz="1800" dirty="0">
                             <a:latin typeface="Cambria Math" panose="02040503050406030204" pitchFamily="18" charset="0"/>
@@ -10599,7 +10696,7 @@
                               <a:latin typeface="Cambria Math" panose="02040503050406030204" pitchFamily="18" charset="0"/>
                               <a:ea typeface="Cambria Math" panose="02040503050406030204" pitchFamily="18" charset="0"/>
                             </a:rPr>
-                            <a:t>171.67</a:t>
+                            <a:t>745</a:t>
                           </a:r>
                           <a:endParaRPr lang="he-IL" sz="1800" dirty="0">
                             <a:latin typeface="Cambria Math" panose="02040503050406030204" pitchFamily="18" charset="0"/>
@@ -10620,7 +10717,7 @@
                               <a:latin typeface="Cambria Math" panose="02040503050406030204" pitchFamily="18" charset="0"/>
                               <a:ea typeface="Cambria Math" panose="02040503050406030204" pitchFamily="18" charset="0"/>
                             </a:rPr>
-                            <a:t>0.174</a:t>
+                            <a:t>956</a:t>
                           </a:r>
                           <a:endParaRPr lang="he-IL" sz="1800" dirty="0">
                             <a:latin typeface="Cambria Math" panose="02040503050406030204" pitchFamily="18" charset="0"/>
@@ -10673,7 +10770,7 @@
                               <a:latin typeface="Cambria Math" panose="02040503050406030204" pitchFamily="18" charset="0"/>
                               <a:ea typeface="Cambria Math" panose="02040503050406030204" pitchFamily="18" charset="0"/>
                             </a:rPr>
-                            <a:t>0.00088</a:t>
+                            <a:t>0.00116</a:t>
                           </a:r>
                           <a:endParaRPr lang="he-IL" sz="1800" dirty="0">
                             <a:latin typeface="Cambria Math" panose="02040503050406030204" pitchFamily="18" charset="0"/>
@@ -10694,7 +10791,7 @@
                               <a:latin typeface="Cambria Math" panose="02040503050406030204" pitchFamily="18" charset="0"/>
                               <a:ea typeface="Cambria Math" panose="02040503050406030204" pitchFamily="18" charset="0"/>
                             </a:rPr>
-                            <a:t>1</a:t>
+                            <a:t>0.00075</a:t>
                           </a:r>
                           <a:endParaRPr lang="he-IL" sz="1800" dirty="0">
                             <a:latin typeface="Cambria Math" panose="02040503050406030204" pitchFamily="18" charset="0"/>
@@ -10747,7 +10844,7 @@
                               <a:latin typeface="Cambria Math" panose="02040503050406030204" pitchFamily="18" charset="0"/>
                               <a:ea typeface="Cambria Math" panose="02040503050406030204" pitchFamily="18" charset="0"/>
                             </a:rPr>
-                            <a:t>6.5</a:t>
+                            <a:t>1.87</a:t>
                           </a:r>
                           <a:endParaRPr lang="he-IL" sz="1800" dirty="0">
                             <a:latin typeface="Cambria Math" panose="02040503050406030204" pitchFamily="18" charset="0"/>
@@ -10768,7 +10865,7 @@
                               <a:latin typeface="Cambria Math" panose="02040503050406030204" pitchFamily="18" charset="0"/>
                               <a:ea typeface="Cambria Math" panose="02040503050406030204" pitchFamily="18" charset="0"/>
                             </a:rPr>
-                            <a:t>6.6</a:t>
+                            <a:t>-1.1</a:t>
                           </a:r>
                           <a:endParaRPr lang="he-IL" sz="1800" dirty="0">
                             <a:latin typeface="Cambria Math" panose="02040503050406030204" pitchFamily="18" charset="0"/>
@@ -10812,7 +10909,7 @@
                               <a:latin typeface="Cambria Math" panose="02040503050406030204" pitchFamily="18" charset="0"/>
                               <a:ea typeface="Cambria Math" panose="02040503050406030204" pitchFamily="18" charset="0"/>
                             </a:rPr>
-                            <a:t>0.165</a:t>
+                            <a:t>0.413</a:t>
                           </a:r>
                           <a:endParaRPr lang="he-IL" sz="1800" dirty="0">
                             <a:latin typeface="Cambria Math" panose="02040503050406030204" pitchFamily="18" charset="0"/>
@@ -10833,7 +10930,7 @@
                               <a:latin typeface="Cambria Math" panose="02040503050406030204" pitchFamily="18" charset="0"/>
                               <a:ea typeface="Cambria Math" panose="02040503050406030204" pitchFamily="18" charset="0"/>
                             </a:rPr>
-                            <a:t>0.141</a:t>
+                            <a:t>0.382</a:t>
                           </a:r>
                           <a:endParaRPr lang="he-IL" sz="1800" dirty="0">
                             <a:latin typeface="Cambria Math" panose="02040503050406030204" pitchFamily="18" charset="0"/>
@@ -10870,7 +10967,7 @@
             </a:graphic>
           </p:graphicFrame>
         </mc:Choice>
-        <mc:Fallback xmlns="">
+        <mc:Fallback>
           <p:graphicFrame>
             <p:nvGraphicFramePr>
               <p:cNvPr id="6" name="Table 5"/>
@@ -10880,7 +10977,7 @@
               <p:nvPr>
                 <p:extLst>
                   <p:ext uri="{D42A27DB-BD31-4B8C-83A1-F6EECF244321}">
-                    <p14:modId xmlns:p14="http://schemas.microsoft.com/office/powerpoint/2010/main" val="194699424"/>
+                    <p14:modId xmlns:p14="http://schemas.microsoft.com/office/powerpoint/2010/main" val="1175918882"/>
                   </p:ext>
                 </p:extLst>
               </p:nvPr>
@@ -10910,16 +11007,16 @@
                           <a:r>
                             <a:rPr lang="en-US" sz="1800" dirty="0" smtClean="0">
                               <a:solidFill>
-                                <a:srgbClr val="E02829"/>
+                                <a:schemeClr val="tx2"/>
                               </a:solidFill>
                               <a:latin typeface="Cambria Math" panose="02040503050406030204" pitchFamily="18" charset="0"/>
                               <a:ea typeface="Cambria Math" panose="02040503050406030204" pitchFamily="18" charset="0"/>
                             </a:rPr>
-                            <a:t>Red</a:t>
+                            <a:t>MG1655</a:t>
                           </a:r>
                           <a:endParaRPr lang="he-IL" sz="1800" dirty="0">
                             <a:solidFill>
-                              <a:srgbClr val="E02829"/>
+                              <a:schemeClr val="tx2"/>
                             </a:solidFill>
                             <a:latin typeface="Cambria Math" panose="02040503050406030204" pitchFamily="18" charset="0"/>
                             <a:ea typeface="Cambria Math" panose="02040503050406030204" pitchFamily="18" charset="0"/>
@@ -10937,17 +11034,17 @@
                           <a:r>
                             <a:rPr lang="en-US" sz="1800" b="1" kern="1200" dirty="0" smtClean="0">
                               <a:solidFill>
-                                <a:srgbClr val="59A754"/>
+                                <a:schemeClr val="tx2"/>
                               </a:solidFill>
                               <a:latin typeface="Cambria Math" panose="02040503050406030204" pitchFamily="18" charset="0"/>
                               <a:ea typeface="Cambria Math" panose="02040503050406030204" pitchFamily="18" charset="0"/>
                               <a:cs typeface="+mn-cs"/>
                             </a:rPr>
-                            <a:t>Green</a:t>
+                            <a:t>DH12S</a:t>
                           </a:r>
                           <a:endParaRPr lang="he-IL" sz="1800" b="1" kern="1200" dirty="0">
                             <a:solidFill>
-                              <a:srgbClr val="59A754"/>
+                              <a:schemeClr val="tx2"/>
                             </a:solidFill>
                             <a:latin typeface="Cambria Math" panose="02040503050406030204" pitchFamily="18" charset="0"/>
                             <a:ea typeface="Cambria Math" panose="02040503050406030204" pitchFamily="18" charset="0"/>
@@ -10991,7 +11088,7 @@
                               <a:latin typeface="Cambria Math" panose="02040503050406030204" pitchFamily="18" charset="0"/>
                               <a:ea typeface="Cambria Math" panose="02040503050406030204" pitchFamily="18" charset="0"/>
                             </a:rPr>
-                            <a:t>0.0979</a:t>
+                            <a:t>0.36</a:t>
                           </a:r>
                           <a:endParaRPr lang="he-IL" sz="1800" dirty="0">
                             <a:latin typeface="Cambria Math" panose="02040503050406030204" pitchFamily="18" charset="0"/>
@@ -11012,7 +11109,7 @@
                               <a:latin typeface="Cambria Math" panose="02040503050406030204" pitchFamily="18" charset="0"/>
                               <a:ea typeface="Cambria Math" panose="02040503050406030204" pitchFamily="18" charset="0"/>
                             </a:rPr>
-                            <a:t>0.0983</a:t>
+                            <a:t>0.29</a:t>
                           </a:r>
                           <a:endParaRPr lang="he-IL" sz="1800" dirty="0">
                             <a:latin typeface="Cambria Math" panose="02040503050406030204" pitchFamily="18" charset="0"/>
@@ -11032,7 +11129,7 @@
                       </a:txBody>
                       <a:tcPr>
                         <a:blipFill rotWithShape="1">
-                          <a:blip r:embed="rId17"/>
+                          <a:blip r:embed="rId16"/>
                           <a:stretch>
                             <a:fillRect l="-111620" t="-110000" b="-525000"/>
                           </a:stretch>
@@ -11052,7 +11149,7 @@
                               <a:latin typeface="Cambria Math" panose="02040503050406030204" pitchFamily="18" charset="0"/>
                               <a:ea typeface="Cambria Math" panose="02040503050406030204" pitchFamily="18" charset="0"/>
                             </a:rPr>
-                            <a:t>1.332</a:t>
+                            <a:t>0.59</a:t>
                           </a:r>
                           <a:endParaRPr lang="he-IL" sz="1800" dirty="0">
                             <a:latin typeface="Cambria Math" panose="02040503050406030204" pitchFamily="18" charset="0"/>
@@ -11073,7 +11170,7 @@
                               <a:latin typeface="Cambria Math" panose="02040503050406030204" pitchFamily="18" charset="0"/>
                               <a:ea typeface="Cambria Math" panose="02040503050406030204" pitchFamily="18" charset="0"/>
                             </a:rPr>
-                            <a:t>1.136</a:t>
+                            <a:t>0.5</a:t>
                           </a:r>
                           <a:endParaRPr lang="he-IL" sz="1800" dirty="0">
                             <a:latin typeface="Cambria Math" panose="02040503050406030204" pitchFamily="18" charset="0"/>
@@ -11093,7 +11190,7 @@
                       </a:txBody>
                       <a:tcPr>
                         <a:blipFill rotWithShape="1">
-                          <a:blip r:embed="rId17"/>
+                          <a:blip r:embed="rId16"/>
                           <a:stretch>
                             <a:fillRect l="-111620" t="-210000" b="-425000"/>
                           </a:stretch>
@@ -11113,7 +11210,7 @@
                               <a:latin typeface="Cambria Math" panose="02040503050406030204" pitchFamily="18" charset="0"/>
                               <a:ea typeface="Cambria Math" panose="02040503050406030204" pitchFamily="18" charset="0"/>
                             </a:rPr>
-                            <a:t>171.67</a:t>
+                            <a:t>745</a:t>
                           </a:r>
                           <a:endParaRPr lang="he-IL" sz="1800" dirty="0">
                             <a:latin typeface="Cambria Math" panose="02040503050406030204" pitchFamily="18" charset="0"/>
@@ -11134,7 +11231,7 @@
                               <a:latin typeface="Cambria Math" panose="02040503050406030204" pitchFamily="18" charset="0"/>
                               <a:ea typeface="Cambria Math" panose="02040503050406030204" pitchFamily="18" charset="0"/>
                             </a:rPr>
-                            <a:t>0.174</a:t>
+                            <a:t>956</a:t>
                           </a:r>
                           <a:endParaRPr lang="he-IL" sz="1800" dirty="0">
                             <a:latin typeface="Cambria Math" panose="02040503050406030204" pitchFamily="18" charset="0"/>
@@ -11154,7 +11251,7 @@
                       </a:txBody>
                       <a:tcPr>
                         <a:blipFill rotWithShape="1">
-                          <a:blip r:embed="rId17"/>
+                          <a:blip r:embed="rId16"/>
                           <a:stretch>
                             <a:fillRect l="-111620" t="-310000" b="-325000"/>
                           </a:stretch>
@@ -11174,7 +11271,7 @@
                               <a:latin typeface="Cambria Math" panose="02040503050406030204" pitchFamily="18" charset="0"/>
                               <a:ea typeface="Cambria Math" panose="02040503050406030204" pitchFamily="18" charset="0"/>
                             </a:rPr>
-                            <a:t>0.00088</a:t>
+                            <a:t>0.00116</a:t>
                           </a:r>
                           <a:endParaRPr lang="he-IL" sz="1800" dirty="0">
                             <a:latin typeface="Cambria Math" panose="02040503050406030204" pitchFamily="18" charset="0"/>
@@ -11195,7 +11292,7 @@
                               <a:latin typeface="Cambria Math" panose="02040503050406030204" pitchFamily="18" charset="0"/>
                               <a:ea typeface="Cambria Math" panose="02040503050406030204" pitchFamily="18" charset="0"/>
                             </a:rPr>
-                            <a:t>1</a:t>
+                            <a:t>0.00075</a:t>
                           </a:r>
                           <a:endParaRPr lang="he-IL" sz="1800" dirty="0">
                             <a:latin typeface="Cambria Math" panose="02040503050406030204" pitchFamily="18" charset="0"/>
@@ -11215,7 +11312,7 @@
                       </a:txBody>
                       <a:tcPr>
                         <a:blipFill rotWithShape="1">
-                          <a:blip r:embed="rId17"/>
+                          <a:blip r:embed="rId16"/>
                           <a:stretch>
                             <a:fillRect l="-111620" t="-410000" b="-225000"/>
                           </a:stretch>
@@ -11235,7 +11332,7 @@
                               <a:latin typeface="Cambria Math" panose="02040503050406030204" pitchFamily="18" charset="0"/>
                               <a:ea typeface="Cambria Math" panose="02040503050406030204" pitchFamily="18" charset="0"/>
                             </a:rPr>
-                            <a:t>6.5</a:t>
+                            <a:t>1.87</a:t>
                           </a:r>
                           <a:endParaRPr lang="he-IL" sz="1800" dirty="0">
                             <a:latin typeface="Cambria Math" panose="02040503050406030204" pitchFamily="18" charset="0"/>
@@ -11256,7 +11353,7 @@
                               <a:latin typeface="Cambria Math" panose="02040503050406030204" pitchFamily="18" charset="0"/>
                               <a:ea typeface="Cambria Math" panose="02040503050406030204" pitchFamily="18" charset="0"/>
                             </a:rPr>
-                            <a:t>6.6</a:t>
+                            <a:t>-1.1</a:t>
                           </a:r>
                           <a:endParaRPr lang="he-IL" sz="1800" dirty="0">
                             <a:latin typeface="Cambria Math" panose="02040503050406030204" pitchFamily="18" charset="0"/>
@@ -11300,7 +11397,7 @@
                               <a:latin typeface="Cambria Math" panose="02040503050406030204" pitchFamily="18" charset="0"/>
                               <a:ea typeface="Cambria Math" panose="02040503050406030204" pitchFamily="18" charset="0"/>
                             </a:rPr>
-                            <a:t>0.165</a:t>
+                            <a:t>0.413</a:t>
                           </a:r>
                           <a:endParaRPr lang="he-IL" sz="1800" dirty="0">
                             <a:latin typeface="Cambria Math" panose="02040503050406030204" pitchFamily="18" charset="0"/>
@@ -11321,7 +11418,7 @@
                               <a:latin typeface="Cambria Math" panose="02040503050406030204" pitchFamily="18" charset="0"/>
                               <a:ea typeface="Cambria Math" panose="02040503050406030204" pitchFamily="18" charset="0"/>
                             </a:rPr>
-                            <a:t>0.141</a:t>
+                            <a:t>0.382</a:t>
                           </a:r>
                           <a:endParaRPr lang="he-IL" sz="1800" dirty="0">
                             <a:latin typeface="Cambria Math" panose="02040503050406030204" pitchFamily="18" charset="0"/>
@@ -11368,7 +11465,7 @@
           <p:nvPr/>
         </p:nvPicPr>
         <p:blipFill>
-          <a:blip r:embed="rId18">
+          <a:blip r:embed="rId17">
             <a:extLst>
               <a:ext uri="{28A0092B-C50C-407E-A947-70E740481C1C}">
                 <a14:useLocalDpi xmlns:a14="http://schemas.microsoft.com/office/drawing/2010/main" val="0"/>
@@ -11499,8 +11596,8 @@
           </a:fontRef>
         </p:style>
       </p:cxnSp>
-      <mc:AlternateContent xmlns:mc="http://schemas.openxmlformats.org/markup-compatibility/2006" xmlns:a14="http://schemas.microsoft.com/office/drawing/2010/main">
-        <mc:Choice Requires="a14">
+      <mc:AlternateContent xmlns:mc="http://schemas.openxmlformats.org/markup-compatibility/2006">
+        <mc:Choice xmlns:a14="http://schemas.microsoft.com/office/drawing/2010/main" Requires="a14">
           <p:sp>
             <p:nvSpPr>
               <p:cNvPr id="14" name="Rectangle 13"/>
@@ -11510,7 +11607,7 @@
             <p:spPr>
               <a:xfrm>
                 <a:off x="12613101" y="28885909"/>
-                <a:ext cx="3555140" cy="954107"/>
+                <a:ext cx="3356368" cy="954107"/>
               </a:xfrm>
               <a:prstGeom prst="rect">
                 <a:avLst/>
@@ -11577,10 +11674,10 @@
                         <m:t>.</m:t>
                       </m:r>
                       <m:r>
-                        <a:rPr lang="en-US" altLang="he-IL" i="1">
+                        <a:rPr lang="en-US" altLang="he-IL" b="0" i="1" smtClean="0">
                           <a:latin typeface="Cambria Math"/>
                         </a:rPr>
-                        <m:t>479</m:t>
+                        <m:t>523</m:t>
                       </m:r>
                       <m:r>
                         <a:rPr lang="en-US" altLang="he-IL" i="1">
@@ -11604,7 +11701,7 @@
                         <a:rPr lang="en-US" altLang="he-IL" i="1">
                           <a:latin typeface="Cambria Math"/>
                         </a:rPr>
-                        <m:t>0008</m:t>
+                        <m:t>001</m:t>
                       </m:r>
                     </m:oMath>
                   </m:oMathPara>
@@ -11650,16 +11747,16 @@
                         <m:t>0</m:t>
                       </m:r>
                       <m:r>
-                        <a:rPr lang="en-US" altLang="he-IL" i="1">
+                        <a:rPr lang="en-US" altLang="he-IL" b="0" i="1" smtClean="0">
                           <a:latin typeface="Cambria Math"/>
                         </a:rPr>
                         <m:t>.</m:t>
                       </m:r>
                       <m:r>
-                        <a:rPr lang="en-US" altLang="he-IL" i="1">
+                        <a:rPr lang="en-US" altLang="he-IL" b="0" i="1" smtClean="0">
                           <a:latin typeface="Cambria Math"/>
                         </a:rPr>
-                        <m:t>0777</m:t>
+                        <m:t>118</m:t>
                       </m:r>
                       <m:r>
                         <a:rPr lang="en-US" altLang="he-IL" i="1">
@@ -11680,10 +11777,10 @@
                         <m:t>.</m:t>
                       </m:r>
                       <m:r>
-                        <a:rPr lang="en-US" altLang="he-IL" i="1">
+                        <a:rPr lang="en-US" altLang="he-IL" b="0" i="1" smtClean="0">
                           <a:latin typeface="Cambria Math"/>
                         </a:rPr>
-                        <m:t>0004</m:t>
+                        <m:t>0005</m:t>
                       </m:r>
                     </m:oMath>
                   </m:oMathPara>
@@ -11695,7 +11792,7 @@
             </p:txBody>
           </p:sp>
         </mc:Choice>
-        <mc:Fallback xmlns="">
+        <mc:Fallback>
           <p:sp>
             <p:nvSpPr>
               <p:cNvPr id="14" name="Rectangle 13"/>
@@ -11707,13 +11804,13 @@
             <p:spPr>
               <a:xfrm>
                 <a:off x="12613101" y="28885909"/>
-                <a:ext cx="3555140" cy="954107"/>
+                <a:ext cx="3356368" cy="954107"/>
               </a:xfrm>
               <a:prstGeom prst="rect">
                 <a:avLst/>
               </a:prstGeom>
               <a:blipFill rotWithShape="1">
-                <a:blip r:embed="rId19"/>
+                <a:blip r:embed="rId18"/>
                 <a:stretch>
                   <a:fillRect/>
                 </a:stretch>
@@ -11880,7 +11977,7 @@
             <a:r>
               <a:rPr lang="en-US" altLang="he-IL" sz="3900" b="1" dirty="0" smtClean="0">
                 <a:solidFill>
-                  <a:srgbClr val="E02829"/>
+                  <a:srgbClr val="3B7EB5"/>
                 </a:solidFill>
                 <a:latin typeface="Calibri" pitchFamily="34" charset="0"/>
               </a:rPr>
@@ -11901,6 +11998,9 @@
             </a:r>
             <a:r>
               <a:rPr lang="en-US" sz="2500" b="1" dirty="0" smtClean="0">
+                <a:solidFill>
+                  <a:srgbClr val="3B7EB5"/>
+                </a:solidFill>
                 <a:latin typeface="Times New Roman" pitchFamily="18" charset="0"/>
               </a:rPr>
               <a:t>predict competitions </a:t>
@@ -11913,9 +12013,21 @@
             </a:r>
             <a:r>
               <a:rPr lang="en-US" sz="2500" b="1" dirty="0" smtClean="0">
+                <a:solidFill>
+                  <a:srgbClr val="3B7EB5"/>
+                </a:solidFill>
                 <a:latin typeface="Times New Roman" pitchFamily="18" charset="0"/>
               </a:rPr>
-              <a:t>estimate selection coefficients</a:t>
+              <a:t>infer  selection </a:t>
+            </a:r>
+            <a:r>
+              <a:rPr lang="en-US" sz="2500" b="1" dirty="0" smtClean="0">
+                <a:solidFill>
+                  <a:srgbClr val="3B7EB5"/>
+                </a:solidFill>
+                <a:latin typeface="Times New Roman" pitchFamily="18" charset="0"/>
+              </a:rPr>
+              <a:t>coefficients</a:t>
             </a:r>
             <a:r>
               <a:rPr lang="en-US" sz="2500" dirty="0" smtClean="0">
@@ -11925,6 +12037,9 @@
             </a:r>
             <a:r>
               <a:rPr lang="en-US" sz="2500" b="1" dirty="0" smtClean="0">
+                <a:solidFill>
+                  <a:srgbClr val="3B7EB5"/>
+                </a:solidFill>
                 <a:latin typeface="Times New Roman" pitchFamily="18" charset="0"/>
               </a:rPr>
               <a:t>experiments and models </a:t>
@@ -12058,7 +12173,7 @@
           <p:nvPr/>
         </p:nvPicPr>
         <p:blipFill>
-          <a:blip r:embed="rId20">
+          <a:blip r:embed="rId19">
             <a:extLst>
               <a:ext uri="{28A0092B-C50C-407E-A947-70E740481C1C}">
                 <a14:useLocalDpi xmlns:a14="http://schemas.microsoft.com/office/drawing/2010/main" val="0"/>
@@ -12099,7 +12214,7 @@
           <p:nvPr/>
         </p:nvPicPr>
         <p:blipFill>
-          <a:blip r:embed="rId21">
+          <a:blip r:embed="rId20">
             <a:extLst>
               <a:ext uri="{28A0092B-C50C-407E-A947-70E740481C1C}">
                 <a14:useLocalDpi xmlns:a14="http://schemas.microsoft.com/office/drawing/2010/main" val="0"/>
@@ -12163,11 +12278,11 @@
           <p:nvPr/>
         </p:nvPicPr>
         <p:blipFill>
-          <a:blip r:embed="rId22">
+          <a:blip r:embed="rId21">
             <a:extLst>
               <a:ext uri="{BEBA8EAE-BF5A-486C-A8C5-ECC9F3942E4B}">
                 <a14:imgProps xmlns:a14="http://schemas.microsoft.com/office/drawing/2010/main">
-                  <a14:imgLayer r:embed="rId23">
+                  <a14:imgLayer r:embed="rId22">
                     <a14:imgEffect>
                       <a14:backgroundRemoval t="0" b="100000" l="0" r="100000"/>
                     </a14:imgEffect>
@@ -12213,7 +12328,7 @@
           <p:nvPr/>
         </p:nvPicPr>
         <p:blipFill>
-          <a:blip r:embed="rId24">
+          <a:blip r:embed="rId23">
             <a:extLst>
               <a:ext uri="{28A0092B-C50C-407E-A947-70E740481C1C}">
                 <a14:useLocalDpi xmlns:a14="http://schemas.microsoft.com/office/drawing/2010/main" val="0"/>
@@ -12478,7 +12593,7 @@
             <p:nvPr/>
           </p:nvPicPr>
           <p:blipFill>
-            <a:blip r:embed="rId25">
+            <a:blip r:embed="rId24">
               <a:extLst>
                 <a:ext uri="{28A0092B-C50C-407E-A947-70E740481C1C}">
                   <a14:useLocalDpi xmlns:a14="http://schemas.microsoft.com/office/drawing/2010/main" val="0"/>
@@ -12551,7 +12666,7 @@
           <p:nvPr/>
         </p:nvPicPr>
         <p:blipFill rotWithShape="1">
-          <a:blip r:embed="rId26">
+          <a:blip r:embed="rId25">
             <a:extLst>
               <a:ext uri="{28A0092B-C50C-407E-A947-70E740481C1C}">
                 <a14:useLocalDpi xmlns:a14="http://schemas.microsoft.com/office/drawing/2010/main" val="0"/>
@@ -12672,88 +12787,6 @@
           </a:p>
         </p:txBody>
       </p:sp>
-      <p:pic>
-        <p:nvPicPr>
-          <p:cNvPr id="11" name="Picture 3" descr="D:\university\presentations\GRC 2015\all_curves.png"/>
-          <p:cNvPicPr>
-            <a:picLocks noChangeAspect="1" noChangeArrowheads="1"/>
-          </p:cNvPicPr>
-          <p:nvPr/>
-        </p:nvPicPr>
-        <p:blipFill>
-          <a:blip r:embed="rId27">
-            <a:extLst>
-              <a:ext uri="{28A0092B-C50C-407E-A947-70E740481C1C}">
-                <a14:useLocalDpi xmlns:a14="http://schemas.microsoft.com/office/drawing/2010/main" val="0"/>
-              </a:ext>
-            </a:extLst>
-          </a:blip>
-          <a:srcRect/>
-          <a:stretch>
-            <a:fillRect/>
-          </a:stretch>
-        </p:blipFill>
-        <p:spPr bwMode="auto">
-          <a:xfrm>
-            <a:off x="1630800" y="16364855"/>
-            <a:ext cx="7748588" cy="5157788"/>
-          </a:xfrm>
-          <a:prstGeom prst="rect">
-            <a:avLst/>
-          </a:prstGeom>
-          <a:noFill/>
-          <a:extLst>
-            <a:ext uri="{909E8E84-426E-40DD-AFC4-6F175D3DCCD1}">
-              <a14:hiddenFill xmlns:a14="http://schemas.microsoft.com/office/drawing/2010/main">
-                <a:solidFill>
-                  <a:srgbClr val="FFFFFF"/>
-                </a:solidFill>
-              </a14:hiddenFill>
-            </a:ext>
-          </a:extLst>
-        </p:spPr>
-      </p:pic>
-      <p:pic>
-        <p:nvPicPr>
-          <p:cNvPr id="1029" name="Picture 5" descr="D:\university\presentations\GRC 2015\competition.png"/>
-          <p:cNvPicPr>
-            <a:picLocks noChangeAspect="1" noChangeArrowheads="1"/>
-          </p:cNvPicPr>
-          <p:nvPr/>
-        </p:nvPicPr>
-        <p:blipFill>
-          <a:blip r:embed="rId28">
-            <a:extLst>
-              <a:ext uri="{28A0092B-C50C-407E-A947-70E740481C1C}">
-                <a14:useLocalDpi xmlns:a14="http://schemas.microsoft.com/office/drawing/2010/main" val="0"/>
-              </a:ext>
-            </a:extLst>
-          </a:blip>
-          <a:srcRect/>
-          <a:stretch>
-            <a:fillRect/>
-          </a:stretch>
-        </p:blipFill>
-        <p:spPr bwMode="auto">
-          <a:xfrm>
-            <a:off x="11304000" y="12636000"/>
-            <a:ext cx="7748588" cy="5310188"/>
-          </a:xfrm>
-          <a:prstGeom prst="rect">
-            <a:avLst/>
-          </a:prstGeom>
-          <a:noFill/>
-          <a:extLst>
-            <a:ext uri="{909E8E84-426E-40DD-AFC4-6F175D3DCCD1}">
-              <a14:hiddenFill xmlns:a14="http://schemas.microsoft.com/office/drawing/2010/main">
-                <a:solidFill>
-                  <a:srgbClr val="FFFFFF"/>
-                </a:solidFill>
-              </a14:hiddenFill>
-            </a:ext>
-          </a:extLst>
-        </p:spPr>
-      </p:pic>
       <p:sp>
         <p:nvSpPr>
           <p:cNvPr id="31" name="Rectangle 30"/>
@@ -12899,7 +12932,7 @@
           <p:nvPr/>
         </p:nvPicPr>
         <p:blipFill>
-          <a:blip r:embed="rId29">
+          <a:blip r:embed="rId26">
             <a:extLst>
               <a:ext uri="{28A0092B-C50C-407E-A947-70E740481C1C}">
                 <a14:useLocalDpi xmlns:a14="http://schemas.microsoft.com/office/drawing/2010/main" val="0"/>
@@ -13074,6 +13107,129 @@
           </a:p>
         </p:txBody>
       </p:sp>
+      <p:pic>
+        <p:nvPicPr>
+          <p:cNvPr id="14345" name="Picture 5" descr="D:\university\presentations\GRC 2015\model_fits_poster.png"/>
+          <p:cNvPicPr>
+            <a:picLocks noChangeAspect="1" noChangeArrowheads="1"/>
+          </p:cNvPicPr>
+          <p:nvPr/>
+        </p:nvPicPr>
+        <p:blipFill>
+          <a:blip r:embed="rId27">
+            <a:extLst>
+              <a:ext uri="{28A0092B-C50C-407E-A947-70E740481C1C}">
+                <a14:useLocalDpi xmlns:a14="http://schemas.microsoft.com/office/drawing/2010/main" val="0"/>
+              </a:ext>
+            </a:extLst>
+          </a:blip>
+          <a:srcRect/>
+          <a:stretch>
+            <a:fillRect/>
+          </a:stretch>
+        </p:blipFill>
+        <p:spPr bwMode="auto">
+          <a:xfrm>
+            <a:off x="1630800" y="25887600"/>
+            <a:ext cx="7748588" cy="5297487"/>
+          </a:xfrm>
+          <a:prstGeom prst="rect">
+            <a:avLst/>
+          </a:prstGeom>
+          <a:noFill/>
+          <a:extLst>
+            <a:ext uri="{909E8E84-426E-40DD-AFC4-6F175D3DCCD1}">
+              <a14:hiddenFill xmlns:a14="http://schemas.microsoft.com/office/drawing/2010/main">
+                <a:solidFill>
+                  <a:srgbClr val="FFFFFF"/>
+                </a:solidFill>
+              </a14:hiddenFill>
+            </a:ext>
+          </a:extLst>
+        </p:spPr>
+      </p:pic>
+      <p:pic>
+        <p:nvPicPr>
+          <p:cNvPr id="1031" name="Picture 7" descr="D:\university\presentations\GRC 2015\competition_poster.png"/>
+          <p:cNvPicPr>
+            <a:picLocks noChangeAspect="1" noChangeArrowheads="1"/>
+          </p:cNvPicPr>
+          <p:nvPr/>
+        </p:nvPicPr>
+        <p:blipFill>
+          <a:blip r:embed="rId28">
+            <a:extLst>
+              <a:ext uri="{28A0092B-C50C-407E-A947-70E740481C1C}">
+                <a14:useLocalDpi xmlns:a14="http://schemas.microsoft.com/office/drawing/2010/main" val="0"/>
+              </a:ext>
+            </a:extLst>
+          </a:blip>
+          <a:srcRect/>
+          <a:stretch>
+            <a:fillRect/>
+          </a:stretch>
+        </p:blipFill>
+        <p:spPr bwMode="auto">
+          <a:xfrm>
+            <a:off x="11304000" y="12636000"/>
+            <a:ext cx="7748588" cy="5310187"/>
+          </a:xfrm>
+          <a:prstGeom prst="rect">
+            <a:avLst/>
+          </a:prstGeom>
+          <a:noFill/>
+          <a:extLst>
+            <a:ext uri="{909E8E84-426E-40DD-AFC4-6F175D3DCCD1}">
+              <a14:hiddenFill xmlns:a14="http://schemas.microsoft.com/office/drawing/2010/main">
+                <a:solidFill>
+                  <a:srgbClr val="FFFFFF"/>
+                </a:solidFill>
+              </a14:hiddenFill>
+            </a:ext>
+          </a:extLst>
+        </p:spPr>
+      </p:pic>
+      <p:pic>
+        <p:nvPicPr>
+          <p:cNvPr id="1035" name="Picture 11" descr="D:\university\presentations\GRC 2015\all_curves_poster.png"/>
+          <p:cNvPicPr>
+            <a:picLocks noChangeAspect="1" noChangeArrowheads="1"/>
+          </p:cNvPicPr>
+          <p:nvPr/>
+        </p:nvPicPr>
+        <p:blipFill>
+          <a:blip r:embed="rId29">
+            <a:extLst>
+              <a:ext uri="{28A0092B-C50C-407E-A947-70E740481C1C}">
+                <a14:useLocalDpi xmlns:a14="http://schemas.microsoft.com/office/drawing/2010/main" val="0"/>
+              </a:ext>
+            </a:extLst>
+          </a:blip>
+          <a:srcRect/>
+          <a:stretch>
+            <a:fillRect/>
+          </a:stretch>
+        </p:blipFill>
+        <p:spPr bwMode="auto">
+          <a:xfrm>
+            <a:off x="1630800" y="15982139"/>
+            <a:ext cx="7583487" cy="5157788"/>
+          </a:xfrm>
+          <a:prstGeom prst="rect">
+            <a:avLst/>
+          </a:prstGeom>
+          <a:noFill/>
+          <a:extLst>
+            <a:ext uri="{909E8E84-426E-40DD-AFC4-6F175D3DCCD1}">
+              <a14:hiddenFill xmlns:a14="http://schemas.microsoft.com/office/drawing/2010/main">
+                <a:solidFill>
+                  <a:srgbClr val="FFFFFF"/>
+                </a:solidFill>
+              </a14:hiddenFill>
+            </a:ext>
+          </a:extLst>
+        </p:spPr>
+      </p:pic>
     </p:spTree>
   </p:cSld>
   <p:clrMapOvr>

</xml_diff>

<commit_message>
change color, verify numbers
</commit_message>
<xml_diff>
--- a/poster.pptx
+++ b/poster.pptx
@@ -254,7 +254,7 @@
             <a:fld id="{4DB31F7E-24C3-4F74-B155-4FAB7B65A36F}" type="datetime1">
               <a:rPr lang="en-US" altLang="he-IL"/>
               <a:pPr/>
-              <a:t>6/21/2015</a:t>
+              <a:t>6/22/2015</a:t>
             </a:fld>
             <a:endParaRPr lang="en-US" altLang="he-IL"/>
           </a:p>
@@ -4428,13 +4428,7 @@
                   <a:rPr lang="en-US" altLang="he-IL" sz="2500" dirty="0" smtClean="0">
                     <a:latin typeface="Times New Roman" pitchFamily="18" charset="0"/>
                   </a:rPr>
-                  <a:t> the frequency of the </a:t>
-                </a:r>
-                <a:r>
-                  <a:rPr lang="en-US" altLang="he-IL" sz="2500" dirty="0" smtClean="0">
-                    <a:latin typeface="Times New Roman" pitchFamily="18" charset="0"/>
-                  </a:rPr>
-                  <a:t>advantageous strain </a:t>
+                  <a:t> the frequency of the advantageous strain </a:t>
                 </a:r>
                 <a14:m>
                   <m:oMath xmlns:m="http://schemas.openxmlformats.org/officeDocument/2006/math">
@@ -4757,16 +4751,7 @@
                     </a:solidFill>
                     <a:latin typeface="Times New Roman" pitchFamily="18" charset="0"/>
                   </a:rPr>
-                  <a:t>selection </a:t>
-                </a:r>
-                <a:r>
-                  <a:rPr lang="en-US" altLang="he-IL" sz="2500" dirty="0" smtClean="0">
-                    <a:solidFill>
-                      <a:srgbClr val="3B7EB5"/>
-                    </a:solidFill>
-                    <a:latin typeface="Times New Roman" pitchFamily="18" charset="0"/>
-                  </a:rPr>
-                  <a:t>coefficient </a:t>
+                  <a:t>selection coefficient </a:t>
                 </a:r>
                 <a:r>
                   <a:rPr lang="en-US" altLang="he-IL" sz="2500" dirty="0" smtClean="0">
@@ -4774,9 +4759,6 @@
                   </a:rPr>
                   <a:t>of the advantageous strain.</a:t>
                 </a:r>
-                <a:endParaRPr lang="en-US" altLang="he-IL" sz="2500" dirty="0" smtClean="0">
-                  <a:latin typeface="Times New Roman" pitchFamily="18" charset="0"/>
-                </a:endParaRPr>
               </a:p>
               <a:p>
                 <a:pPr indent="180000" eaLnBrk="1" hangingPunct="1">
@@ -4825,19 +4807,7 @@
                   <a:rPr lang="en-US" altLang="he-IL" sz="2500" dirty="0" smtClean="0">
                     <a:latin typeface="Times New Roman" pitchFamily="18" charset="0"/>
                   </a:rPr>
-                  <a:t>We fit the above  equation to the frequency of the </a:t>
-                </a:r>
-                <a:r>
-                  <a:rPr lang="en-US" altLang="he-IL" sz="2500" dirty="0" smtClean="0">
-                    <a:latin typeface="Times New Roman" pitchFamily="18" charset="0"/>
-                  </a:rPr>
-                  <a:t>advantageous strain </a:t>
-                </a:r>
-                <a:r>
-                  <a:rPr lang="en-US" altLang="he-IL" sz="2500" dirty="0" smtClean="0">
-                    <a:latin typeface="Times New Roman" pitchFamily="18" charset="0"/>
-                  </a:rPr>
-                  <a:t>in the competition simulation. </a:t>
+                  <a:t>We fit the above  equation to the frequency of the advantageous strain in the competition simulation. </a:t>
                 </a:r>
               </a:p>
               <a:p>
@@ -5140,7 +5110,7 @@
       </mc:AlternateContent>
       <p:pic>
         <p:nvPicPr>
-          <p:cNvPr id="1034" name="Picture 10" descr="D:\university\presentations\GRC 2015\frequency_fit_poster.png"/>
+          <p:cNvPr id="1029" name="Picture 5" descr="D:\university\presentations\GRC 2015\frequency_fit_poster.png"/>
           <p:cNvPicPr>
             <a:picLocks noChangeAspect="1" noChangeArrowheads="1"/>
           </p:cNvPicPr>
@@ -5162,7 +5132,7 @@
         <p:spPr bwMode="auto">
           <a:xfrm>
             <a:off x="11304000" y="28623600"/>
-            <a:ext cx="7748587" cy="5297487"/>
+            <a:ext cx="7748588" cy="5297488"/>
           </a:xfrm>
           <a:prstGeom prst="rect">
             <a:avLst/>
@@ -5179,8 +5149,8 @@
           </a:extLst>
         </p:spPr>
       </p:pic>
-      <mc:AlternateContent xmlns:mc="http://schemas.openxmlformats.org/markup-compatibility/2006">
-        <mc:Choice xmlns:a14="http://schemas.microsoft.com/office/drawing/2010/main" Requires="a14">
+      <mc:AlternateContent xmlns:mc="http://schemas.openxmlformats.org/markup-compatibility/2006" xmlns:a14="http://schemas.microsoft.com/office/drawing/2010/main">
+        <mc:Choice Requires="a14">
           <p:sp>
             <p:nvSpPr>
               <p:cNvPr id="14340" name="Text Box 11"/>
@@ -5413,16 +5383,7 @@
                     </a:solidFill>
                     <a:latin typeface="Times New Roman"/>
                   </a:rPr>
-                  <a:t>E</a:t>
-                </a:r>
-                <a:r>
-                  <a:rPr lang="en-US" sz="2500" i="1" dirty="0" smtClean="0">
-                    <a:solidFill>
-                      <a:srgbClr val="000000"/>
-                    </a:solidFill>
-                    <a:latin typeface="Times New Roman"/>
-                  </a:rPr>
-                  <a:t>. coli </a:t>
+                  <a:t>E. coli </a:t>
                 </a:r>
                 <a:r>
                   <a:rPr lang="en-US" sz="2500" dirty="0" smtClean="0">
@@ -6217,7 +6178,7 @@
             </p:txBody>
           </p:sp>
         </mc:Choice>
-        <mc:Fallback>
+        <mc:Fallback xmlns="">
           <p:sp>
             <p:nvSpPr>
               <p:cNvPr id="14340" name="Text Box 11"/>
@@ -8003,8 +7964,8 @@
           </a:p>
         </p:txBody>
       </p:sp>
-      <mc:AlternateContent xmlns:mc="http://schemas.openxmlformats.org/markup-compatibility/2006">
-        <mc:Choice xmlns:a14="http://schemas.microsoft.com/office/drawing/2010/main" Requires="a14">
+      <mc:AlternateContent xmlns:mc="http://schemas.openxmlformats.org/markup-compatibility/2006" xmlns:a14="http://schemas.microsoft.com/office/drawing/2010/main">
+        <mc:Choice Requires="a14">
           <p:sp>
             <p:nvSpPr>
               <p:cNvPr id="14342" name="Text Box 12"/>
@@ -8672,7 +8633,7 @@
             </p:txBody>
           </p:sp>
         </mc:Choice>
-        <mc:Fallback>
+        <mc:Fallback xmlns="">
           <p:sp>
             <p:nvSpPr>
               <p:cNvPr id="14342" name="Text Box 12"/>
@@ -10416,7 +10377,7 @@
               <p:nvPr>
                 <p:extLst>
                   <p:ext uri="{D42A27DB-BD31-4B8C-83A1-F6EECF244321}">
-                    <p14:modId xmlns:p14="http://schemas.microsoft.com/office/powerpoint/2010/main" val="1175918882"/>
+                    <p14:modId xmlns:p14="http://schemas.microsoft.com/office/powerpoint/2010/main" val="2459022874"/>
                   </p:ext>
                 </p:extLst>
               </p:nvPr>
@@ -10527,7 +10488,7 @@
                               <a:latin typeface="Cambria Math" panose="02040503050406030204" pitchFamily="18" charset="0"/>
                               <a:ea typeface="Cambria Math" panose="02040503050406030204" pitchFamily="18" charset="0"/>
                             </a:rPr>
-                            <a:t>0.36</a:t>
+                            <a:t>0.185</a:t>
                           </a:r>
                           <a:endParaRPr lang="he-IL" sz="1800" dirty="0">
                             <a:latin typeface="Cambria Math" panose="02040503050406030204" pitchFamily="18" charset="0"/>
@@ -10548,7 +10509,7 @@
                               <a:latin typeface="Cambria Math" panose="02040503050406030204" pitchFamily="18" charset="0"/>
                               <a:ea typeface="Cambria Math" panose="02040503050406030204" pitchFamily="18" charset="0"/>
                             </a:rPr>
-                            <a:t>0.29</a:t>
+                            <a:t>0.183</a:t>
                           </a:r>
                           <a:endParaRPr lang="he-IL" sz="1800" dirty="0">
                             <a:latin typeface="Cambria Math" panose="02040503050406030204" pitchFamily="18" charset="0"/>
@@ -10696,7 +10657,7 @@
                               <a:latin typeface="Cambria Math" panose="02040503050406030204" pitchFamily="18" charset="0"/>
                               <a:ea typeface="Cambria Math" panose="02040503050406030204" pitchFamily="18" charset="0"/>
                             </a:rPr>
-                            <a:t>745</a:t>
+                            <a:t>0.39</a:t>
                           </a:r>
                           <a:endParaRPr lang="he-IL" sz="1800" dirty="0">
                             <a:latin typeface="Cambria Math" panose="02040503050406030204" pitchFamily="18" charset="0"/>
@@ -10717,7 +10678,7 @@
                               <a:latin typeface="Cambria Math" panose="02040503050406030204" pitchFamily="18" charset="0"/>
                               <a:ea typeface="Cambria Math" panose="02040503050406030204" pitchFamily="18" charset="0"/>
                             </a:rPr>
-                            <a:t>956</a:t>
+                            <a:t>0.86</a:t>
                           </a:r>
                           <a:endParaRPr lang="he-IL" sz="1800" dirty="0">
                             <a:latin typeface="Cambria Math" panose="02040503050406030204" pitchFamily="18" charset="0"/>
@@ -10770,7 +10731,7 @@
                               <a:latin typeface="Cambria Math" panose="02040503050406030204" pitchFamily="18" charset="0"/>
                               <a:ea typeface="Cambria Math" panose="02040503050406030204" pitchFamily="18" charset="0"/>
                             </a:rPr>
-                            <a:t>0.00116</a:t>
+                            <a:t>2.97</a:t>
                           </a:r>
                           <a:endParaRPr lang="he-IL" sz="1800" dirty="0">
                             <a:latin typeface="Cambria Math" panose="02040503050406030204" pitchFamily="18" charset="0"/>
@@ -10791,7 +10752,7 @@
                               <a:latin typeface="Cambria Math" panose="02040503050406030204" pitchFamily="18" charset="0"/>
                               <a:ea typeface="Cambria Math" panose="02040503050406030204" pitchFamily="18" charset="0"/>
                             </a:rPr>
-                            <a:t>0.00075</a:t>
+                            <a:t>1</a:t>
                           </a:r>
                           <a:endParaRPr lang="he-IL" sz="1800" dirty="0">
                             <a:latin typeface="Cambria Math" panose="02040503050406030204" pitchFamily="18" charset="0"/>
@@ -10844,7 +10805,7 @@
                               <a:latin typeface="Cambria Math" panose="02040503050406030204" pitchFamily="18" charset="0"/>
                               <a:ea typeface="Cambria Math" panose="02040503050406030204" pitchFamily="18" charset="0"/>
                             </a:rPr>
-                            <a:t>1.87</a:t>
+                            <a:t>0.18</a:t>
                           </a:r>
                           <a:endParaRPr lang="he-IL" sz="1800" dirty="0">
                             <a:latin typeface="Cambria Math" panose="02040503050406030204" pitchFamily="18" charset="0"/>
@@ -10865,7 +10826,7 @@
                               <a:latin typeface="Cambria Math" panose="02040503050406030204" pitchFamily="18" charset="0"/>
                               <a:ea typeface="Cambria Math" panose="02040503050406030204" pitchFamily="18" charset="0"/>
                             </a:rPr>
-                            <a:t>-1.1</a:t>
+                            <a:t>0.4</a:t>
                           </a:r>
                           <a:endParaRPr lang="he-IL" sz="1800" dirty="0">
                             <a:latin typeface="Cambria Math" panose="02040503050406030204" pitchFamily="18" charset="0"/>
@@ -10909,7 +10870,7 @@
                               <a:latin typeface="Cambria Math" panose="02040503050406030204" pitchFamily="18" charset="0"/>
                               <a:ea typeface="Cambria Math" panose="02040503050406030204" pitchFamily="18" charset="0"/>
                             </a:rPr>
-                            <a:t>0.413</a:t>
+                            <a:t>0.38</a:t>
                           </a:r>
                           <a:endParaRPr lang="he-IL" sz="1800" dirty="0">
                             <a:latin typeface="Cambria Math" panose="02040503050406030204" pitchFamily="18" charset="0"/>
@@ -10930,7 +10891,7 @@
                               <a:latin typeface="Cambria Math" panose="02040503050406030204" pitchFamily="18" charset="0"/>
                               <a:ea typeface="Cambria Math" panose="02040503050406030204" pitchFamily="18" charset="0"/>
                             </a:rPr>
-                            <a:t>0.382</a:t>
+                            <a:t>0.27</a:t>
                           </a:r>
                           <a:endParaRPr lang="he-IL" sz="1800" dirty="0">
                             <a:latin typeface="Cambria Math" panose="02040503050406030204" pitchFamily="18" charset="0"/>
@@ -10977,7 +10938,7 @@
               <p:nvPr>
                 <p:extLst>
                   <p:ext uri="{D42A27DB-BD31-4B8C-83A1-F6EECF244321}">
-                    <p14:modId xmlns:p14="http://schemas.microsoft.com/office/powerpoint/2010/main" val="1175918882"/>
+                    <p14:modId xmlns:p14="http://schemas.microsoft.com/office/powerpoint/2010/main" val="2459022874"/>
                   </p:ext>
                 </p:extLst>
               </p:nvPr>
@@ -11088,7 +11049,7 @@
                               <a:latin typeface="Cambria Math" panose="02040503050406030204" pitchFamily="18" charset="0"/>
                               <a:ea typeface="Cambria Math" panose="02040503050406030204" pitchFamily="18" charset="0"/>
                             </a:rPr>
-                            <a:t>0.36</a:t>
+                            <a:t>0.185</a:t>
                           </a:r>
                           <a:endParaRPr lang="he-IL" sz="1800" dirty="0">
                             <a:latin typeface="Cambria Math" panose="02040503050406030204" pitchFamily="18" charset="0"/>
@@ -11109,7 +11070,7 @@
                               <a:latin typeface="Cambria Math" panose="02040503050406030204" pitchFamily="18" charset="0"/>
                               <a:ea typeface="Cambria Math" panose="02040503050406030204" pitchFamily="18" charset="0"/>
                             </a:rPr>
-                            <a:t>0.29</a:t>
+                            <a:t>0.183</a:t>
                           </a:r>
                           <a:endParaRPr lang="he-IL" sz="1800" dirty="0">
                             <a:latin typeface="Cambria Math" panose="02040503050406030204" pitchFamily="18" charset="0"/>
@@ -11210,7 +11171,7 @@
                               <a:latin typeface="Cambria Math" panose="02040503050406030204" pitchFamily="18" charset="0"/>
                               <a:ea typeface="Cambria Math" panose="02040503050406030204" pitchFamily="18" charset="0"/>
                             </a:rPr>
-                            <a:t>745</a:t>
+                            <a:t>0.39</a:t>
                           </a:r>
                           <a:endParaRPr lang="he-IL" sz="1800" dirty="0">
                             <a:latin typeface="Cambria Math" panose="02040503050406030204" pitchFamily="18" charset="0"/>
@@ -11231,7 +11192,7 @@
                               <a:latin typeface="Cambria Math" panose="02040503050406030204" pitchFamily="18" charset="0"/>
                               <a:ea typeface="Cambria Math" panose="02040503050406030204" pitchFamily="18" charset="0"/>
                             </a:rPr>
-                            <a:t>956</a:t>
+                            <a:t>0.86</a:t>
                           </a:r>
                           <a:endParaRPr lang="he-IL" sz="1800" dirty="0">
                             <a:latin typeface="Cambria Math" panose="02040503050406030204" pitchFamily="18" charset="0"/>
@@ -11271,7 +11232,7 @@
                               <a:latin typeface="Cambria Math" panose="02040503050406030204" pitchFamily="18" charset="0"/>
                               <a:ea typeface="Cambria Math" panose="02040503050406030204" pitchFamily="18" charset="0"/>
                             </a:rPr>
-                            <a:t>0.00116</a:t>
+                            <a:t>2.97</a:t>
                           </a:r>
                           <a:endParaRPr lang="he-IL" sz="1800" dirty="0">
                             <a:latin typeface="Cambria Math" panose="02040503050406030204" pitchFamily="18" charset="0"/>
@@ -11292,7 +11253,7 @@
                               <a:latin typeface="Cambria Math" panose="02040503050406030204" pitchFamily="18" charset="0"/>
                               <a:ea typeface="Cambria Math" panose="02040503050406030204" pitchFamily="18" charset="0"/>
                             </a:rPr>
-                            <a:t>0.00075</a:t>
+                            <a:t>1</a:t>
                           </a:r>
                           <a:endParaRPr lang="he-IL" sz="1800" dirty="0">
                             <a:latin typeface="Cambria Math" panose="02040503050406030204" pitchFamily="18" charset="0"/>
@@ -11332,7 +11293,7 @@
                               <a:latin typeface="Cambria Math" panose="02040503050406030204" pitchFamily="18" charset="0"/>
                               <a:ea typeface="Cambria Math" panose="02040503050406030204" pitchFamily="18" charset="0"/>
                             </a:rPr>
-                            <a:t>1.87</a:t>
+                            <a:t>0.18</a:t>
                           </a:r>
                           <a:endParaRPr lang="he-IL" sz="1800" dirty="0">
                             <a:latin typeface="Cambria Math" panose="02040503050406030204" pitchFamily="18" charset="0"/>
@@ -11353,7 +11314,7 @@
                               <a:latin typeface="Cambria Math" panose="02040503050406030204" pitchFamily="18" charset="0"/>
                               <a:ea typeface="Cambria Math" panose="02040503050406030204" pitchFamily="18" charset="0"/>
                             </a:rPr>
-                            <a:t>-1.1</a:t>
+                            <a:t>0.4</a:t>
                           </a:r>
                           <a:endParaRPr lang="he-IL" sz="1800" dirty="0">
                             <a:latin typeface="Cambria Math" panose="02040503050406030204" pitchFamily="18" charset="0"/>
@@ -11397,7 +11358,7 @@
                               <a:latin typeface="Cambria Math" panose="02040503050406030204" pitchFamily="18" charset="0"/>
                               <a:ea typeface="Cambria Math" panose="02040503050406030204" pitchFamily="18" charset="0"/>
                             </a:rPr>
-                            <a:t>0.413</a:t>
+                            <a:t>0.38</a:t>
                           </a:r>
                           <a:endParaRPr lang="he-IL" sz="1800" dirty="0">
                             <a:latin typeface="Cambria Math" panose="02040503050406030204" pitchFamily="18" charset="0"/>
@@ -11418,7 +11379,7 @@
                               <a:latin typeface="Cambria Math" panose="02040503050406030204" pitchFamily="18" charset="0"/>
                               <a:ea typeface="Cambria Math" panose="02040503050406030204" pitchFamily="18" charset="0"/>
                             </a:rPr>
-                            <a:t>0.382</a:t>
+                            <a:t>0.27</a:t>
                           </a:r>
                           <a:endParaRPr lang="he-IL" sz="1800" dirty="0">
                             <a:latin typeface="Cambria Math" panose="02040503050406030204" pitchFamily="18" charset="0"/>
@@ -11606,7 +11567,7 @@
             </p:nvSpPr>
             <p:spPr>
               <a:xfrm>
-                <a:off x="12613101" y="28885909"/>
+                <a:off x="12613101" y="28646428"/>
                 <a:ext cx="3356368" cy="954107"/>
               </a:xfrm>
               <a:prstGeom prst="rect">
@@ -11677,7 +11638,7 @@
                         <a:rPr lang="en-US" altLang="he-IL" b="0" i="1" smtClean="0">
                           <a:latin typeface="Cambria Math"/>
                         </a:rPr>
-                        <m:t>523</m:t>
+                        <m:t>489</m:t>
                       </m:r>
                       <m:r>
                         <a:rPr lang="en-US" altLang="he-IL" i="1">
@@ -11756,7 +11717,7 @@
                         <a:rPr lang="en-US" altLang="he-IL" b="0" i="1" smtClean="0">
                           <a:latin typeface="Cambria Math"/>
                         </a:rPr>
-                        <m:t>118</m:t>
+                        <m:t>134</m:t>
                       </m:r>
                       <m:r>
                         <a:rPr lang="en-US" altLang="he-IL" i="1">
@@ -11780,7 +11741,13 @@
                         <a:rPr lang="en-US" altLang="he-IL" b="0" i="1" smtClean="0">
                           <a:latin typeface="Cambria Math"/>
                         </a:rPr>
-                        <m:t>0005</m:t>
+                        <m:t>000</m:t>
+                      </m:r>
+                      <m:r>
+                        <a:rPr lang="en-US" altLang="he-IL" b="0" i="1" smtClean="0">
+                          <a:latin typeface="Cambria Math"/>
+                        </a:rPr>
+                        <m:t>6</m:t>
                       </m:r>
                     </m:oMath>
                   </m:oMathPara>
@@ -11803,7 +11770,7 @@
             </p:nvSpPr>
             <p:spPr>
               <a:xfrm>
-                <a:off x="12613101" y="28885909"/>
+                <a:off x="12613101" y="28646428"/>
                 <a:ext cx="3356368" cy="954107"/>
               </a:xfrm>
               <a:prstGeom prst="rect">
@@ -12018,16 +11985,7 @@
                 </a:solidFill>
                 <a:latin typeface="Times New Roman" pitchFamily="18" charset="0"/>
               </a:rPr>
-              <a:t>infer  selection </a:t>
-            </a:r>
-            <a:r>
-              <a:rPr lang="en-US" sz="2500" b="1" dirty="0" smtClean="0">
-                <a:solidFill>
-                  <a:srgbClr val="3B7EB5"/>
-                </a:solidFill>
-                <a:latin typeface="Times New Roman" pitchFamily="18" charset="0"/>
-              </a:rPr>
-              <a:t>coefficients</a:t>
+              <a:t>infer  selection coefficients</a:t>
             </a:r>
             <a:r>
               <a:rPr lang="en-US" sz="2500" dirty="0" smtClean="0">
@@ -13109,7 +13067,7 @@
       </p:sp>
       <p:pic>
         <p:nvPicPr>
-          <p:cNvPr id="14345" name="Picture 5" descr="D:\university\presentations\GRC 2015\model_fits_poster.png"/>
+          <p:cNvPr id="11" name="Picture 2" descr="D:\university\presentations\GRC 2015\all_curves_poster.png"/>
           <p:cNvPicPr>
             <a:picLocks noChangeAspect="1" noChangeArrowheads="1"/>
           </p:cNvPicPr>
@@ -13130,8 +13088,8 @@
         </p:blipFill>
         <p:spPr bwMode="auto">
           <a:xfrm>
-            <a:off x="1630800" y="25887600"/>
-            <a:ext cx="7748588" cy="5297487"/>
+            <a:off x="1630800" y="15984000"/>
+            <a:ext cx="7748588" cy="5310188"/>
           </a:xfrm>
           <a:prstGeom prst="rect">
             <a:avLst/>
@@ -13150,7 +13108,7 @@
       </p:pic>
       <p:pic>
         <p:nvPicPr>
-          <p:cNvPr id="1031" name="Picture 7" descr="D:\university\presentations\GRC 2015\competition_poster.png"/>
+          <p:cNvPr id="16" name="Picture 4" descr="D:\university\presentations\GRC 2015\competition_poster.png"/>
           <p:cNvPicPr>
             <a:picLocks noChangeAspect="1" noChangeArrowheads="1"/>
           </p:cNvPicPr>
@@ -13172,7 +13130,7 @@
         <p:spPr bwMode="auto">
           <a:xfrm>
             <a:off x="11304000" y="12636000"/>
-            <a:ext cx="7748588" cy="5310187"/>
+            <a:ext cx="7748588" cy="5310188"/>
           </a:xfrm>
           <a:prstGeom prst="rect">
             <a:avLst/>
@@ -13191,7 +13149,7 @@
       </p:pic>
       <p:pic>
         <p:nvPicPr>
-          <p:cNvPr id="1035" name="Picture 11" descr="D:\university\presentations\GRC 2015\all_curves_poster.png"/>
+          <p:cNvPr id="25" name="Picture 6" descr="D:\university\presentations\GRC 2015\model_fits_poster.png"/>
           <p:cNvPicPr>
             <a:picLocks noChangeAspect="1" noChangeArrowheads="1"/>
           </p:cNvPicPr>
@@ -13212,8 +13170,8 @@
         </p:blipFill>
         <p:spPr bwMode="auto">
           <a:xfrm>
-            <a:off x="1630800" y="15982139"/>
-            <a:ext cx="7583487" cy="5157788"/>
+            <a:off x="1630800" y="25887600"/>
+            <a:ext cx="7748588" cy="5310188"/>
           </a:xfrm>
           <a:prstGeom prst="rect">
             <a:avLst/>

</xml_diff>